<commit_message>
Add states example, and start Directives presentation
</commit_message>
<xml_diff>
--- a/material/AngularJS Taller.pptx
+++ b/material/AngularJS Taller.pptx
@@ -1645,8 +1645,21 @@
             </a:r>
             <a:r>
               <a:rPr lang="en-US" baseline="0" dirty="0" smtClean="0"/>
-              <a:t> practice.</a:t>
-            </a:r>
+              <a:t> </a:t>
+            </a:r>
+            <a:r>
+              <a:rPr lang="en-US" baseline="0" dirty="0" smtClean="0"/>
+              <a:t>practice (</a:t>
+            </a:r>
+            <a:r>
+              <a:rPr lang="en-US" baseline="0" dirty="0" err="1" smtClean="0"/>
+              <a:t>practiceA</a:t>
+            </a:r>
+            <a:r>
+              <a:rPr lang="en-US" baseline="0" dirty="0" smtClean="0"/>
+              <a:t>).</a:t>
+            </a:r>
+            <a:endParaRPr lang="en-US" baseline="0" dirty="0" smtClean="0"/>
           </a:p>
           <a:p>
             <a:endParaRPr lang="en-US" dirty="0" smtClean="0"/>
@@ -2378,8 +2391,13 @@
             </a:pPr>
             <a:r>
               <a:rPr lang="en-US" dirty="0" smtClean="0"/>
-              <a:t> * @name practice1App.controller:MainCtrl</a:t>
-            </a:r>
+              <a:t> * @name </a:t>
+            </a:r>
+            <a:r>
+              <a:rPr lang="en-US" dirty="0" err="1" smtClean="0"/>
+              <a:t>practiceAApp.controller:MainCtrl</a:t>
+            </a:r>
+            <a:endParaRPr lang="en-US" dirty="0" smtClean="0"/>
           </a:p>
           <a:p>
             <a:pPr marL="0" indent="0">
@@ -2413,8 +2431,13 @@
             </a:pPr>
             <a:r>
               <a:rPr lang="en-US" dirty="0" smtClean="0"/>
-              <a:t> * Controller of the practice1App</a:t>
-            </a:r>
+              <a:t> * Controller of the </a:t>
+            </a:r>
+            <a:r>
+              <a:rPr lang="en-US" dirty="0" err="1" smtClean="0"/>
+              <a:t>practiceAApp</a:t>
+            </a:r>
+            <a:endParaRPr lang="en-US" dirty="0" smtClean="0"/>
           </a:p>
           <a:p>
             <a:pPr marL="0" indent="0">
@@ -2437,7 +2460,19 @@
             </a:r>
             <a:r>
               <a:rPr lang="en-US" dirty="0" smtClean="0"/>
-              <a:t>('practice1App')</a:t>
+              <a:t>(</a:t>
+            </a:r>
+            <a:r>
+              <a:rPr lang="en-US" dirty="0" smtClean="0"/>
+              <a:t>'</a:t>
+            </a:r>
+            <a:r>
+              <a:rPr lang="en-US" dirty="0" err="1" smtClean="0"/>
+              <a:t>practiceAApp</a:t>
+            </a:r>
+            <a:r>
+              <a:rPr lang="en-US" dirty="0" smtClean="0"/>
+              <a:t>')</a:t>
             </a:r>
           </a:p>
           <a:p>
@@ -3947,8 +3982,21 @@
             </a:r>
             <a:r>
               <a:rPr lang="en-US" baseline="0" dirty="0" smtClean="0"/>
-              <a:t> practice.</a:t>
-            </a:r>
+              <a:t> </a:t>
+            </a:r>
+            <a:r>
+              <a:rPr lang="en-US" baseline="0" dirty="0" smtClean="0"/>
+              <a:t>practice (</a:t>
+            </a:r>
+            <a:r>
+              <a:rPr lang="en-US" baseline="0" dirty="0" err="1" smtClean="0"/>
+              <a:t>practiceA</a:t>
+            </a:r>
+            <a:r>
+              <a:rPr lang="en-US" baseline="0" dirty="0" smtClean="0"/>
+              <a:t>).</a:t>
+            </a:r>
+            <a:endParaRPr lang="en-US" baseline="0" dirty="0" smtClean="0"/>
           </a:p>
           <a:p>
             <a:pPr marL="0" indent="0">
@@ -7148,7 +7196,11 @@
             </a:r>
             <a:r>
               <a:rPr lang="en-US" baseline="0" dirty="0" smtClean="0"/>
-              <a:t>-view in all the module HTML, but we may have an application which have multiple parts that we want to manage separately and load-refresh independent of each other for better render performance. </a:t>
+              <a:t>-view in all the module HTML, but we may have an application which have multiple parts that we want to manage </a:t>
+            </a:r>
+            <a:r>
+              <a:rPr lang="en-US" baseline="0" dirty="0" smtClean="0"/>
+              <a:t>independently with its own view, resolve, controller, etc. </a:t>
             </a:r>
             <a:endParaRPr lang="en-US" baseline="0" dirty="0" smtClean="0"/>
           </a:p>
@@ -7162,11 +7214,7 @@
             </a:r>
             <a:r>
               <a:rPr lang="en-US" baseline="0" dirty="0" smtClean="0"/>
-              <a:t> </a:t>
-            </a:r>
-            <a:r>
-              <a:rPr lang="en-US" baseline="0" dirty="0" smtClean="0"/>
-              <a:t>have a way to do that and is using the module </a:t>
+              <a:t> have a way to do that and is using the module </a:t>
             </a:r>
             <a:r>
               <a:rPr lang="en-US" baseline="0" dirty="0" err="1" smtClean="0"/>
@@ -7312,7 +7360,19 @@
             </a:r>
             <a:r>
               <a:rPr lang="en-US" baseline="0" dirty="0" smtClean="0"/>
-              <a:t>-router module has it's own way to manage routing so to start an application you should first plan which one you are going to use. I recommend the use of </a:t>
+              <a:t>-router module has it's own way to manage routing so to start an application you should first plan which one </a:t>
+            </a:r>
+            <a:r>
+              <a:rPr lang="en-US" baseline="0" dirty="0" smtClean="0"/>
+              <a:t>you'll going </a:t>
+            </a:r>
+            <a:r>
+              <a:rPr lang="en-US" baseline="0" dirty="0" smtClean="0"/>
+              <a:t>to use. I </a:t>
+            </a:r>
+            <a:r>
+              <a:rPr lang="en-US" baseline="0" dirty="0" smtClean="0"/>
+              <a:t>recommend use </a:t>
             </a:r>
             <a:r>
               <a:rPr lang="en-US" baseline="0" dirty="0" err="1" smtClean="0"/>
@@ -7320,7 +7380,15 @@
             </a:r>
             <a:r>
               <a:rPr lang="en-US" baseline="0" dirty="0" smtClean="0"/>
-              <a:t>-route and its states for complicated and large applications, and for simple applications/websites use </a:t>
+              <a:t>-route and its states for </a:t>
+            </a:r>
+            <a:r>
+              <a:rPr lang="en-US" baseline="0" dirty="0" smtClean="0"/>
+              <a:t>complex and </a:t>
+            </a:r>
+            <a:r>
+              <a:rPr lang="en-US" baseline="0" dirty="0" smtClean="0"/>
+              <a:t>large applications, and for simple applications/websites use </a:t>
             </a:r>
             <a:r>
               <a:rPr lang="en-US" baseline="0" dirty="0" err="1" smtClean="0"/>
@@ -7337,7 +7405,15 @@
           <a:p>
             <a:r>
               <a:rPr lang="en-US" baseline="0" dirty="0" smtClean="0"/>
-              <a:t>One of the main differences is a way to split views and manage the controllers/views depending on the state. This will bring the way to divide the work, reuse functionalities, refresh parts of the application, etc. </a:t>
+              <a:t>One of the main differences is a way to split views and manage the controllers/views depending on the state. This will bring the way to divide the work, reuse </a:t>
+            </a:r>
+            <a:r>
+              <a:rPr lang="en-US" baseline="0" dirty="0" smtClean="0"/>
+              <a:t>functionalities, </a:t>
+            </a:r>
+            <a:r>
+              <a:rPr lang="en-US" baseline="0" dirty="0" smtClean="0"/>
+              <a:t>etc. </a:t>
             </a:r>
           </a:p>
           <a:p>
@@ -7346,7 +7422,19 @@
           <a:p>
             <a:r>
               <a:rPr lang="en-US" baseline="0" dirty="0" smtClean="0"/>
-              <a:t>You can also use a URL Routing:</a:t>
+              <a:t>Like </a:t>
+            </a:r>
+            <a:r>
+              <a:rPr lang="en-US" baseline="0" dirty="0" err="1" smtClean="0"/>
+              <a:t>ngRoute</a:t>
+            </a:r>
+            <a:r>
+              <a:rPr lang="en-US" baseline="0" dirty="0" smtClean="0"/>
+              <a:t>, you also have URL </a:t>
+            </a:r>
+            <a:r>
+              <a:rPr lang="en-US" baseline="0" dirty="0" smtClean="0"/>
+              <a:t>Routing:</a:t>
             </a:r>
           </a:p>
           <a:p>
@@ -8029,7 +8117,7 @@
           <a:lstStyle/>
           <a:p>
             <a:r>
-              <a:rPr lang="en-US" dirty="0" smtClean="0"/>
+              <a:rPr lang="en-US" u="sng" dirty="0" smtClean="0"/>
               <a:t>a) Creates a new route manually and with Yeoman.</a:t>
             </a:r>
           </a:p>
@@ -8065,8 +8153,21 @@
             </a:r>
             <a:r>
               <a:rPr lang="en-US" baseline="0" dirty="0" smtClean="0"/>
-              <a:t> practice.</a:t>
-            </a:r>
+              <a:t> </a:t>
+            </a:r>
+            <a:r>
+              <a:rPr lang="en-US" baseline="0" dirty="0" smtClean="0"/>
+              <a:t>practice (</a:t>
+            </a:r>
+            <a:r>
+              <a:rPr lang="en-US" baseline="0" dirty="0" err="1" smtClean="0"/>
+              <a:t>practiceA</a:t>
+            </a:r>
+            <a:r>
+              <a:rPr lang="en-US" baseline="0" dirty="0" smtClean="0"/>
+              <a:t>).</a:t>
+            </a:r>
+            <a:endParaRPr lang="en-US" baseline="0" dirty="0" smtClean="0"/>
           </a:p>
           <a:p>
             <a:pPr marL="0" marR="0" indent="0" algn="l" defTabSz="914400" rtl="0" eaLnBrk="1" fontAlgn="auto" latinLnBrk="0" hangingPunct="1">
@@ -8571,11 +8672,7 @@
             </a:pPr>
             <a:r>
               <a:rPr lang="en-US" dirty="0" smtClean="0"/>
-              <a:t>	</a:t>
-            </a:r>
-            <a:r>
-              <a:rPr lang="en-US" dirty="0" smtClean="0"/>
-              <a:t>&lt;a </a:t>
+              <a:t>	&lt;a </a:t>
             </a:r>
             <a:r>
               <a:rPr lang="en-US" dirty="0" err="1" smtClean="0"/>
@@ -8585,7 +8682,6 @@
               <a:rPr lang="en-US" dirty="0" smtClean="0"/>
               <a:t>="#/test2"&gt;Test 2&lt;/a&gt;</a:t>
             </a:r>
-            <a:endParaRPr lang="en-US" dirty="0" smtClean="0"/>
           </a:p>
           <a:p>
             <a:pPr marL="228600" marR="0" indent="-228600" algn="l" defTabSz="914400" rtl="0" eaLnBrk="1" fontAlgn="auto" latinLnBrk="0" hangingPunct="1">
@@ -8627,7 +8723,7 @@
           </a:p>
           <a:p>
             <a:r>
-              <a:rPr lang="en-US" dirty="0" smtClean="0"/>
+              <a:rPr lang="en-US" u="sng" dirty="0" smtClean="0"/>
               <a:t>b) Create a project using states.</a:t>
             </a:r>
           </a:p>
@@ -8642,13 +8738,1997 @@
             </a:r>
             <a:r>
               <a:rPr lang="en-US" baseline="0" dirty="0" smtClean="0"/>
-              <a:t> folder outside the previous project, and create a new Yeoman project inside.</a:t>
+              <a:t> folder outside the </a:t>
+            </a:r>
+            <a:r>
+              <a:rPr lang="en-US" baseline="0" dirty="0" err="1" smtClean="0"/>
+              <a:t>practiceA</a:t>
+            </a:r>
+            <a:r>
+              <a:rPr lang="en-US" baseline="0" dirty="0" smtClean="0"/>
+              <a:t>, </a:t>
+            </a:r>
+            <a:r>
+              <a:rPr lang="en-US" baseline="0" dirty="0" smtClean="0"/>
+              <a:t>and create a new Yeoman project </a:t>
+            </a:r>
+            <a:r>
+              <a:rPr lang="en-US" baseline="0" dirty="0" smtClean="0"/>
+              <a:t>inside with "</a:t>
+            </a:r>
+            <a:r>
+              <a:rPr lang="en-US" baseline="0" dirty="0" err="1" smtClean="0"/>
+              <a:t>yo</a:t>
+            </a:r>
+            <a:r>
+              <a:rPr lang="en-US" baseline="0" dirty="0" smtClean="0"/>
+              <a:t> angular </a:t>
+            </a:r>
+            <a:r>
+              <a:rPr lang="en-US" baseline="0" dirty="0" err="1" smtClean="0"/>
+              <a:t>practiceB</a:t>
+            </a:r>
+            <a:r>
+              <a:rPr lang="en-US" baseline="0" dirty="0" smtClean="0"/>
+              <a:t>". We are going to leave the </a:t>
+            </a:r>
+            <a:r>
+              <a:rPr lang="en-US" baseline="0" dirty="0" err="1" smtClean="0"/>
+              <a:t>ngResource</a:t>
+            </a:r>
+            <a:r>
+              <a:rPr lang="en-US" baseline="0" dirty="0" smtClean="0"/>
+              <a:t> and the </a:t>
+            </a:r>
+            <a:r>
+              <a:rPr lang="en-US" baseline="0" dirty="0" err="1" smtClean="0"/>
+              <a:t>ngRoute</a:t>
+            </a:r>
+            <a:r>
+              <a:rPr lang="en-US" baseline="0" dirty="0" smtClean="0"/>
+              <a:t>, to simplify the example but those are not necessary because we are going to use </a:t>
+            </a:r>
+            <a:r>
+              <a:rPr lang="en-US" baseline="0" dirty="0" err="1" smtClean="0"/>
+              <a:t>ui</a:t>
+            </a:r>
+            <a:r>
+              <a:rPr lang="en-US" baseline="0" dirty="0" smtClean="0"/>
+              <a:t>-router. There's a Yeoman generator for this (https://www.npmjs.com/package/generator-angular-ui-router), but I rather to go for the angular generator because is maintained by more people, and also I don't recommend use the generators for creating routes, directives, etc. because for me is better </a:t>
+            </a:r>
+            <a:r>
+              <a:rPr lang="en-US" baseline="0" dirty="0" err="1" smtClean="0"/>
+              <a:t>copy-paste&amp;remove</a:t>
+            </a:r>
+            <a:r>
+              <a:rPr lang="en-US" baseline="0" dirty="0" smtClean="0"/>
+              <a:t> my own already set controllers.</a:t>
             </a:r>
           </a:p>
           <a:p>
             <a:pPr marL="228600" indent="-228600">
               <a:buFont typeface="+mj-lt"/>
               <a:buAutoNum type="arabicPeriod"/>
+            </a:pPr>
+            <a:r>
+              <a:rPr lang="en-US" baseline="0" dirty="0" smtClean="0"/>
+              <a:t>Once is created we need to install the </a:t>
+            </a:r>
+            <a:r>
+              <a:rPr lang="en-US" baseline="0" dirty="0" err="1" smtClean="0"/>
+              <a:t>ui</a:t>
+            </a:r>
+            <a:r>
+              <a:rPr lang="en-US" baseline="0" dirty="0" smtClean="0"/>
+              <a:t>-router, for this we are going to use Bower: "bower install </a:t>
+            </a:r>
+            <a:r>
+              <a:rPr lang="en-US" dirty="0" smtClean="0"/>
+              <a:t>angular-</a:t>
+            </a:r>
+            <a:r>
+              <a:rPr lang="en-US" dirty="0" err="1" smtClean="0"/>
+              <a:t>ui</a:t>
+            </a:r>
+            <a:r>
+              <a:rPr lang="en-US" dirty="0" smtClean="0"/>
+              <a:t>-router</a:t>
+            </a:r>
+            <a:r>
+              <a:rPr lang="en-US" baseline="0" dirty="0" smtClean="0"/>
+              <a:t> --save"</a:t>
+            </a:r>
+            <a:r>
+              <a:rPr lang="en-US" u="sng" baseline="0" dirty="0" smtClean="0"/>
+              <a:t>.</a:t>
+            </a:r>
+          </a:p>
+          <a:p>
+            <a:pPr marL="228600" marR="0" indent="-228600" algn="l" defTabSz="914400" rtl="0" eaLnBrk="1" fontAlgn="auto" latinLnBrk="0" hangingPunct="1">
+              <a:lnSpc>
+                <a:spcPct val="100000"/>
+              </a:lnSpc>
+              <a:spcBef>
+                <a:spcPts val="0"/>
+              </a:spcBef>
+              <a:spcAft>
+                <a:spcPts val="0"/>
+              </a:spcAft>
+              <a:buClrTx/>
+              <a:buSzTx/>
+              <a:buFont typeface="+mj-lt"/>
+              <a:buAutoNum type="arabicPeriod"/>
+              <a:tabLst/>
+              <a:defRPr/>
+            </a:pPr>
+            <a:r>
+              <a:rPr lang="en-US" dirty="0" smtClean="0"/>
+              <a:t>Open "app/scripts/app.js" and change the dependencies:</a:t>
+            </a:r>
+          </a:p>
+          <a:p>
+            <a:pPr marL="685800" marR="0" lvl="1" indent="-228600" algn="l" defTabSz="914400" rtl="0" eaLnBrk="1" fontAlgn="auto" latinLnBrk="0" hangingPunct="1">
+              <a:lnSpc>
+                <a:spcPct val="100000"/>
+              </a:lnSpc>
+              <a:spcBef>
+                <a:spcPts val="0"/>
+              </a:spcBef>
+              <a:spcAft>
+                <a:spcPts val="0"/>
+              </a:spcAft>
+              <a:buClrTx/>
+              <a:buSzTx/>
+              <a:buFont typeface="+mj-lt"/>
+              <a:buAutoNum type="alphaLcPeriod"/>
+              <a:tabLst/>
+              <a:defRPr/>
+            </a:pPr>
+            <a:r>
+              <a:rPr lang="en-US" dirty="0" smtClean="0"/>
+              <a:t>Remove "</a:t>
+            </a:r>
+            <a:r>
+              <a:rPr lang="en-US" dirty="0" err="1" smtClean="0"/>
+              <a:t>ngRoute</a:t>
+            </a:r>
+            <a:r>
+              <a:rPr lang="en-US" dirty="0" smtClean="0"/>
+              <a:t>" and "</a:t>
+            </a:r>
+            <a:r>
+              <a:rPr lang="en-US" dirty="0" err="1" smtClean="0"/>
+              <a:t>ngResource</a:t>
+            </a:r>
+            <a:r>
+              <a:rPr lang="en-US" dirty="0" smtClean="0"/>
+              <a:t>".</a:t>
+            </a:r>
+          </a:p>
+          <a:p>
+            <a:pPr marL="685800" marR="0" lvl="1" indent="-228600" algn="l" defTabSz="914400" rtl="0" eaLnBrk="1" fontAlgn="auto" latinLnBrk="0" hangingPunct="1">
+              <a:lnSpc>
+                <a:spcPct val="100000"/>
+              </a:lnSpc>
+              <a:spcBef>
+                <a:spcPts val="0"/>
+              </a:spcBef>
+              <a:spcAft>
+                <a:spcPts val="0"/>
+              </a:spcAft>
+              <a:buClrTx/>
+              <a:buSzTx/>
+              <a:buFont typeface="+mj-lt"/>
+              <a:buAutoNum type="alphaLcPeriod"/>
+              <a:tabLst/>
+              <a:defRPr/>
+            </a:pPr>
+            <a:r>
+              <a:rPr lang="en-US" dirty="0" smtClean="0"/>
+              <a:t>Add "</a:t>
+            </a:r>
+            <a:r>
+              <a:rPr lang="en-US" dirty="0" err="1" smtClean="0"/>
+              <a:t>ui.router</a:t>
+            </a:r>
+            <a:r>
+              <a:rPr lang="en-US" dirty="0" smtClean="0"/>
+              <a:t>".</a:t>
+            </a:r>
+          </a:p>
+          <a:p>
+            <a:pPr marL="228600" marR="0" lvl="0" indent="-228600" algn="l" defTabSz="914400" rtl="0" eaLnBrk="1" fontAlgn="auto" latinLnBrk="0" hangingPunct="1">
+              <a:lnSpc>
+                <a:spcPct val="100000"/>
+              </a:lnSpc>
+              <a:spcBef>
+                <a:spcPts val="0"/>
+              </a:spcBef>
+              <a:spcAft>
+                <a:spcPts val="0"/>
+              </a:spcAft>
+              <a:buClrTx/>
+              <a:buSzTx/>
+              <a:buFont typeface="+mj-lt"/>
+              <a:buAutoNum type="arabicPeriod"/>
+              <a:tabLst/>
+              <a:defRPr/>
+            </a:pPr>
+            <a:r>
+              <a:rPr lang="en-US" dirty="0" smtClean="0"/>
+              <a:t>Create the states: </a:t>
+            </a:r>
+          </a:p>
+          <a:p>
+            <a:pPr marL="685800" marR="0" lvl="1" indent="-228600" algn="l" defTabSz="914400" rtl="0" eaLnBrk="1" fontAlgn="auto" latinLnBrk="0" hangingPunct="1">
+              <a:lnSpc>
+                <a:spcPct val="100000"/>
+              </a:lnSpc>
+              <a:spcBef>
+                <a:spcPts val="0"/>
+              </a:spcBef>
+              <a:spcAft>
+                <a:spcPts val="0"/>
+              </a:spcAft>
+              <a:buClrTx/>
+              <a:buSzTx/>
+              <a:buFont typeface="+mj-lt"/>
+              <a:buAutoNum type="alphaLcPeriod"/>
+              <a:tabLst/>
+              <a:defRPr/>
+            </a:pPr>
+            <a:r>
+              <a:rPr lang="en-US" dirty="0" smtClean="0"/>
+              <a:t>Modify</a:t>
+            </a:r>
+            <a:r>
+              <a:rPr lang="en-US" baseline="0" dirty="0" smtClean="0"/>
+              <a:t> the "</a:t>
+            </a:r>
+            <a:r>
+              <a:rPr lang="en-US" baseline="0" dirty="0" err="1" smtClean="0"/>
+              <a:t>config</a:t>
+            </a:r>
+            <a:r>
+              <a:rPr lang="en-US" baseline="0" dirty="0" smtClean="0"/>
+              <a:t>", and use the $</a:t>
+            </a:r>
+            <a:r>
+              <a:rPr lang="en-US" baseline="0" dirty="0" err="1" smtClean="0"/>
+              <a:t>stateProvider</a:t>
+            </a:r>
+            <a:r>
+              <a:rPr lang="en-US" baseline="0" dirty="0" smtClean="0"/>
+              <a:t> instead of the $</a:t>
+            </a:r>
+            <a:r>
+              <a:rPr lang="en-US" baseline="0" dirty="0" err="1" smtClean="0"/>
+              <a:t>routeProvider</a:t>
+            </a:r>
+            <a:r>
+              <a:rPr lang="en-US" baseline="0" dirty="0" smtClean="0"/>
+              <a:t>.</a:t>
+            </a:r>
+          </a:p>
+          <a:p>
+            <a:pPr marL="685800" marR="0" lvl="1" indent="-228600" algn="l" defTabSz="914400" rtl="0" eaLnBrk="1" fontAlgn="auto" latinLnBrk="0" hangingPunct="1">
+              <a:lnSpc>
+                <a:spcPct val="100000"/>
+              </a:lnSpc>
+              <a:spcBef>
+                <a:spcPts val="0"/>
+              </a:spcBef>
+              <a:spcAft>
+                <a:spcPts val="0"/>
+              </a:spcAft>
+              <a:buClrTx/>
+              <a:buSzTx/>
+              <a:buFont typeface="+mj-lt"/>
+              <a:buAutoNum type="alphaLcPeriod"/>
+              <a:tabLst/>
+              <a:defRPr/>
+            </a:pPr>
+            <a:r>
+              <a:rPr lang="en-US" baseline="0" dirty="0" smtClean="0"/>
+              <a:t>Convert the "when" to the "state" word.</a:t>
+            </a:r>
+          </a:p>
+          <a:p>
+            <a:pPr marL="685800" marR="0" lvl="1" indent="-228600" algn="l" defTabSz="914400" rtl="0" eaLnBrk="1" fontAlgn="auto" latinLnBrk="0" hangingPunct="1">
+              <a:lnSpc>
+                <a:spcPct val="100000"/>
+              </a:lnSpc>
+              <a:spcBef>
+                <a:spcPts val="0"/>
+              </a:spcBef>
+              <a:spcAft>
+                <a:spcPts val="0"/>
+              </a:spcAft>
+              <a:buClrTx/>
+              <a:buSzTx/>
+              <a:buFont typeface="+mj-lt"/>
+              <a:buAutoNum type="alphaLcPeriod"/>
+              <a:tabLst/>
+              <a:defRPr/>
+            </a:pPr>
+            <a:r>
+              <a:rPr lang="en-US" baseline="0" dirty="0" smtClean="0"/>
+              <a:t>Add the parameter "</a:t>
+            </a:r>
+            <a:r>
+              <a:rPr lang="en-US" baseline="0" dirty="0" err="1" smtClean="0"/>
+              <a:t>url</a:t>
+            </a:r>
+            <a:r>
+              <a:rPr lang="en-US" baseline="0" dirty="0" smtClean="0"/>
+              <a:t>" followed with the corresponding value, </a:t>
+            </a:r>
+            <a:r>
+              <a:rPr lang="en-US" baseline="0" dirty="0" err="1" smtClean="0"/>
+              <a:t>eg</a:t>
+            </a:r>
+            <a:r>
+              <a:rPr lang="en-US" baseline="0" dirty="0" smtClean="0"/>
+              <a:t>. "/", "/about", etc.</a:t>
+            </a:r>
+          </a:p>
+          <a:p>
+            <a:pPr marL="685800" marR="0" lvl="1" indent="-228600" algn="l" defTabSz="914400" rtl="0" eaLnBrk="1" fontAlgn="auto" latinLnBrk="0" hangingPunct="1">
+              <a:lnSpc>
+                <a:spcPct val="100000"/>
+              </a:lnSpc>
+              <a:spcBef>
+                <a:spcPts val="0"/>
+              </a:spcBef>
+              <a:spcAft>
+                <a:spcPts val="0"/>
+              </a:spcAft>
+              <a:buClrTx/>
+              <a:buSzTx/>
+              <a:buFont typeface="+mj-lt"/>
+              <a:buAutoNum type="alphaLcPeriod"/>
+              <a:tabLst/>
+              <a:defRPr/>
+            </a:pPr>
+            <a:r>
+              <a:rPr lang="en-US" baseline="0" dirty="0" smtClean="0"/>
+              <a:t>Delete the "otherwise" method and instead of it you should add a state for the 404.</a:t>
+            </a:r>
+          </a:p>
+          <a:p>
+            <a:pPr marL="457200" marR="0" lvl="1" indent="0" algn="l" defTabSz="914400" rtl="0" eaLnBrk="1" fontAlgn="auto" latinLnBrk="0" hangingPunct="1">
+              <a:lnSpc>
+                <a:spcPct val="100000"/>
+              </a:lnSpc>
+              <a:spcBef>
+                <a:spcPts val="0"/>
+              </a:spcBef>
+              <a:spcAft>
+                <a:spcPts val="0"/>
+              </a:spcAft>
+              <a:buClrTx/>
+              <a:buSzTx/>
+              <a:buFont typeface="+mj-lt"/>
+              <a:buNone/>
+              <a:tabLst/>
+              <a:defRPr/>
+            </a:pPr>
+            <a:r>
+              <a:rPr lang="en-US" baseline="0" dirty="0" smtClean="0"/>
+              <a:t>The app.js should be like:</a:t>
+            </a:r>
+          </a:p>
+          <a:p>
+            <a:pPr marL="457200" marR="0" lvl="1" indent="0" algn="l" defTabSz="914400" rtl="0" eaLnBrk="1" fontAlgn="auto" latinLnBrk="0" hangingPunct="1">
+              <a:lnSpc>
+                <a:spcPct val="100000"/>
+              </a:lnSpc>
+              <a:spcBef>
+                <a:spcPts val="0"/>
+              </a:spcBef>
+              <a:spcAft>
+                <a:spcPts val="0"/>
+              </a:spcAft>
+              <a:buClrTx/>
+              <a:buSzTx/>
+              <a:buFont typeface="+mj-lt"/>
+              <a:buNone/>
+              <a:tabLst/>
+              <a:defRPr/>
+            </a:pPr>
+            <a:endParaRPr lang="en-US" baseline="0" dirty="0" smtClean="0"/>
+          </a:p>
+          <a:p>
+            <a:pPr marL="0" marR="0" lvl="0" indent="0" algn="l" defTabSz="914400" rtl="0" eaLnBrk="1" fontAlgn="auto" latinLnBrk="0" hangingPunct="1">
+              <a:lnSpc>
+                <a:spcPct val="100000"/>
+              </a:lnSpc>
+              <a:spcBef>
+                <a:spcPts val="0"/>
+              </a:spcBef>
+              <a:spcAft>
+                <a:spcPts val="0"/>
+              </a:spcAft>
+              <a:buClrTx/>
+              <a:buSzTx/>
+              <a:buFont typeface="+mj-lt"/>
+              <a:buNone/>
+              <a:tabLst/>
+              <a:defRPr/>
+            </a:pPr>
+            <a:r>
+              <a:rPr lang="en-US" dirty="0" smtClean="0"/>
+              <a:t>------------------------------------------------------------------------------------------------------------------------------------------------------</a:t>
+            </a:r>
+            <a:endParaRPr lang="en-US" baseline="0" dirty="0" smtClean="0"/>
+          </a:p>
+          <a:p>
+            <a:pPr marL="457200" marR="0" lvl="1" indent="0" algn="l" defTabSz="914400" rtl="0" eaLnBrk="1" fontAlgn="auto" latinLnBrk="0" hangingPunct="1">
+              <a:lnSpc>
+                <a:spcPct val="100000"/>
+              </a:lnSpc>
+              <a:spcBef>
+                <a:spcPts val="0"/>
+              </a:spcBef>
+              <a:spcAft>
+                <a:spcPts val="0"/>
+              </a:spcAft>
+              <a:buClrTx/>
+              <a:buSzTx/>
+              <a:buFont typeface="+mj-lt"/>
+              <a:buNone/>
+              <a:tabLst/>
+              <a:defRPr/>
+            </a:pPr>
+            <a:r>
+              <a:rPr lang="en-US" dirty="0" smtClean="0"/>
+              <a:t>angular</a:t>
+            </a:r>
+          </a:p>
+          <a:p>
+            <a:pPr marL="457200" marR="0" lvl="1" indent="0" algn="l" defTabSz="914400" rtl="0" eaLnBrk="1" fontAlgn="auto" latinLnBrk="0" hangingPunct="1">
+              <a:lnSpc>
+                <a:spcPct val="100000"/>
+              </a:lnSpc>
+              <a:spcBef>
+                <a:spcPts val="0"/>
+              </a:spcBef>
+              <a:spcAft>
+                <a:spcPts val="0"/>
+              </a:spcAft>
+              <a:buClrTx/>
+              <a:buSzTx/>
+              <a:buFont typeface="+mj-lt"/>
+              <a:buNone/>
+              <a:tabLst/>
+              <a:defRPr/>
+            </a:pPr>
+            <a:r>
+              <a:rPr lang="en-US" dirty="0" smtClean="0"/>
+              <a:t>  .module('</a:t>
+            </a:r>
+            <a:r>
+              <a:rPr lang="en-US" dirty="0" err="1" smtClean="0"/>
+              <a:t>practiceBApp</a:t>
+            </a:r>
+            <a:r>
+              <a:rPr lang="en-US" dirty="0" smtClean="0"/>
+              <a:t>', [</a:t>
+            </a:r>
+          </a:p>
+          <a:p>
+            <a:pPr marL="457200" marR="0" lvl="1" indent="0" algn="l" defTabSz="914400" rtl="0" eaLnBrk="1" fontAlgn="auto" latinLnBrk="0" hangingPunct="1">
+              <a:lnSpc>
+                <a:spcPct val="100000"/>
+              </a:lnSpc>
+              <a:spcBef>
+                <a:spcPts val="0"/>
+              </a:spcBef>
+              <a:spcAft>
+                <a:spcPts val="0"/>
+              </a:spcAft>
+              <a:buClrTx/>
+              <a:buSzTx/>
+              <a:buFont typeface="+mj-lt"/>
+              <a:buNone/>
+              <a:tabLst/>
+              <a:defRPr/>
+            </a:pPr>
+            <a:r>
+              <a:rPr lang="en-US" dirty="0" smtClean="0"/>
+              <a:t>    '</a:t>
+            </a:r>
+            <a:r>
+              <a:rPr lang="en-US" dirty="0" err="1" smtClean="0"/>
+              <a:t>ngAnimate</a:t>
+            </a:r>
+            <a:r>
+              <a:rPr lang="en-US" dirty="0" smtClean="0"/>
+              <a:t>',</a:t>
+            </a:r>
+          </a:p>
+          <a:p>
+            <a:pPr marL="457200" marR="0" lvl="1" indent="0" algn="l" defTabSz="914400" rtl="0" eaLnBrk="1" fontAlgn="auto" latinLnBrk="0" hangingPunct="1">
+              <a:lnSpc>
+                <a:spcPct val="100000"/>
+              </a:lnSpc>
+              <a:spcBef>
+                <a:spcPts val="0"/>
+              </a:spcBef>
+              <a:spcAft>
+                <a:spcPts val="0"/>
+              </a:spcAft>
+              <a:buClrTx/>
+              <a:buSzTx/>
+              <a:buFont typeface="+mj-lt"/>
+              <a:buNone/>
+              <a:tabLst/>
+              <a:defRPr/>
+            </a:pPr>
+            <a:r>
+              <a:rPr lang="en-US" dirty="0" smtClean="0"/>
+              <a:t>    '</a:t>
+            </a:r>
+            <a:r>
+              <a:rPr lang="en-US" dirty="0" err="1" smtClean="0"/>
+              <a:t>ngCookies</a:t>
+            </a:r>
+            <a:r>
+              <a:rPr lang="en-US" dirty="0" smtClean="0"/>
+              <a:t>',</a:t>
+            </a:r>
+          </a:p>
+          <a:p>
+            <a:pPr marL="457200" marR="0" lvl="1" indent="0" algn="l" defTabSz="914400" rtl="0" eaLnBrk="1" fontAlgn="auto" latinLnBrk="0" hangingPunct="1">
+              <a:lnSpc>
+                <a:spcPct val="100000"/>
+              </a:lnSpc>
+              <a:spcBef>
+                <a:spcPts val="0"/>
+              </a:spcBef>
+              <a:spcAft>
+                <a:spcPts val="0"/>
+              </a:spcAft>
+              <a:buClrTx/>
+              <a:buSzTx/>
+              <a:buFont typeface="+mj-lt"/>
+              <a:buNone/>
+              <a:tabLst/>
+              <a:defRPr/>
+            </a:pPr>
+            <a:r>
+              <a:rPr lang="en-US" dirty="0" smtClean="0"/>
+              <a:t>    '</a:t>
+            </a:r>
+            <a:r>
+              <a:rPr lang="en-US" dirty="0" err="1" smtClean="0"/>
+              <a:t>ui.router</a:t>
+            </a:r>
+            <a:r>
+              <a:rPr lang="en-US" dirty="0" smtClean="0"/>
+              <a:t>',</a:t>
+            </a:r>
+          </a:p>
+          <a:p>
+            <a:pPr marL="457200" marR="0" lvl="1" indent="0" algn="l" defTabSz="914400" rtl="0" eaLnBrk="1" fontAlgn="auto" latinLnBrk="0" hangingPunct="1">
+              <a:lnSpc>
+                <a:spcPct val="100000"/>
+              </a:lnSpc>
+              <a:spcBef>
+                <a:spcPts val="0"/>
+              </a:spcBef>
+              <a:spcAft>
+                <a:spcPts val="0"/>
+              </a:spcAft>
+              <a:buClrTx/>
+              <a:buSzTx/>
+              <a:buFont typeface="+mj-lt"/>
+              <a:buNone/>
+              <a:tabLst/>
+              <a:defRPr/>
+            </a:pPr>
+            <a:r>
+              <a:rPr lang="en-US" dirty="0" smtClean="0"/>
+              <a:t>    '</a:t>
+            </a:r>
+            <a:r>
+              <a:rPr lang="en-US" dirty="0" err="1" smtClean="0"/>
+              <a:t>ngSanitize</a:t>
+            </a:r>
+            <a:r>
+              <a:rPr lang="en-US" dirty="0" smtClean="0"/>
+              <a:t>',</a:t>
+            </a:r>
+          </a:p>
+          <a:p>
+            <a:pPr marL="457200" marR="0" lvl="1" indent="0" algn="l" defTabSz="914400" rtl="0" eaLnBrk="1" fontAlgn="auto" latinLnBrk="0" hangingPunct="1">
+              <a:lnSpc>
+                <a:spcPct val="100000"/>
+              </a:lnSpc>
+              <a:spcBef>
+                <a:spcPts val="0"/>
+              </a:spcBef>
+              <a:spcAft>
+                <a:spcPts val="0"/>
+              </a:spcAft>
+              <a:buClrTx/>
+              <a:buSzTx/>
+              <a:buFont typeface="+mj-lt"/>
+              <a:buNone/>
+              <a:tabLst/>
+              <a:defRPr/>
+            </a:pPr>
+            <a:r>
+              <a:rPr lang="en-US" dirty="0" smtClean="0"/>
+              <a:t>    '</a:t>
+            </a:r>
+            <a:r>
+              <a:rPr lang="en-US" dirty="0" err="1" smtClean="0"/>
+              <a:t>ngTouch</a:t>
+            </a:r>
+            <a:r>
+              <a:rPr lang="en-US" dirty="0" smtClean="0"/>
+              <a:t>'</a:t>
+            </a:r>
+          </a:p>
+          <a:p>
+            <a:pPr marL="457200" marR="0" lvl="1" indent="0" algn="l" defTabSz="914400" rtl="0" eaLnBrk="1" fontAlgn="auto" latinLnBrk="0" hangingPunct="1">
+              <a:lnSpc>
+                <a:spcPct val="100000"/>
+              </a:lnSpc>
+              <a:spcBef>
+                <a:spcPts val="0"/>
+              </a:spcBef>
+              <a:spcAft>
+                <a:spcPts val="0"/>
+              </a:spcAft>
+              <a:buClrTx/>
+              <a:buSzTx/>
+              <a:buFont typeface="+mj-lt"/>
+              <a:buNone/>
+              <a:tabLst/>
+              <a:defRPr/>
+            </a:pPr>
+            <a:r>
+              <a:rPr lang="en-US" dirty="0" smtClean="0"/>
+              <a:t>  ])</a:t>
+            </a:r>
+          </a:p>
+          <a:p>
+            <a:pPr marL="457200" marR="0" lvl="1" indent="0" algn="l" defTabSz="914400" rtl="0" eaLnBrk="1" fontAlgn="auto" latinLnBrk="0" hangingPunct="1">
+              <a:lnSpc>
+                <a:spcPct val="100000"/>
+              </a:lnSpc>
+              <a:spcBef>
+                <a:spcPts val="0"/>
+              </a:spcBef>
+              <a:spcAft>
+                <a:spcPts val="0"/>
+              </a:spcAft>
+              <a:buClrTx/>
+              <a:buSzTx/>
+              <a:buFont typeface="+mj-lt"/>
+              <a:buNone/>
+              <a:tabLst/>
+              <a:defRPr/>
+            </a:pPr>
+            <a:r>
+              <a:rPr lang="en-US" dirty="0" smtClean="0"/>
+              <a:t>  .</a:t>
+            </a:r>
+            <a:r>
+              <a:rPr lang="en-US" dirty="0" err="1" smtClean="0"/>
+              <a:t>config</a:t>
+            </a:r>
+            <a:r>
+              <a:rPr lang="en-US" dirty="0" smtClean="0"/>
+              <a:t>(function ($</a:t>
+            </a:r>
+            <a:r>
+              <a:rPr lang="en-US" dirty="0" err="1" smtClean="0"/>
+              <a:t>stateProvider</a:t>
+            </a:r>
+            <a:r>
+              <a:rPr lang="en-US" dirty="0" smtClean="0"/>
+              <a:t>) {</a:t>
+            </a:r>
+          </a:p>
+          <a:p>
+            <a:pPr marL="457200" marR="0" lvl="1" indent="0" algn="l" defTabSz="914400" rtl="0" eaLnBrk="1" fontAlgn="auto" latinLnBrk="0" hangingPunct="1">
+              <a:lnSpc>
+                <a:spcPct val="100000"/>
+              </a:lnSpc>
+              <a:spcBef>
+                <a:spcPts val="0"/>
+              </a:spcBef>
+              <a:spcAft>
+                <a:spcPts val="0"/>
+              </a:spcAft>
+              <a:buClrTx/>
+              <a:buSzTx/>
+              <a:buFont typeface="+mj-lt"/>
+              <a:buNone/>
+              <a:tabLst/>
+              <a:defRPr/>
+            </a:pPr>
+            <a:r>
+              <a:rPr lang="en-US" dirty="0" smtClean="0"/>
+              <a:t>    $</a:t>
+            </a:r>
+            <a:r>
+              <a:rPr lang="en-US" dirty="0" err="1" smtClean="0"/>
+              <a:t>stateProvider</a:t>
+            </a:r>
+            <a:endParaRPr lang="en-US" dirty="0" smtClean="0"/>
+          </a:p>
+          <a:p>
+            <a:pPr marL="457200" marR="0" lvl="1" indent="0" algn="l" defTabSz="914400" rtl="0" eaLnBrk="1" fontAlgn="auto" latinLnBrk="0" hangingPunct="1">
+              <a:lnSpc>
+                <a:spcPct val="100000"/>
+              </a:lnSpc>
+              <a:spcBef>
+                <a:spcPts val="0"/>
+              </a:spcBef>
+              <a:spcAft>
+                <a:spcPts val="0"/>
+              </a:spcAft>
+              <a:buClrTx/>
+              <a:buSzTx/>
+              <a:buFont typeface="+mj-lt"/>
+              <a:buNone/>
+              <a:tabLst/>
+              <a:defRPr/>
+            </a:pPr>
+            <a:r>
+              <a:rPr lang="en-US" dirty="0" smtClean="0"/>
+              <a:t>      .state('main', {</a:t>
+            </a:r>
+          </a:p>
+          <a:p>
+            <a:pPr marL="457200" marR="0" lvl="1" indent="0" algn="l" defTabSz="914400" rtl="0" eaLnBrk="1" fontAlgn="auto" latinLnBrk="0" hangingPunct="1">
+              <a:lnSpc>
+                <a:spcPct val="100000"/>
+              </a:lnSpc>
+              <a:spcBef>
+                <a:spcPts val="0"/>
+              </a:spcBef>
+              <a:spcAft>
+                <a:spcPts val="0"/>
+              </a:spcAft>
+              <a:buClrTx/>
+              <a:buSzTx/>
+              <a:buFont typeface="+mj-lt"/>
+              <a:buNone/>
+              <a:tabLst/>
+              <a:defRPr/>
+            </a:pPr>
+            <a:r>
+              <a:rPr lang="en-US" dirty="0" smtClean="0"/>
+              <a:t>        url: '/',</a:t>
+            </a:r>
+          </a:p>
+          <a:p>
+            <a:pPr marL="457200" marR="0" lvl="1" indent="0" algn="l" defTabSz="914400" rtl="0" eaLnBrk="1" fontAlgn="auto" latinLnBrk="0" hangingPunct="1">
+              <a:lnSpc>
+                <a:spcPct val="100000"/>
+              </a:lnSpc>
+              <a:spcBef>
+                <a:spcPts val="0"/>
+              </a:spcBef>
+              <a:spcAft>
+                <a:spcPts val="0"/>
+              </a:spcAft>
+              <a:buClrTx/>
+              <a:buSzTx/>
+              <a:buFont typeface="+mj-lt"/>
+              <a:buNone/>
+              <a:tabLst/>
+              <a:defRPr/>
+            </a:pPr>
+            <a:r>
+              <a:rPr lang="en-US" dirty="0" smtClean="0"/>
+              <a:t>        </a:t>
+            </a:r>
+            <a:r>
+              <a:rPr lang="en-US" dirty="0" err="1" smtClean="0"/>
+              <a:t>templateUrl</a:t>
+            </a:r>
+            <a:r>
+              <a:rPr lang="en-US" dirty="0" smtClean="0"/>
+              <a:t>: 'views/main.html',</a:t>
+            </a:r>
+          </a:p>
+          <a:p>
+            <a:pPr marL="457200" marR="0" lvl="1" indent="0" algn="l" defTabSz="914400" rtl="0" eaLnBrk="1" fontAlgn="auto" latinLnBrk="0" hangingPunct="1">
+              <a:lnSpc>
+                <a:spcPct val="100000"/>
+              </a:lnSpc>
+              <a:spcBef>
+                <a:spcPts val="0"/>
+              </a:spcBef>
+              <a:spcAft>
+                <a:spcPts val="0"/>
+              </a:spcAft>
+              <a:buClrTx/>
+              <a:buSzTx/>
+              <a:buFont typeface="+mj-lt"/>
+              <a:buNone/>
+              <a:tabLst/>
+              <a:defRPr/>
+            </a:pPr>
+            <a:r>
+              <a:rPr lang="en-US" dirty="0" smtClean="0"/>
+              <a:t>        controller: '</a:t>
+            </a:r>
+            <a:r>
+              <a:rPr lang="en-US" dirty="0" err="1" smtClean="0"/>
+              <a:t>MainCtrl</a:t>
+            </a:r>
+            <a:r>
+              <a:rPr lang="en-US" dirty="0" smtClean="0"/>
+              <a:t>',</a:t>
+            </a:r>
+          </a:p>
+          <a:p>
+            <a:pPr marL="457200" marR="0" lvl="1" indent="0" algn="l" defTabSz="914400" rtl="0" eaLnBrk="1" fontAlgn="auto" latinLnBrk="0" hangingPunct="1">
+              <a:lnSpc>
+                <a:spcPct val="100000"/>
+              </a:lnSpc>
+              <a:spcBef>
+                <a:spcPts val="0"/>
+              </a:spcBef>
+              <a:spcAft>
+                <a:spcPts val="0"/>
+              </a:spcAft>
+              <a:buClrTx/>
+              <a:buSzTx/>
+              <a:buFont typeface="+mj-lt"/>
+              <a:buNone/>
+              <a:tabLst/>
+              <a:defRPr/>
+            </a:pPr>
+            <a:r>
+              <a:rPr lang="en-US" dirty="0" smtClean="0"/>
+              <a:t>        </a:t>
+            </a:r>
+            <a:r>
+              <a:rPr lang="en-US" dirty="0" err="1" smtClean="0"/>
+              <a:t>controllerAs</a:t>
+            </a:r>
+            <a:r>
+              <a:rPr lang="en-US" dirty="0" smtClean="0"/>
+              <a:t>: '</a:t>
+            </a:r>
+            <a:r>
+              <a:rPr lang="en-US" dirty="0" err="1" smtClean="0"/>
+              <a:t>mainCtrl</a:t>
+            </a:r>
+            <a:r>
+              <a:rPr lang="en-US" dirty="0" smtClean="0"/>
+              <a:t>'</a:t>
+            </a:r>
+          </a:p>
+          <a:p>
+            <a:pPr marL="457200" marR="0" lvl="1" indent="0" algn="l" defTabSz="914400" rtl="0" eaLnBrk="1" fontAlgn="auto" latinLnBrk="0" hangingPunct="1">
+              <a:lnSpc>
+                <a:spcPct val="100000"/>
+              </a:lnSpc>
+              <a:spcBef>
+                <a:spcPts val="0"/>
+              </a:spcBef>
+              <a:spcAft>
+                <a:spcPts val="0"/>
+              </a:spcAft>
+              <a:buClrTx/>
+              <a:buSzTx/>
+              <a:buFont typeface="+mj-lt"/>
+              <a:buNone/>
+              <a:tabLst/>
+              <a:defRPr/>
+            </a:pPr>
+            <a:r>
+              <a:rPr lang="en-US" dirty="0" smtClean="0"/>
+              <a:t>      })</a:t>
+            </a:r>
+          </a:p>
+          <a:p>
+            <a:pPr marL="457200" marR="0" lvl="1" indent="0" algn="l" defTabSz="914400" rtl="0" eaLnBrk="1" fontAlgn="auto" latinLnBrk="0" hangingPunct="1">
+              <a:lnSpc>
+                <a:spcPct val="100000"/>
+              </a:lnSpc>
+              <a:spcBef>
+                <a:spcPts val="0"/>
+              </a:spcBef>
+              <a:spcAft>
+                <a:spcPts val="0"/>
+              </a:spcAft>
+              <a:buClrTx/>
+              <a:buSzTx/>
+              <a:buFont typeface="+mj-lt"/>
+              <a:buNone/>
+              <a:tabLst/>
+              <a:defRPr/>
+            </a:pPr>
+            <a:r>
+              <a:rPr lang="en-US" dirty="0" smtClean="0"/>
+              <a:t>      .state('about', {</a:t>
+            </a:r>
+          </a:p>
+          <a:p>
+            <a:pPr marL="457200" marR="0" lvl="1" indent="0" algn="l" defTabSz="914400" rtl="0" eaLnBrk="1" fontAlgn="auto" latinLnBrk="0" hangingPunct="1">
+              <a:lnSpc>
+                <a:spcPct val="100000"/>
+              </a:lnSpc>
+              <a:spcBef>
+                <a:spcPts val="0"/>
+              </a:spcBef>
+              <a:spcAft>
+                <a:spcPts val="0"/>
+              </a:spcAft>
+              <a:buClrTx/>
+              <a:buSzTx/>
+              <a:buFont typeface="+mj-lt"/>
+              <a:buNone/>
+              <a:tabLst/>
+              <a:defRPr/>
+            </a:pPr>
+            <a:r>
+              <a:rPr lang="en-US" dirty="0" smtClean="0"/>
+              <a:t>        url: '/about',</a:t>
+            </a:r>
+          </a:p>
+          <a:p>
+            <a:pPr marL="457200" marR="0" lvl="1" indent="0" algn="l" defTabSz="914400" rtl="0" eaLnBrk="1" fontAlgn="auto" latinLnBrk="0" hangingPunct="1">
+              <a:lnSpc>
+                <a:spcPct val="100000"/>
+              </a:lnSpc>
+              <a:spcBef>
+                <a:spcPts val="0"/>
+              </a:spcBef>
+              <a:spcAft>
+                <a:spcPts val="0"/>
+              </a:spcAft>
+              <a:buClrTx/>
+              <a:buSzTx/>
+              <a:buFont typeface="+mj-lt"/>
+              <a:buNone/>
+              <a:tabLst/>
+              <a:defRPr/>
+            </a:pPr>
+            <a:r>
+              <a:rPr lang="en-US" dirty="0" smtClean="0"/>
+              <a:t>        </a:t>
+            </a:r>
+            <a:r>
+              <a:rPr lang="en-US" dirty="0" err="1" smtClean="0"/>
+              <a:t>templateUrl</a:t>
+            </a:r>
+            <a:r>
+              <a:rPr lang="en-US" dirty="0" smtClean="0"/>
+              <a:t>: 'views/about.html',</a:t>
+            </a:r>
+          </a:p>
+          <a:p>
+            <a:pPr marL="457200" marR="0" lvl="1" indent="0" algn="l" defTabSz="914400" rtl="0" eaLnBrk="1" fontAlgn="auto" latinLnBrk="0" hangingPunct="1">
+              <a:lnSpc>
+                <a:spcPct val="100000"/>
+              </a:lnSpc>
+              <a:spcBef>
+                <a:spcPts val="0"/>
+              </a:spcBef>
+              <a:spcAft>
+                <a:spcPts val="0"/>
+              </a:spcAft>
+              <a:buClrTx/>
+              <a:buSzTx/>
+              <a:buFont typeface="+mj-lt"/>
+              <a:buNone/>
+              <a:tabLst/>
+              <a:defRPr/>
+            </a:pPr>
+            <a:r>
+              <a:rPr lang="en-US" dirty="0" smtClean="0"/>
+              <a:t>        controller: '</a:t>
+            </a:r>
+            <a:r>
+              <a:rPr lang="en-US" dirty="0" err="1" smtClean="0"/>
+              <a:t>AboutCtrl</a:t>
+            </a:r>
+            <a:r>
+              <a:rPr lang="en-US" dirty="0" smtClean="0"/>
+              <a:t>',</a:t>
+            </a:r>
+          </a:p>
+          <a:p>
+            <a:pPr marL="457200" marR="0" lvl="1" indent="0" algn="l" defTabSz="914400" rtl="0" eaLnBrk="1" fontAlgn="auto" latinLnBrk="0" hangingPunct="1">
+              <a:lnSpc>
+                <a:spcPct val="100000"/>
+              </a:lnSpc>
+              <a:spcBef>
+                <a:spcPts val="0"/>
+              </a:spcBef>
+              <a:spcAft>
+                <a:spcPts val="0"/>
+              </a:spcAft>
+              <a:buClrTx/>
+              <a:buSzTx/>
+              <a:buFont typeface="+mj-lt"/>
+              <a:buNone/>
+              <a:tabLst/>
+              <a:defRPr/>
+            </a:pPr>
+            <a:r>
+              <a:rPr lang="en-US" dirty="0" smtClean="0"/>
+              <a:t>        </a:t>
+            </a:r>
+            <a:r>
+              <a:rPr lang="en-US" dirty="0" err="1" smtClean="0"/>
+              <a:t>controllerAs</a:t>
+            </a:r>
+            <a:r>
+              <a:rPr lang="en-US" dirty="0" smtClean="0"/>
+              <a:t>: '</a:t>
+            </a:r>
+            <a:r>
+              <a:rPr lang="en-US" dirty="0" err="1" smtClean="0"/>
+              <a:t>aboutCtrl</a:t>
+            </a:r>
+            <a:r>
+              <a:rPr lang="en-US" dirty="0" smtClean="0"/>
+              <a:t>'</a:t>
+            </a:r>
+          </a:p>
+          <a:p>
+            <a:pPr marL="457200" marR="0" lvl="1" indent="0" algn="l" defTabSz="914400" rtl="0" eaLnBrk="1" fontAlgn="auto" latinLnBrk="0" hangingPunct="1">
+              <a:lnSpc>
+                <a:spcPct val="100000"/>
+              </a:lnSpc>
+              <a:spcBef>
+                <a:spcPts val="0"/>
+              </a:spcBef>
+              <a:spcAft>
+                <a:spcPts val="0"/>
+              </a:spcAft>
+              <a:buClrTx/>
+              <a:buSzTx/>
+              <a:buFont typeface="+mj-lt"/>
+              <a:buNone/>
+              <a:tabLst/>
+              <a:defRPr/>
+            </a:pPr>
+            <a:r>
+              <a:rPr lang="en-US" dirty="0" smtClean="0"/>
+              <a:t>      })</a:t>
+            </a:r>
+          </a:p>
+          <a:p>
+            <a:pPr marL="457200" marR="0" lvl="1" indent="0" algn="l" defTabSz="914400" rtl="0" eaLnBrk="1" fontAlgn="auto" latinLnBrk="0" hangingPunct="1">
+              <a:lnSpc>
+                <a:spcPct val="100000"/>
+              </a:lnSpc>
+              <a:spcBef>
+                <a:spcPts val="0"/>
+              </a:spcBef>
+              <a:spcAft>
+                <a:spcPts val="0"/>
+              </a:spcAft>
+              <a:buClrTx/>
+              <a:buSzTx/>
+              <a:buFont typeface="+mj-lt"/>
+              <a:buNone/>
+              <a:tabLst/>
+              <a:defRPr/>
+            </a:pPr>
+            <a:r>
+              <a:rPr lang="en-US" dirty="0" smtClean="0"/>
+              <a:t>      .state('404', {</a:t>
+            </a:r>
+          </a:p>
+          <a:p>
+            <a:pPr marL="457200" marR="0" lvl="1" indent="0" algn="l" defTabSz="914400" rtl="0" eaLnBrk="1" fontAlgn="auto" latinLnBrk="0" hangingPunct="1">
+              <a:lnSpc>
+                <a:spcPct val="100000"/>
+              </a:lnSpc>
+              <a:spcBef>
+                <a:spcPts val="0"/>
+              </a:spcBef>
+              <a:spcAft>
+                <a:spcPts val="0"/>
+              </a:spcAft>
+              <a:buClrTx/>
+              <a:buSzTx/>
+              <a:buFont typeface="+mj-lt"/>
+              <a:buNone/>
+              <a:tabLst/>
+              <a:defRPr/>
+            </a:pPr>
+            <a:r>
+              <a:rPr lang="en-US" dirty="0" smtClean="0"/>
+              <a:t>        url: '*path',</a:t>
+            </a:r>
+          </a:p>
+          <a:p>
+            <a:pPr marL="457200" marR="0" lvl="1" indent="0" algn="l" defTabSz="914400" rtl="0" eaLnBrk="1" fontAlgn="auto" latinLnBrk="0" hangingPunct="1">
+              <a:lnSpc>
+                <a:spcPct val="100000"/>
+              </a:lnSpc>
+              <a:spcBef>
+                <a:spcPts val="0"/>
+              </a:spcBef>
+              <a:spcAft>
+                <a:spcPts val="0"/>
+              </a:spcAft>
+              <a:buClrTx/>
+              <a:buSzTx/>
+              <a:buFont typeface="+mj-lt"/>
+              <a:buNone/>
+              <a:tabLst/>
+              <a:defRPr/>
+            </a:pPr>
+            <a:r>
+              <a:rPr lang="en-US" dirty="0" smtClean="0"/>
+              <a:t>        template: '&lt;div&gt;404 Not found!&lt;/div&gt;'</a:t>
+            </a:r>
+          </a:p>
+          <a:p>
+            <a:pPr marL="457200" marR="0" lvl="1" indent="0" algn="l" defTabSz="914400" rtl="0" eaLnBrk="1" fontAlgn="auto" latinLnBrk="0" hangingPunct="1">
+              <a:lnSpc>
+                <a:spcPct val="100000"/>
+              </a:lnSpc>
+              <a:spcBef>
+                <a:spcPts val="0"/>
+              </a:spcBef>
+              <a:spcAft>
+                <a:spcPts val="0"/>
+              </a:spcAft>
+              <a:buClrTx/>
+              <a:buSzTx/>
+              <a:buFont typeface="+mj-lt"/>
+              <a:buNone/>
+              <a:tabLst/>
+              <a:defRPr/>
+            </a:pPr>
+            <a:r>
+              <a:rPr lang="en-US" dirty="0" smtClean="0"/>
+              <a:t>      });</a:t>
+            </a:r>
+          </a:p>
+          <a:p>
+            <a:pPr marL="457200" marR="0" lvl="1" indent="0" algn="l" defTabSz="914400" rtl="0" eaLnBrk="1" fontAlgn="auto" latinLnBrk="0" hangingPunct="1">
+              <a:lnSpc>
+                <a:spcPct val="100000"/>
+              </a:lnSpc>
+              <a:spcBef>
+                <a:spcPts val="0"/>
+              </a:spcBef>
+              <a:spcAft>
+                <a:spcPts val="0"/>
+              </a:spcAft>
+              <a:buClrTx/>
+              <a:buSzTx/>
+              <a:buFont typeface="+mj-lt"/>
+              <a:buNone/>
+              <a:tabLst/>
+              <a:defRPr/>
+            </a:pPr>
+            <a:r>
+              <a:rPr lang="en-US" dirty="0" smtClean="0"/>
+              <a:t>  });</a:t>
+            </a:r>
+          </a:p>
+          <a:p>
+            <a:pPr marL="0" marR="0" lvl="0" indent="0" algn="l" defTabSz="914400" rtl="0" eaLnBrk="1" fontAlgn="auto" latinLnBrk="0" hangingPunct="1">
+              <a:lnSpc>
+                <a:spcPct val="100000"/>
+              </a:lnSpc>
+              <a:spcBef>
+                <a:spcPts val="0"/>
+              </a:spcBef>
+              <a:spcAft>
+                <a:spcPts val="0"/>
+              </a:spcAft>
+              <a:buClrTx/>
+              <a:buSzTx/>
+              <a:buFont typeface="+mj-lt"/>
+              <a:buNone/>
+              <a:tabLst/>
+              <a:defRPr/>
+            </a:pPr>
+            <a:r>
+              <a:rPr lang="en-US" dirty="0" smtClean="0"/>
+              <a:t>------------------------------------------------------------------------------------------------------------------------------------------------------</a:t>
+            </a:r>
+          </a:p>
+          <a:p>
+            <a:pPr marL="228600" indent="-228600">
+              <a:buFont typeface="+mj-lt"/>
+              <a:buAutoNum type="arabicPeriod"/>
+            </a:pPr>
+            <a:endParaRPr lang="en-US" u="none" baseline="0" dirty="0" smtClean="0"/>
+          </a:p>
+          <a:p>
+            <a:pPr marL="228600" indent="-228600">
+              <a:buFont typeface="+mj-lt"/>
+              <a:buAutoNum type="arabicPeriod" startAt="5"/>
+            </a:pPr>
+            <a:r>
+              <a:rPr lang="en-US" u="none" baseline="0" dirty="0" smtClean="0"/>
+              <a:t>Edit </a:t>
+            </a:r>
+            <a:r>
+              <a:rPr lang="en-US" dirty="0" smtClean="0"/>
+              <a:t>"app/index.html" and change the "</a:t>
+            </a:r>
+            <a:r>
+              <a:rPr lang="en-US" dirty="0" err="1" smtClean="0"/>
+              <a:t>ng</a:t>
+            </a:r>
+            <a:r>
+              <a:rPr lang="en-US" dirty="0" smtClean="0"/>
+              <a:t>-view" to "</a:t>
+            </a:r>
+            <a:r>
+              <a:rPr lang="en-US" dirty="0" err="1" smtClean="0"/>
+              <a:t>ui</a:t>
+            </a:r>
+            <a:r>
+              <a:rPr lang="en-US" dirty="0" smtClean="0"/>
+              <a:t>-view".</a:t>
+            </a:r>
+          </a:p>
+          <a:p>
+            <a:pPr marL="228600" indent="-228600">
+              <a:buFont typeface="+mj-lt"/>
+              <a:buAutoNum type="arabicPeriod" startAt="5"/>
+            </a:pPr>
+            <a:r>
+              <a:rPr lang="en-US" u="none" baseline="0" dirty="0" smtClean="0"/>
+              <a:t>Run "grunt serve". You'll see that the application now works with the states, in the URL type a random state to check the 404 message.</a:t>
+            </a:r>
+          </a:p>
+          <a:p>
+            <a:pPr marL="228600" indent="-228600">
+              <a:buFont typeface="+mj-lt"/>
+              <a:buAutoNum type="arabicPeriod" startAt="5"/>
+            </a:pPr>
+            <a:endParaRPr lang="en-US" u="none" baseline="0" dirty="0" smtClean="0"/>
+          </a:p>
+          <a:p>
+            <a:pPr marL="0" indent="0">
+              <a:buFont typeface="+mj-lt"/>
+              <a:buNone/>
+            </a:pPr>
+            <a:r>
+              <a:rPr lang="en-US" u="sng" baseline="0" dirty="0" smtClean="0"/>
+              <a:t>c) Create an example of multiple views</a:t>
+            </a:r>
+          </a:p>
+          <a:p>
+            <a:pPr marL="0" marR="0" indent="0" algn="l" defTabSz="914400" rtl="0" eaLnBrk="1" fontAlgn="auto" latinLnBrk="0" hangingPunct="1">
+              <a:lnSpc>
+                <a:spcPct val="100000"/>
+              </a:lnSpc>
+              <a:spcBef>
+                <a:spcPts val="0"/>
+              </a:spcBef>
+              <a:spcAft>
+                <a:spcPts val="0"/>
+              </a:spcAft>
+              <a:buClrTx/>
+              <a:buSzTx/>
+              <a:buFont typeface="+mj-lt"/>
+              <a:buNone/>
+              <a:tabLst/>
+              <a:defRPr/>
+            </a:pPr>
+            <a:r>
+              <a:rPr lang="en-US" dirty="0" smtClean="0"/>
+              <a:t>For this</a:t>
+            </a:r>
+            <a:r>
+              <a:rPr lang="en-US" baseline="0" dirty="0" smtClean="0"/>
+              <a:t> example w</a:t>
+            </a:r>
+            <a:r>
+              <a:rPr lang="en-US" dirty="0" smtClean="0"/>
+              <a:t>e are going to use the previous</a:t>
+            </a:r>
+            <a:r>
+              <a:rPr lang="en-US" baseline="0" dirty="0" smtClean="0"/>
+              <a:t> practice (</a:t>
+            </a:r>
+            <a:r>
+              <a:rPr lang="en-US" baseline="0" dirty="0" err="1" smtClean="0"/>
+              <a:t>practiceB</a:t>
+            </a:r>
+            <a:r>
+              <a:rPr lang="en-US" baseline="0" dirty="0" smtClean="0"/>
+              <a:t>).</a:t>
+            </a:r>
+          </a:p>
+          <a:p>
+            <a:pPr marL="0" indent="0">
+              <a:buFont typeface="+mj-lt"/>
+              <a:buNone/>
+            </a:pPr>
+            <a:r>
+              <a:rPr lang="en-US" u="none" baseline="0" dirty="0" smtClean="0"/>
+              <a:t>We are going to use the about page, adding two parts in it, and with buttons change the views inside.</a:t>
+            </a:r>
+          </a:p>
+          <a:p>
+            <a:pPr marL="228600" indent="-228600">
+              <a:buFont typeface="+mj-lt"/>
+              <a:buAutoNum type="arabicPeriod"/>
+            </a:pPr>
+            <a:r>
+              <a:rPr lang="en-US" u="none" baseline="0" dirty="0" smtClean="0"/>
+              <a:t>We have to create the views, for that you could add files in the "app/views" folder, or use the Yeoman's angular generator: "</a:t>
+            </a:r>
+            <a:r>
+              <a:rPr lang="en-US" u="none" baseline="0" dirty="0" err="1" smtClean="0"/>
+              <a:t>yo</a:t>
+            </a:r>
+            <a:r>
+              <a:rPr lang="en-US" u="none" baseline="0" dirty="0" smtClean="0"/>
+              <a:t> </a:t>
+            </a:r>
+            <a:r>
+              <a:rPr lang="en-US" u="none" baseline="0" dirty="0" err="1" smtClean="0"/>
+              <a:t>angular:view</a:t>
+            </a:r>
+            <a:r>
+              <a:rPr lang="en-US" u="none" baseline="0" dirty="0" smtClean="0"/>
+              <a:t> exampleView1", change the number and add until you have 4 different views.</a:t>
+            </a:r>
+          </a:p>
+          <a:p>
+            <a:pPr marL="228600" indent="-228600">
+              <a:buFont typeface="+mj-lt"/>
+              <a:buAutoNum type="arabicPeriod"/>
+            </a:pPr>
+            <a:r>
+              <a:rPr lang="en-US" u="none" baseline="0" dirty="0" smtClean="0"/>
+              <a:t>Go the desired template where you're going to have multiple views, in this example we are going to use the about, so please open the "app/views/about.html".</a:t>
+            </a:r>
+          </a:p>
+          <a:p>
+            <a:pPr marL="228600" indent="-228600">
+              <a:buFont typeface="+mj-lt"/>
+              <a:buAutoNum type="arabicPeriod"/>
+            </a:pPr>
+            <a:r>
+              <a:rPr lang="en-US" u="none" baseline="0" dirty="0" smtClean="0"/>
+              <a:t>Replace with the following code:</a:t>
+            </a:r>
+          </a:p>
+          <a:p>
+            <a:pPr marL="0" indent="0">
+              <a:buFont typeface="+mj-lt"/>
+              <a:buNone/>
+            </a:pPr>
+            <a:endParaRPr lang="en-US" u="none" baseline="0" dirty="0" smtClean="0"/>
+          </a:p>
+          <a:p>
+            <a:pPr marL="0" marR="0" lvl="0" indent="0" algn="l" defTabSz="914400" rtl="0" eaLnBrk="1" fontAlgn="auto" latinLnBrk="0" hangingPunct="1">
+              <a:lnSpc>
+                <a:spcPct val="100000"/>
+              </a:lnSpc>
+              <a:spcBef>
+                <a:spcPts val="0"/>
+              </a:spcBef>
+              <a:spcAft>
+                <a:spcPts val="0"/>
+              </a:spcAft>
+              <a:buClrTx/>
+              <a:buSzTx/>
+              <a:buFont typeface="+mj-lt"/>
+              <a:buNone/>
+              <a:tabLst/>
+              <a:defRPr/>
+            </a:pPr>
+            <a:r>
+              <a:rPr lang="en-US" dirty="0" smtClean="0"/>
+              <a:t>------------------------------------------------------------------------------------------------------------------------------------------------------</a:t>
+            </a:r>
+            <a:endParaRPr lang="en-US" u="none" baseline="0" dirty="0" smtClean="0"/>
+          </a:p>
+          <a:p>
+            <a:pPr marL="457200" lvl="1" indent="0">
+              <a:buFont typeface="+mj-lt"/>
+              <a:buNone/>
+            </a:pPr>
+            <a:r>
+              <a:rPr lang="en-US" u="none" baseline="0" dirty="0" smtClean="0"/>
+              <a:t>&lt;div&gt;</a:t>
+            </a:r>
+          </a:p>
+          <a:p>
+            <a:pPr marL="457200" lvl="1" indent="0">
+              <a:buFont typeface="+mj-lt"/>
+              <a:buNone/>
+            </a:pPr>
+            <a:r>
+              <a:rPr lang="en-US" u="none" baseline="0" dirty="0" smtClean="0"/>
+              <a:t>  &lt;h2&gt;This is the about view.&lt;/h2&gt;</a:t>
+            </a:r>
+          </a:p>
+          <a:p>
+            <a:pPr marL="457200" lvl="1" indent="0">
+              <a:buFont typeface="+mj-lt"/>
+              <a:buNone/>
+            </a:pPr>
+            <a:r>
+              <a:rPr lang="en-US" u="none" baseline="0" dirty="0" smtClean="0"/>
+              <a:t>  &lt;div class="</a:t>
+            </a:r>
+            <a:r>
+              <a:rPr lang="en-US" u="none" baseline="0" dirty="0" err="1" smtClean="0"/>
+              <a:t>navbar</a:t>
+            </a:r>
+            <a:r>
+              <a:rPr lang="en-US" u="none" baseline="0" dirty="0" smtClean="0"/>
+              <a:t> </a:t>
+            </a:r>
+            <a:r>
+              <a:rPr lang="en-US" u="none" baseline="0" dirty="0" err="1" smtClean="0"/>
+              <a:t>navbar</a:t>
+            </a:r>
+            <a:r>
+              <a:rPr lang="en-US" u="none" baseline="0" dirty="0" smtClean="0"/>
+              <a:t>-default" role="navigation"&gt;</a:t>
+            </a:r>
+          </a:p>
+          <a:p>
+            <a:pPr marL="457200" lvl="1" indent="0">
+              <a:buFont typeface="+mj-lt"/>
+              <a:buNone/>
+            </a:pPr>
+            <a:r>
+              <a:rPr lang="en-US" u="none" baseline="0" dirty="0" smtClean="0"/>
+              <a:t>    &lt;div class="container"&gt;</a:t>
+            </a:r>
+          </a:p>
+          <a:p>
+            <a:pPr marL="457200" lvl="1" indent="0">
+              <a:buFont typeface="+mj-lt"/>
+              <a:buNone/>
+            </a:pPr>
+            <a:r>
+              <a:rPr lang="en-US" u="none" baseline="0" dirty="0" smtClean="0"/>
+              <a:t>      &lt;div class="collapse </a:t>
+            </a:r>
+            <a:r>
+              <a:rPr lang="en-US" u="none" baseline="0" dirty="0" err="1" smtClean="0"/>
+              <a:t>navbar</a:t>
+            </a:r>
+            <a:r>
+              <a:rPr lang="en-US" u="none" baseline="0" dirty="0" smtClean="0"/>
+              <a:t>-collapse" id="</a:t>
+            </a:r>
+            <a:r>
+              <a:rPr lang="en-US" u="none" baseline="0" dirty="0" err="1" smtClean="0"/>
+              <a:t>js</a:t>
+            </a:r>
+            <a:r>
+              <a:rPr lang="en-US" u="none" baseline="0" dirty="0" smtClean="0"/>
+              <a:t>-</a:t>
+            </a:r>
+            <a:r>
+              <a:rPr lang="en-US" u="none" baseline="0" dirty="0" err="1" smtClean="0"/>
+              <a:t>navbar</a:t>
+            </a:r>
+            <a:r>
+              <a:rPr lang="en-US" u="none" baseline="0" dirty="0" smtClean="0"/>
+              <a:t>-collapse"&gt;</a:t>
+            </a:r>
+          </a:p>
+          <a:p>
+            <a:pPr marL="457200" lvl="1" indent="0">
+              <a:buFont typeface="+mj-lt"/>
+              <a:buNone/>
+            </a:pPr>
+            <a:r>
+              <a:rPr lang="en-US" u="none" baseline="0" dirty="0" smtClean="0"/>
+              <a:t>        &lt;</a:t>
+            </a:r>
+            <a:r>
+              <a:rPr lang="en-US" u="none" baseline="0" dirty="0" err="1" smtClean="0"/>
+              <a:t>ul</a:t>
+            </a:r>
+            <a:r>
+              <a:rPr lang="en-US" u="none" baseline="0" dirty="0" smtClean="0"/>
+              <a:t> class="</a:t>
+            </a:r>
+            <a:r>
+              <a:rPr lang="en-US" u="none" baseline="0" dirty="0" err="1" smtClean="0"/>
+              <a:t>nav</a:t>
+            </a:r>
+            <a:r>
+              <a:rPr lang="en-US" u="none" baseline="0" dirty="0" smtClean="0"/>
+              <a:t> </a:t>
+            </a:r>
+            <a:r>
+              <a:rPr lang="en-US" u="none" baseline="0" dirty="0" err="1" smtClean="0"/>
+              <a:t>navbar-nav</a:t>
+            </a:r>
+            <a:r>
+              <a:rPr lang="en-US" u="none" baseline="0" dirty="0" smtClean="0"/>
+              <a:t>"&gt;</a:t>
+            </a:r>
+          </a:p>
+          <a:p>
+            <a:pPr marL="457200" lvl="1" indent="0">
+              <a:buFont typeface="+mj-lt"/>
+              <a:buNone/>
+            </a:pPr>
+            <a:r>
+              <a:rPr lang="en-US" u="none" baseline="0" dirty="0" smtClean="0"/>
+              <a:t>          &lt;li&gt;&lt;a </a:t>
+            </a:r>
+            <a:r>
+              <a:rPr lang="en-US" u="none" baseline="0" dirty="0" err="1" smtClean="0"/>
+              <a:t>ui-sref</a:t>
+            </a:r>
+            <a:r>
+              <a:rPr lang="en-US" u="none" baseline="0" dirty="0" smtClean="0"/>
+              <a:t>="about.example1"&gt;1 y 2&lt;/a&gt;&lt;/li&gt;</a:t>
+            </a:r>
+          </a:p>
+          <a:p>
+            <a:pPr marL="457200" lvl="1" indent="0">
+              <a:buFont typeface="+mj-lt"/>
+              <a:buNone/>
+            </a:pPr>
+            <a:r>
+              <a:rPr lang="en-US" u="none" baseline="0" dirty="0" smtClean="0"/>
+              <a:t>          &lt;li&gt;&lt;a </a:t>
+            </a:r>
+            <a:r>
+              <a:rPr lang="en-US" u="none" baseline="0" dirty="0" err="1" smtClean="0"/>
+              <a:t>ui-sref</a:t>
+            </a:r>
+            <a:r>
+              <a:rPr lang="en-US" u="none" baseline="0" dirty="0" smtClean="0"/>
+              <a:t>="about.example2"&gt;2 y 3&lt;/a&gt;&lt;/li&gt;</a:t>
+            </a:r>
+          </a:p>
+          <a:p>
+            <a:pPr marL="457200" lvl="1" indent="0">
+              <a:buFont typeface="+mj-lt"/>
+              <a:buNone/>
+            </a:pPr>
+            <a:r>
+              <a:rPr lang="en-US" u="none" baseline="0" dirty="0" smtClean="0"/>
+              <a:t>          &lt;li&gt;&lt;a </a:t>
+            </a:r>
+            <a:r>
+              <a:rPr lang="en-US" u="none" baseline="0" dirty="0" err="1" smtClean="0"/>
+              <a:t>ui-sref</a:t>
+            </a:r>
+            <a:r>
+              <a:rPr lang="en-US" u="none" baseline="0" dirty="0" smtClean="0"/>
+              <a:t>="about.example3"&gt;3 y 4&lt;/a&gt;&lt;/li&gt;</a:t>
+            </a:r>
+          </a:p>
+          <a:p>
+            <a:pPr marL="457200" lvl="1" indent="0">
+              <a:buFont typeface="+mj-lt"/>
+              <a:buNone/>
+            </a:pPr>
+            <a:r>
+              <a:rPr lang="en-US" u="none" baseline="0" dirty="0" smtClean="0"/>
+              <a:t>          &lt;li&gt;&lt;a </a:t>
+            </a:r>
+            <a:r>
+              <a:rPr lang="en-US" u="none" baseline="0" dirty="0" err="1" smtClean="0"/>
+              <a:t>ui-sref</a:t>
+            </a:r>
+            <a:r>
+              <a:rPr lang="en-US" u="none" baseline="0" dirty="0" smtClean="0"/>
+              <a:t>="about.example4"&gt;4 y 1&lt;/a&gt;&lt;/li&gt;</a:t>
+            </a:r>
+          </a:p>
+          <a:p>
+            <a:pPr marL="457200" lvl="1" indent="0">
+              <a:buFont typeface="+mj-lt"/>
+              <a:buNone/>
+            </a:pPr>
+            <a:r>
+              <a:rPr lang="en-US" u="none" baseline="0" dirty="0" smtClean="0"/>
+              <a:t>        &lt;/</a:t>
+            </a:r>
+            <a:r>
+              <a:rPr lang="en-US" u="none" baseline="0" dirty="0" err="1" smtClean="0"/>
+              <a:t>ul</a:t>
+            </a:r>
+            <a:r>
+              <a:rPr lang="en-US" u="none" baseline="0" dirty="0" smtClean="0"/>
+              <a:t>&gt;</a:t>
+            </a:r>
+          </a:p>
+          <a:p>
+            <a:pPr marL="457200" lvl="1" indent="0">
+              <a:buFont typeface="+mj-lt"/>
+              <a:buNone/>
+            </a:pPr>
+            <a:r>
+              <a:rPr lang="en-US" u="none" baseline="0" dirty="0" smtClean="0"/>
+              <a:t>      &lt;/div&gt;</a:t>
+            </a:r>
+          </a:p>
+          <a:p>
+            <a:pPr marL="457200" lvl="1" indent="0">
+              <a:buFont typeface="+mj-lt"/>
+              <a:buNone/>
+            </a:pPr>
+            <a:r>
+              <a:rPr lang="en-US" u="none" baseline="0" dirty="0" smtClean="0"/>
+              <a:t>    &lt;/div&gt;</a:t>
+            </a:r>
+          </a:p>
+          <a:p>
+            <a:pPr marL="457200" lvl="1" indent="0">
+              <a:buFont typeface="+mj-lt"/>
+              <a:buNone/>
+            </a:pPr>
+            <a:r>
+              <a:rPr lang="en-US" u="none" baseline="0" dirty="0" smtClean="0"/>
+              <a:t>  &lt;/div&gt;</a:t>
+            </a:r>
+          </a:p>
+          <a:p>
+            <a:pPr marL="457200" lvl="1" indent="0">
+              <a:buFont typeface="+mj-lt"/>
+              <a:buNone/>
+            </a:pPr>
+            <a:r>
+              <a:rPr lang="en-US" u="none" baseline="0" dirty="0" smtClean="0"/>
+              <a:t>  &lt;div </a:t>
+            </a:r>
+            <a:r>
+              <a:rPr lang="en-US" u="none" baseline="0" dirty="0" err="1" smtClean="0"/>
+              <a:t>ui</a:t>
+            </a:r>
+            <a:r>
+              <a:rPr lang="en-US" u="none" baseline="0" dirty="0" smtClean="0"/>
+              <a:t>-view="</a:t>
+            </a:r>
+            <a:r>
+              <a:rPr lang="en-US" u="none" baseline="0" dirty="0" err="1" smtClean="0"/>
+              <a:t>aboutContent</a:t>
+            </a:r>
+            <a:r>
+              <a:rPr lang="en-US" u="none" baseline="0" dirty="0" smtClean="0"/>
+              <a:t>"&gt;&lt;/div&gt;</a:t>
+            </a:r>
+          </a:p>
+          <a:p>
+            <a:pPr marL="457200" lvl="1" indent="0">
+              <a:buFont typeface="+mj-lt"/>
+              <a:buNone/>
+            </a:pPr>
+            <a:r>
+              <a:rPr lang="en-US" u="none" baseline="0" dirty="0" smtClean="0"/>
+              <a:t>  &lt;div </a:t>
+            </a:r>
+            <a:r>
+              <a:rPr lang="en-US" u="none" baseline="0" dirty="0" err="1" smtClean="0"/>
+              <a:t>ui</a:t>
+            </a:r>
+            <a:r>
+              <a:rPr lang="en-US" u="none" baseline="0" dirty="0" smtClean="0"/>
+              <a:t>-view="</a:t>
+            </a:r>
+            <a:r>
+              <a:rPr lang="en-US" u="none" baseline="0" dirty="0" err="1" smtClean="0"/>
+              <a:t>aboutFooter</a:t>
+            </a:r>
+            <a:r>
+              <a:rPr lang="en-US" u="none" baseline="0" dirty="0" smtClean="0"/>
+              <a:t>"&gt;&lt;/div&gt;</a:t>
+            </a:r>
+          </a:p>
+          <a:p>
+            <a:pPr marL="457200" lvl="1" indent="0">
+              <a:buFont typeface="+mj-lt"/>
+              <a:buNone/>
+            </a:pPr>
+            <a:r>
+              <a:rPr lang="en-US" u="none" baseline="0" dirty="0" smtClean="0"/>
+              <a:t>&lt;/div&gt;</a:t>
+            </a:r>
+          </a:p>
+          <a:p>
+            <a:pPr marL="0" marR="0" lvl="0" indent="0" algn="l" defTabSz="914400" rtl="0" eaLnBrk="1" fontAlgn="auto" latinLnBrk="0" hangingPunct="1">
+              <a:lnSpc>
+                <a:spcPct val="100000"/>
+              </a:lnSpc>
+              <a:spcBef>
+                <a:spcPts val="0"/>
+              </a:spcBef>
+              <a:spcAft>
+                <a:spcPts val="0"/>
+              </a:spcAft>
+              <a:buClrTx/>
+              <a:buSzTx/>
+              <a:buFont typeface="+mj-lt"/>
+              <a:buNone/>
+              <a:tabLst/>
+              <a:defRPr/>
+            </a:pPr>
+            <a:r>
+              <a:rPr lang="en-US" dirty="0" smtClean="0"/>
+              <a:t>------------------------------------------------------------------------------------------------------------------------------------------------------</a:t>
+            </a:r>
+          </a:p>
+          <a:p>
+            <a:pPr marL="0" indent="0">
+              <a:buFont typeface="+mj-lt"/>
+              <a:buNone/>
+            </a:pPr>
+            <a:endParaRPr lang="en-US" u="none" baseline="0" dirty="0" smtClean="0"/>
+          </a:p>
+          <a:p>
+            <a:pPr marL="228600" indent="-228600">
+              <a:buFont typeface="+mj-lt"/>
+              <a:buAutoNum type="arabicPeriod" startAt="4"/>
+            </a:pPr>
+            <a:r>
+              <a:rPr lang="en-US" dirty="0" smtClean="0"/>
+              <a:t>Open "app/scripts/app.js" and add the states for the 4 examples like this:</a:t>
+            </a:r>
+          </a:p>
+          <a:p>
+            <a:pPr marL="0" indent="0">
+              <a:buFont typeface="+mj-lt"/>
+              <a:buNone/>
+            </a:pPr>
+            <a:endParaRPr lang="en-US" dirty="0" smtClean="0"/>
+          </a:p>
+          <a:p>
+            <a:pPr marL="0" indent="0">
+              <a:buFont typeface="+mj-lt"/>
+              <a:buNone/>
+            </a:pPr>
+            <a:r>
+              <a:rPr lang="en-US" dirty="0" smtClean="0"/>
+              <a:t>.state('about.example1', {</a:t>
+            </a:r>
+          </a:p>
+          <a:p>
+            <a:pPr marL="0" indent="0">
+              <a:buFont typeface="+mj-lt"/>
+              <a:buNone/>
+            </a:pPr>
+            <a:r>
+              <a:rPr lang="en-US" dirty="0" smtClean="0"/>
+              <a:t>        parent: 'about',</a:t>
+            </a:r>
+          </a:p>
+          <a:p>
+            <a:pPr marL="0" indent="0">
+              <a:buFont typeface="+mj-lt"/>
+              <a:buNone/>
+            </a:pPr>
+            <a:r>
+              <a:rPr lang="en-US" dirty="0" smtClean="0"/>
+              <a:t>        views: {</a:t>
+            </a:r>
+          </a:p>
+          <a:p>
+            <a:pPr marL="0" indent="0">
+              <a:buFont typeface="+mj-lt"/>
+              <a:buNone/>
+            </a:pPr>
+            <a:r>
+              <a:rPr lang="en-US" dirty="0" smtClean="0"/>
+              <a:t>          </a:t>
+            </a:r>
+            <a:r>
+              <a:rPr lang="en-US" dirty="0" err="1" smtClean="0"/>
+              <a:t>aboutContent</a:t>
+            </a:r>
+            <a:r>
+              <a:rPr lang="en-US" dirty="0" smtClean="0"/>
+              <a:t>: {</a:t>
+            </a:r>
+          </a:p>
+          <a:p>
+            <a:pPr marL="0" indent="0">
+              <a:buFont typeface="+mj-lt"/>
+              <a:buNone/>
+            </a:pPr>
+            <a:r>
+              <a:rPr lang="en-US" dirty="0" smtClean="0"/>
+              <a:t>            </a:t>
+            </a:r>
+            <a:r>
+              <a:rPr lang="en-US" dirty="0" err="1" smtClean="0"/>
+              <a:t>templateUrl</a:t>
+            </a:r>
+            <a:r>
+              <a:rPr lang="en-US" dirty="0" smtClean="0"/>
+              <a:t>: 'views/exampleview1.html'</a:t>
+            </a:r>
+          </a:p>
+          <a:p>
+            <a:pPr marL="0" indent="0">
+              <a:buFont typeface="+mj-lt"/>
+              <a:buNone/>
+            </a:pPr>
+            <a:r>
+              <a:rPr lang="en-US" dirty="0" smtClean="0"/>
+              <a:t>          },</a:t>
+            </a:r>
+          </a:p>
+          <a:p>
+            <a:pPr marL="0" indent="0">
+              <a:buFont typeface="+mj-lt"/>
+              <a:buNone/>
+            </a:pPr>
+            <a:r>
+              <a:rPr lang="en-US" dirty="0" smtClean="0"/>
+              <a:t>          </a:t>
+            </a:r>
+            <a:r>
+              <a:rPr lang="en-US" dirty="0" err="1" smtClean="0"/>
+              <a:t>aboutFooter</a:t>
+            </a:r>
+            <a:r>
+              <a:rPr lang="en-US" dirty="0" smtClean="0"/>
+              <a:t>: {</a:t>
+            </a:r>
+          </a:p>
+          <a:p>
+            <a:pPr marL="0" indent="0">
+              <a:buFont typeface="+mj-lt"/>
+              <a:buNone/>
+            </a:pPr>
+            <a:r>
+              <a:rPr lang="en-US" dirty="0" smtClean="0"/>
+              <a:t>            </a:t>
+            </a:r>
+            <a:r>
+              <a:rPr lang="en-US" dirty="0" err="1" smtClean="0"/>
+              <a:t>templateUrl</a:t>
+            </a:r>
+            <a:r>
+              <a:rPr lang="en-US" dirty="0" smtClean="0"/>
+              <a:t>: 'views/exampleview2.html'</a:t>
+            </a:r>
+          </a:p>
+          <a:p>
+            <a:pPr marL="0" indent="0">
+              <a:buFont typeface="+mj-lt"/>
+              <a:buNone/>
+            </a:pPr>
+            <a:r>
+              <a:rPr lang="en-US" dirty="0" smtClean="0"/>
+              <a:t>          }</a:t>
+            </a:r>
+          </a:p>
+          <a:p>
+            <a:pPr marL="0" indent="0">
+              <a:buFont typeface="+mj-lt"/>
+              <a:buNone/>
+            </a:pPr>
+            <a:r>
+              <a:rPr lang="en-US" dirty="0" smtClean="0"/>
+              <a:t>        }</a:t>
+            </a:r>
+          </a:p>
+          <a:p>
+            <a:pPr marL="0" indent="0">
+              <a:buFont typeface="+mj-lt"/>
+              <a:buNone/>
+            </a:pPr>
+            <a:r>
+              <a:rPr lang="en-US" dirty="0" smtClean="0"/>
+              <a:t>      })</a:t>
+            </a:r>
+          </a:p>
+          <a:p>
+            <a:pPr marL="0" indent="0">
+              <a:buFont typeface="+mj-lt"/>
+              <a:buNone/>
+            </a:pPr>
+            <a:endParaRPr lang="en-US" u="none" baseline="0" dirty="0" smtClean="0"/>
+          </a:p>
+          <a:p>
+            <a:pPr marL="228600" indent="-228600">
+              <a:buFont typeface="+mj-lt"/>
+              <a:buAutoNum type="arabicPeriod" startAt="5"/>
+            </a:pPr>
+            <a:r>
+              <a:rPr lang="en-US" u="none" baseline="0" dirty="0" smtClean="0"/>
+              <a:t> Add the rest of the states: "</a:t>
+            </a:r>
+            <a:r>
+              <a:rPr lang="en-US" dirty="0" smtClean="0"/>
+              <a:t>about.example2</a:t>
+            </a:r>
+            <a:r>
+              <a:rPr lang="en-US" u="none" baseline="0" dirty="0" smtClean="0"/>
+              <a:t>", "</a:t>
+            </a:r>
+            <a:r>
+              <a:rPr lang="en-US" dirty="0" smtClean="0"/>
+              <a:t>about.example3</a:t>
+            </a:r>
+            <a:r>
+              <a:rPr lang="en-US" u="none" baseline="0" dirty="0" smtClean="0"/>
+              <a:t>" y "</a:t>
+            </a:r>
+            <a:r>
+              <a:rPr lang="en-US" dirty="0" smtClean="0"/>
+              <a:t>about.example4</a:t>
+            </a:r>
+            <a:r>
+              <a:rPr lang="en-US" u="none" baseline="0" dirty="0" smtClean="0"/>
+              <a:t>" making combination of the templates in the views.</a:t>
+            </a:r>
+          </a:p>
+          <a:p>
+            <a:pPr marL="228600" indent="-228600">
+              <a:buFont typeface="+mj-lt"/>
+              <a:buAutoNum type="arabicPeriod" startAt="5"/>
+            </a:pPr>
+            <a:r>
+              <a:rPr lang="en-US" u="none" baseline="0" dirty="0" smtClean="0"/>
+              <a:t>Run "grunt serve". </a:t>
+            </a:r>
+          </a:p>
+          <a:p>
+            <a:pPr marL="228600" indent="-228600">
+              <a:buFont typeface="+mj-lt"/>
+              <a:buAutoNum type="arabicPeriod" startAt="5"/>
+            </a:pPr>
+            <a:r>
+              <a:rPr lang="en-US" u="none" baseline="0" dirty="0" smtClean="0"/>
+              <a:t>Go to "About" section.</a:t>
+            </a:r>
+          </a:p>
+          <a:p>
+            <a:pPr marL="228600" indent="-228600">
+              <a:buFont typeface="+mj-lt"/>
+              <a:buAutoNum type="arabicPeriod" startAt="5"/>
+            </a:pPr>
+            <a:r>
+              <a:rPr lang="en-US" u="none" baseline="0" dirty="0" smtClean="0"/>
+              <a:t>Click on the various buttons in the </a:t>
+            </a:r>
+            <a:r>
+              <a:rPr lang="en-US" u="none" baseline="0" dirty="0" err="1" smtClean="0"/>
+              <a:t>navbar</a:t>
+            </a:r>
+            <a:r>
+              <a:rPr lang="en-US" u="none" baseline="0" dirty="0" smtClean="0"/>
+              <a:t> added and observe the results.</a:t>
+            </a:r>
+          </a:p>
+          <a:p>
+            <a:pPr marL="228600" indent="-228600">
+              <a:buFont typeface="+mj-lt"/>
+              <a:buAutoNum type="arabicPeriod" startAt="5"/>
+            </a:pPr>
+            <a:endParaRPr lang="en-US" u="none" baseline="0" dirty="0" smtClean="0"/>
+          </a:p>
+          <a:p>
+            <a:pPr marL="0" indent="0">
+              <a:buFont typeface="+mj-lt"/>
+              <a:buNone/>
+            </a:pPr>
+            <a:r>
+              <a:rPr lang="en-US" u="none" baseline="0" dirty="0" smtClean="0"/>
+              <a:t>As you can see, in the example only we use a simple HTML template to change, but this also works with controllers, resolve and the other properties a state can be configured.</a:t>
+            </a:r>
+            <a:endParaRPr lang="en-US" u="none" baseline="0" dirty="0" smtClean="0"/>
+          </a:p>
+          <a:p>
+            <a:pPr marL="228600" indent="-228600">
+              <a:buFont typeface="+mj-lt"/>
+              <a:buAutoNum type="alphaLcParenR"/>
             </a:pPr>
             <a:endParaRPr lang="en-US" baseline="0" dirty="0" smtClean="0"/>
           </a:p>
@@ -8669,7 +10749,21 @@
             </a:pPr>
             <a:r>
               <a:rPr lang="en-US" dirty="0" smtClean="0"/>
-              <a:t>https://github.com/yeoman/generator-angular</a:t>
+              <a:t>https://</a:t>
+            </a:r>
+            <a:r>
+              <a:rPr lang="en-US" dirty="0" smtClean="0"/>
+              <a:t>github.com/yeoman/generator-angular</a:t>
+            </a:r>
+          </a:p>
+          <a:p>
+            <a:pPr marL="0" indent="0">
+              <a:buFont typeface="+mj-lt"/>
+              <a:buNone/>
+            </a:pPr>
+            <a:r>
+              <a:rPr lang="en-US" dirty="0" smtClean="0"/>
+              <a:t>https://www.npmjs.com/package/generator-angular-ui-router</a:t>
             </a:r>
             <a:endParaRPr lang="en-US" dirty="0"/>
           </a:p>
@@ -8755,6 +10849,35 @@
           <a:bodyPr/>
           <a:lstStyle/>
           <a:p>
+            <a:r>
+              <a:rPr lang="en-US" dirty="0" err="1" smtClean="0"/>
+              <a:t>AngularJS</a:t>
+            </a:r>
+            <a:r>
+              <a:rPr lang="en-US" dirty="0" smtClean="0"/>
+              <a:t> lets you extend HTML with new attributes and functionalities.</a:t>
+            </a:r>
+          </a:p>
+          <a:p>
+            <a:endParaRPr lang="en-US" dirty="0" smtClean="0"/>
+          </a:p>
+          <a:p>
+            <a:r>
+              <a:rPr lang="en-US" dirty="0" smtClean="0"/>
+              <a:t>In the slide we can appreciate that we are creating the "my-new-tag" element, that uses the</a:t>
+            </a:r>
+            <a:r>
+              <a:rPr lang="en-US" baseline="0" dirty="0" smtClean="0"/>
+              <a:t> </a:t>
+            </a:r>
+            <a:r>
+              <a:rPr lang="en-US" baseline="0" dirty="0" err="1" smtClean="0"/>
+              <a:t>AngularJS</a:t>
+            </a:r>
+            <a:r>
+              <a:rPr lang="en-US" baseline="0" dirty="0" smtClean="0"/>
+              <a:t> $compile system to creates a element that a browser can understand.</a:t>
+            </a:r>
             <a:endParaRPr lang="en-US" dirty="0"/>
           </a:p>
         </p:txBody>
@@ -8776,6 +10899,457 @@
           <a:p>
             <a:fld id="{212C6109-0EF7-4E6B-B279-6389DF78298C}" type="slidenum">
               <a:rPr lang="en-US" smtClean="0"/>
+              <a:t>26</a:t>
+            </a:fld>
+            <a:endParaRPr lang="en-US"/>
+          </a:p>
+        </p:txBody>
+      </p:sp>
+    </p:spTree>
+    <p:extLst>
+      <p:ext uri="{BB962C8B-B14F-4D97-AF65-F5344CB8AC3E}">
+        <p14:creationId xmlns:p14="http://schemas.microsoft.com/office/powerpoint/2010/main" val="3633688630"/>
+      </p:ext>
+    </p:extLst>
+  </p:cSld>
+  <p:clrMapOvr>
+    <a:masterClrMapping/>
+  </p:clrMapOvr>
+</p:notes>
+</file>
+
+<file path=ppt/notesSlides/notesSlide26.xml><?xml version="1.0" encoding="utf-8"?>
+<p:notes xmlns:a="http://schemas.openxmlformats.org/drawingml/2006/main" xmlns:r="http://schemas.openxmlformats.org/officeDocument/2006/relationships" xmlns:p="http://schemas.openxmlformats.org/presentationml/2006/main">
+  <p:cSld>
+    <p:spTree>
+      <p:nvGrpSpPr>
+        <p:cNvPr id="1" name=""/>
+        <p:cNvGrpSpPr/>
+        <p:nvPr/>
+      </p:nvGrpSpPr>
+      <p:grpSpPr>
+        <a:xfrm>
+          <a:off x="0" y="0"/>
+          <a:ext cx="0" cy="0"/>
+          <a:chOff x="0" y="0"/>
+          <a:chExt cx="0" cy="0"/>
+        </a:xfrm>
+      </p:grpSpPr>
+      <p:sp>
+        <p:nvSpPr>
+          <p:cNvPr id="2" name="1 Marcador de imagen de diapositiva"/>
+          <p:cNvSpPr>
+            <a:spLocks noGrp="1" noRot="1" noChangeAspect="1"/>
+          </p:cNvSpPr>
+          <p:nvPr>
+            <p:ph type="sldImg"/>
+          </p:nvPr>
+        </p:nvSpPr>
+        <p:spPr/>
+      </p:sp>
+      <p:sp>
+        <p:nvSpPr>
+          <p:cNvPr id="3" name="2 Marcador de notas"/>
+          <p:cNvSpPr>
+            <a:spLocks noGrp="1"/>
+          </p:cNvSpPr>
+          <p:nvPr>
+            <p:ph type="body" idx="1"/>
+          </p:nvPr>
+        </p:nvSpPr>
+        <p:spPr/>
+        <p:txBody>
+          <a:bodyPr/>
+          <a:lstStyle/>
+          <a:p>
+            <a:r>
+              <a:rPr lang="en-US" dirty="0" smtClean="0"/>
+              <a:t>A</a:t>
+            </a:r>
+            <a:r>
+              <a:rPr lang="en-US" baseline="0" dirty="0" smtClean="0"/>
+              <a:t> directive can be match in the browser with a various names, this optional names was created in a way that every browser can have customized attributes and elements.</a:t>
+            </a:r>
+          </a:p>
+          <a:p>
+            <a:endParaRPr lang="en-US" baseline="0" dirty="0" smtClean="0"/>
+          </a:p>
+          <a:p>
+            <a:r>
+              <a:rPr lang="en-US" baseline="0" dirty="0" smtClean="0"/>
+              <a:t>In the slide we can observe that the directive "</a:t>
+            </a:r>
+            <a:r>
+              <a:rPr lang="en-US" baseline="0" dirty="0" err="1" smtClean="0"/>
+              <a:t>ngRepeat</a:t>
+            </a:r>
+            <a:r>
+              <a:rPr lang="en-US" baseline="0" dirty="0" smtClean="0"/>
+              <a:t>" can be put in the displayed forms, the ones in red are the most common and I recommend to use, the others could be deprecated in the future, because aren't much popular.</a:t>
+            </a:r>
+            <a:endParaRPr lang="en-US" dirty="0"/>
+          </a:p>
+        </p:txBody>
+      </p:sp>
+      <p:sp>
+        <p:nvSpPr>
+          <p:cNvPr id="4" name="3 Marcador de número de diapositiva"/>
+          <p:cNvSpPr>
+            <a:spLocks noGrp="1"/>
+          </p:cNvSpPr>
+          <p:nvPr>
+            <p:ph type="sldNum" sz="quarter" idx="10"/>
+          </p:nvPr>
+        </p:nvSpPr>
+        <p:spPr/>
+        <p:txBody>
+          <a:bodyPr/>
+          <a:lstStyle/>
+          <a:p>
+            <a:fld id="{212C6109-0EF7-4E6B-B279-6389DF78298C}" type="slidenum">
+              <a:rPr lang="en-US" smtClean="0"/>
+              <a:t>27</a:t>
+            </a:fld>
+            <a:endParaRPr lang="en-US"/>
+          </a:p>
+        </p:txBody>
+      </p:sp>
+    </p:spTree>
+    <p:extLst>
+      <p:ext uri="{BB962C8B-B14F-4D97-AF65-F5344CB8AC3E}">
+        <p14:creationId xmlns:p14="http://schemas.microsoft.com/office/powerpoint/2010/main" val="853035063"/>
+      </p:ext>
+    </p:extLst>
+  </p:cSld>
+  <p:clrMapOvr>
+    <a:masterClrMapping/>
+  </p:clrMapOvr>
+</p:notes>
+</file>
+
+<file path=ppt/notesSlides/notesSlide27.xml><?xml version="1.0" encoding="utf-8"?>
+<p:notes xmlns:a="http://schemas.openxmlformats.org/drawingml/2006/main" xmlns:r="http://schemas.openxmlformats.org/officeDocument/2006/relationships" xmlns:p="http://schemas.openxmlformats.org/presentationml/2006/main">
+  <p:cSld>
+    <p:spTree>
+      <p:nvGrpSpPr>
+        <p:cNvPr id="1" name=""/>
+        <p:cNvGrpSpPr/>
+        <p:nvPr/>
+      </p:nvGrpSpPr>
+      <p:grpSpPr>
+        <a:xfrm>
+          <a:off x="0" y="0"/>
+          <a:ext cx="0" cy="0"/>
+          <a:chOff x="0" y="0"/>
+          <a:chExt cx="0" cy="0"/>
+        </a:xfrm>
+      </p:grpSpPr>
+      <p:sp>
+        <p:nvSpPr>
+          <p:cNvPr id="2" name="1 Marcador de imagen de diapositiva"/>
+          <p:cNvSpPr>
+            <a:spLocks noGrp="1" noRot="1" noChangeAspect="1"/>
+          </p:cNvSpPr>
+          <p:nvPr>
+            <p:ph type="sldImg"/>
+          </p:nvPr>
+        </p:nvSpPr>
+        <p:spPr/>
+      </p:sp>
+      <p:sp>
+        <p:nvSpPr>
+          <p:cNvPr id="3" name="2 Marcador de notas"/>
+          <p:cNvSpPr>
+            <a:spLocks noGrp="1"/>
+          </p:cNvSpPr>
+          <p:nvPr>
+            <p:ph type="body" idx="1"/>
+          </p:nvPr>
+        </p:nvSpPr>
+        <p:spPr/>
+        <p:txBody>
+          <a:bodyPr/>
+          <a:lstStyle/>
+          <a:p>
+            <a:r>
+              <a:rPr lang="en-US" dirty="0" smtClean="0"/>
+              <a:t>The slide shows how you can create a "</a:t>
+            </a:r>
+            <a:r>
+              <a:rPr lang="en-US" dirty="0" err="1" smtClean="0"/>
+              <a:t>myButton</a:t>
+            </a:r>
+            <a:r>
+              <a:rPr lang="en-US" dirty="0" smtClean="0"/>
+              <a:t>" directive in the module "</a:t>
+            </a:r>
+            <a:r>
+              <a:rPr lang="en-US" dirty="0" err="1" smtClean="0"/>
+              <a:t>myApp</a:t>
+            </a:r>
+            <a:r>
+              <a:rPr lang="en-US" dirty="0" smtClean="0"/>
+              <a:t>".</a:t>
+            </a:r>
+          </a:p>
+          <a:p>
+            <a:endParaRPr lang="en-US" dirty="0" smtClean="0"/>
+          </a:p>
+          <a:p>
+            <a:r>
+              <a:rPr lang="en-US" dirty="0" smtClean="0"/>
+              <a:t>The</a:t>
+            </a:r>
+            <a:r>
+              <a:rPr lang="en-US" baseline="0" dirty="0" smtClean="0"/>
+              <a:t> names in the directive have to be in camel case notation to work, this will be translated to HTML with hyphens: "</a:t>
+            </a:r>
+            <a:r>
+              <a:rPr lang="en-US" baseline="0" dirty="0" err="1" smtClean="0"/>
+              <a:t>myButton</a:t>
+            </a:r>
+            <a:r>
+              <a:rPr lang="en-US" baseline="0" dirty="0" smtClean="0"/>
+              <a:t>" in the HTML templates is mapped with "my-button". (the same for the scope attributes).</a:t>
+            </a:r>
+          </a:p>
+          <a:p>
+            <a:endParaRPr lang="en-US" baseline="0" dirty="0" smtClean="0"/>
+          </a:p>
+          <a:p>
+            <a:r>
+              <a:rPr lang="en-US" baseline="0" dirty="0" smtClean="0"/>
+              <a:t>The more used properties in a directive are:</a:t>
+            </a:r>
+          </a:p>
+          <a:p>
+            <a:endParaRPr lang="en-US" baseline="0" dirty="0" smtClean="0"/>
+          </a:p>
+          <a:p>
+            <a:r>
+              <a:rPr lang="en-US" baseline="0" dirty="0" smtClean="0"/>
+              <a:t>restrict:		This could have the letters:</a:t>
+            </a:r>
+          </a:p>
+          <a:p>
+            <a:pPr marL="2000250" lvl="4" indent="-171450">
+              <a:buFont typeface="Arial" panose="020B0604020202020204" pitchFamily="34" charset="0"/>
+              <a:buChar char="•"/>
+            </a:pPr>
+            <a:r>
+              <a:rPr lang="en-US" baseline="0" dirty="0" smtClean="0"/>
+              <a:t>E - element: &lt;my-button&gt;</a:t>
+            </a:r>
+          </a:p>
+          <a:p>
+            <a:pPr marL="2000250" lvl="4" indent="-171450">
+              <a:buFont typeface="Arial" panose="020B0604020202020204" pitchFamily="34" charset="0"/>
+              <a:buChar char="•"/>
+            </a:pPr>
+            <a:r>
+              <a:rPr lang="en-US" baseline="0" dirty="0" smtClean="0"/>
+              <a:t>A - attribute: &lt;div my-button&gt;&lt;/div&gt;</a:t>
+            </a:r>
+          </a:p>
+          <a:p>
+            <a:pPr marL="2000250" lvl="4" indent="-171450">
+              <a:buFont typeface="Arial" panose="020B0604020202020204" pitchFamily="34" charset="0"/>
+              <a:buChar char="•"/>
+            </a:pPr>
+            <a:r>
+              <a:rPr lang="en-US" baseline="0" dirty="0" smtClean="0"/>
+              <a:t>C - class: &lt;div class="my-button"&gt;&lt;/div&gt;</a:t>
+            </a:r>
+          </a:p>
+          <a:p>
+            <a:pPr marL="1543050" lvl="3" indent="-171450">
+              <a:buFont typeface="Arial" panose="020B0604020202020204" pitchFamily="34" charset="0"/>
+              <a:buChar char="•"/>
+            </a:pPr>
+            <a:endParaRPr lang="en-US" baseline="0" dirty="0" smtClean="0"/>
+          </a:p>
+          <a:p>
+            <a:pPr marL="0" lvl="0" indent="0">
+              <a:buFont typeface="Arial" panose="020B0604020202020204" pitchFamily="34" charset="0"/>
+              <a:buNone/>
+            </a:pPr>
+            <a:r>
+              <a:rPr lang="en-US" baseline="0" dirty="0" smtClean="0"/>
+              <a:t>replace: 		As the name tells, is for making the html that creates the directive being replaced by the html of the directive in the code sent to the browser. Is recommended to replace always when you can to reduce the HTML code size.</a:t>
+            </a:r>
+          </a:p>
+          <a:p>
+            <a:pPr marL="0" lvl="0" indent="0">
+              <a:buFont typeface="Arial" panose="020B0604020202020204" pitchFamily="34" charset="0"/>
+              <a:buNone/>
+            </a:pPr>
+            <a:endParaRPr lang="en-US" baseline="0" dirty="0" smtClean="0"/>
+          </a:p>
+          <a:p>
+            <a:pPr marL="0" lvl="0" indent="0">
+              <a:buFont typeface="Arial" panose="020B0604020202020204" pitchFamily="34" charset="0"/>
+              <a:buNone/>
+            </a:pPr>
+            <a:r>
+              <a:rPr lang="en-US" baseline="0" dirty="0" smtClean="0"/>
+              <a:t>template or </a:t>
+            </a:r>
+            <a:r>
+              <a:rPr lang="en-US" baseline="0" dirty="0" err="1" smtClean="0"/>
+              <a:t>templateUrl</a:t>
+            </a:r>
+            <a:r>
+              <a:rPr lang="en-US" baseline="0" dirty="0" smtClean="0"/>
+              <a:t>: 	Is to point the directive where are the template to follow, if you have a big structure of HTML for your directive, is always recommended to use the </a:t>
+            </a:r>
+            <a:r>
+              <a:rPr lang="en-US" baseline="0" dirty="0" err="1" smtClean="0"/>
+              <a:t>templateUrl</a:t>
+            </a:r>
+            <a:r>
+              <a:rPr lang="en-US" baseline="0" dirty="0" smtClean="0"/>
+              <a:t>.</a:t>
+            </a:r>
+          </a:p>
+          <a:p>
+            <a:pPr marL="0" lvl="0" indent="0">
+              <a:buFont typeface="Arial" panose="020B0604020202020204" pitchFamily="34" charset="0"/>
+              <a:buNone/>
+            </a:pPr>
+            <a:endParaRPr lang="en-US" baseline="0" dirty="0" smtClean="0"/>
+          </a:p>
+          <a:p>
+            <a:pPr marL="0" lvl="0" indent="0">
+              <a:buFont typeface="Arial" panose="020B0604020202020204" pitchFamily="34" charset="0"/>
+              <a:buNone/>
+            </a:pPr>
+            <a:r>
+              <a:rPr lang="en-US" baseline="0" dirty="0" err="1" smtClean="0"/>
+              <a:t>transclude</a:t>
+            </a:r>
+            <a:r>
+              <a:rPr lang="en-US" baseline="0" dirty="0" smtClean="0"/>
+              <a:t>:</a:t>
+            </a:r>
+            <a:r>
+              <a:rPr lang="en-US" baseline="0" dirty="0"/>
+              <a:t> </a:t>
+            </a:r>
+            <a:r>
+              <a:rPr lang="en-US" baseline="0" dirty="0" smtClean="0"/>
+              <a:t>		This is a little bit difficult to understand, but is the ability of the directive to receive code inside a directive, and then uses it inside. This creates a </a:t>
+            </a:r>
+            <a:r>
+              <a:rPr lang="en-US" baseline="0" dirty="0" err="1" smtClean="0"/>
+              <a:t>ChildScope</a:t>
+            </a:r>
+            <a:r>
+              <a:rPr lang="en-US" baseline="0" dirty="0" smtClean="0"/>
+              <a:t> that may loose the original scope (This will be covered in the future lessons), </a:t>
+            </a:r>
+            <a:r>
+              <a:rPr lang="en-US" baseline="0" dirty="0" err="1" smtClean="0"/>
+              <a:t>eg</a:t>
+            </a:r>
+            <a:r>
+              <a:rPr lang="en-US" baseline="0" dirty="0" smtClean="0"/>
+              <a:t>. &lt;my-button&gt;&lt;other-directive&gt;Something&lt;/other-directive&gt;&lt;/my-button&gt;</a:t>
+            </a:r>
+          </a:p>
+          <a:p>
+            <a:pPr marL="0" lvl="0" indent="0">
+              <a:buFont typeface="Arial" panose="020B0604020202020204" pitchFamily="34" charset="0"/>
+              <a:buNone/>
+            </a:pPr>
+            <a:endParaRPr lang="en-US" baseline="0" dirty="0" smtClean="0"/>
+          </a:p>
+          <a:p>
+            <a:pPr marL="0" lvl="0" indent="0">
+              <a:buFont typeface="Arial" panose="020B0604020202020204" pitchFamily="34" charset="0"/>
+              <a:buNone/>
+            </a:pPr>
+            <a:r>
+              <a:rPr lang="en-US" baseline="0" dirty="0" smtClean="0"/>
+              <a:t>scope:		This will tell the type of scope the directive will have. This will be covered in the next lesson.</a:t>
+            </a:r>
+          </a:p>
+          <a:p>
+            <a:pPr marL="0" lvl="0" indent="0">
+              <a:buFont typeface="Arial" panose="020B0604020202020204" pitchFamily="34" charset="0"/>
+              <a:buNone/>
+            </a:pPr>
+            <a:endParaRPr lang="en-US" baseline="0" dirty="0" smtClean="0"/>
+          </a:p>
+          <a:p>
+            <a:pPr marL="0" lvl="0" indent="0">
+              <a:buFont typeface="Arial" panose="020B0604020202020204" pitchFamily="34" charset="0"/>
+              <a:buNone/>
+            </a:pPr>
+            <a:r>
+              <a:rPr lang="en-US" baseline="0" dirty="0" smtClean="0"/>
+              <a:t>compile: 		Is the functions that will be executed in the compile stage.</a:t>
+            </a:r>
+          </a:p>
+          <a:p>
+            <a:pPr marL="0" lvl="0" indent="0">
+              <a:buFont typeface="Arial" panose="020B0604020202020204" pitchFamily="34" charset="0"/>
+              <a:buNone/>
+            </a:pPr>
+            <a:endParaRPr lang="en-US" baseline="0" dirty="0" smtClean="0"/>
+          </a:p>
+          <a:p>
+            <a:pPr marL="0" lvl="0" indent="0">
+              <a:buFont typeface="Arial" panose="020B0604020202020204" pitchFamily="34" charset="0"/>
+              <a:buNone/>
+            </a:pPr>
+            <a:r>
+              <a:rPr lang="en-US" baseline="0" dirty="0" smtClean="0"/>
+              <a:t>link:		Is the function execute when the directive is already compiled and ready for DOM manipulation.</a:t>
+            </a:r>
+          </a:p>
+          <a:p>
+            <a:pPr marL="0" lvl="0" indent="0">
+              <a:buFont typeface="Arial" panose="020B0604020202020204" pitchFamily="34" charset="0"/>
+              <a:buNone/>
+            </a:pPr>
+            <a:endParaRPr lang="en-US" baseline="0" dirty="0" smtClean="0"/>
+          </a:p>
+          <a:p>
+            <a:pPr marL="0" lvl="0" indent="0">
+              <a:buFont typeface="Arial" panose="020B0604020202020204" pitchFamily="34" charset="0"/>
+              <a:buNone/>
+            </a:pPr>
+            <a:r>
+              <a:rPr lang="en-US" baseline="0" dirty="0" smtClean="0"/>
+              <a:t>controller:		You can also add the controller you want in the directive, but because the controller function execution is too late when the directive compiles and is ready, it should be use in a very specific cases.</a:t>
+            </a:r>
+          </a:p>
+          <a:p>
+            <a:pPr marL="0" lvl="0" indent="0">
+              <a:buFont typeface="Arial" panose="020B0604020202020204" pitchFamily="34" charset="0"/>
+              <a:buNone/>
+            </a:pPr>
+            <a:endParaRPr lang="en-US" baseline="0" dirty="0" smtClean="0"/>
+          </a:p>
+        </p:txBody>
+      </p:sp>
+      <p:sp>
+        <p:nvSpPr>
+          <p:cNvPr id="4" name="3 Marcador de número de diapositiva"/>
+          <p:cNvSpPr>
+            <a:spLocks noGrp="1"/>
+          </p:cNvSpPr>
+          <p:nvPr>
+            <p:ph type="sldNum" sz="quarter" idx="10"/>
+          </p:nvPr>
+        </p:nvSpPr>
+        <p:spPr/>
+        <p:txBody>
+          <a:bodyPr/>
+          <a:lstStyle/>
+          <a:p>
+            <a:fld id="{212C6109-0EF7-4E6B-B279-6389DF78298C}" type="slidenum">
+              <a:rPr lang="en-US" smtClean="0"/>
               <a:t>28</a:t>
             </a:fld>
             <a:endParaRPr lang="en-US"/>
@@ -8786,6 +11360,480 @@
     <p:extLst>
       <p:ext uri="{BB962C8B-B14F-4D97-AF65-F5344CB8AC3E}">
         <p14:creationId xmlns:p14="http://schemas.microsoft.com/office/powerpoint/2010/main" val="2083353165"/>
+      </p:ext>
+    </p:extLst>
+  </p:cSld>
+  <p:clrMapOvr>
+    <a:masterClrMapping/>
+  </p:clrMapOvr>
+</p:notes>
+</file>
+
+<file path=ppt/notesSlides/notesSlide28.xml><?xml version="1.0" encoding="utf-8"?>
+<p:notes xmlns:a="http://schemas.openxmlformats.org/drawingml/2006/main" xmlns:r="http://schemas.openxmlformats.org/officeDocument/2006/relationships" xmlns:p="http://schemas.openxmlformats.org/presentationml/2006/main">
+  <p:cSld>
+    <p:spTree>
+      <p:nvGrpSpPr>
+        <p:cNvPr id="1" name=""/>
+        <p:cNvGrpSpPr/>
+        <p:nvPr/>
+      </p:nvGrpSpPr>
+      <p:grpSpPr>
+        <a:xfrm>
+          <a:off x="0" y="0"/>
+          <a:ext cx="0" cy="0"/>
+          <a:chOff x="0" y="0"/>
+          <a:chExt cx="0" cy="0"/>
+        </a:xfrm>
+      </p:grpSpPr>
+      <p:sp>
+        <p:nvSpPr>
+          <p:cNvPr id="2" name="1 Marcador de imagen de diapositiva"/>
+          <p:cNvSpPr>
+            <a:spLocks noGrp="1" noRot="1" noChangeAspect="1"/>
+          </p:cNvSpPr>
+          <p:nvPr>
+            <p:ph type="sldImg"/>
+          </p:nvPr>
+        </p:nvSpPr>
+        <p:spPr/>
+      </p:sp>
+      <p:sp>
+        <p:nvSpPr>
+          <p:cNvPr id="3" name="2 Marcador de notas"/>
+          <p:cNvSpPr>
+            <a:spLocks noGrp="1"/>
+          </p:cNvSpPr>
+          <p:nvPr>
+            <p:ph type="body" idx="1"/>
+          </p:nvPr>
+        </p:nvSpPr>
+        <p:spPr/>
+        <p:txBody>
+          <a:bodyPr/>
+          <a:lstStyle/>
+          <a:p>
+            <a:r>
+              <a:rPr lang="en-US" dirty="0" smtClean="0"/>
+              <a:t>Like we previous check the scope of something limits</a:t>
+            </a:r>
+            <a:r>
+              <a:rPr lang="en-US" baseline="0" dirty="0" smtClean="0"/>
+              <a:t> to change things inside/outside. So, when making directives you may need to control the functionality inside, or use the information outside.</a:t>
+            </a:r>
+          </a:p>
+          <a:p>
+            <a:endParaRPr lang="en-US" baseline="0" dirty="0" smtClean="0"/>
+          </a:p>
+          <a:p>
+            <a:r>
+              <a:rPr lang="en-US" baseline="0" dirty="0" smtClean="0"/>
+              <a:t>The types of scopes available for a directive are:</a:t>
+            </a:r>
+          </a:p>
+          <a:p>
+            <a:endParaRPr lang="en-US" baseline="0" dirty="0" smtClean="0"/>
+          </a:p>
+          <a:p>
+            <a:r>
+              <a:rPr lang="en-US" baseline="0" dirty="0" smtClean="0"/>
+              <a:t>false: Directive uses its parent scope.</a:t>
+            </a:r>
+          </a:p>
+          <a:p>
+            <a:endParaRPr lang="en-US" baseline="0" dirty="0" smtClean="0"/>
+          </a:p>
+          <a:p>
+            <a:r>
+              <a:rPr lang="en-US" baseline="0" dirty="0" smtClean="0"/>
+              <a:t>true: </a:t>
+            </a:r>
+            <a:r>
+              <a:rPr lang="en-US" dirty="0" smtClean="0"/>
+              <a:t>Directive gets a new scope</a:t>
+            </a:r>
+            <a:r>
+              <a:rPr lang="en-US" baseline="0" dirty="0" smtClean="0"/>
+              <a:t> </a:t>
+            </a:r>
+            <a:r>
+              <a:rPr lang="en-US" dirty="0" smtClean="0"/>
+              <a:t>prototypically inherited from</a:t>
+            </a:r>
+            <a:r>
+              <a:rPr lang="en-US" baseline="0" dirty="0" smtClean="0"/>
+              <a:t> the parent scope</a:t>
+            </a:r>
+            <a:r>
+              <a:rPr lang="en-US" dirty="0" smtClean="0"/>
+              <a:t>.</a:t>
+            </a:r>
+            <a:endParaRPr lang="en-US" baseline="0" dirty="0" smtClean="0"/>
+          </a:p>
+          <a:p>
+            <a:endParaRPr lang="en-US" baseline="0" dirty="0" smtClean="0"/>
+          </a:p>
+          <a:p>
+            <a:r>
+              <a:rPr lang="en-US" baseline="0" dirty="0" smtClean="0"/>
+              <a:t>Isolated  {}: Directive gets a new isolated scope completely detached from its parent scope.</a:t>
+            </a:r>
+          </a:p>
+        </p:txBody>
+      </p:sp>
+      <p:sp>
+        <p:nvSpPr>
+          <p:cNvPr id="4" name="3 Marcador de número de diapositiva"/>
+          <p:cNvSpPr>
+            <a:spLocks noGrp="1"/>
+          </p:cNvSpPr>
+          <p:nvPr>
+            <p:ph type="sldNum" sz="quarter" idx="10"/>
+          </p:nvPr>
+        </p:nvSpPr>
+        <p:spPr/>
+        <p:txBody>
+          <a:bodyPr/>
+          <a:lstStyle/>
+          <a:p>
+            <a:fld id="{212C6109-0EF7-4E6B-B279-6389DF78298C}" type="slidenum">
+              <a:rPr lang="en-US" smtClean="0"/>
+              <a:t>29</a:t>
+            </a:fld>
+            <a:endParaRPr lang="en-US"/>
+          </a:p>
+        </p:txBody>
+      </p:sp>
+    </p:spTree>
+    <p:extLst>
+      <p:ext uri="{BB962C8B-B14F-4D97-AF65-F5344CB8AC3E}">
+        <p14:creationId xmlns:p14="http://schemas.microsoft.com/office/powerpoint/2010/main" val="2238330699"/>
+      </p:ext>
+    </p:extLst>
+  </p:cSld>
+  <p:clrMapOvr>
+    <a:masterClrMapping/>
+  </p:clrMapOvr>
+</p:notes>
+</file>
+
+<file path=ppt/notesSlides/notesSlide29.xml><?xml version="1.0" encoding="utf-8"?>
+<p:notes xmlns:a="http://schemas.openxmlformats.org/drawingml/2006/main" xmlns:r="http://schemas.openxmlformats.org/officeDocument/2006/relationships" xmlns:p="http://schemas.openxmlformats.org/presentationml/2006/main">
+  <p:cSld>
+    <p:spTree>
+      <p:nvGrpSpPr>
+        <p:cNvPr id="1" name=""/>
+        <p:cNvGrpSpPr/>
+        <p:nvPr/>
+      </p:nvGrpSpPr>
+      <p:grpSpPr>
+        <a:xfrm>
+          <a:off x="0" y="0"/>
+          <a:ext cx="0" cy="0"/>
+          <a:chOff x="0" y="0"/>
+          <a:chExt cx="0" cy="0"/>
+        </a:xfrm>
+      </p:grpSpPr>
+      <p:sp>
+        <p:nvSpPr>
+          <p:cNvPr id="2" name="1 Marcador de imagen de diapositiva"/>
+          <p:cNvSpPr>
+            <a:spLocks noGrp="1" noRot="1" noChangeAspect="1"/>
+          </p:cNvSpPr>
+          <p:nvPr>
+            <p:ph type="sldImg"/>
+          </p:nvPr>
+        </p:nvSpPr>
+        <p:spPr/>
+      </p:sp>
+      <p:sp>
+        <p:nvSpPr>
+          <p:cNvPr id="3" name="2 Marcador de notas"/>
+          <p:cNvSpPr>
+            <a:spLocks noGrp="1"/>
+          </p:cNvSpPr>
+          <p:nvPr>
+            <p:ph type="body" idx="1"/>
+          </p:nvPr>
+        </p:nvSpPr>
+        <p:spPr/>
+        <p:txBody>
+          <a:bodyPr/>
+          <a:lstStyle/>
+          <a:p>
+            <a:r>
+              <a:rPr lang="en-US" u="sng" dirty="0" smtClean="0"/>
+              <a:t>Controller Function Executes</a:t>
+            </a:r>
+          </a:p>
+          <a:p>
+            <a:endParaRPr lang="en-US" dirty="0" smtClean="0"/>
+          </a:p>
+          <a:p>
+            <a:r>
+              <a:rPr lang="en-US" dirty="0" smtClean="0"/>
+              <a:t>The first function to execute for each instance is the controller function. It is here where the code can initialize a scope object as any good controller function will do.</a:t>
+            </a:r>
+          </a:p>
+          <a:p>
+            <a:r>
+              <a:rPr lang="en-US" dirty="0" smtClean="0"/>
+              <a:t>Note the controller can also take an $element argument and receive a reference to the simple element clone that will appear in the DOM.</a:t>
+            </a:r>
+          </a:p>
+          <a:p>
+            <a:r>
+              <a:rPr lang="en-US" dirty="0" smtClean="0"/>
+              <a:t>The element will look just like the element in the previous picture because the framework hasn’t performed the </a:t>
+            </a:r>
+            <a:r>
+              <a:rPr lang="en-US" dirty="0" err="1" smtClean="0"/>
+              <a:t>transclusion</a:t>
+            </a:r>
+            <a:r>
+              <a:rPr lang="en-US" dirty="0" smtClean="0"/>
+              <a:t> or setup data binding, but it is the element that will live in the DOM, unlike the element reference in compile.</a:t>
+            </a:r>
+          </a:p>
+          <a:p>
+            <a:r>
+              <a:rPr lang="en-US" dirty="0" smtClean="0"/>
+              <a:t>However, we try to keep controllers from referencing elements directly. You generally want to limit direct element interaction to the post link function.</a:t>
+            </a:r>
+          </a:p>
+          <a:p>
+            <a:endParaRPr lang="en-US" dirty="0" smtClean="0"/>
+          </a:p>
+          <a:p>
+            <a:r>
+              <a:rPr lang="en-US" b="0" u="sng" dirty="0" smtClean="0"/>
+              <a:t>Pre-link Executes</a:t>
+            </a:r>
+          </a:p>
+          <a:p>
+            <a:endParaRPr lang="en-US" dirty="0" smtClean="0"/>
+          </a:p>
+          <a:p>
+            <a:r>
+              <a:rPr lang="en-US" dirty="0" smtClean="0"/>
+              <a:t>Element In Angular Pre </a:t>
+            </a:r>
+            <a:r>
+              <a:rPr lang="en-US" dirty="0" err="1" smtClean="0"/>
+              <a:t>LinkBy</a:t>
+            </a:r>
+            <a:r>
+              <a:rPr lang="en-US" dirty="0" smtClean="0"/>
+              <a:t> the time we reach the pre-link function (the function attached to the pre property of the object returned from compile), we’ll have both a scope initialized by the controller function, and a reference to a real element that will appear in the DOM.</a:t>
+            </a:r>
+          </a:p>
+          <a:p>
+            <a:r>
+              <a:rPr lang="en-US" dirty="0" smtClean="0"/>
+              <a:t>However, we still don’t have </a:t>
+            </a:r>
+            <a:r>
+              <a:rPr lang="en-US" dirty="0" err="1" smtClean="0"/>
+              <a:t>transcluded</a:t>
+            </a:r>
+            <a:r>
+              <a:rPr lang="en-US" dirty="0" smtClean="0"/>
+              <a:t> content and the template isn’t linked to the scope because the bindings aren’t setup.</a:t>
+            </a:r>
+          </a:p>
+          <a:p>
+            <a:r>
+              <a:rPr lang="en-US" dirty="0" smtClean="0"/>
+              <a:t>The pre link function is only useful in a couple special scenarios, which is why you can return a function from compile instead of an object and the function will be considered by the framework as the post link function.</a:t>
+            </a:r>
+          </a:p>
+          <a:p>
+            <a:endParaRPr lang="en-US" dirty="0" smtClean="0"/>
+          </a:p>
+          <a:p>
+            <a:r>
+              <a:rPr lang="en-US" u="sng" dirty="0" smtClean="0"/>
+              <a:t>Post-link Executes</a:t>
+            </a:r>
+          </a:p>
+          <a:p>
+            <a:endParaRPr lang="en-US" dirty="0" smtClean="0"/>
+          </a:p>
+          <a:p>
+            <a:r>
+              <a:rPr lang="en-US" dirty="0" smtClean="0"/>
+              <a:t>Element in </a:t>
+            </a:r>
+            <a:r>
+              <a:rPr lang="en-US" dirty="0" err="1" smtClean="0"/>
+              <a:t>AngularJS</a:t>
+            </a:r>
+            <a:r>
+              <a:rPr lang="en-US" dirty="0" smtClean="0"/>
+              <a:t> Post </a:t>
+            </a:r>
+            <a:r>
+              <a:rPr lang="en-US" dirty="0" err="1" smtClean="0"/>
+              <a:t>LinkPost</a:t>
+            </a:r>
+            <a:r>
+              <a:rPr lang="en-US" dirty="0" smtClean="0"/>
+              <a:t> link is the last function to execute. Now the </a:t>
+            </a:r>
+            <a:r>
+              <a:rPr lang="en-US" dirty="0" err="1" smtClean="0"/>
+              <a:t>transclusion</a:t>
+            </a:r>
+            <a:r>
+              <a:rPr lang="en-US" dirty="0" smtClean="0"/>
+              <a:t> is complete, the template is linked to a scope, and the view will update with data bound values after the next digest cycle.</a:t>
+            </a:r>
+          </a:p>
+          <a:p>
+            <a:r>
+              <a:rPr lang="en-US" dirty="0" smtClean="0"/>
+              <a:t>In post-link it is safe to manipulate the DOM, attach event handlers, inspect child elements, and setup observations on attributes and watches on the scope.</a:t>
+            </a:r>
+          </a:p>
+          <a:p>
+            <a:endParaRPr lang="en-US" dirty="0" smtClean="0"/>
+          </a:p>
+          <a:p>
+            <a:endParaRPr lang="en-US" dirty="0" smtClean="0"/>
+          </a:p>
+          <a:p>
+            <a:r>
+              <a:rPr lang="en-US" dirty="0" smtClean="0"/>
+              <a:t>Resume:</a:t>
+            </a:r>
+          </a:p>
+          <a:p>
+            <a:pPr marL="171450" indent="-171450">
+              <a:buFont typeface="Arial" panose="020B0604020202020204" pitchFamily="34" charset="0"/>
+              <a:buChar char="•"/>
+            </a:pPr>
+            <a:r>
+              <a:rPr lang="en-US" dirty="0" smtClean="0"/>
+              <a:t>Steps:</a:t>
+            </a:r>
+          </a:p>
+          <a:p>
+            <a:pPr marL="685800" lvl="1" indent="-228600">
+              <a:buFont typeface="+mj-lt"/>
+              <a:buAutoNum type="arabicParenR"/>
+            </a:pPr>
+            <a:r>
+              <a:rPr lang="en-US" dirty="0" smtClean="0"/>
+              <a:t>Controller gets executed first</a:t>
+            </a:r>
+          </a:p>
+          <a:p>
+            <a:pPr marL="685800" lvl="1" indent="-228600">
+              <a:buFont typeface="+mj-lt"/>
+              <a:buAutoNum type="arabicParenR"/>
+            </a:pPr>
+            <a:r>
+              <a:rPr lang="en-US" dirty="0" smtClean="0"/>
+              <a:t>Pre-link gets executed next</a:t>
+            </a:r>
+          </a:p>
+          <a:p>
+            <a:pPr marL="685800" lvl="1" indent="-228600">
+              <a:buFont typeface="+mj-lt"/>
+              <a:buAutoNum type="arabicParenR"/>
+            </a:pPr>
+            <a:r>
+              <a:rPr lang="en-US" dirty="0" smtClean="0"/>
+              <a:t>Post-link gets executed last</a:t>
+            </a:r>
+            <a:endParaRPr lang="en-US" dirty="0" smtClean="0"/>
+          </a:p>
+          <a:p>
+            <a:pPr marL="171450" indent="-171450">
+              <a:buFont typeface="Arial" panose="020B0604020202020204" pitchFamily="34" charset="0"/>
+              <a:buChar char="•"/>
+            </a:pPr>
+            <a:r>
+              <a:rPr lang="en-US" dirty="0" smtClean="0"/>
+              <a:t>compile - use for template DOM manipulation (i.e., manipulation of </a:t>
+            </a:r>
+            <a:r>
+              <a:rPr lang="en-US" dirty="0" err="1" smtClean="0"/>
+              <a:t>tElement</a:t>
+            </a:r>
+            <a:r>
+              <a:rPr lang="en-US" dirty="0" smtClean="0"/>
+              <a:t> = template element), hence manipulations that apply to all DOM clones of the template associated with the directive.</a:t>
+            </a:r>
+          </a:p>
+          <a:p>
+            <a:pPr marL="171450" indent="-171450">
+              <a:buFont typeface="Arial" panose="020B0604020202020204" pitchFamily="34" charset="0"/>
+              <a:buChar char="•"/>
+            </a:pPr>
+            <a:r>
+              <a:rPr lang="en-US" dirty="0" smtClean="0"/>
+              <a:t>link - use for registering DOM listeners (i.e., $watch expressions on the instance scope) as well as instance DOM manipulation (i.e., manipulation of </a:t>
+            </a:r>
+            <a:r>
+              <a:rPr lang="en-US" dirty="0" err="1" smtClean="0"/>
+              <a:t>iElement</a:t>
+            </a:r>
+            <a:r>
+              <a:rPr lang="en-US" dirty="0" smtClean="0"/>
+              <a:t> = individual instance element).</a:t>
+            </a:r>
+          </a:p>
+          <a:p>
+            <a:pPr marL="171450" indent="-171450">
+              <a:buFont typeface="Arial" panose="020B0604020202020204" pitchFamily="34" charset="0"/>
+              <a:buChar char="•"/>
+            </a:pPr>
+            <a:endParaRPr lang="en-US" dirty="0" smtClean="0"/>
+          </a:p>
+          <a:p>
+            <a:pPr marL="171450" indent="-171450">
+              <a:buFont typeface="Arial" panose="020B0604020202020204" pitchFamily="34" charset="0"/>
+              <a:buChar char="•"/>
+            </a:pPr>
+            <a:endParaRPr lang="en-US" dirty="0" smtClean="0"/>
+          </a:p>
+          <a:p>
+            <a:pPr marL="171450" indent="-171450">
+              <a:buFont typeface="Arial" panose="020B0604020202020204" pitchFamily="34" charset="0"/>
+              <a:buChar char="•"/>
+            </a:pPr>
+            <a:endParaRPr lang="en-US" dirty="0" smtClean="0"/>
+          </a:p>
+        </p:txBody>
+      </p:sp>
+      <p:sp>
+        <p:nvSpPr>
+          <p:cNvPr id="4" name="3 Marcador de número de diapositiva"/>
+          <p:cNvSpPr>
+            <a:spLocks noGrp="1"/>
+          </p:cNvSpPr>
+          <p:nvPr>
+            <p:ph type="sldNum" sz="quarter" idx="10"/>
+          </p:nvPr>
+        </p:nvSpPr>
+        <p:spPr/>
+        <p:txBody>
+          <a:bodyPr/>
+          <a:lstStyle/>
+          <a:p>
+            <a:fld id="{212C6109-0EF7-4E6B-B279-6389DF78298C}" type="slidenum">
+              <a:rPr lang="en-US" smtClean="0"/>
+              <a:t>30</a:t>
+            </a:fld>
+            <a:endParaRPr lang="en-US"/>
+          </a:p>
+        </p:txBody>
+      </p:sp>
+    </p:spTree>
+    <p:extLst>
+      <p:ext uri="{BB962C8B-B14F-4D97-AF65-F5344CB8AC3E}">
+        <p14:creationId xmlns:p14="http://schemas.microsoft.com/office/powerpoint/2010/main" val="1230588237"/>
       </p:ext>
     </p:extLst>
   </p:cSld>
@@ -8980,8 +12028,13 @@
             </a:r>
             <a:r>
               <a:rPr lang="es-ES" baseline="0" dirty="0" smtClean="0"/>
-              <a:t>'cd C://…/folder'.</a:t>
-            </a:r>
+              <a:t>'cd C</a:t>
+            </a:r>
+            <a:r>
+              <a:rPr lang="es-ES" baseline="0" dirty="0" smtClean="0"/>
+              <a:t>://…/practiceA'.</a:t>
+            </a:r>
+            <a:endParaRPr lang="es-ES" baseline="0" dirty="0" smtClean="0"/>
           </a:p>
           <a:p>
             <a:pPr marL="228600" indent="-228600">
@@ -8998,7 +12051,19 @@
             </a:r>
             <a:r>
               <a:rPr lang="en-US" baseline="0" noProof="0" dirty="0" smtClean="0"/>
-              <a:t> angular practice-1'. This will download, install and execute the necessary to build a start-up application.</a:t>
+              <a:t> angular </a:t>
+            </a:r>
+            <a:r>
+              <a:rPr lang="en-US" baseline="0" noProof="0" dirty="0" err="1" smtClean="0"/>
+              <a:t>practiceA</a:t>
+            </a:r>
+            <a:r>
+              <a:rPr lang="en-US" baseline="0" noProof="0" dirty="0" smtClean="0"/>
+              <a:t>'. </a:t>
+            </a:r>
+            <a:r>
+              <a:rPr lang="en-US" baseline="0" noProof="0" dirty="0" smtClean="0"/>
+              <a:t>This will download, install and execute the necessary to build a start-up application.</a:t>
             </a:r>
           </a:p>
           <a:p>
@@ -9092,7 +12157,15 @@
             </a:r>
             <a:r>
               <a:rPr lang="en-US" baseline="0" noProof="0" dirty="0" smtClean="0"/>
-              <a:t> the command prompt in the root directory of the previous practice and run the command: '</a:t>
+              <a:t> the command prompt in the root directory of the previous practice (</a:t>
+            </a:r>
+            <a:r>
+              <a:rPr lang="en-US" baseline="0" noProof="0" dirty="0" err="1" smtClean="0"/>
+              <a:t>practiceA</a:t>
+            </a:r>
+            <a:r>
+              <a:rPr lang="en-US" baseline="0" noProof="0" dirty="0" smtClean="0"/>
+              <a:t>) and run the command: '</a:t>
             </a:r>
             <a:r>
               <a:rPr lang="en-US" noProof="0" dirty="0" smtClean="0"/>
@@ -9123,7 +12196,11 @@
             </a:pPr>
             <a:r>
               <a:rPr lang="en-US" baseline="0" noProof="0" dirty="0" smtClean="0"/>
-              <a:t>Bower has some commands that you can use, please check the documentation for more information or run 'bower -h'.</a:t>
+              <a:t>Bower </a:t>
+            </a:r>
+            <a:r>
+              <a:rPr lang="en-US" baseline="0" noProof="0" dirty="0" smtClean="0"/>
+              <a:t>has some commands that you can use, please check the documentation for more information or run 'bower -h'.</a:t>
             </a:r>
           </a:p>
           <a:p>
@@ -10020,13 +13097,8 @@
             </a:r>
             <a:r>
               <a:rPr lang="en-US" baseline="0" noProof="0" dirty="0" smtClean="0"/>
-              <a:t> </a:t>
-            </a:r>
-            <a:r>
-              <a:rPr lang="en-US" baseline="0" noProof="0" smtClean="0"/>
-              <a:t>file.</a:t>
-            </a:r>
-            <a:endParaRPr lang="en-US" baseline="0" noProof="0" dirty="0" smtClean="0"/>
+              <a:t> file.</a:t>
+            </a:r>
           </a:p>
           <a:p>
             <a:pPr marL="628650" lvl="1" indent="-171450">
@@ -10114,6 +13186,114 @@
     <p:extLst>
       <p:ext uri="{BB962C8B-B14F-4D97-AF65-F5344CB8AC3E}">
         <p14:creationId xmlns:p14="http://schemas.microsoft.com/office/powerpoint/2010/main" val="2026206250"/>
+      </p:ext>
+    </p:extLst>
+  </p:cSld>
+  <p:clrMapOvr>
+    <a:masterClrMapping/>
+  </p:clrMapOvr>
+</p:notes>
+</file>
+
+<file path=ppt/notesSlides/notesSlide30.xml><?xml version="1.0" encoding="utf-8"?>
+<p:notes xmlns:a="http://schemas.openxmlformats.org/drawingml/2006/main" xmlns:r="http://schemas.openxmlformats.org/officeDocument/2006/relationships" xmlns:p="http://schemas.openxmlformats.org/presentationml/2006/main">
+  <p:cSld>
+    <p:spTree>
+      <p:nvGrpSpPr>
+        <p:cNvPr id="1" name=""/>
+        <p:cNvGrpSpPr/>
+        <p:nvPr/>
+      </p:nvGrpSpPr>
+      <p:grpSpPr>
+        <a:xfrm>
+          <a:off x="0" y="0"/>
+          <a:ext cx="0" cy="0"/>
+          <a:chOff x="0" y="0"/>
+          <a:chExt cx="0" cy="0"/>
+        </a:xfrm>
+      </p:grpSpPr>
+      <p:sp>
+        <p:nvSpPr>
+          <p:cNvPr id="2" name="1 Marcador de imagen de diapositiva"/>
+          <p:cNvSpPr>
+            <a:spLocks noGrp="1" noRot="1" noChangeAspect="1"/>
+          </p:cNvSpPr>
+          <p:nvPr>
+            <p:ph type="sldImg"/>
+          </p:nvPr>
+        </p:nvSpPr>
+        <p:spPr/>
+      </p:sp>
+      <p:sp>
+        <p:nvSpPr>
+          <p:cNvPr id="3" name="2 Marcador de notas"/>
+          <p:cNvSpPr>
+            <a:spLocks noGrp="1"/>
+          </p:cNvSpPr>
+          <p:nvPr>
+            <p:ph type="body" idx="1"/>
+          </p:nvPr>
+        </p:nvSpPr>
+        <p:spPr/>
+        <p:txBody>
+          <a:bodyPr/>
+          <a:lstStyle/>
+          <a:p>
+            <a:r>
+              <a:rPr lang="en-US" dirty="0" smtClean="0"/>
+              <a:t>As you can see in the image it explains</a:t>
+            </a:r>
+            <a:r>
+              <a:rPr lang="en-US" baseline="0" dirty="0" smtClean="0"/>
+              <a:t> when the compile </a:t>
+            </a:r>
+            <a:r>
+              <a:rPr lang="en-US" baseline="0" dirty="0" err="1" smtClean="0"/>
+              <a:t>preLink</a:t>
+            </a:r>
+            <a:r>
+              <a:rPr lang="en-US" baseline="0" dirty="0" smtClean="0"/>
+              <a:t>, and </a:t>
+            </a:r>
+            <a:r>
+              <a:rPr lang="en-US" baseline="0" dirty="0" err="1" smtClean="0"/>
+              <a:t>postLink</a:t>
+            </a:r>
+            <a:r>
+              <a:rPr lang="en-US" baseline="0" dirty="0" smtClean="0"/>
+              <a:t> works.</a:t>
+            </a:r>
+            <a:endParaRPr lang="en-US" dirty="0"/>
+          </a:p>
+        </p:txBody>
+      </p:sp>
+      <p:sp>
+        <p:nvSpPr>
+          <p:cNvPr id="4" name="3 Marcador de número de diapositiva"/>
+          <p:cNvSpPr>
+            <a:spLocks noGrp="1"/>
+          </p:cNvSpPr>
+          <p:nvPr>
+            <p:ph type="sldNum" sz="quarter" idx="10"/>
+          </p:nvPr>
+        </p:nvSpPr>
+        <p:spPr/>
+        <p:txBody>
+          <a:bodyPr/>
+          <a:lstStyle/>
+          <a:p>
+            <a:fld id="{212C6109-0EF7-4E6B-B279-6389DF78298C}" type="slidenum">
+              <a:rPr lang="en-US" smtClean="0"/>
+              <a:t>31</a:t>
+            </a:fld>
+            <a:endParaRPr lang="en-US"/>
+          </a:p>
+        </p:txBody>
+      </p:sp>
+    </p:spTree>
+    <p:extLst>
+      <p:ext uri="{BB962C8B-B14F-4D97-AF65-F5344CB8AC3E}">
+        <p14:creationId xmlns:p14="http://schemas.microsoft.com/office/powerpoint/2010/main" val="2862877163"/>
       </p:ext>
     </p:extLst>
   </p:cSld>
@@ -10411,15 +13591,7 @@
           <a:p>
             <a:r>
               <a:rPr lang="en-US" baseline="0" dirty="0" smtClean="0"/>
-              <a:t>The controller as a part of the MVC structure, you can create a controller with the command in the </a:t>
-            </a:r>
-            <a:r>
-              <a:rPr lang="en-US" baseline="0" dirty="0" smtClean="0"/>
-              <a:t>slide, </a:t>
-            </a:r>
-            <a:r>
-              <a:rPr lang="en-US" baseline="0" dirty="0" smtClean="0"/>
-              <a:t>or by adding the </a:t>
+              <a:t>The controller as a part of the MVC structure, you can create a controller with the command in the slide, or by adding the </a:t>
             </a:r>
             <a:r>
               <a:rPr lang="en-US" baseline="0" dirty="0" err="1" smtClean="0"/>
@@ -10427,11 +13599,7 @@
             </a:r>
             <a:r>
               <a:rPr lang="en-US" baseline="0" dirty="0" smtClean="0"/>
-              <a:t>-controller</a:t>
-            </a:r>
-            <a:r>
-              <a:rPr lang="en-US" baseline="0" dirty="0" smtClean="0"/>
-              <a:t>="</a:t>
+              <a:t>-controller="</a:t>
             </a:r>
             <a:r>
               <a:rPr lang="en-US" baseline="0" dirty="0" err="1" smtClean="0"/>
@@ -10439,11 +13607,7 @@
             </a:r>
             <a:r>
               <a:rPr lang="en-US" baseline="0" dirty="0" smtClean="0"/>
-              <a:t>" in the html</a:t>
-            </a:r>
-            <a:r>
-              <a:rPr lang="en-US" baseline="0" dirty="0" smtClean="0"/>
-              <a:t>.</a:t>
+              <a:t>" in the html.</a:t>
             </a:r>
           </a:p>
           <a:p>
@@ -10454,7 +13618,6 @@
               <a:rPr lang="en-US" baseline="0" dirty="0" smtClean="0"/>
               <a:t>The controller names should start with a capital letter as standard.</a:t>
             </a:r>
-            <a:endParaRPr lang="en-US" baseline="0" dirty="0" smtClean="0"/>
           </a:p>
           <a:p>
             <a:endParaRPr lang="en-US" baseline="0" dirty="0" smtClean="0"/>
@@ -10780,12 +13943,57 @@
           <a:bodyPr/>
           <a:lstStyle/>
           <a:p>
-            <a:pPr marL="0" indent="0">
-              <a:buNone/>
-            </a:pPr>
-            <a:r>
-              <a:rPr lang="en-US" dirty="0" smtClean="0"/>
-              <a:t>a) Create a module and a controller.</a:t>
+            <a:pPr marL="0" marR="0" indent="0" algn="l" defTabSz="914400" rtl="0" eaLnBrk="1" fontAlgn="auto" latinLnBrk="0" hangingPunct="1">
+              <a:lnSpc>
+                <a:spcPct val="100000"/>
+              </a:lnSpc>
+              <a:spcBef>
+                <a:spcPts val="0"/>
+              </a:spcBef>
+              <a:spcAft>
+                <a:spcPts val="0"/>
+              </a:spcAft>
+              <a:buClrTx/>
+              <a:buSzTx/>
+              <a:buFontTx/>
+              <a:buNone/>
+              <a:tabLst/>
+              <a:defRPr/>
+            </a:pPr>
+            <a:r>
+              <a:rPr lang="en-US" dirty="0" smtClean="0"/>
+              <a:t>We are going to use the previous</a:t>
+            </a:r>
+            <a:r>
+              <a:rPr lang="en-US" baseline="0" dirty="0" smtClean="0"/>
+              <a:t> practice (</a:t>
+            </a:r>
+            <a:r>
+              <a:rPr lang="en-US" baseline="0" dirty="0" err="1" smtClean="0"/>
+              <a:t>practiceA</a:t>
+            </a:r>
+            <a:r>
+              <a:rPr lang="en-US" baseline="0" dirty="0" smtClean="0"/>
+              <a:t>).</a:t>
+            </a:r>
+          </a:p>
+          <a:p>
+            <a:pPr marL="0" indent="0">
+              <a:buNone/>
+            </a:pPr>
+            <a:endParaRPr lang="en-US" dirty="0" smtClean="0"/>
+          </a:p>
+          <a:p>
+            <a:pPr marL="0" indent="0">
+              <a:buNone/>
+            </a:pPr>
+            <a:r>
+              <a:rPr lang="en-US" dirty="0" smtClean="0"/>
+              <a:t>a</a:t>
+            </a:r>
+            <a:r>
+              <a:rPr lang="en-US" dirty="0" smtClean="0"/>
+              <a:t>) Create a module and a controller.</a:t>
             </a:r>
           </a:p>
           <a:p>
@@ -19853,7 +23061,11 @@
             </a:pPr>
             <a:r>
               <a:rPr lang="en-US" dirty="0" smtClean="0"/>
-              <a:t>Creates a new route manually and with Yeoman.</a:t>
+              <a:t>Create </a:t>
+            </a:r>
+            <a:r>
+              <a:rPr lang="en-US" dirty="0" smtClean="0"/>
+              <a:t>a new route manually and with Yeoman.</a:t>
             </a:r>
           </a:p>
           <a:p>
@@ -19863,8 +23075,29 @@
             </a:pPr>
             <a:r>
               <a:rPr lang="en-US" dirty="0" smtClean="0"/>
-              <a:t>Create a project using states.</a:t>
-            </a:r>
+              <a:t>Create a project using </a:t>
+            </a:r>
+            <a:r>
+              <a:rPr lang="en-US" dirty="0" smtClean="0"/>
+              <a:t>states instead of routes.</a:t>
+            </a:r>
+          </a:p>
+          <a:p>
+            <a:pPr marL="514350" indent="-514350">
+              <a:buFont typeface="+mj-lt"/>
+              <a:buAutoNum type="alphaLcParenR"/>
+            </a:pPr>
+            <a:r>
+              <a:rPr lang="en-US" dirty="0" smtClean="0"/>
+              <a:t>Create an example of multiple views.</a:t>
+            </a:r>
+            <a:endParaRPr lang="en-US" dirty="0"/>
+          </a:p>
+          <a:p>
+            <a:pPr marL="514350" indent="-514350">
+              <a:buFont typeface="+mj-lt"/>
+              <a:buAutoNum type="alphaLcParenR"/>
+            </a:pPr>
             <a:endParaRPr lang="en-US" dirty="0"/>
           </a:p>
         </p:txBody>
@@ -20195,7 +23428,7 @@
                   <a:schemeClr val="accent2"/>
                 </a:solidFill>
               </a:rPr>
-              <a:t>miNuevoTag</a:t>
+              <a:t>miNewTag</a:t>
             </a:r>
             <a:endParaRPr lang="es-ES" dirty="0" smtClean="0">
               <a:solidFill>
@@ -20356,7 +23589,11 @@
               <a:t>	</a:t>
             </a:r>
             <a:r>
-              <a:rPr lang="es-ES" dirty="0" err="1" smtClean="0"/>
+              <a:rPr lang="es-ES" dirty="0" err="1" smtClean="0">
+                <a:solidFill>
+                  <a:schemeClr val="accent2"/>
+                </a:solidFill>
+              </a:rPr>
               <a:t>ng-repeat</a:t>
             </a:r>
             <a:r>
@@ -20391,21 +23628,45 @@
             </a:r>
             <a:r>
               <a:rPr lang="es-ES" dirty="0" smtClean="0"/>
-              <a:t>		data-</a:t>
-            </a:r>
-            <a:r>
-              <a:rPr lang="es-ES" dirty="0" err="1" smtClean="0"/>
+              <a:t>		</a:t>
+            </a:r>
+            <a:r>
+              <a:rPr lang="es-ES" dirty="0" smtClean="0">
+                <a:solidFill>
+                  <a:schemeClr val="accent2"/>
+                </a:solidFill>
+              </a:rPr>
+              <a:t>data-</a:t>
+            </a:r>
+            <a:r>
+              <a:rPr lang="es-ES" dirty="0" err="1" smtClean="0">
+                <a:solidFill>
+                  <a:schemeClr val="accent2"/>
+                </a:solidFill>
+              </a:rPr>
               <a:t>ng</a:t>
             </a:r>
             <a:r>
-              <a:rPr lang="es-ES" dirty="0" smtClean="0"/>
+              <a:rPr lang="es-ES" dirty="0" smtClean="0">
+                <a:solidFill>
+                  <a:schemeClr val="accent2"/>
+                </a:solidFill>
+              </a:rPr>
               <a:t>-</a:t>
             </a:r>
             <a:r>
-              <a:rPr lang="es-ES" dirty="0" err="1" smtClean="0"/>
+              <a:rPr lang="es-ES" dirty="0" err="1" smtClean="0">
+                <a:solidFill>
+                  <a:schemeClr val="accent2"/>
+                </a:solidFill>
+              </a:rPr>
               <a:t>repeat</a:t>
             </a:r>
-            <a:endParaRPr lang="es-ES" dirty="0" smtClean="0"/>
+            <a:endParaRPr lang="es-ES" dirty="0" smtClean="0">
+              <a:solidFill>
+                <a:schemeClr val="accent2"/>
+              </a:solidFill>
+            </a:endParaRPr>
           </a:p>
           <a:p>
             <a:endParaRPr lang="en-US" dirty="0"/>
@@ -20483,7 +23744,7 @@
           <a:lstStyle/>
           <a:p>
             <a:pPr algn="ctr"/>
-            <a:endParaRPr lang="en-US"/>
+            <a:endParaRPr lang="en-US" dirty="0"/>
           </a:p>
         </p:txBody>
       </p:sp>
@@ -20504,7 +23765,15 @@
           <a:p>
             <a:r>
               <a:rPr lang="es-ES" dirty="0" err="1" smtClean="0"/>
-              <a:t>Directives</a:t>
+              <a:t>Create</a:t>
+            </a:r>
+            <a:r>
+              <a:rPr lang="es-ES" dirty="0" smtClean="0"/>
+              <a:t> a </a:t>
+            </a:r>
+            <a:r>
+              <a:rPr lang="es-ES" dirty="0" err="1" smtClean="0"/>
+              <a:t>Directive</a:t>
             </a:r>
             <a:endParaRPr lang="en-US" dirty="0"/>
           </a:p>
@@ -20520,10 +23789,15 @@
             <p:ph idx="1"/>
           </p:nvPr>
         </p:nvSpPr>
-        <p:spPr/>
+        <p:spPr>
+          <a:xfrm>
+            <a:off x="457200" y="1484784"/>
+            <a:ext cx="8229600" cy="4525963"/>
+          </a:xfrm>
+        </p:spPr>
         <p:txBody>
           <a:bodyPr>
-            <a:normAutofit fontScale="70000" lnSpcReduction="20000"/>
+            <a:noAutofit/>
           </a:bodyPr>
           <a:lstStyle/>
           <a:p>
@@ -20531,19 +23805,19 @@
               <a:buNone/>
             </a:pPr>
             <a:r>
-              <a:rPr lang="es-ES" sz="2800" dirty="0" err="1" smtClean="0"/>
+              <a:rPr lang="es-ES" sz="1600" dirty="0" err="1" smtClean="0"/>
               <a:t>Angular.module</a:t>
             </a:r>
             <a:r>
-              <a:rPr lang="es-ES" sz="2800" dirty="0" smtClean="0"/>
+              <a:rPr lang="es-ES" sz="1600" dirty="0" smtClean="0"/>
               <a:t>('</a:t>
             </a:r>
             <a:r>
-              <a:rPr lang="es-ES" sz="2800" dirty="0" err="1" smtClean="0"/>
+              <a:rPr lang="es-ES" sz="1600" dirty="0" err="1" smtClean="0"/>
               <a:t>myApp</a:t>
             </a:r>
             <a:r>
-              <a:rPr lang="es-ES" sz="2800" dirty="0" smtClean="0"/>
+              <a:rPr lang="es-ES" sz="1600" dirty="0" smtClean="0"/>
               <a:t>',[])</a:t>
             </a:r>
           </a:p>
@@ -20552,31 +23826,31 @@
               <a:buNone/>
             </a:pPr>
             <a:r>
-              <a:rPr lang="es-ES" dirty="0" smtClean="0"/>
+              <a:rPr lang="es-ES" sz="1800" dirty="0" smtClean="0"/>
               <a:t>.</a:t>
             </a:r>
             <a:r>
-              <a:rPr lang="es-ES" dirty="0" err="1" smtClean="0"/>
+              <a:rPr lang="es-ES" sz="1800" dirty="0" err="1" smtClean="0"/>
               <a:t>directive</a:t>
             </a:r>
             <a:r>
-              <a:rPr lang="es-ES" dirty="0" smtClean="0"/>
+              <a:rPr lang="es-ES" sz="1800" dirty="0" smtClean="0"/>
               <a:t>( '</a:t>
             </a:r>
             <a:r>
-              <a:rPr lang="es-ES" dirty="0" err="1" smtClean="0"/>
+              <a:rPr lang="es-ES" sz="1800" dirty="0" err="1" smtClean="0"/>
               <a:t>myButton</a:t>
             </a:r>
             <a:r>
-              <a:rPr lang="es-ES" dirty="0" smtClean="0"/>
+              <a:rPr lang="es-ES" sz="1800" dirty="0" smtClean="0"/>
               <a:t>', </a:t>
             </a:r>
             <a:r>
-              <a:rPr lang="es-ES" dirty="0" err="1" smtClean="0"/>
+              <a:rPr lang="es-ES" sz="1800" dirty="0" err="1" smtClean="0"/>
               <a:t>function</a:t>
             </a:r>
             <a:r>
-              <a:rPr lang="es-ES" dirty="0" smtClean="0"/>
+              <a:rPr lang="es-ES" sz="1800" dirty="0" smtClean="0"/>
               <a:t>(){</a:t>
             </a:r>
           </a:p>
@@ -20585,15 +23859,15 @@
               <a:buNone/>
             </a:pPr>
             <a:r>
-              <a:rPr lang="es-ES" dirty="0" smtClean="0"/>
+              <a:rPr lang="es-ES" sz="1800" dirty="0" smtClean="0"/>
               <a:t>	</a:t>
             </a:r>
             <a:r>
-              <a:rPr lang="es-ES" dirty="0" err="1" smtClean="0"/>
+              <a:rPr lang="es-ES" sz="1800" dirty="0" err="1" smtClean="0"/>
               <a:t>return</a:t>
             </a:r>
             <a:r>
-              <a:rPr lang="es-ES" dirty="0" smtClean="0"/>
+              <a:rPr lang="es-ES" sz="1800" dirty="0" smtClean="0"/>
               <a:t> {</a:t>
             </a:r>
           </a:p>
@@ -20602,15 +23876,15 @@
               <a:buNone/>
             </a:pPr>
             <a:r>
-              <a:rPr lang="es-ES" dirty="0"/>
+              <a:rPr lang="es-ES" sz="1800" dirty="0"/>
               <a:t>		</a:t>
             </a:r>
             <a:r>
-              <a:rPr lang="es-ES" dirty="0" err="1" smtClean="0"/>
+              <a:rPr lang="es-ES" sz="1800" dirty="0" err="1" smtClean="0"/>
               <a:t>restrict</a:t>
             </a:r>
             <a:r>
-              <a:rPr lang="es-ES" dirty="0" smtClean="0"/>
+              <a:rPr lang="es-ES" sz="1800" dirty="0" smtClean="0"/>
               <a:t>: 'EAC',</a:t>
             </a:r>
           </a:p>
@@ -20619,19 +23893,19 @@
               <a:buNone/>
             </a:pPr>
             <a:r>
-              <a:rPr lang="es-ES" dirty="0"/>
+              <a:rPr lang="es-ES" sz="1800" dirty="0"/>
               <a:t>	</a:t>
             </a:r>
             <a:r>
-              <a:rPr lang="es-ES" dirty="0" smtClean="0"/>
+              <a:rPr lang="es-ES" sz="1800" dirty="0" smtClean="0"/>
               <a:t>	</a:t>
             </a:r>
             <a:r>
-              <a:rPr lang="es-ES" dirty="0" err="1" smtClean="0"/>
+              <a:rPr lang="es-ES" sz="1800" dirty="0" err="1" smtClean="0"/>
               <a:t>replace</a:t>
             </a:r>
             <a:r>
-              <a:rPr lang="es-ES" dirty="0" smtClean="0"/>
+              <a:rPr lang="es-ES" sz="1800" dirty="0" smtClean="0"/>
               <a:t>: true,</a:t>
             </a:r>
           </a:p>
@@ -20640,98 +23914,114 @@
               <a:buNone/>
             </a:pPr>
             <a:r>
-              <a:rPr lang="es-ES" dirty="0"/>
+              <a:rPr lang="es-ES" sz="1800" dirty="0"/>
               <a:t>	</a:t>
             </a:r>
             <a:r>
-              <a:rPr lang="es-ES" dirty="0" smtClean="0"/>
+              <a:rPr lang="es-ES" sz="1800" dirty="0" smtClean="0"/>
               <a:t>	</a:t>
             </a:r>
             <a:r>
-              <a:rPr lang="es-ES" dirty="0" err="1" smtClean="0"/>
+              <a:rPr lang="es-ES" sz="1800" dirty="0" err="1" smtClean="0"/>
               <a:t>template</a:t>
             </a:r>
             <a:r>
-              <a:rPr lang="es-ES" dirty="0" smtClean="0"/>
+              <a:rPr lang="es-ES" sz="1800" dirty="0" smtClean="0"/>
               <a:t>: '&lt;div</a:t>
             </a:r>
             <a:r>
-              <a:rPr lang="es-ES" u="sng" dirty="0" smtClean="0"/>
+              <a:rPr lang="es-ES" sz="1800" u="sng" dirty="0" smtClean="0"/>
               <a:t>&gt;&lt;/</a:t>
             </a:r>
             <a:r>
-              <a:rPr lang="es-ES" dirty="0" smtClean="0"/>
+              <a:rPr lang="es-ES" sz="1800" dirty="0" smtClean="0"/>
               <a:t>div&gt;',  // </a:t>
             </a:r>
             <a:r>
-              <a:rPr lang="es-ES" dirty="0" err="1" smtClean="0"/>
+              <a:rPr lang="es-ES" sz="1800" dirty="0" err="1" smtClean="0"/>
               <a:t>or</a:t>
             </a:r>
             <a:r>
-              <a:rPr lang="es-ES" dirty="0" smtClean="0"/>
-              <a:t> 'url.html',</a:t>
-            </a:r>
-          </a:p>
-          <a:p>
-            <a:pPr marL="0" indent="0">
-              <a:buNone/>
-            </a:pPr>
-            <a:r>
-              <a:rPr lang="es-ES" dirty="0"/>
+              <a:rPr lang="es-ES" sz="1800" dirty="0" smtClean="0"/>
+              <a:t> </a:t>
+            </a:r>
+            <a:r>
+              <a:rPr lang="es-ES" sz="1800" dirty="0" err="1" smtClean="0"/>
+              <a:t>templateUrl</a:t>
+            </a:r>
+            <a:r>
+              <a:rPr lang="es-ES" sz="1800" dirty="0" smtClean="0"/>
+              <a:t>: </a:t>
+            </a:r>
+            <a:r>
+              <a:rPr lang="es-ES" sz="1800" dirty="0"/>
+              <a:t>'url.html</a:t>
+            </a:r>
+            <a:r>
+              <a:rPr lang="es-ES" sz="1800" dirty="0" smtClean="0"/>
+              <a:t>',</a:t>
+            </a:r>
+          </a:p>
+          <a:p>
+            <a:pPr marL="0" indent="0">
+              <a:buNone/>
+            </a:pPr>
+            <a:r>
+              <a:rPr lang="es-ES" sz="1800" dirty="0"/>
               <a:t>	</a:t>
             </a:r>
             <a:r>
-              <a:rPr lang="es-ES" dirty="0" smtClean="0"/>
+              <a:rPr lang="es-ES" sz="1800" dirty="0" smtClean="0"/>
               <a:t>	</a:t>
             </a:r>
             <a:r>
-              <a:rPr lang="es-ES" dirty="0" err="1" smtClean="0"/>
+              <a:rPr lang="es-ES" sz="1800" dirty="0" err="1" smtClean="0"/>
               <a:t>transclude</a:t>
             </a:r>
             <a:r>
-              <a:rPr lang="es-ES" dirty="0" smtClean="0"/>
+              <a:rPr lang="es-ES" sz="1800" dirty="0" smtClean="0"/>
               <a:t>: true,   // </a:t>
             </a:r>
             <a:r>
-              <a:rPr lang="es-ES" dirty="0" err="1" smtClean="0"/>
+              <a:rPr lang="es-ES" sz="1800" dirty="0" err="1" smtClean="0"/>
               <a:t>for</a:t>
             </a:r>
             <a:r>
-              <a:rPr lang="es-ES" dirty="0" smtClean="0"/>
+              <a:rPr lang="es-ES" sz="1800" dirty="0" smtClean="0"/>
               <a:t> </a:t>
             </a:r>
             <a:r>
-              <a:rPr lang="es-ES" dirty="0" err="1" smtClean="0"/>
+              <a:rPr lang="es-ES" sz="1800" dirty="0" err="1" smtClean="0"/>
               <a:t>arbitrary</a:t>
             </a:r>
             <a:r>
-              <a:rPr lang="es-ES" dirty="0" smtClean="0"/>
+              <a:rPr lang="es-ES" sz="1800" dirty="0" smtClean="0"/>
               <a:t> </a:t>
             </a:r>
             <a:r>
-              <a:rPr lang="es-ES" dirty="0" err="1" smtClean="0"/>
+              <a:rPr lang="es-ES" sz="1800" dirty="0" err="1" smtClean="0"/>
               <a:t>content</a:t>
             </a:r>
-            <a:endParaRPr lang="es-ES" dirty="0" smtClean="0"/>
-          </a:p>
-          <a:p>
-            <a:pPr marL="0" indent="0">
-              <a:buNone/>
-            </a:pPr>
-            <a:r>
-              <a:rPr lang="es-ES" dirty="0"/>
+            <a:endParaRPr lang="es-ES" sz="1800" dirty="0" smtClean="0"/>
+          </a:p>
+          <a:p>
+            <a:pPr marL="0" indent="0">
+              <a:buNone/>
+            </a:pPr>
+            <a:r>
+              <a:rPr lang="es-ES" sz="1800" dirty="0"/>
               <a:t>	</a:t>
             </a:r>
             <a:r>
-              <a:rPr lang="es-ES" dirty="0" smtClean="0"/>
+              <a:rPr lang="es-ES" sz="1800" dirty="0" smtClean="0"/>
               <a:t>	</a:t>
             </a:r>
             <a:r>
-              <a:rPr lang="es-ES" dirty="0" err="1" smtClean="0"/>
+              <a:rPr lang="es-ES" sz="1800" dirty="0" err="1" smtClean="0"/>
               <a:t>scope</a:t>
             </a:r>
             <a:r>
-              <a:rPr lang="es-ES" dirty="0" smtClean="0"/>
+              <a:rPr lang="es-ES" sz="1800" dirty="0" smtClean="0"/>
               <a:t>: {},</a:t>
             </a:r>
           </a:p>
@@ -20740,19 +24030,19 @@
               <a:buNone/>
             </a:pPr>
             <a:r>
-              <a:rPr lang="es-ES" dirty="0"/>
+              <a:rPr lang="es-ES" sz="1800" dirty="0"/>
               <a:t>	</a:t>
             </a:r>
             <a:r>
-              <a:rPr lang="es-ES" dirty="0" smtClean="0"/>
+              <a:rPr lang="es-ES" sz="1800" dirty="0" smtClean="0"/>
               <a:t>	compile: </a:t>
             </a:r>
             <a:r>
-              <a:rPr lang="es-ES" dirty="0" err="1" smtClean="0"/>
+              <a:rPr lang="es-ES" sz="1800" dirty="0" err="1" smtClean="0"/>
               <a:t>function</a:t>
             </a:r>
             <a:r>
-              <a:rPr lang="es-ES" dirty="0" smtClean="0"/>
+              <a:rPr lang="es-ES" sz="1800" dirty="0" smtClean="0"/>
               <a:t>(){}</a:t>
             </a:r>
           </a:p>
@@ -20761,7 +24051,29 @@
               <a:buNone/>
             </a:pPr>
             <a:r>
-              <a:rPr lang="es-ES" dirty="0" smtClean="0"/>
+              <a:rPr lang="es-ES" sz="1800" dirty="0"/>
+              <a:t>	</a:t>
+            </a:r>
+            <a:r>
+              <a:rPr lang="es-ES" sz="1800" dirty="0" smtClean="0"/>
+              <a:t>	link: </a:t>
+            </a:r>
+            <a:r>
+              <a:rPr lang="es-ES" sz="1800" dirty="0" err="1" smtClean="0"/>
+              <a:t>function</a:t>
+            </a:r>
+            <a:r>
+              <a:rPr lang="es-ES" sz="1800" dirty="0" smtClean="0"/>
+              <a:t>(){}</a:t>
+            </a:r>
+            <a:endParaRPr lang="es-ES" sz="1800" dirty="0" smtClean="0"/>
+          </a:p>
+          <a:p>
+            <a:pPr marL="0" indent="0">
+              <a:buNone/>
+            </a:pPr>
+            <a:r>
+              <a:rPr lang="es-ES" sz="1800" dirty="0" smtClean="0"/>
               <a:t>		….</a:t>
             </a:r>
           </a:p>
@@ -20770,7 +24082,7 @@
               <a:buNone/>
             </a:pPr>
             <a:r>
-              <a:rPr lang="es-ES" dirty="0" smtClean="0"/>
+              <a:rPr lang="es-ES" sz="1800" dirty="0" smtClean="0"/>
               <a:t>	}</a:t>
             </a:r>
           </a:p>
@@ -20779,7 +24091,7 @@
               <a:buNone/>
             </a:pPr>
             <a:r>
-              <a:rPr lang="es-ES" dirty="0" smtClean="0"/>
+              <a:rPr lang="es-ES" sz="1800" dirty="0" smtClean="0"/>
               <a:t>});</a:t>
             </a:r>
           </a:p>
@@ -20877,7 +24189,27 @@
           <a:p>
             <a:r>
               <a:rPr lang="es-ES" dirty="0" err="1" smtClean="0"/>
-              <a:t>Isolated</a:t>
+              <a:t>Scopes</a:t>
+            </a:r>
+            <a:r>
+              <a:rPr lang="es-ES" dirty="0" smtClean="0"/>
+              <a:t> </a:t>
+            </a:r>
+            <a:r>
+              <a:rPr lang="es-ES" dirty="0" err="1" smtClean="0"/>
+              <a:t>types</a:t>
+            </a:r>
+            <a:r>
+              <a:rPr lang="es-ES" dirty="0" smtClean="0"/>
+              <a:t> &amp; </a:t>
+            </a:r>
+            <a:r>
+              <a:rPr lang="es-ES" dirty="0" err="1"/>
+              <a:t>I</a:t>
+            </a:r>
+            <a:r>
+              <a:rPr lang="es-ES" dirty="0" err="1" smtClean="0"/>
+              <a:t>solated</a:t>
             </a:r>
             <a:r>
               <a:rPr lang="es-ES" dirty="0" smtClean="0"/>
@@ -22058,82 +25390,6 @@
       </p:grpSpPr>
       <p:sp>
         <p:nvSpPr>
-          <p:cNvPr id="4" name="3 Rectángulo"/>
-          <p:cNvSpPr/>
-          <p:nvPr/>
-        </p:nvSpPr>
-        <p:spPr>
-          <a:xfrm>
-            <a:off x="827584" y="1556792"/>
-            <a:ext cx="7560840" cy="4608512"/>
-          </a:xfrm>
-          <a:prstGeom prst="rect">
-            <a:avLst/>
-          </a:prstGeom>
-        </p:spPr>
-        <p:style>
-          <a:lnRef idx="1">
-            <a:schemeClr val="accent1"/>
-          </a:lnRef>
-          <a:fillRef idx="3">
-            <a:schemeClr val="accent1"/>
-          </a:fillRef>
-          <a:effectRef idx="2">
-            <a:schemeClr val="accent1"/>
-          </a:effectRef>
-          <a:fontRef idx="minor">
-            <a:schemeClr val="lt1"/>
-          </a:fontRef>
-        </p:style>
-        <p:txBody>
-          <a:bodyPr rtlCol="0" anchor="ctr"/>
-          <a:lstStyle/>
-          <a:p>
-            <a:pPr algn="ctr"/>
-            <a:endParaRPr lang="en-US"/>
-          </a:p>
-        </p:txBody>
-      </p:sp>
-      <p:sp>
-        <p:nvSpPr>
-          <p:cNvPr id="8" name="7 Rectángulo"/>
-          <p:cNvSpPr/>
-          <p:nvPr/>
-        </p:nvSpPr>
-        <p:spPr>
-          <a:xfrm>
-            <a:off x="1115616" y="4005064"/>
-            <a:ext cx="6984776" cy="1944216"/>
-          </a:xfrm>
-          <a:prstGeom prst="rect">
-            <a:avLst/>
-          </a:prstGeom>
-        </p:spPr>
-        <p:style>
-          <a:lnRef idx="1">
-            <a:schemeClr val="accent2"/>
-          </a:lnRef>
-          <a:fillRef idx="3">
-            <a:schemeClr val="accent2"/>
-          </a:fillRef>
-          <a:effectRef idx="2">
-            <a:schemeClr val="accent2"/>
-          </a:effectRef>
-          <a:fontRef idx="minor">
-            <a:schemeClr val="lt1"/>
-          </a:fontRef>
-        </p:style>
-        <p:txBody>
-          <a:bodyPr rtlCol="0" anchor="ctr"/>
-          <a:lstStyle/>
-          <a:p>
-            <a:pPr algn="ctr"/>
-            <a:endParaRPr lang="en-US"/>
-          </a:p>
-        </p:txBody>
-      </p:sp>
-      <p:sp>
-        <p:nvSpPr>
           <p:cNvPr id="2" name="1 Título"/>
           <p:cNvSpPr>
             <a:spLocks noGrp="1"/>
@@ -22159,196 +25415,47 @@
           </a:p>
         </p:txBody>
       </p:sp>
-      <p:sp>
-        <p:nvSpPr>
-          <p:cNvPr id="5" name="4 Rectángulo"/>
-          <p:cNvSpPr/>
+      <p:pic>
+        <p:nvPicPr>
+          <p:cNvPr id="1026" name="Picture 2" descr="http://www.jvandemo.com/content/images/2014/Aug/cycle-2.png"/>
+          <p:cNvPicPr>
+            <a:picLocks noChangeAspect="1" noChangeArrowheads="1"/>
+          </p:cNvPicPr>
           <p:nvPr/>
-        </p:nvSpPr>
-        <p:spPr>
+        </p:nvPicPr>
+        <p:blipFill>
+          <a:blip r:embed="rId3">
+            <a:extLst>
+              <a:ext uri="{28A0092B-C50C-407E-A947-70E740481C1C}">
+                <a14:useLocalDpi xmlns:a14="http://schemas.microsoft.com/office/drawing/2010/main" val="0"/>
+              </a:ext>
+            </a:extLst>
+          </a:blip>
+          <a:srcRect/>
+          <a:stretch>
+            <a:fillRect/>
+          </a:stretch>
+        </p:blipFill>
+        <p:spPr bwMode="auto">
           <a:xfrm>
-            <a:off x="1115616" y="1844824"/>
-            <a:ext cx="6984776" cy="1944216"/>
+            <a:off x="251520" y="2564904"/>
+            <a:ext cx="8552426" cy="2813298"/>
           </a:xfrm>
           <a:prstGeom prst="rect">
             <a:avLst/>
           </a:prstGeom>
+          <a:noFill/>
+          <a:extLst>
+            <a:ext uri="{909E8E84-426E-40DD-AFC4-6F175D3DCCD1}">
+              <a14:hiddenFill xmlns:a14="http://schemas.microsoft.com/office/drawing/2010/main">
+                <a:solidFill>
+                  <a:srgbClr val="FFFFFF"/>
+                </a:solidFill>
+              </a14:hiddenFill>
+            </a:ext>
+          </a:extLst>
         </p:spPr>
-        <p:style>
-          <a:lnRef idx="1">
-            <a:schemeClr val="accent6"/>
-          </a:lnRef>
-          <a:fillRef idx="3">
-            <a:schemeClr val="accent6"/>
-          </a:fillRef>
-          <a:effectRef idx="2">
-            <a:schemeClr val="accent6"/>
-          </a:effectRef>
-          <a:fontRef idx="minor">
-            <a:schemeClr val="lt1"/>
-          </a:fontRef>
-        </p:style>
-        <p:txBody>
-          <a:bodyPr rtlCol="0" anchor="ctr"/>
-          <a:lstStyle/>
-          <a:p>
-            <a:pPr algn="ctr"/>
-            <a:endParaRPr lang="en-US"/>
-          </a:p>
-        </p:txBody>
-      </p:sp>
-      <p:sp>
-        <p:nvSpPr>
-          <p:cNvPr id="6" name="5 Rectángulo redondeado"/>
-          <p:cNvSpPr/>
-          <p:nvPr/>
-        </p:nvSpPr>
-        <p:spPr>
-          <a:xfrm>
-            <a:off x="1403648" y="4293096"/>
-            <a:ext cx="3024336" cy="1368152"/>
-          </a:xfrm>
-          <a:prstGeom prst="roundRect">
-            <a:avLst/>
-          </a:prstGeom>
-        </p:spPr>
-        <p:style>
-          <a:lnRef idx="1">
-            <a:schemeClr val="accent4"/>
-          </a:lnRef>
-          <a:fillRef idx="3">
-            <a:schemeClr val="accent4"/>
-          </a:fillRef>
-          <a:effectRef idx="2">
-            <a:schemeClr val="accent4"/>
-          </a:effectRef>
-          <a:fontRef idx="minor">
-            <a:schemeClr val="lt1"/>
-          </a:fontRef>
-        </p:style>
-        <p:txBody>
-          <a:bodyPr rtlCol="0" anchor="ctr"/>
-          <a:lstStyle/>
-          <a:p>
-            <a:pPr algn="ctr"/>
-            <a:endParaRPr lang="en-US"/>
-          </a:p>
-        </p:txBody>
-      </p:sp>
-      <p:sp>
-        <p:nvSpPr>
-          <p:cNvPr id="7" name="6 Rectángulo redondeado"/>
-          <p:cNvSpPr/>
-          <p:nvPr/>
-        </p:nvSpPr>
-        <p:spPr>
-          <a:xfrm>
-            <a:off x="4788024" y="2132856"/>
-            <a:ext cx="3024336" cy="1368152"/>
-          </a:xfrm>
-          <a:prstGeom prst="roundRect">
-            <a:avLst/>
-          </a:prstGeom>
-        </p:spPr>
-        <p:style>
-          <a:lnRef idx="1">
-            <a:schemeClr val="accent3"/>
-          </a:lnRef>
-          <a:fillRef idx="3">
-            <a:schemeClr val="accent3"/>
-          </a:fillRef>
-          <a:effectRef idx="2">
-            <a:schemeClr val="accent3"/>
-          </a:effectRef>
-          <a:fontRef idx="minor">
-            <a:schemeClr val="lt1"/>
-          </a:fontRef>
-        </p:style>
-        <p:txBody>
-          <a:bodyPr rtlCol="0" anchor="ctr"/>
-          <a:lstStyle/>
-          <a:p>
-            <a:pPr algn="ctr"/>
-            <a:endParaRPr lang="en-US"/>
-          </a:p>
-        </p:txBody>
-      </p:sp>
-      <p:sp>
-        <p:nvSpPr>
-          <p:cNvPr id="9" name="8 Rectángulo redondeado"/>
-          <p:cNvSpPr/>
-          <p:nvPr/>
-        </p:nvSpPr>
-        <p:spPr>
-          <a:xfrm>
-            <a:off x="1403648" y="2132856"/>
-            <a:ext cx="3024336" cy="1368152"/>
-          </a:xfrm>
-          <a:prstGeom prst="roundRect">
-            <a:avLst/>
-          </a:prstGeom>
-        </p:spPr>
-        <p:style>
-          <a:lnRef idx="1">
-            <a:schemeClr val="accent4"/>
-          </a:lnRef>
-          <a:fillRef idx="3">
-            <a:schemeClr val="accent4"/>
-          </a:fillRef>
-          <a:effectRef idx="2">
-            <a:schemeClr val="accent4"/>
-          </a:effectRef>
-          <a:fontRef idx="minor">
-            <a:schemeClr val="lt1"/>
-          </a:fontRef>
-        </p:style>
-        <p:txBody>
-          <a:bodyPr rtlCol="0" anchor="ctr"/>
-          <a:lstStyle/>
-          <a:p>
-            <a:pPr algn="ctr"/>
-            <a:endParaRPr lang="en-US"/>
-          </a:p>
-        </p:txBody>
-      </p:sp>
-      <p:sp>
-        <p:nvSpPr>
-          <p:cNvPr id="10" name="9 Rectángulo redondeado"/>
-          <p:cNvSpPr/>
-          <p:nvPr/>
-        </p:nvSpPr>
-        <p:spPr>
-          <a:xfrm>
-            <a:off x="4818128" y="4293096"/>
-            <a:ext cx="3024336" cy="1368152"/>
-          </a:xfrm>
-          <a:prstGeom prst="roundRect">
-            <a:avLst/>
-          </a:prstGeom>
-        </p:spPr>
-        <p:style>
-          <a:lnRef idx="1">
-            <a:schemeClr val="accent3"/>
-          </a:lnRef>
-          <a:fillRef idx="3">
-            <a:schemeClr val="accent3"/>
-          </a:fillRef>
-          <a:effectRef idx="2">
-            <a:schemeClr val="accent3"/>
-          </a:effectRef>
-          <a:fontRef idx="minor">
-            <a:schemeClr val="lt1"/>
-          </a:fontRef>
-        </p:style>
-        <p:txBody>
-          <a:bodyPr rtlCol="0" anchor="ctr"/>
-          <a:lstStyle/>
-          <a:p>
-            <a:pPr algn="ctr"/>
-            <a:endParaRPr lang="en-US"/>
-          </a:p>
-        </p:txBody>
-      </p:sp>
+      </p:pic>
     </p:spTree>
     <p:extLst>
       <p:ext uri="{BB962C8B-B14F-4D97-AF65-F5344CB8AC3E}">

</xml_diff>

<commit_message>
Add more directives notes
</commit_message>
<xml_diff>
--- a/material/AngularJS Taller.pptx
+++ b/material/AngularJS Taller.pptx
@@ -1645,11 +1645,7 @@
             </a:r>
             <a:r>
               <a:rPr lang="en-US" baseline="0" dirty="0" smtClean="0"/>
-              <a:t> </a:t>
-            </a:r>
-            <a:r>
-              <a:rPr lang="en-US" baseline="0" dirty="0" smtClean="0"/>
-              <a:t>practice (</a:t>
+              <a:t> practice (</a:t>
             </a:r>
             <a:r>
               <a:rPr lang="en-US" baseline="0" dirty="0" err="1" smtClean="0"/>
@@ -1659,7 +1655,6 @@
               <a:rPr lang="en-US" baseline="0" dirty="0" smtClean="0"/>
               <a:t>).</a:t>
             </a:r>
-            <a:endParaRPr lang="en-US" baseline="0" dirty="0" smtClean="0"/>
           </a:p>
           <a:p>
             <a:endParaRPr lang="en-US" dirty="0" smtClean="0"/>
@@ -2460,11 +2455,7 @@
             </a:r>
             <a:r>
               <a:rPr lang="en-US" dirty="0" smtClean="0"/>
-              <a:t>(</a:t>
-            </a:r>
-            <a:r>
-              <a:rPr lang="en-US" dirty="0" smtClean="0"/>
-              <a:t>'</a:t>
+              <a:t>('</a:t>
             </a:r>
             <a:r>
               <a:rPr lang="en-US" dirty="0" err="1" smtClean="0"/>
@@ -3982,11 +3973,7 @@
             </a:r>
             <a:r>
               <a:rPr lang="en-US" baseline="0" dirty="0" smtClean="0"/>
-              <a:t> </a:t>
-            </a:r>
-            <a:r>
-              <a:rPr lang="en-US" baseline="0" dirty="0" smtClean="0"/>
-              <a:t>practice (</a:t>
+              <a:t> practice (</a:t>
             </a:r>
             <a:r>
               <a:rPr lang="en-US" baseline="0" dirty="0" err="1" smtClean="0"/>
@@ -3996,7 +3983,6 @@
               <a:rPr lang="en-US" baseline="0" dirty="0" smtClean="0"/>
               <a:t>).</a:t>
             </a:r>
-            <a:endParaRPr lang="en-US" baseline="0" dirty="0" smtClean="0"/>
           </a:p>
           <a:p>
             <a:pPr marL="0" indent="0">
@@ -7196,13 +7182,8 @@
             </a:r>
             <a:r>
               <a:rPr lang="en-US" baseline="0" dirty="0" smtClean="0"/>
-              <a:t>-view in all the module HTML, but we may have an application which have multiple parts that we want to manage </a:t>
-            </a:r>
-            <a:r>
-              <a:rPr lang="en-US" baseline="0" dirty="0" smtClean="0"/>
-              <a:t>independently with its own view, resolve, controller, etc. </a:t>
-            </a:r>
-            <a:endParaRPr lang="en-US" baseline="0" dirty="0" smtClean="0"/>
+              <a:t>-view in all the module HTML, but we may have an application which have multiple parts that we want to manage independently with its own view, resolve, controller, etc. </a:t>
+            </a:r>
           </a:p>
           <a:p>
             <a:endParaRPr lang="en-US" baseline="0" dirty="0" smtClean="0"/>
@@ -7360,19 +7341,7 @@
             </a:r>
             <a:r>
               <a:rPr lang="en-US" baseline="0" dirty="0" smtClean="0"/>
-              <a:t>-router module has it's own way to manage routing so to start an application you should first plan which one </a:t>
-            </a:r>
-            <a:r>
-              <a:rPr lang="en-US" baseline="0" dirty="0" smtClean="0"/>
-              <a:t>you'll going </a:t>
-            </a:r>
-            <a:r>
-              <a:rPr lang="en-US" baseline="0" dirty="0" smtClean="0"/>
-              <a:t>to use. I </a:t>
-            </a:r>
-            <a:r>
-              <a:rPr lang="en-US" baseline="0" dirty="0" smtClean="0"/>
-              <a:t>recommend use </a:t>
+              <a:t>-router module has it's own way to manage routing so to start an application you should first plan which one you'll going to use. I recommend use </a:t>
             </a:r>
             <a:r>
               <a:rPr lang="en-US" baseline="0" dirty="0" err="1" smtClean="0"/>
@@ -7380,15 +7349,7 @@
             </a:r>
             <a:r>
               <a:rPr lang="en-US" baseline="0" dirty="0" smtClean="0"/>
-              <a:t>-route and its states for </a:t>
-            </a:r>
-            <a:r>
-              <a:rPr lang="en-US" baseline="0" dirty="0" smtClean="0"/>
-              <a:t>complex and </a:t>
-            </a:r>
-            <a:r>
-              <a:rPr lang="en-US" baseline="0" dirty="0" smtClean="0"/>
-              <a:t>large applications, and for simple applications/websites use </a:t>
+              <a:t>-route and its states for complex and large applications, and for simple applications/websites use </a:t>
             </a:r>
             <a:r>
               <a:rPr lang="en-US" baseline="0" dirty="0" err="1" smtClean="0"/>
@@ -7405,15 +7366,7 @@
           <a:p>
             <a:r>
               <a:rPr lang="en-US" baseline="0" dirty="0" smtClean="0"/>
-              <a:t>One of the main differences is a way to split views and manage the controllers/views depending on the state. This will bring the way to divide the work, reuse </a:t>
-            </a:r>
-            <a:r>
-              <a:rPr lang="en-US" baseline="0" dirty="0" smtClean="0"/>
-              <a:t>functionalities, </a:t>
-            </a:r>
-            <a:r>
-              <a:rPr lang="en-US" baseline="0" dirty="0" smtClean="0"/>
-              <a:t>etc. </a:t>
+              <a:t>One of the main differences is a way to split views and manage the controllers/views depending on the state. This will bring the way to divide the work, reuse functionalities, etc. </a:t>
             </a:r>
           </a:p>
           <a:p>
@@ -7430,11 +7383,7 @@
             </a:r>
             <a:r>
               <a:rPr lang="en-US" baseline="0" dirty="0" smtClean="0"/>
-              <a:t>, you also have URL </a:t>
-            </a:r>
-            <a:r>
-              <a:rPr lang="en-US" baseline="0" dirty="0" smtClean="0"/>
-              <a:t>Routing:</a:t>
+              <a:t>, you also have URL Routing:</a:t>
             </a:r>
           </a:p>
           <a:p>
@@ -8153,11 +8102,7 @@
             </a:r>
             <a:r>
               <a:rPr lang="en-US" baseline="0" dirty="0" smtClean="0"/>
-              <a:t> </a:t>
-            </a:r>
-            <a:r>
-              <a:rPr lang="en-US" baseline="0" dirty="0" smtClean="0"/>
-              <a:t>practice (</a:t>
+              <a:t> practice (</a:t>
             </a:r>
             <a:r>
               <a:rPr lang="en-US" baseline="0" dirty="0" err="1" smtClean="0"/>
@@ -8167,7 +8112,6 @@
               <a:rPr lang="en-US" baseline="0" dirty="0" smtClean="0"/>
               <a:t>).</a:t>
             </a:r>
-            <a:endParaRPr lang="en-US" baseline="0" dirty="0" smtClean="0"/>
           </a:p>
           <a:p>
             <a:pPr marL="0" marR="0" indent="0" algn="l" defTabSz="914400" rtl="0" eaLnBrk="1" fontAlgn="auto" latinLnBrk="0" hangingPunct="1">
@@ -8746,15 +8690,7 @@
             </a:r>
             <a:r>
               <a:rPr lang="en-US" baseline="0" dirty="0" smtClean="0"/>
-              <a:t>, </a:t>
-            </a:r>
-            <a:r>
-              <a:rPr lang="en-US" baseline="0" dirty="0" smtClean="0"/>
-              <a:t>and create a new Yeoman project </a:t>
-            </a:r>
-            <a:r>
-              <a:rPr lang="en-US" baseline="0" dirty="0" smtClean="0"/>
-              <a:t>inside with "</a:t>
+              <a:t>, and create a new Yeoman project inside with "</a:t>
             </a:r>
             <a:r>
               <a:rPr lang="en-US" baseline="0" dirty="0" err="1" smtClean="0"/>
@@ -10723,7 +10659,6 @@
               <a:rPr lang="en-US" u="none" baseline="0" dirty="0" smtClean="0"/>
               <a:t>As you can see, in the example only we use a simple HTML template to change, but this also works with controllers, resolve and the other properties a state can be configured.</a:t>
             </a:r>
-            <a:endParaRPr lang="en-US" u="none" baseline="0" dirty="0" smtClean="0"/>
           </a:p>
           <a:p>
             <a:pPr marL="228600" indent="-228600">
@@ -10749,11 +10684,7 @@
             </a:pPr>
             <a:r>
               <a:rPr lang="en-US" dirty="0" smtClean="0"/>
-              <a:t>https://</a:t>
-            </a:r>
-            <a:r>
-              <a:rPr lang="en-US" dirty="0" smtClean="0"/>
-              <a:t>github.com/yeoman/generator-angular</a:t>
+              <a:t>https://github.com/yeoman/generator-angular</a:t>
             </a:r>
           </a:p>
           <a:p>
@@ -11476,8 +11407,152 @@
           <a:p>
             <a:r>
               <a:rPr lang="en-US" baseline="0" dirty="0" smtClean="0"/>
-              <a:t>Isolated  {}: Directive gets a new isolated scope completely detached from its parent scope.</a:t>
-            </a:r>
+              <a:t>Isolated  {}: Directive gets a new isolated scope completely detached from its parent scope</a:t>
+            </a:r>
+            <a:r>
+              <a:rPr lang="en-US" baseline="0" dirty="0" smtClean="0"/>
+              <a:t>.</a:t>
+            </a:r>
+          </a:p>
+          <a:p>
+            <a:endParaRPr lang="en-US" baseline="0" dirty="0" smtClean="0"/>
+          </a:p>
+          <a:p>
+            <a:r>
+              <a:rPr lang="en-US" baseline="0" dirty="0" smtClean="0"/>
+              <a:t>When you select an Isolated scope you have options to get information from the parent, this by adding the scope variables values in camel case, that in the template will go with hyphens as an attribute, </a:t>
+            </a:r>
+            <a:r>
+              <a:rPr lang="en-US" baseline="0" dirty="0" err="1" smtClean="0"/>
+              <a:t>eg</a:t>
+            </a:r>
+            <a:r>
+              <a:rPr lang="en-US" baseline="0" dirty="0" smtClean="0"/>
+              <a:t>:</a:t>
+            </a:r>
+          </a:p>
+          <a:p>
+            <a:endParaRPr lang="en-US" baseline="0" dirty="0" smtClean="0"/>
+          </a:p>
+          <a:p>
+            <a:r>
+              <a:rPr lang="en-US" baseline="0" dirty="0" smtClean="0"/>
+              <a:t>	scope:{</a:t>
+            </a:r>
+          </a:p>
+          <a:p>
+            <a:r>
+              <a:rPr lang="en-US" baseline="0" dirty="0" smtClean="0"/>
+              <a:t>		</a:t>
+            </a:r>
+            <a:r>
+              <a:rPr lang="en-US" baseline="0" dirty="0" err="1" smtClean="0"/>
+              <a:t>camelCase</a:t>
+            </a:r>
+            <a:r>
+              <a:rPr lang="en-US" baseline="0" dirty="0" smtClean="0"/>
+              <a:t>: '=</a:t>
+            </a:r>
+            <a:r>
+              <a:rPr lang="en-US" baseline="0" dirty="0" err="1" smtClean="0"/>
+              <a:t>attributeInCamelCase</a:t>
+            </a:r>
+            <a:r>
+              <a:rPr lang="en-US" baseline="0" dirty="0" smtClean="0"/>
+              <a:t>'</a:t>
+            </a:r>
+          </a:p>
+          <a:p>
+            <a:r>
+              <a:rPr lang="en-US" baseline="0" dirty="0" smtClean="0"/>
+              <a:t>	}</a:t>
+            </a:r>
+          </a:p>
+          <a:p>
+            <a:endParaRPr lang="en-US" baseline="0" dirty="0" smtClean="0"/>
+          </a:p>
+          <a:p>
+            <a:r>
+              <a:rPr lang="en-US" baseline="0" dirty="0" err="1" smtClean="0"/>
+              <a:t>Inisde</a:t>
+            </a:r>
+            <a:r>
+              <a:rPr lang="en-US" baseline="0" dirty="0" smtClean="0"/>
+              <a:t> the directive you will get the value with "</a:t>
+            </a:r>
+            <a:r>
+              <a:rPr lang="en-US" baseline="0" dirty="0" err="1" smtClean="0"/>
+              <a:t>scope.camelCase</a:t>
+            </a:r>
+            <a:r>
+              <a:rPr lang="en-US" baseline="0" dirty="0" smtClean="0"/>
+              <a:t>", and in the template will go as: "&lt;directive attribute-in-camel-case="</a:t>
+            </a:r>
+            <a:r>
+              <a:rPr lang="en-US" baseline="0" dirty="0" err="1" smtClean="0"/>
+              <a:t>someValue</a:t>
+            </a:r>
+            <a:r>
+              <a:rPr lang="en-US" baseline="0" dirty="0" smtClean="0"/>
+              <a:t>"&gt;&lt;/directive&gt;", if you omit the name and only have the sign, </a:t>
+            </a:r>
+            <a:r>
+              <a:rPr lang="en-US" baseline="0" dirty="0" err="1" smtClean="0"/>
+              <a:t>AngularJS</a:t>
+            </a:r>
+            <a:r>
+              <a:rPr lang="en-US" baseline="0" dirty="0" smtClean="0"/>
+              <a:t> will assume that is going to be the same name as the scope.</a:t>
+            </a:r>
+          </a:p>
+          <a:p>
+            <a:endParaRPr lang="en-US" baseline="0" dirty="0" smtClean="0"/>
+          </a:p>
+          <a:p>
+            <a:r>
+              <a:rPr lang="en-US" baseline="0" dirty="0" smtClean="0"/>
+              <a:t>The signs in the directive's scope will mean:</a:t>
+            </a:r>
+          </a:p>
+          <a:p>
+            <a:endParaRPr lang="en-US" baseline="0" dirty="0" smtClean="0"/>
+          </a:p>
+          <a:p>
+            <a:pPr marL="171450" indent="-171450">
+              <a:buFont typeface="Arial" panose="020B0604020202020204" pitchFamily="34" charset="0"/>
+              <a:buChar char="•"/>
+            </a:pPr>
+            <a:r>
+              <a:rPr lang="en-US" baseline="0" dirty="0" smtClean="0"/>
+              <a:t>'@' – Text binding, is only to get string values. </a:t>
+            </a:r>
+          </a:p>
+          <a:p>
+            <a:pPr marL="171450" indent="-171450">
+              <a:buFont typeface="Arial" panose="020B0604020202020204" pitchFamily="34" charset="0"/>
+              <a:buChar char="•"/>
+            </a:pPr>
+            <a:r>
+              <a:rPr lang="en-US" baseline="0" dirty="0" smtClean="0"/>
+              <a:t>'&amp;' – On way binding, I to pass from the parent a value, but isolate the value in a get function to let the parent be independent on how the children treat the variable.</a:t>
+            </a:r>
+          </a:p>
+          <a:p>
+            <a:pPr marL="171450" indent="-171450">
+              <a:buFont typeface="Arial" panose="020B0604020202020204" pitchFamily="34" charset="0"/>
+              <a:buChar char="•"/>
+            </a:pPr>
+            <a:r>
+              <a:rPr lang="en-US" baseline="0" dirty="0" smtClean="0"/>
+              <a:t>'=' – Two way binding, Pass the value, and if the value is changed inside the value will update the parents value.</a:t>
+            </a:r>
+          </a:p>
+          <a:p>
+            <a:pPr marL="171450" indent="-171450">
+              <a:buFont typeface="Arial" panose="020B0604020202020204" pitchFamily="34" charset="0"/>
+              <a:buChar char="•"/>
+            </a:pPr>
+            <a:endParaRPr lang="en-US" baseline="0" dirty="0" smtClean="0"/>
           </a:p>
         </p:txBody>
       </p:sp>
@@ -11746,7 +11821,6 @@
               <a:rPr lang="en-US" dirty="0" smtClean="0"/>
               <a:t>Post-link gets executed last</a:t>
             </a:r>
-            <a:endParaRPr lang="en-US" dirty="0" smtClean="0"/>
           </a:p>
           <a:p>
             <a:pPr marL="171450" indent="-171450">
@@ -12028,13 +12102,8 @@
             </a:r>
             <a:r>
               <a:rPr lang="es-ES" baseline="0" dirty="0" smtClean="0"/>
-              <a:t>'cd C</a:t>
-            </a:r>
-            <a:r>
-              <a:rPr lang="es-ES" baseline="0" dirty="0" smtClean="0"/>
-              <a:t>://…/practiceA'.</a:t>
-            </a:r>
-            <a:endParaRPr lang="es-ES" baseline="0" dirty="0" smtClean="0"/>
+              <a:t>'cd C://…/practiceA'.</a:t>
+            </a:r>
           </a:p>
           <a:p>
             <a:pPr marL="228600" indent="-228600">
@@ -12059,11 +12128,7 @@
             </a:r>
             <a:r>
               <a:rPr lang="en-US" baseline="0" noProof="0" dirty="0" smtClean="0"/>
-              <a:t>'. </a:t>
-            </a:r>
-            <a:r>
-              <a:rPr lang="en-US" baseline="0" noProof="0" dirty="0" smtClean="0"/>
-              <a:t>This will download, install and execute the necessary to build a start-up application.</a:t>
+              <a:t>'. This will download, install and execute the necessary to build a start-up application.</a:t>
             </a:r>
           </a:p>
           <a:p>
@@ -12196,11 +12261,7 @@
             </a:pPr>
             <a:r>
               <a:rPr lang="en-US" baseline="0" noProof="0" dirty="0" smtClean="0"/>
-              <a:t>Bower </a:t>
-            </a:r>
-            <a:r>
-              <a:rPr lang="en-US" baseline="0" noProof="0" dirty="0" smtClean="0"/>
-              <a:t>has some commands that you can use, please check the documentation for more information or run 'bower -h'.</a:t>
+              <a:t>Bower has some commands that you can use, please check the documentation for more information or run 'bower -h'.</a:t>
             </a:r>
           </a:p>
           <a:p>
@@ -13989,11 +14050,7 @@
             </a:pPr>
             <a:r>
               <a:rPr lang="en-US" dirty="0" smtClean="0"/>
-              <a:t>a</a:t>
-            </a:r>
-            <a:r>
-              <a:rPr lang="en-US" dirty="0" smtClean="0"/>
-              <a:t>) Create a module and a controller.</a:t>
+              <a:t>a) Create a module and a controller.</a:t>
             </a:r>
           </a:p>
           <a:p>
@@ -23061,11 +23118,7 @@
             </a:pPr>
             <a:r>
               <a:rPr lang="en-US" dirty="0" smtClean="0"/>
-              <a:t>Create </a:t>
-            </a:r>
-            <a:r>
-              <a:rPr lang="en-US" dirty="0" smtClean="0"/>
-              <a:t>a new route manually and with Yeoman.</a:t>
+              <a:t>Create a new route manually and with Yeoman.</a:t>
             </a:r>
           </a:p>
           <a:p>
@@ -23075,11 +23128,7 @@
             </a:pPr>
             <a:r>
               <a:rPr lang="en-US" dirty="0" smtClean="0"/>
-              <a:t>Create a project using </a:t>
-            </a:r>
-            <a:r>
-              <a:rPr lang="en-US" dirty="0" smtClean="0"/>
-              <a:t>states instead of routes.</a:t>
+              <a:t>Create a project using states instead of routes.</a:t>
             </a:r>
           </a:p>
           <a:p>
@@ -24066,7 +24115,6 @@
               <a:rPr lang="es-ES" sz="1800" dirty="0" smtClean="0"/>
               <a:t>(){}</a:t>
             </a:r>
-            <a:endParaRPr lang="es-ES" sz="1800" dirty="0" smtClean="0"/>
           </a:p>
           <a:p>
             <a:pPr marL="0" indent="0">

</xml_diff>

<commit_message>
Add Unit test theory
</commit_message>
<xml_diff>
--- a/material/AngularJS Taller.pptx
+++ b/material/AngularJS Taller.pptx
@@ -5,7 +5,7 @@
     <p:sldMasterId id="2147483648" r:id="rId1"/>
   </p:sldMasterIdLst>
   <p:notesMasterIdLst>
-    <p:notesMasterId r:id="rId46"/>
+    <p:notesMasterId r:id="rId50"/>
   </p:notesMasterIdLst>
   <p:sldIdLst>
     <p:sldId id="256" r:id="rId2"/>
@@ -51,7 +51,11 @@
     <p:sldId id="279" r:id="rId42"/>
     <p:sldId id="292" r:id="rId43"/>
     <p:sldId id="293" r:id="rId44"/>
-    <p:sldId id="281" r:id="rId45"/>
+    <p:sldId id="302" r:id="rId45"/>
+    <p:sldId id="303" r:id="rId46"/>
+    <p:sldId id="304" r:id="rId47"/>
+    <p:sldId id="305" r:id="rId48"/>
+    <p:sldId id="281" r:id="rId49"/>
   </p:sldIdLst>
   <p:sldSz cx="9144000" cy="6858000" type="screen4x3"/>
   <p:notesSz cx="6858000" cy="9144000"/>
@@ -13475,11 +13479,7 @@
             </a:pPr>
             <a:r>
               <a:rPr lang="es-ES" baseline="0" dirty="0" smtClean="0"/>
-              <a:t>http://fontawesome.io</a:t>
-            </a:r>
-            <a:r>
-              <a:rPr lang="es-ES" baseline="0" dirty="0" smtClean="0"/>
-              <a:t>/</a:t>
+              <a:t>http://fontawesome.io/</a:t>
             </a:r>
           </a:p>
           <a:p>
@@ -13491,7 +13491,6 @@
               <a:rPr lang="es-ES" baseline="0" dirty="0" smtClean="0"/>
               <a:t>http://gruntjs.com/configuring-tasks#globbing-patterns</a:t>
             </a:r>
-            <a:endParaRPr lang="es-ES" baseline="0" dirty="0" smtClean="0"/>
           </a:p>
         </p:txBody>
       </p:sp>
@@ -13825,13 +13824,8 @@
             </a:r>
             <a:r>
               <a:rPr lang="en-US" baseline="0" dirty="0" smtClean="0"/>
-              <a:t>, which is preferable to use </a:t>
-            </a:r>
-            <a:r>
-              <a:rPr lang="en-US" baseline="0" dirty="0" smtClean="0"/>
-              <a:t>for maintainability.</a:t>
-            </a:r>
-            <a:endParaRPr lang="en-US" baseline="0" dirty="0" smtClean="0"/>
+              <a:t>, which is preferable to use for maintainability.</a:t>
+            </a:r>
           </a:p>
           <a:p>
             <a:pPr marL="685800" lvl="1" indent="-228600">
@@ -13840,35 +13834,7 @@
             </a:pPr>
             <a:r>
               <a:rPr lang="en-US" baseline="0" dirty="0" smtClean="0"/>
-              <a:t>The generator doesn't encapsulate the directive, so </a:t>
-            </a:r>
-            <a:r>
-              <a:rPr lang="en-US" baseline="0" dirty="0" smtClean="0"/>
-              <a:t>in a </a:t>
-            </a:r>
-            <a:r>
-              <a:rPr lang="en-US" baseline="0" dirty="0" smtClean="0"/>
-              <a:t>large project you could have a lot of directives running wild in this directives folder, so is preferable to organize this on </a:t>
-            </a:r>
-            <a:r>
-              <a:rPr lang="en-US" baseline="0" dirty="0" smtClean="0"/>
-              <a:t>folders, </a:t>
-            </a:r>
-            <a:r>
-              <a:rPr lang="en-US" baseline="0" dirty="0" smtClean="0"/>
-              <a:t>and </a:t>
-            </a:r>
-            <a:r>
-              <a:rPr lang="en-US" baseline="0" dirty="0" smtClean="0"/>
-              <a:t>creates </a:t>
-            </a:r>
-            <a:r>
-              <a:rPr lang="en-US" baseline="0" dirty="0" smtClean="0"/>
-              <a:t>a module per each directive (</a:t>
-            </a:r>
-            <a:r>
-              <a:rPr lang="en-US" baseline="0" dirty="0" smtClean="0"/>
-              <a:t>This modularization </a:t>
+              <a:t>The generator doesn't encapsulate the directive, so in a large project you could have a lot of directives running wild in this directives folder, so is preferable to organize this on folders, and creates a module per each directive (This modularization </a:t>
             </a:r>
             <a:r>
               <a:rPr lang="en-US" u="none" baseline="0" dirty="0" smtClean="0"/>
@@ -13878,7 +13844,6 @@
               <a:rPr lang="en-US" baseline="0" dirty="0" smtClean="0"/>
               <a:t>).</a:t>
             </a:r>
-            <a:endParaRPr lang="en-US" baseline="0" dirty="0" smtClean="0"/>
           </a:p>
           <a:p>
             <a:pPr marL="228600" lvl="0" indent="-228600">
@@ -13887,15 +13852,7 @@
             </a:pPr>
             <a:r>
               <a:rPr lang="en-US" baseline="0" dirty="0" smtClean="0"/>
-              <a:t>First we are going to create a folder inside the directives folder, this should be </a:t>
-            </a:r>
-            <a:r>
-              <a:rPr lang="en-US" baseline="0" dirty="0" smtClean="0"/>
-              <a:t>named as </a:t>
-            </a:r>
-            <a:r>
-              <a:rPr lang="en-US" baseline="0" dirty="0" smtClean="0"/>
-              <a:t>you will use it in HTML, with hyphens, </a:t>
+              <a:t>First we are going to create a folder inside the directives folder, this should be named as you will use it in HTML, with hyphens, </a:t>
             </a:r>
             <a:r>
               <a:rPr lang="en-US" baseline="0" dirty="0" err="1" smtClean="0"/>
@@ -13923,15 +13880,7 @@
             </a:pPr>
             <a:r>
               <a:rPr lang="en-US" baseline="0" dirty="0" smtClean="0"/>
-              <a:t>Change the path added by Yeoman in the "app/index.html</a:t>
-            </a:r>
-            <a:r>
-              <a:rPr lang="en-US" baseline="0" dirty="0" smtClean="0"/>
-              <a:t>", </a:t>
-            </a:r>
-            <a:r>
-              <a:rPr lang="en-US" baseline="0" dirty="0" smtClean="0"/>
-              <a:t>and add the folder we created into the path.</a:t>
+              <a:t>Change the path added by Yeoman in the "app/index.html", and add the folder we created into the path.</a:t>
             </a:r>
           </a:p>
           <a:p>
@@ -13941,15 +13890,7 @@
             </a:pPr>
             <a:r>
               <a:rPr lang="en-US" baseline="0" dirty="0" smtClean="0"/>
-              <a:t>Also we need to change the "Gruntfile.js" </a:t>
-            </a:r>
-            <a:r>
-              <a:rPr lang="en-US" baseline="0" dirty="0" smtClean="0"/>
-              <a:t>watch </a:t>
-            </a:r>
-            <a:r>
-              <a:rPr lang="en-US" baseline="0" dirty="0" smtClean="0"/>
-              <a:t>in order to check changes with this new structure, and for that we need to add "{,*/}" in the paths of the "watch" inside the </a:t>
+              <a:t>Also we need to change the "Gruntfile.js" watch in order to check changes with this new structure, and for that we need to add "{,*/}" in the paths of the "watch" inside the </a:t>
             </a:r>
             <a:r>
               <a:rPr lang="en-US" baseline="0" dirty="0" err="1" smtClean="0"/>
@@ -13993,11 +13934,7 @@
             </a:r>
             <a:r>
               <a:rPr lang="en-US" baseline="0" dirty="0" smtClean="0"/>
-              <a:t>" "files" we need to add two "{,*/}" to check the directive's template changes</a:t>
-            </a:r>
-            <a:r>
-              <a:rPr lang="en-US" baseline="0" dirty="0" smtClean="0"/>
-              <a:t>. (You can also add /**/, but is preferable maintain a controlled environment of file search for performance purposes)</a:t>
+              <a:t>" "files" we need to add two "{,*/}" to check the directive's template changes. (You can also add /**/, but is preferable maintain a controlled environment of file search for performance purposes)</a:t>
             </a:r>
           </a:p>
           <a:p>
@@ -14040,15 +13977,7 @@
             </a:pPr>
             <a:r>
               <a:rPr lang="en-US" u="none" baseline="0" dirty="0" smtClean="0"/>
-              <a:t>Now back to the real practice, modify </a:t>
-            </a:r>
-            <a:r>
-              <a:rPr lang="en-US" u="none" baseline="0" dirty="0" smtClean="0"/>
-              <a:t>the </a:t>
-            </a:r>
-            <a:r>
-              <a:rPr lang="en-US" u="none" baseline="0" dirty="0" smtClean="0"/>
-              <a:t>directive </a:t>
+              <a:t>Now back to the real practice, modify the directive </a:t>
             </a:r>
             <a:r>
               <a:rPr lang="en-US" u="none" baseline="0" dirty="0" err="1" smtClean="0"/>
@@ -15635,7 +15564,23 @@
             </a:r>
             <a:r>
               <a:rPr lang="en-US" baseline="0" dirty="0" smtClean="0"/>
-              <a:t>: it works like an "@" isolated scope variable. It is recommended to better use the scope values, but it will always depends on your implementation.</a:t>
+              <a:t>: it works like an "@" isolated scope </a:t>
+            </a:r>
+            <a:r>
+              <a:rPr lang="en-US" baseline="0" dirty="0" smtClean="0"/>
+              <a:t>variable, because the main difference between this and the scope is that the scope makes a </a:t>
+            </a:r>
+            <a:r>
+              <a:rPr lang="en-US" baseline="0" dirty="0" err="1" smtClean="0"/>
+              <a:t>eval</a:t>
+            </a:r>
+            <a:r>
+              <a:rPr lang="en-US" baseline="0" dirty="0" smtClean="0"/>
+              <a:t>() on it, and this doesn't. </a:t>
+            </a:r>
+            <a:r>
+              <a:rPr lang="en-US" baseline="0" dirty="0" smtClean="0"/>
+              <a:t>It is recommended to better use the scope values, but it will always depends on your implementation.</a:t>
             </a:r>
           </a:p>
           <a:p>
@@ -15647,7 +15592,6 @@
               <a:rPr lang="en-US" baseline="0" dirty="0" smtClean="0"/>
               <a:t>The result of this will work as a "true" scope, but leaving independent the child of the parent changes after the build of the directive, this is useful for sending parent functions needed inside the child that wont change.</a:t>
             </a:r>
-            <a:endParaRPr lang="en-US" baseline="0" dirty="0" smtClean="0"/>
           </a:p>
           <a:p>
             <a:endParaRPr lang="en-US" dirty="0" smtClean="0"/>
@@ -15672,15 +15616,7 @@
             </a:pPr>
             <a:r>
               <a:rPr lang="en-US" u="sng" dirty="0" smtClean="0"/>
-              <a:t>c) Send </a:t>
-            </a:r>
-            <a:r>
-              <a:rPr lang="en-US" u="sng" dirty="0" smtClean="0"/>
-              <a:t>a directive to a module for portability</a:t>
-            </a:r>
-            <a:r>
-              <a:rPr lang="en-US" u="sng" dirty="0" smtClean="0"/>
-              <a:t>.</a:t>
+              <a:t>c) Send a directive to a module for portability.</a:t>
             </a:r>
           </a:p>
           <a:p>
@@ -16558,15 +16494,7 @@
           <a:p>
             <a:r>
               <a:rPr lang="en-US" u="sng" dirty="0" smtClean="0"/>
-              <a:t>d) Check </a:t>
-            </a:r>
-            <a:r>
-              <a:rPr lang="en-US" u="sng" dirty="0" smtClean="0"/>
-              <a:t>the run order</a:t>
-            </a:r>
-            <a:r>
-              <a:rPr lang="en-US" u="sng" dirty="0" smtClean="0"/>
-              <a:t>.</a:t>
+              <a:t>d) Check the run order.</a:t>
             </a:r>
           </a:p>
           <a:p>
@@ -18490,6 +18418,135 @@
           <a:p>
             <a:r>
               <a:rPr lang="en-US" dirty="0" smtClean="0"/>
+              <a:t>Angular have a way to communicate between $scope,</a:t>
+            </a:r>
+            <a:r>
+              <a:rPr lang="en-US" baseline="0" dirty="0" smtClean="0"/>
+              <a:t> using the $</a:t>
+            </a:r>
+            <a:r>
+              <a:rPr lang="en-US" baseline="0" dirty="0" err="1" smtClean="0"/>
+              <a:t>rootScope</a:t>
+            </a:r>
+            <a:r>
+              <a:rPr lang="en-US" baseline="0" dirty="0" smtClean="0"/>
+              <a:t> and $scope functions:</a:t>
+            </a:r>
+          </a:p>
+          <a:p>
+            <a:r>
+              <a:rPr lang="en-US" baseline="0" dirty="0" smtClean="0"/>
+              <a:t>$broadcast: inform to the child's, grandchild's, etc.</a:t>
+            </a:r>
+          </a:p>
+          <a:p>
+            <a:r>
+              <a:rPr lang="en-US" baseline="0" dirty="0" smtClean="0"/>
+              <a:t>$emit: send a message to the upper $scopes</a:t>
+            </a:r>
+          </a:p>
+          <a:p>
+            <a:endParaRPr lang="en-US" baseline="0" dirty="0" smtClean="0"/>
+          </a:p>
+          <a:p>
+            <a:r>
+              <a:rPr lang="en-US" baseline="0" dirty="0" smtClean="0"/>
+              <a:t>So, for example in the image you can observe the way of the $broadcast will go down, and the $emit go up. So if you want to communicate to a sibling $scope, you should put a way to tell the parent to then tell the sibling to do it; or at the worst case that you can't go to the father, go to the $</a:t>
+            </a:r>
+            <a:r>
+              <a:rPr lang="en-US" baseline="0" dirty="0" err="1" smtClean="0"/>
+              <a:t>rootScope</a:t>
+            </a:r>
+            <a:r>
+              <a:rPr lang="en-US" baseline="0" dirty="0" smtClean="0"/>
+              <a:t> which is the main scope in an angular instance.</a:t>
+            </a:r>
+            <a:endParaRPr lang="en-US" dirty="0"/>
+          </a:p>
+        </p:txBody>
+      </p:sp>
+      <p:sp>
+        <p:nvSpPr>
+          <p:cNvPr id="4" name="3 Marcador de número de diapositiva"/>
+          <p:cNvSpPr>
+            <a:spLocks noGrp="1"/>
+          </p:cNvSpPr>
+          <p:nvPr>
+            <p:ph type="sldNum" sz="quarter" idx="10"/>
+          </p:nvPr>
+        </p:nvSpPr>
+        <p:spPr/>
+        <p:txBody>
+          <a:bodyPr/>
+          <a:lstStyle/>
+          <a:p>
+            <a:fld id="{212C6109-0EF7-4E6B-B279-6389DF78298C}" type="slidenum">
+              <a:rPr lang="en-US" smtClean="0"/>
+              <a:t>40</a:t>
+            </a:fld>
+            <a:endParaRPr lang="en-US"/>
+          </a:p>
+        </p:txBody>
+      </p:sp>
+    </p:spTree>
+    <p:extLst>
+      <p:ext uri="{BB962C8B-B14F-4D97-AF65-F5344CB8AC3E}">
+        <p14:creationId xmlns:p14="http://schemas.microsoft.com/office/powerpoint/2010/main" val="1772023581"/>
+      </p:ext>
+    </p:extLst>
+  </p:cSld>
+  <p:clrMapOvr>
+    <a:masterClrMapping/>
+  </p:clrMapOvr>
+</p:notes>
+</file>
+
+<file path=ppt/notesSlides/notesSlide39.xml><?xml version="1.0" encoding="utf-8"?>
+<p:notes xmlns:a="http://schemas.openxmlformats.org/drawingml/2006/main" xmlns:r="http://schemas.openxmlformats.org/officeDocument/2006/relationships" xmlns:p="http://schemas.openxmlformats.org/presentationml/2006/main">
+  <p:cSld>
+    <p:spTree>
+      <p:nvGrpSpPr>
+        <p:cNvPr id="1" name=""/>
+        <p:cNvGrpSpPr/>
+        <p:nvPr/>
+      </p:nvGrpSpPr>
+      <p:grpSpPr>
+        <a:xfrm>
+          <a:off x="0" y="0"/>
+          <a:ext cx="0" cy="0"/>
+          <a:chOff x="0" y="0"/>
+          <a:chExt cx="0" cy="0"/>
+        </a:xfrm>
+      </p:grpSpPr>
+      <p:sp>
+        <p:nvSpPr>
+          <p:cNvPr id="2" name="1 Marcador de imagen de diapositiva"/>
+          <p:cNvSpPr>
+            <a:spLocks noGrp="1" noRot="1" noChangeAspect="1"/>
+          </p:cNvSpPr>
+          <p:nvPr>
+            <p:ph type="sldImg"/>
+          </p:nvPr>
+        </p:nvSpPr>
+        <p:spPr/>
+      </p:sp>
+      <p:sp>
+        <p:nvSpPr>
+          <p:cNvPr id="3" name="2 Marcador de notas"/>
+          <p:cNvSpPr>
+            <a:spLocks noGrp="1"/>
+          </p:cNvSpPr>
+          <p:nvPr>
+            <p:ph type="body" idx="1"/>
+          </p:nvPr>
+        </p:nvSpPr>
+        <p:spPr/>
+        <p:txBody>
+          <a:bodyPr/>
+          <a:lstStyle/>
+          <a:p>
+            <a:r>
+              <a:rPr lang="en-US" dirty="0" smtClean="0"/>
               <a:t>$timeout: </a:t>
             </a:r>
             <a:r>
@@ -18823,6 +18880,769 @@
 </p:notes>
 </file>
 
+<file path=ppt/notesSlides/notesSlide40.xml><?xml version="1.0" encoding="utf-8"?>
+<p:notes xmlns:a="http://schemas.openxmlformats.org/drawingml/2006/main" xmlns:r="http://schemas.openxmlformats.org/officeDocument/2006/relationships" xmlns:p="http://schemas.openxmlformats.org/presentationml/2006/main">
+  <p:cSld>
+    <p:spTree>
+      <p:nvGrpSpPr>
+        <p:cNvPr id="1" name=""/>
+        <p:cNvGrpSpPr/>
+        <p:nvPr/>
+      </p:nvGrpSpPr>
+      <p:grpSpPr>
+        <a:xfrm>
+          <a:off x="0" y="0"/>
+          <a:ext cx="0" cy="0"/>
+          <a:chOff x="0" y="0"/>
+          <a:chExt cx="0" cy="0"/>
+        </a:xfrm>
+      </p:grpSpPr>
+      <p:sp>
+        <p:nvSpPr>
+          <p:cNvPr id="2" name="1 Marcador de imagen de diapositiva"/>
+          <p:cNvSpPr>
+            <a:spLocks noGrp="1" noRot="1" noChangeAspect="1"/>
+          </p:cNvSpPr>
+          <p:nvPr>
+            <p:ph type="sldImg"/>
+          </p:nvPr>
+        </p:nvSpPr>
+        <p:spPr/>
+      </p:sp>
+      <p:sp>
+        <p:nvSpPr>
+          <p:cNvPr id="3" name="2 Marcador de notas"/>
+          <p:cNvSpPr>
+            <a:spLocks noGrp="1"/>
+          </p:cNvSpPr>
+          <p:nvPr>
+            <p:ph type="body" idx="1"/>
+          </p:nvPr>
+        </p:nvSpPr>
+        <p:spPr/>
+        <p:txBody>
+          <a:bodyPr/>
+          <a:lstStyle/>
+          <a:p>
+            <a:endParaRPr lang="en-US" dirty="0"/>
+          </a:p>
+        </p:txBody>
+      </p:sp>
+      <p:sp>
+        <p:nvSpPr>
+          <p:cNvPr id="4" name="3 Marcador de número de diapositiva"/>
+          <p:cNvSpPr>
+            <a:spLocks noGrp="1"/>
+          </p:cNvSpPr>
+          <p:nvPr>
+            <p:ph type="sldNum" sz="quarter" idx="10"/>
+          </p:nvPr>
+        </p:nvSpPr>
+        <p:spPr/>
+        <p:txBody>
+          <a:bodyPr/>
+          <a:lstStyle/>
+          <a:p>
+            <a:fld id="{212C6109-0EF7-4E6B-B279-6389DF78298C}" type="slidenum">
+              <a:rPr lang="en-US" smtClean="0"/>
+              <a:t>42</a:t>
+            </a:fld>
+            <a:endParaRPr lang="en-US"/>
+          </a:p>
+        </p:txBody>
+      </p:sp>
+    </p:spTree>
+    <p:extLst>
+      <p:ext uri="{BB962C8B-B14F-4D97-AF65-F5344CB8AC3E}">
+        <p14:creationId xmlns:p14="http://schemas.microsoft.com/office/powerpoint/2010/main" val="1101562653"/>
+      </p:ext>
+    </p:extLst>
+  </p:cSld>
+  <p:clrMapOvr>
+    <a:masterClrMapping/>
+  </p:clrMapOvr>
+</p:notes>
+</file>
+
+<file path=ppt/notesSlides/notesSlide41.xml><?xml version="1.0" encoding="utf-8"?>
+<p:notes xmlns:a="http://schemas.openxmlformats.org/drawingml/2006/main" xmlns:r="http://schemas.openxmlformats.org/officeDocument/2006/relationships" xmlns:p="http://schemas.openxmlformats.org/presentationml/2006/main">
+  <p:cSld>
+    <p:spTree>
+      <p:nvGrpSpPr>
+        <p:cNvPr id="1" name=""/>
+        <p:cNvGrpSpPr/>
+        <p:nvPr/>
+      </p:nvGrpSpPr>
+      <p:grpSpPr>
+        <a:xfrm>
+          <a:off x="0" y="0"/>
+          <a:ext cx="0" cy="0"/>
+          <a:chOff x="0" y="0"/>
+          <a:chExt cx="0" cy="0"/>
+        </a:xfrm>
+      </p:grpSpPr>
+      <p:sp>
+        <p:nvSpPr>
+          <p:cNvPr id="2" name="1 Marcador de imagen de diapositiva"/>
+          <p:cNvSpPr>
+            <a:spLocks noGrp="1" noRot="1" noChangeAspect="1"/>
+          </p:cNvSpPr>
+          <p:nvPr>
+            <p:ph type="sldImg"/>
+          </p:nvPr>
+        </p:nvSpPr>
+        <p:spPr/>
+      </p:sp>
+      <p:sp>
+        <p:nvSpPr>
+          <p:cNvPr id="3" name="2 Marcador de notas"/>
+          <p:cNvSpPr>
+            <a:spLocks noGrp="1"/>
+          </p:cNvSpPr>
+          <p:nvPr>
+            <p:ph type="body" idx="1"/>
+          </p:nvPr>
+        </p:nvSpPr>
+        <p:spPr/>
+        <p:txBody>
+          <a:bodyPr/>
+          <a:lstStyle/>
+          <a:p>
+            <a:r>
+              <a:rPr lang="en-US" dirty="0" smtClean="0"/>
+              <a:t>Unit test</a:t>
+            </a:r>
+          </a:p>
+          <a:p>
+            <a:endParaRPr lang="en-US" dirty="0" smtClean="0"/>
+          </a:p>
+          <a:p>
+            <a:r>
+              <a:rPr lang="en-US" dirty="0" smtClean="0"/>
+              <a:t>Unit testing is a software development process in which the smallest testable parts of an application, called units, are individually and independently scrutinized for proper operation. Unit testing is often automated but it can also be done manually. </a:t>
+            </a:r>
+          </a:p>
+          <a:p>
+            <a:endParaRPr lang="en-US" dirty="0" smtClean="0"/>
+          </a:p>
+          <a:p>
+            <a:pPr marL="0" marR="0" indent="0" algn="l" defTabSz="914400" rtl="0" eaLnBrk="1" fontAlgn="auto" latinLnBrk="0" hangingPunct="1">
+              <a:lnSpc>
+                <a:spcPct val="100000"/>
+              </a:lnSpc>
+              <a:spcBef>
+                <a:spcPts val="0"/>
+              </a:spcBef>
+              <a:spcAft>
+                <a:spcPts val="0"/>
+              </a:spcAft>
+              <a:buClrTx/>
+              <a:buSzTx/>
+              <a:buFontTx/>
+              <a:buNone/>
+              <a:tabLst/>
+              <a:defRPr/>
+            </a:pPr>
+            <a:r>
+              <a:rPr lang="en-US" dirty="0" smtClean="0"/>
+              <a:t>Why unit test?</a:t>
+            </a:r>
+          </a:p>
+          <a:p>
+            <a:r>
+              <a:rPr lang="en-US" dirty="0" smtClean="0"/>
+              <a:t>You</a:t>
+            </a:r>
+            <a:r>
+              <a:rPr lang="en-US" baseline="0" dirty="0" smtClean="0"/>
+              <a:t> usually test things a couple of times, so somebody, want to automate this process and do it by units. This means that you write code to test your code.</a:t>
+            </a:r>
+          </a:p>
+          <a:p>
+            <a:r>
+              <a:rPr lang="en-US" baseline="0" dirty="0" smtClean="0"/>
+              <a:t>The way to create a test to your code implies that you need certain knowledge on how the things works, and referring to Angular, how you invoke things, create controllers, how the time and data flows in your application, etc. </a:t>
+            </a:r>
+          </a:p>
+        </p:txBody>
+      </p:sp>
+      <p:sp>
+        <p:nvSpPr>
+          <p:cNvPr id="4" name="3 Marcador de número de diapositiva"/>
+          <p:cNvSpPr>
+            <a:spLocks noGrp="1"/>
+          </p:cNvSpPr>
+          <p:nvPr>
+            <p:ph type="sldNum" sz="quarter" idx="10"/>
+          </p:nvPr>
+        </p:nvSpPr>
+        <p:spPr/>
+        <p:txBody>
+          <a:bodyPr/>
+          <a:lstStyle/>
+          <a:p>
+            <a:fld id="{212C6109-0EF7-4E6B-B279-6389DF78298C}" type="slidenum">
+              <a:rPr lang="en-US" smtClean="0"/>
+              <a:t>43</a:t>
+            </a:fld>
+            <a:endParaRPr lang="en-US"/>
+          </a:p>
+        </p:txBody>
+      </p:sp>
+    </p:spTree>
+    <p:extLst>
+      <p:ext uri="{BB962C8B-B14F-4D97-AF65-F5344CB8AC3E}">
+        <p14:creationId xmlns:p14="http://schemas.microsoft.com/office/powerpoint/2010/main" val="2163992691"/>
+      </p:ext>
+    </p:extLst>
+  </p:cSld>
+  <p:clrMapOvr>
+    <a:masterClrMapping/>
+  </p:clrMapOvr>
+</p:notes>
+</file>
+
+<file path=ppt/notesSlides/notesSlide42.xml><?xml version="1.0" encoding="utf-8"?>
+<p:notes xmlns:a="http://schemas.openxmlformats.org/drawingml/2006/main" xmlns:r="http://schemas.openxmlformats.org/officeDocument/2006/relationships" xmlns:p="http://schemas.openxmlformats.org/presentationml/2006/main">
+  <p:cSld>
+    <p:spTree>
+      <p:nvGrpSpPr>
+        <p:cNvPr id="1" name=""/>
+        <p:cNvGrpSpPr/>
+        <p:nvPr/>
+      </p:nvGrpSpPr>
+      <p:grpSpPr>
+        <a:xfrm>
+          <a:off x="0" y="0"/>
+          <a:ext cx="0" cy="0"/>
+          <a:chOff x="0" y="0"/>
+          <a:chExt cx="0" cy="0"/>
+        </a:xfrm>
+      </p:grpSpPr>
+      <p:sp>
+        <p:nvSpPr>
+          <p:cNvPr id="2" name="1 Marcador de imagen de diapositiva"/>
+          <p:cNvSpPr>
+            <a:spLocks noGrp="1" noRot="1" noChangeAspect="1"/>
+          </p:cNvSpPr>
+          <p:nvPr>
+            <p:ph type="sldImg"/>
+          </p:nvPr>
+        </p:nvSpPr>
+        <p:spPr/>
+      </p:sp>
+      <p:sp>
+        <p:nvSpPr>
+          <p:cNvPr id="3" name="2 Marcador de notas"/>
+          <p:cNvSpPr>
+            <a:spLocks noGrp="1"/>
+          </p:cNvSpPr>
+          <p:nvPr>
+            <p:ph type="body" idx="1"/>
+          </p:nvPr>
+        </p:nvSpPr>
+        <p:spPr/>
+        <p:txBody>
+          <a:bodyPr/>
+          <a:lstStyle/>
+          <a:p>
+            <a:r>
+              <a:rPr lang="en-US" dirty="0" smtClean="0"/>
+              <a:t>Jasmine is a behavior-driven development framework for testing JavaScript code. It does not depend on any other JavaScript frameworks. It does not require a DOM. And it has a clean, obvious syntax so that you can easily write tests.</a:t>
+            </a:r>
+          </a:p>
+          <a:p>
+            <a:endParaRPr lang="en-US" dirty="0" smtClean="0"/>
+          </a:p>
+          <a:p>
+            <a:r>
+              <a:rPr lang="en-US" dirty="0" smtClean="0"/>
+              <a:t>http://jasmine.github.io/</a:t>
+            </a:r>
+            <a:endParaRPr lang="en-US" dirty="0"/>
+          </a:p>
+        </p:txBody>
+      </p:sp>
+      <p:sp>
+        <p:nvSpPr>
+          <p:cNvPr id="4" name="3 Marcador de número de diapositiva"/>
+          <p:cNvSpPr>
+            <a:spLocks noGrp="1"/>
+          </p:cNvSpPr>
+          <p:nvPr>
+            <p:ph type="sldNum" sz="quarter" idx="10"/>
+          </p:nvPr>
+        </p:nvSpPr>
+        <p:spPr/>
+        <p:txBody>
+          <a:bodyPr/>
+          <a:lstStyle/>
+          <a:p>
+            <a:fld id="{212C6109-0EF7-4E6B-B279-6389DF78298C}" type="slidenum">
+              <a:rPr lang="en-US" smtClean="0"/>
+              <a:t>44</a:t>
+            </a:fld>
+            <a:endParaRPr lang="en-US"/>
+          </a:p>
+        </p:txBody>
+      </p:sp>
+    </p:spTree>
+    <p:extLst>
+      <p:ext uri="{BB962C8B-B14F-4D97-AF65-F5344CB8AC3E}">
+        <p14:creationId xmlns:p14="http://schemas.microsoft.com/office/powerpoint/2010/main" val="2809148677"/>
+      </p:ext>
+    </p:extLst>
+  </p:cSld>
+  <p:clrMapOvr>
+    <a:masterClrMapping/>
+  </p:clrMapOvr>
+</p:notes>
+</file>
+
+<file path=ppt/notesSlides/notesSlide43.xml><?xml version="1.0" encoding="utf-8"?>
+<p:notes xmlns:a="http://schemas.openxmlformats.org/drawingml/2006/main" xmlns:r="http://schemas.openxmlformats.org/officeDocument/2006/relationships" xmlns:p="http://schemas.openxmlformats.org/presentationml/2006/main">
+  <p:cSld>
+    <p:spTree>
+      <p:nvGrpSpPr>
+        <p:cNvPr id="1" name=""/>
+        <p:cNvGrpSpPr/>
+        <p:nvPr/>
+      </p:nvGrpSpPr>
+      <p:grpSpPr>
+        <a:xfrm>
+          <a:off x="0" y="0"/>
+          <a:ext cx="0" cy="0"/>
+          <a:chOff x="0" y="0"/>
+          <a:chExt cx="0" cy="0"/>
+        </a:xfrm>
+      </p:grpSpPr>
+      <p:sp>
+        <p:nvSpPr>
+          <p:cNvPr id="2" name="1 Marcador de imagen de diapositiva"/>
+          <p:cNvSpPr>
+            <a:spLocks noGrp="1" noRot="1" noChangeAspect="1"/>
+          </p:cNvSpPr>
+          <p:nvPr>
+            <p:ph type="sldImg"/>
+          </p:nvPr>
+        </p:nvSpPr>
+        <p:spPr/>
+      </p:sp>
+      <p:sp>
+        <p:nvSpPr>
+          <p:cNvPr id="3" name="2 Marcador de notas"/>
+          <p:cNvSpPr>
+            <a:spLocks noGrp="1"/>
+          </p:cNvSpPr>
+          <p:nvPr>
+            <p:ph type="body" idx="1"/>
+          </p:nvPr>
+        </p:nvSpPr>
+        <p:spPr/>
+        <p:txBody>
+          <a:bodyPr/>
+          <a:lstStyle/>
+          <a:p>
+            <a:pPr marL="171450" indent="-171450">
+              <a:buFont typeface="Arial" panose="020B0604020202020204" pitchFamily="34" charset="0"/>
+              <a:buChar char="•"/>
+            </a:pPr>
+            <a:r>
+              <a:rPr lang="en-US" dirty="0" err="1" smtClean="0"/>
+              <a:t>toBe</a:t>
+            </a:r>
+            <a:r>
+              <a:rPr lang="en-US" dirty="0" smtClean="0"/>
+              <a:t>: to be the exact same</a:t>
+            </a:r>
+          </a:p>
+          <a:p>
+            <a:pPr marL="171450" indent="-171450">
+              <a:buFont typeface="Arial" panose="020B0604020202020204" pitchFamily="34" charset="0"/>
+              <a:buChar char="•"/>
+            </a:pPr>
+            <a:r>
+              <a:rPr lang="en-US" dirty="0" err="1" smtClean="0"/>
+              <a:t>toBeDefined</a:t>
+            </a:r>
+            <a:r>
+              <a:rPr lang="en-US" dirty="0" smtClean="0"/>
+              <a:t>: not</a:t>
+            </a:r>
+            <a:r>
+              <a:rPr lang="en-US" baseline="0" dirty="0" smtClean="0"/>
+              <a:t> send undefined as a </a:t>
+            </a:r>
+            <a:r>
+              <a:rPr lang="en-US" baseline="0" dirty="0" err="1" smtClean="0"/>
+              <a:t>typeof</a:t>
+            </a:r>
+            <a:endParaRPr lang="en-US" dirty="0" smtClean="0"/>
+          </a:p>
+          <a:p>
+            <a:pPr marL="171450" indent="-171450">
+              <a:buFont typeface="Arial" panose="020B0604020202020204" pitchFamily="34" charset="0"/>
+              <a:buChar char="•"/>
+            </a:pPr>
+            <a:r>
+              <a:rPr lang="en-US" dirty="0" err="1" smtClean="0"/>
+              <a:t>toHaveBeenCalled</a:t>
+            </a:r>
+            <a:r>
+              <a:rPr lang="en-US" dirty="0" smtClean="0"/>
+              <a:t>: this will use a spy to know if has</a:t>
+            </a:r>
+            <a:r>
+              <a:rPr lang="en-US" baseline="0" dirty="0" smtClean="0"/>
+              <a:t> been called.</a:t>
+            </a:r>
+            <a:endParaRPr lang="en-US" dirty="0" smtClean="0"/>
+          </a:p>
+          <a:p>
+            <a:pPr marL="171450" indent="-171450">
+              <a:buFont typeface="Arial" panose="020B0604020202020204" pitchFamily="34" charset="0"/>
+              <a:buChar char="•"/>
+            </a:pPr>
+            <a:r>
+              <a:rPr lang="en-US" dirty="0" err="1" smtClean="0"/>
+              <a:t>toHaveBeenCalledTimes</a:t>
+            </a:r>
+            <a:r>
+              <a:rPr lang="en-US" dirty="0" smtClean="0"/>
+              <a:t>: this count the number of times something</a:t>
+            </a:r>
+            <a:r>
+              <a:rPr lang="en-US" baseline="0" dirty="0" smtClean="0"/>
+              <a:t> has been called.</a:t>
+            </a:r>
+            <a:endParaRPr lang="en-US" dirty="0" smtClean="0"/>
+          </a:p>
+          <a:p>
+            <a:pPr marL="171450" indent="-171450">
+              <a:buFont typeface="Arial" panose="020B0604020202020204" pitchFamily="34" charset="0"/>
+              <a:buChar char="•"/>
+            </a:pPr>
+            <a:r>
+              <a:rPr lang="en-US" dirty="0" err="1" smtClean="0"/>
+              <a:t>toHaveBeenCalledWith</a:t>
+            </a:r>
+            <a:r>
+              <a:rPr lang="en-US" dirty="0" smtClean="0"/>
+              <a:t>: comate with what parameters has been called.</a:t>
+            </a:r>
+          </a:p>
+          <a:p>
+            <a:pPr marL="171450" indent="-171450">
+              <a:buFont typeface="Arial" panose="020B0604020202020204" pitchFamily="34" charset="0"/>
+              <a:buChar char="•"/>
+            </a:pPr>
+            <a:r>
+              <a:rPr lang="en-US" dirty="0" err="1" smtClean="0"/>
+              <a:t>toEqual</a:t>
+            </a:r>
+            <a:r>
+              <a:rPr lang="en-US" dirty="0" smtClean="0"/>
+              <a:t>: to be similar (used for comparing objects and arrays that may have the same values, but in different order)</a:t>
+            </a:r>
+          </a:p>
+          <a:p>
+            <a:pPr marL="171450" indent="-171450">
+              <a:buFont typeface="Arial" panose="020B0604020202020204" pitchFamily="34" charset="0"/>
+              <a:buChar char="•"/>
+            </a:pPr>
+            <a:r>
+              <a:rPr lang="en-US" dirty="0" err="1" smtClean="0"/>
+              <a:t>toThrowError</a:t>
+            </a:r>
+            <a:r>
+              <a:rPr lang="en-US" dirty="0" smtClean="0"/>
+              <a:t>:</a:t>
+            </a:r>
+            <a:r>
+              <a:rPr lang="en-US" baseline="0" dirty="0" smtClean="0"/>
+              <a:t> check if throws a JavaScript error (</a:t>
+            </a:r>
+            <a:r>
+              <a:rPr lang="en-US" baseline="0" dirty="0" err="1" smtClean="0"/>
+              <a:t>NaN</a:t>
+            </a:r>
+            <a:r>
+              <a:rPr lang="en-US" baseline="0" dirty="0" smtClean="0"/>
+              <a:t>, undefined, etc.)</a:t>
+            </a:r>
+            <a:endParaRPr lang="en-US" dirty="0" smtClean="0"/>
+          </a:p>
+        </p:txBody>
+      </p:sp>
+      <p:sp>
+        <p:nvSpPr>
+          <p:cNvPr id="4" name="3 Marcador de número de diapositiva"/>
+          <p:cNvSpPr>
+            <a:spLocks noGrp="1"/>
+          </p:cNvSpPr>
+          <p:nvPr>
+            <p:ph type="sldNum" sz="quarter" idx="10"/>
+          </p:nvPr>
+        </p:nvSpPr>
+        <p:spPr/>
+        <p:txBody>
+          <a:bodyPr/>
+          <a:lstStyle/>
+          <a:p>
+            <a:fld id="{212C6109-0EF7-4E6B-B279-6389DF78298C}" type="slidenum">
+              <a:rPr lang="en-US" smtClean="0"/>
+              <a:t>45</a:t>
+            </a:fld>
+            <a:endParaRPr lang="en-US"/>
+          </a:p>
+        </p:txBody>
+      </p:sp>
+    </p:spTree>
+    <p:extLst>
+      <p:ext uri="{BB962C8B-B14F-4D97-AF65-F5344CB8AC3E}">
+        <p14:creationId xmlns:p14="http://schemas.microsoft.com/office/powerpoint/2010/main" val="855718625"/>
+      </p:ext>
+    </p:extLst>
+  </p:cSld>
+  <p:clrMapOvr>
+    <a:masterClrMapping/>
+  </p:clrMapOvr>
+</p:notes>
+</file>
+
+<file path=ppt/notesSlides/notesSlide44.xml><?xml version="1.0" encoding="utf-8"?>
+<p:notes xmlns:a="http://schemas.openxmlformats.org/drawingml/2006/main" xmlns:r="http://schemas.openxmlformats.org/officeDocument/2006/relationships" xmlns:p="http://schemas.openxmlformats.org/presentationml/2006/main">
+  <p:cSld>
+    <p:spTree>
+      <p:nvGrpSpPr>
+        <p:cNvPr id="1" name=""/>
+        <p:cNvGrpSpPr/>
+        <p:nvPr/>
+      </p:nvGrpSpPr>
+      <p:grpSpPr>
+        <a:xfrm>
+          <a:off x="0" y="0"/>
+          <a:ext cx="0" cy="0"/>
+          <a:chOff x="0" y="0"/>
+          <a:chExt cx="0" cy="0"/>
+        </a:xfrm>
+      </p:grpSpPr>
+      <p:sp>
+        <p:nvSpPr>
+          <p:cNvPr id="2" name="1 Marcador de imagen de diapositiva"/>
+          <p:cNvSpPr>
+            <a:spLocks noGrp="1" noRot="1" noChangeAspect="1"/>
+          </p:cNvSpPr>
+          <p:nvPr>
+            <p:ph type="sldImg"/>
+          </p:nvPr>
+        </p:nvSpPr>
+        <p:spPr/>
+      </p:sp>
+      <p:sp>
+        <p:nvSpPr>
+          <p:cNvPr id="3" name="2 Marcador de notas"/>
+          <p:cNvSpPr>
+            <a:spLocks noGrp="1"/>
+          </p:cNvSpPr>
+          <p:nvPr>
+            <p:ph type="body" idx="1"/>
+          </p:nvPr>
+        </p:nvSpPr>
+        <p:spPr/>
+        <p:txBody>
+          <a:bodyPr/>
+          <a:lstStyle/>
+          <a:p>
+            <a:r>
+              <a:rPr lang="en-US" dirty="0" smtClean="0"/>
+              <a:t>For</a:t>
+            </a:r>
+            <a:r>
+              <a:rPr lang="en-US" baseline="0" dirty="0" smtClean="0"/>
+              <a:t> checking that a function is called, you can add a spy on it with </a:t>
+            </a:r>
+            <a:r>
+              <a:rPr lang="en-US" baseline="0" dirty="0" err="1" smtClean="0"/>
+              <a:t>spyOn</a:t>
+            </a:r>
+            <a:r>
+              <a:rPr lang="en-US" baseline="0" dirty="0" smtClean="0"/>
+              <a:t>, then configure to the following:</a:t>
+            </a:r>
+          </a:p>
+          <a:p>
+            <a:pPr marL="171450" lvl="0" indent="-171450">
+              <a:buFont typeface="Arial" panose="020B0604020202020204" pitchFamily="34" charset="0"/>
+              <a:buChar char="•"/>
+            </a:pPr>
+            <a:r>
+              <a:rPr lang="en-US" dirty="0" err="1" smtClean="0"/>
+              <a:t>and.callThrough</a:t>
+            </a:r>
+            <a:r>
+              <a:rPr lang="en-US" dirty="0" smtClean="0"/>
+              <a:t>: check that is</a:t>
+            </a:r>
+            <a:r>
+              <a:rPr lang="en-US" baseline="0" dirty="0" smtClean="0"/>
+              <a:t> called and let the function do what is supposed to do.</a:t>
+            </a:r>
+            <a:endParaRPr lang="en-US" dirty="0" smtClean="0"/>
+          </a:p>
+          <a:p>
+            <a:pPr marL="171450" lvl="0" indent="-171450">
+              <a:buFont typeface="Arial" panose="020B0604020202020204" pitchFamily="34" charset="0"/>
+              <a:buChar char="•"/>
+            </a:pPr>
+            <a:r>
+              <a:rPr lang="en-US" dirty="0" err="1" smtClean="0"/>
+              <a:t>and.returnValue</a:t>
+            </a:r>
+            <a:r>
+              <a:rPr lang="en-US" dirty="0" smtClean="0"/>
+              <a:t>: spy</a:t>
+            </a:r>
+            <a:r>
+              <a:rPr lang="en-US" baseline="0" dirty="0" smtClean="0"/>
+              <a:t> on it and always return a value.</a:t>
+            </a:r>
+            <a:endParaRPr lang="en-US" dirty="0" smtClean="0"/>
+          </a:p>
+          <a:p>
+            <a:pPr marL="171450" lvl="0" indent="-171450">
+              <a:buFont typeface="Arial" panose="020B0604020202020204" pitchFamily="34" charset="0"/>
+              <a:buChar char="•"/>
+            </a:pPr>
+            <a:r>
+              <a:rPr lang="en-US" dirty="0" err="1" smtClean="0"/>
+              <a:t>and.returnValues</a:t>
+            </a:r>
+            <a:r>
+              <a:rPr lang="en-US" dirty="0" smtClean="0"/>
+              <a:t>: return</a:t>
+            </a:r>
+            <a:r>
+              <a:rPr lang="en-US" baseline="0" dirty="0" smtClean="0"/>
+              <a:t> an array of values, depending on the number of the call the function is.</a:t>
+            </a:r>
+            <a:endParaRPr lang="en-US" dirty="0" smtClean="0"/>
+          </a:p>
+          <a:p>
+            <a:pPr marL="171450" lvl="0" indent="-171450">
+              <a:buFont typeface="Arial" panose="020B0604020202020204" pitchFamily="34" charset="0"/>
+              <a:buChar char="•"/>
+            </a:pPr>
+            <a:r>
+              <a:rPr lang="en-US" dirty="0" err="1" smtClean="0"/>
+              <a:t>and.callFake</a:t>
+            </a:r>
+            <a:r>
+              <a:rPr lang="en-US" dirty="0" smtClean="0"/>
+              <a:t>:</a:t>
+            </a:r>
+            <a:r>
+              <a:rPr lang="en-US" baseline="0" dirty="0" smtClean="0"/>
+              <a:t> completely change the function to what is inside.</a:t>
+            </a:r>
+            <a:endParaRPr lang="en-US" dirty="0" smtClean="0"/>
+          </a:p>
+          <a:p>
+            <a:pPr marL="171450" lvl="0" indent="-171450">
+              <a:buFont typeface="Arial" panose="020B0604020202020204" pitchFamily="34" charset="0"/>
+              <a:buChar char="•"/>
+            </a:pPr>
+            <a:r>
+              <a:rPr lang="en-US" dirty="0" err="1" smtClean="0"/>
+              <a:t>and.throwError</a:t>
+            </a:r>
+            <a:r>
+              <a:rPr lang="en-US" dirty="0" smtClean="0"/>
+              <a:t>: throw a specified error.</a:t>
+            </a:r>
+          </a:p>
+          <a:p>
+            <a:pPr marL="171450" lvl="0" indent="-171450">
+              <a:buFont typeface="Arial" panose="020B0604020202020204" pitchFamily="34" charset="0"/>
+              <a:buChar char="•"/>
+            </a:pPr>
+            <a:endParaRPr lang="en-US" dirty="0" smtClean="0"/>
+          </a:p>
+          <a:p>
+            <a:pPr marL="0" lvl="0" indent="0">
+              <a:buFont typeface="Arial" panose="020B0604020202020204" pitchFamily="34" charset="0"/>
+              <a:buNone/>
+            </a:pPr>
+            <a:r>
+              <a:rPr lang="en-US" dirty="0" smtClean="0"/>
+              <a:t>If</a:t>
+            </a:r>
+            <a:r>
+              <a:rPr lang="en-US" baseline="0" dirty="0" smtClean="0"/>
+              <a:t> you don't have a function to spy on, then you can create a spy on a </a:t>
+            </a:r>
+            <a:r>
+              <a:rPr lang="en-US" baseline="0" dirty="0" err="1" smtClean="0"/>
+              <a:t>varible</a:t>
+            </a:r>
+            <a:r>
+              <a:rPr lang="en-US" baseline="0" dirty="0" smtClean="0"/>
+              <a:t> with </a:t>
+            </a:r>
+            <a:r>
+              <a:rPr lang="en-US" baseline="0" dirty="0" err="1" smtClean="0"/>
+              <a:t>jasmine.createSpy</a:t>
+            </a:r>
+            <a:r>
+              <a:rPr lang="en-US" baseline="0" dirty="0" smtClean="0"/>
+              <a:t>().</a:t>
+            </a:r>
+            <a:endParaRPr lang="en-US" dirty="0" smtClean="0"/>
+          </a:p>
+          <a:p>
+            <a:endParaRPr lang="en-US" baseline="0" dirty="0" smtClean="0"/>
+          </a:p>
+          <a:p>
+            <a:endParaRPr lang="en-US" dirty="0"/>
+          </a:p>
+        </p:txBody>
+      </p:sp>
+      <p:sp>
+        <p:nvSpPr>
+          <p:cNvPr id="4" name="3 Marcador de número de diapositiva"/>
+          <p:cNvSpPr>
+            <a:spLocks noGrp="1"/>
+          </p:cNvSpPr>
+          <p:nvPr>
+            <p:ph type="sldNum" sz="quarter" idx="10"/>
+          </p:nvPr>
+        </p:nvSpPr>
+        <p:spPr/>
+        <p:txBody>
+          <a:bodyPr/>
+          <a:lstStyle/>
+          <a:p>
+            <a:fld id="{212C6109-0EF7-4E6B-B279-6389DF78298C}" type="slidenum">
+              <a:rPr lang="en-US" smtClean="0"/>
+              <a:t>46</a:t>
+            </a:fld>
+            <a:endParaRPr lang="en-US"/>
+          </a:p>
+        </p:txBody>
+      </p:sp>
+    </p:spTree>
+    <p:extLst>
+      <p:ext uri="{BB962C8B-B14F-4D97-AF65-F5344CB8AC3E}">
+        <p14:creationId xmlns:p14="http://schemas.microsoft.com/office/powerpoint/2010/main" val="2989888369"/>
+      </p:ext>
+    </p:extLst>
+  </p:cSld>
+  <p:clrMapOvr>
+    <a:masterClrMapping/>
+  </p:clrMapOvr>
+</p:notes>
+</file>
+
 <file path=ppt/notesSlides/notesSlide5.xml><?xml version="1.0" encoding="utf-8"?>
 <p:notes xmlns:a="http://schemas.openxmlformats.org/drawingml/2006/main" xmlns:r="http://schemas.openxmlformats.org/officeDocument/2006/relationships" xmlns:p="http://schemas.openxmlformats.org/presentationml/2006/main">
   <p:cSld>
@@ -19183,6 +20003,22 @@
             <a:endParaRPr lang="en-US" baseline="0" dirty="0" smtClean="0"/>
           </a:p>
           <a:p>
+            <a:r>
+              <a:rPr lang="en-US" dirty="0" smtClean="0"/>
+              <a:t>The $</a:t>
+            </a:r>
+            <a:r>
+              <a:rPr lang="en-US" dirty="0" err="1" smtClean="0"/>
+              <a:t>rootScope</a:t>
+            </a:r>
+            <a:r>
+              <a:rPr lang="en-US" dirty="0" smtClean="0"/>
+              <a:t>,</a:t>
+            </a:r>
+            <a:r>
+              <a:rPr lang="en-US" baseline="0" dirty="0" smtClean="0"/>
+              <a:t> as it name tells, is the main $scope that produces every others scope and inherit some of its functions.</a:t>
+            </a:r>
             <a:endParaRPr lang="en-US" dirty="0"/>
           </a:p>
         </p:txBody>
@@ -31021,19 +31857,7 @@
             </a:pPr>
             <a:r>
               <a:rPr lang="en-US" dirty="0" smtClean="0"/>
-              <a:t>Create a directives to teach the difference between scopes</a:t>
-            </a:r>
-            <a:r>
-              <a:rPr lang="en-US" dirty="0" smtClean="0"/>
-              <a:t>: </a:t>
-            </a:r>
-            <a:r>
-              <a:rPr lang="en-US" dirty="0" smtClean="0"/>
-              <a:t>without </a:t>
-            </a:r>
-            <a:r>
-              <a:rPr lang="en-US" dirty="0" smtClean="0"/>
-              <a:t>and with.</a:t>
+              <a:t>Create a directives to teach the difference between scopes: without and with.</a:t>
             </a:r>
           </a:p>
           <a:p>
@@ -31045,7 +31869,6 @@
               <a:rPr lang="en-US" dirty="0" smtClean="0"/>
               <a:t>Create an isolated directive with the three different types of binding.</a:t>
             </a:r>
-            <a:endParaRPr lang="en-US" dirty="0" smtClean="0"/>
           </a:p>
           <a:p>
             <a:pPr marL="514350" indent="-514350">
@@ -33549,6 +34372,13 @@
   <p:clrMapOvr>
     <a:masterClrMapping/>
   </p:clrMapOvr>
+  <p:timing>
+    <p:tnLst>
+      <p:par>
+        <p:cTn id="1" dur="indefinite" restart="never" nodeType="tmRoot"/>
+      </p:par>
+    </p:tnLst>
+  </p:timing>
 </p:sld>
 </file>
 
@@ -33850,6 +34680,47 @@
           <a:chExt cx="0" cy="0"/>
         </a:xfrm>
       </p:grpSpPr>
+      <p:pic>
+        <p:nvPicPr>
+          <p:cNvPr id="1026" name="Picture 2" descr="https://apothegms.files.wordpress.com/2013/01/color-crayons-he-did-it.jpg"/>
+          <p:cNvPicPr>
+            <a:picLocks noChangeAspect="1" noChangeArrowheads="1"/>
+          </p:cNvPicPr>
+          <p:nvPr/>
+        </p:nvPicPr>
+        <p:blipFill>
+          <a:blip r:embed="rId3" cstate="print">
+            <a:extLst>
+              <a:ext uri="{28A0092B-C50C-407E-A947-70E740481C1C}">
+                <a14:useLocalDpi xmlns:a14="http://schemas.microsoft.com/office/drawing/2010/main" val="0"/>
+              </a:ext>
+            </a:extLst>
+          </a:blip>
+          <a:srcRect/>
+          <a:stretch>
+            <a:fillRect/>
+          </a:stretch>
+        </p:blipFill>
+        <p:spPr bwMode="auto">
+          <a:xfrm>
+            <a:off x="6538103" y="1118615"/>
+            <a:ext cx="2537788" cy="2368076"/>
+          </a:xfrm>
+          <a:prstGeom prst="rect">
+            <a:avLst/>
+          </a:prstGeom>
+          <a:noFill/>
+          <a:extLst>
+            <a:ext uri="{909E8E84-426E-40DD-AFC4-6F175D3DCCD1}">
+              <a14:hiddenFill xmlns:a14="http://schemas.microsoft.com/office/drawing/2010/main">
+                <a:solidFill>
+                  <a:srgbClr val="FFFFFF"/>
+                </a:solidFill>
+              </a14:hiddenFill>
+            </a:ext>
+          </a:extLst>
+        </p:spPr>
+      </p:pic>
       <p:sp>
         <p:nvSpPr>
           <p:cNvPr id="2" name="1 Título"/>
@@ -33875,20 +34746,924 @@
       </p:sp>
       <p:sp>
         <p:nvSpPr>
-          <p:cNvPr id="3" name="2 Marcador de contenido"/>
-          <p:cNvSpPr>
-            <a:spLocks noGrp="1"/>
-          </p:cNvSpPr>
-          <p:nvPr>
-            <p:ph idx="1"/>
-          </p:nvPr>
+          <p:cNvPr id="5" name="4 Recortar rectángulo de esquina del mismo lado"/>
+          <p:cNvSpPr/>
+          <p:nvPr/>
         </p:nvSpPr>
-        <p:spPr/>
+        <p:spPr>
+          <a:xfrm>
+            <a:off x="3188498" y="1873780"/>
+            <a:ext cx="2088232" cy="684076"/>
+          </a:xfrm>
+          <a:prstGeom prst="snip2SameRect">
+            <a:avLst>
+              <a:gd name="adj1" fmla="val 50000"/>
+              <a:gd name="adj2" fmla="val 0"/>
+            </a:avLst>
+          </a:prstGeom>
+        </p:spPr>
+        <p:style>
+          <a:lnRef idx="1">
+            <a:schemeClr val="accent2"/>
+          </a:lnRef>
+          <a:fillRef idx="3">
+            <a:schemeClr val="accent2"/>
+          </a:fillRef>
+          <a:effectRef idx="2">
+            <a:schemeClr val="accent2"/>
+          </a:effectRef>
+          <a:fontRef idx="minor">
+            <a:schemeClr val="lt1"/>
+          </a:fontRef>
+        </p:style>
         <p:txBody>
-          <a:bodyPr/>
+          <a:bodyPr rtlCol="0" anchor="ctr"/>
           <a:lstStyle/>
           <a:p>
+            <a:pPr algn="ctr"/>
+            <a:r>
+              <a:rPr lang="en-US" dirty="0" smtClean="0"/>
+              <a:t>$</a:t>
+            </a:r>
+            <a:r>
+              <a:rPr lang="en-US" dirty="0" err="1" smtClean="0"/>
+              <a:t>rootScope</a:t>
+            </a:r>
             <a:endParaRPr lang="en-US" dirty="0"/>
+          </a:p>
+        </p:txBody>
+      </p:sp>
+      <p:sp>
+        <p:nvSpPr>
+          <p:cNvPr id="13" name="12 Flecha curvada hacia arriba"/>
+          <p:cNvSpPr/>
+          <p:nvPr/>
+        </p:nvSpPr>
+        <p:spPr>
+          <a:xfrm rot="16200000">
+            <a:off x="5448727" y="1986626"/>
+            <a:ext cx="648072" cy="489266"/>
+          </a:xfrm>
+          <a:prstGeom prst="curvedUpArrow">
+            <a:avLst/>
+          </a:prstGeom>
+        </p:spPr>
+        <p:style>
+          <a:lnRef idx="2">
+            <a:schemeClr val="accent3">
+              <a:shade val="50000"/>
+            </a:schemeClr>
+          </a:lnRef>
+          <a:fillRef idx="1">
+            <a:schemeClr val="accent3"/>
+          </a:fillRef>
+          <a:effectRef idx="0">
+            <a:schemeClr val="accent3"/>
+          </a:effectRef>
+          <a:fontRef idx="minor">
+            <a:schemeClr val="lt1"/>
+          </a:fontRef>
+        </p:style>
+        <p:txBody>
+          <a:bodyPr rtlCol="0" anchor="ctr"/>
+          <a:lstStyle/>
+          <a:p>
+            <a:pPr algn="ctr"/>
+            <a:endParaRPr lang="en-US">
+              <a:solidFill>
+                <a:schemeClr val="tx1"/>
+              </a:solidFill>
+            </a:endParaRPr>
+          </a:p>
+        </p:txBody>
+      </p:sp>
+      <p:sp>
+        <p:nvSpPr>
+          <p:cNvPr id="14" name="13 CuadroTexto"/>
+          <p:cNvSpPr txBox="1"/>
+          <p:nvPr/>
+        </p:nvSpPr>
+        <p:spPr>
+          <a:xfrm>
+            <a:off x="907994" y="1927823"/>
+            <a:ext cx="1224822" cy="923330"/>
+          </a:xfrm>
+          <a:prstGeom prst="rect">
+            <a:avLst/>
+          </a:prstGeom>
+          <a:noFill/>
+        </p:spPr>
+        <p:txBody>
+          <a:bodyPr wrap="none" rtlCol="0">
+            <a:spAutoFit/>
+          </a:bodyPr>
+          <a:lstStyle/>
+          <a:p>
+            <a:r>
+              <a:rPr lang="en-US" dirty="0" smtClean="0"/>
+              <a:t>$emit</a:t>
+            </a:r>
+          </a:p>
+          <a:p>
+            <a:endParaRPr lang="en-US" dirty="0" smtClean="0"/>
+          </a:p>
+          <a:p>
+            <a:r>
+              <a:rPr lang="en-US" dirty="0" smtClean="0"/>
+              <a:t>$broadcast</a:t>
+            </a:r>
+          </a:p>
+        </p:txBody>
+      </p:sp>
+      <p:sp>
+        <p:nvSpPr>
+          <p:cNvPr id="15" name="14 Recortar rectángulo de esquina diagonal"/>
+          <p:cNvSpPr/>
+          <p:nvPr/>
+        </p:nvSpPr>
+        <p:spPr>
+          <a:xfrm>
+            <a:off x="1784342" y="3488984"/>
+            <a:ext cx="1944216" cy="648072"/>
+          </a:xfrm>
+          <a:prstGeom prst="snip2DiagRect">
+            <a:avLst/>
+          </a:prstGeom>
+        </p:spPr>
+        <p:style>
+          <a:lnRef idx="1">
+            <a:schemeClr val="accent2"/>
+          </a:lnRef>
+          <a:fillRef idx="3">
+            <a:schemeClr val="accent2"/>
+          </a:fillRef>
+          <a:effectRef idx="2">
+            <a:schemeClr val="accent2"/>
+          </a:effectRef>
+          <a:fontRef idx="minor">
+            <a:schemeClr val="lt1"/>
+          </a:fontRef>
+        </p:style>
+        <p:txBody>
+          <a:bodyPr rtlCol="0" anchor="ctr"/>
+          <a:lstStyle/>
+          <a:p>
+            <a:pPr algn="ctr"/>
+            <a:r>
+              <a:rPr lang="en-US" dirty="0" smtClean="0"/>
+              <a:t>$scope 1</a:t>
+            </a:r>
+            <a:endParaRPr lang="en-US" dirty="0"/>
+          </a:p>
+        </p:txBody>
+      </p:sp>
+      <p:sp>
+        <p:nvSpPr>
+          <p:cNvPr id="16" name="15 Recortar rectángulo de esquina diagonal"/>
+          <p:cNvSpPr/>
+          <p:nvPr/>
+        </p:nvSpPr>
+        <p:spPr>
+          <a:xfrm>
+            <a:off x="4948935" y="3488984"/>
+            <a:ext cx="1944216" cy="648072"/>
+          </a:xfrm>
+          <a:prstGeom prst="snip2DiagRect">
+            <a:avLst/>
+          </a:prstGeom>
+        </p:spPr>
+        <p:style>
+          <a:lnRef idx="1">
+            <a:schemeClr val="accent2"/>
+          </a:lnRef>
+          <a:fillRef idx="3">
+            <a:schemeClr val="accent2"/>
+          </a:fillRef>
+          <a:effectRef idx="2">
+            <a:schemeClr val="accent2"/>
+          </a:effectRef>
+          <a:fontRef idx="minor">
+            <a:schemeClr val="lt1"/>
+          </a:fontRef>
+        </p:style>
+        <p:txBody>
+          <a:bodyPr rtlCol="0" anchor="ctr"/>
+          <a:lstStyle/>
+          <a:p>
+            <a:pPr algn="ctr"/>
+            <a:r>
+              <a:rPr lang="en-US" dirty="0" smtClean="0"/>
+              <a:t>$scope 2</a:t>
+            </a:r>
+          </a:p>
+        </p:txBody>
+      </p:sp>
+      <p:sp>
+        <p:nvSpPr>
+          <p:cNvPr id="17" name="16 Recortar rectángulo de esquina diagonal"/>
+          <p:cNvSpPr/>
+          <p:nvPr/>
+        </p:nvSpPr>
+        <p:spPr>
+          <a:xfrm>
+            <a:off x="596210" y="5297372"/>
+            <a:ext cx="1944216" cy="648072"/>
+          </a:xfrm>
+          <a:prstGeom prst="snip2DiagRect">
+            <a:avLst/>
+          </a:prstGeom>
+        </p:spPr>
+        <p:style>
+          <a:lnRef idx="1">
+            <a:schemeClr val="accent2"/>
+          </a:lnRef>
+          <a:fillRef idx="3">
+            <a:schemeClr val="accent2"/>
+          </a:fillRef>
+          <a:effectRef idx="2">
+            <a:schemeClr val="accent2"/>
+          </a:effectRef>
+          <a:fontRef idx="minor">
+            <a:schemeClr val="lt1"/>
+          </a:fontRef>
+        </p:style>
+        <p:txBody>
+          <a:bodyPr rtlCol="0" anchor="ctr"/>
+          <a:lstStyle/>
+          <a:p>
+            <a:pPr algn="ctr"/>
+            <a:r>
+              <a:rPr lang="en-US" dirty="0" smtClean="0"/>
+              <a:t>$scope 1.1</a:t>
+            </a:r>
+            <a:endParaRPr lang="en-US" dirty="0"/>
+          </a:p>
+        </p:txBody>
+      </p:sp>
+      <p:sp>
+        <p:nvSpPr>
+          <p:cNvPr id="18" name="17 Recortar rectángulo de esquina diagonal"/>
+          <p:cNvSpPr/>
+          <p:nvPr/>
+        </p:nvSpPr>
+        <p:spPr>
+          <a:xfrm>
+            <a:off x="3799108" y="5297372"/>
+            <a:ext cx="1944216" cy="648072"/>
+          </a:xfrm>
+          <a:prstGeom prst="snip2DiagRect">
+            <a:avLst/>
+          </a:prstGeom>
+        </p:spPr>
+        <p:style>
+          <a:lnRef idx="1">
+            <a:schemeClr val="accent2"/>
+          </a:lnRef>
+          <a:fillRef idx="3">
+            <a:schemeClr val="accent2"/>
+          </a:fillRef>
+          <a:effectRef idx="2">
+            <a:schemeClr val="accent2"/>
+          </a:effectRef>
+          <a:fontRef idx="minor">
+            <a:schemeClr val="lt1"/>
+          </a:fontRef>
+        </p:style>
+        <p:txBody>
+          <a:bodyPr rtlCol="0" anchor="ctr"/>
+          <a:lstStyle/>
+          <a:p>
+            <a:pPr algn="ctr"/>
+            <a:r>
+              <a:rPr lang="en-US" dirty="0" smtClean="0"/>
+              <a:t>$scope 2.1</a:t>
+            </a:r>
+          </a:p>
+        </p:txBody>
+      </p:sp>
+      <p:sp>
+        <p:nvSpPr>
+          <p:cNvPr id="19" name="18 Recortar rectángulo de esquina diagonal"/>
+          <p:cNvSpPr/>
+          <p:nvPr/>
+        </p:nvSpPr>
+        <p:spPr>
+          <a:xfrm>
+            <a:off x="6284842" y="5297372"/>
+            <a:ext cx="1944216" cy="648072"/>
+          </a:xfrm>
+          <a:prstGeom prst="snip2DiagRect">
+            <a:avLst/>
+          </a:prstGeom>
+        </p:spPr>
+        <p:style>
+          <a:lnRef idx="1">
+            <a:schemeClr val="accent2"/>
+          </a:lnRef>
+          <a:fillRef idx="3">
+            <a:schemeClr val="accent2"/>
+          </a:fillRef>
+          <a:effectRef idx="2">
+            <a:schemeClr val="accent2"/>
+          </a:effectRef>
+          <a:fontRef idx="minor">
+            <a:schemeClr val="lt1"/>
+          </a:fontRef>
+        </p:style>
+        <p:txBody>
+          <a:bodyPr rtlCol="0" anchor="ctr"/>
+          <a:lstStyle/>
+          <a:p>
+            <a:pPr algn="ctr"/>
+            <a:r>
+              <a:rPr lang="en-US" dirty="0" smtClean="0"/>
+              <a:t>$scope 2.2</a:t>
+            </a:r>
+          </a:p>
+        </p:txBody>
+      </p:sp>
+      <p:cxnSp>
+        <p:nvCxnSpPr>
+          <p:cNvPr id="27" name="26 Conector recto"/>
+          <p:cNvCxnSpPr>
+            <a:stCxn id="5" idx="1"/>
+            <a:endCxn id="16" idx="3"/>
+          </p:cNvCxnSpPr>
+          <p:nvPr/>
+        </p:nvCxnSpPr>
+        <p:spPr>
+          <a:xfrm>
+            <a:off x="4232614" y="2557856"/>
+            <a:ext cx="1688429" cy="931128"/>
+          </a:xfrm>
+          <a:prstGeom prst="line">
+            <a:avLst/>
+          </a:prstGeom>
+          <a:ln w="63500">
+            <a:headEnd type="oval"/>
+            <a:tailEnd type="oval"/>
+          </a:ln>
+        </p:spPr>
+        <p:style>
+          <a:lnRef idx="1">
+            <a:schemeClr val="accent1"/>
+          </a:lnRef>
+          <a:fillRef idx="0">
+            <a:schemeClr val="accent1"/>
+          </a:fillRef>
+          <a:effectRef idx="0">
+            <a:schemeClr val="accent1"/>
+          </a:effectRef>
+          <a:fontRef idx="minor">
+            <a:schemeClr val="tx1"/>
+          </a:fontRef>
+        </p:style>
+      </p:cxnSp>
+      <p:cxnSp>
+        <p:nvCxnSpPr>
+          <p:cNvPr id="28" name="27 Conector recto"/>
+          <p:cNvCxnSpPr>
+            <a:stCxn id="15" idx="3"/>
+            <a:endCxn id="5" idx="1"/>
+          </p:cNvCxnSpPr>
+          <p:nvPr/>
+        </p:nvCxnSpPr>
+        <p:spPr>
+          <a:xfrm flipV="1">
+            <a:off x="2756450" y="2557856"/>
+            <a:ext cx="1476164" cy="931128"/>
+          </a:xfrm>
+          <a:prstGeom prst="line">
+            <a:avLst/>
+          </a:prstGeom>
+          <a:ln w="63500">
+            <a:headEnd type="oval"/>
+            <a:tailEnd type="oval"/>
+          </a:ln>
+        </p:spPr>
+        <p:style>
+          <a:lnRef idx="1">
+            <a:schemeClr val="accent1"/>
+          </a:lnRef>
+          <a:fillRef idx="0">
+            <a:schemeClr val="accent1"/>
+          </a:fillRef>
+          <a:effectRef idx="0">
+            <a:schemeClr val="accent1"/>
+          </a:effectRef>
+          <a:fontRef idx="minor">
+            <a:schemeClr val="tx1"/>
+          </a:fontRef>
+        </p:style>
+      </p:cxnSp>
+      <p:cxnSp>
+        <p:nvCxnSpPr>
+          <p:cNvPr id="31" name="30 Conector recto"/>
+          <p:cNvCxnSpPr>
+            <a:stCxn id="15" idx="1"/>
+            <a:endCxn id="17" idx="3"/>
+          </p:cNvCxnSpPr>
+          <p:nvPr/>
+        </p:nvCxnSpPr>
+        <p:spPr>
+          <a:xfrm flipH="1">
+            <a:off x="1568318" y="4137056"/>
+            <a:ext cx="1188132" cy="1160316"/>
+          </a:xfrm>
+          <a:prstGeom prst="line">
+            <a:avLst/>
+          </a:prstGeom>
+          <a:ln w="63500">
+            <a:headEnd type="oval"/>
+            <a:tailEnd type="oval"/>
+          </a:ln>
+        </p:spPr>
+        <p:style>
+          <a:lnRef idx="1">
+            <a:schemeClr val="accent1"/>
+          </a:lnRef>
+          <a:fillRef idx="0">
+            <a:schemeClr val="accent1"/>
+          </a:fillRef>
+          <a:effectRef idx="0">
+            <a:schemeClr val="accent1"/>
+          </a:effectRef>
+          <a:fontRef idx="minor">
+            <a:schemeClr val="tx1"/>
+          </a:fontRef>
+        </p:style>
+      </p:cxnSp>
+      <p:cxnSp>
+        <p:nvCxnSpPr>
+          <p:cNvPr id="34" name="33 Conector recto"/>
+          <p:cNvCxnSpPr>
+            <a:stCxn id="16" idx="1"/>
+            <a:endCxn id="18" idx="3"/>
+          </p:cNvCxnSpPr>
+          <p:nvPr/>
+        </p:nvCxnSpPr>
+        <p:spPr>
+          <a:xfrm flipH="1">
+            <a:off x="4771216" y="4137056"/>
+            <a:ext cx="1149827" cy="1160316"/>
+          </a:xfrm>
+          <a:prstGeom prst="line">
+            <a:avLst/>
+          </a:prstGeom>
+          <a:ln w="63500">
+            <a:headEnd type="oval"/>
+            <a:tailEnd type="oval"/>
+          </a:ln>
+        </p:spPr>
+        <p:style>
+          <a:lnRef idx="1">
+            <a:schemeClr val="accent1"/>
+          </a:lnRef>
+          <a:fillRef idx="0">
+            <a:schemeClr val="accent1"/>
+          </a:fillRef>
+          <a:effectRef idx="0">
+            <a:schemeClr val="accent1"/>
+          </a:effectRef>
+          <a:fontRef idx="minor">
+            <a:schemeClr val="tx1"/>
+          </a:fontRef>
+        </p:style>
+      </p:cxnSp>
+      <p:cxnSp>
+        <p:nvCxnSpPr>
+          <p:cNvPr id="37" name="36 Conector recto"/>
+          <p:cNvCxnSpPr>
+            <a:stCxn id="16" idx="1"/>
+            <a:endCxn id="19" idx="3"/>
+          </p:cNvCxnSpPr>
+          <p:nvPr/>
+        </p:nvCxnSpPr>
+        <p:spPr>
+          <a:xfrm>
+            <a:off x="5921043" y="4137056"/>
+            <a:ext cx="1335907" cy="1160316"/>
+          </a:xfrm>
+          <a:prstGeom prst="line">
+            <a:avLst/>
+          </a:prstGeom>
+          <a:ln w="63500">
+            <a:headEnd type="oval"/>
+            <a:tailEnd type="oval"/>
+          </a:ln>
+        </p:spPr>
+        <p:style>
+          <a:lnRef idx="1">
+            <a:schemeClr val="accent1"/>
+          </a:lnRef>
+          <a:fillRef idx="0">
+            <a:schemeClr val="accent1"/>
+          </a:fillRef>
+          <a:effectRef idx="0">
+            <a:schemeClr val="accent1"/>
+          </a:effectRef>
+          <a:fontRef idx="minor">
+            <a:schemeClr val="tx1"/>
+          </a:fontRef>
+        </p:style>
+      </p:cxnSp>
+      <p:sp>
+        <p:nvSpPr>
+          <p:cNvPr id="48" name="47 Flecha derecha"/>
+          <p:cNvSpPr/>
+          <p:nvPr/>
+        </p:nvSpPr>
+        <p:spPr>
+          <a:xfrm rot="1665455">
+            <a:off x="5052958" y="2936261"/>
+            <a:ext cx="1120388" cy="174320"/>
+          </a:xfrm>
+          <a:prstGeom prst="rightArrow">
+            <a:avLst/>
+          </a:prstGeom>
+        </p:spPr>
+        <p:style>
+          <a:lnRef idx="2">
+            <a:schemeClr val="accent1">
+              <a:shade val="50000"/>
+            </a:schemeClr>
+          </a:lnRef>
+          <a:fillRef idx="1">
+            <a:schemeClr val="accent1"/>
+          </a:fillRef>
+          <a:effectRef idx="0">
+            <a:schemeClr val="accent1"/>
+          </a:effectRef>
+          <a:fontRef idx="minor">
+            <a:schemeClr val="lt1"/>
+          </a:fontRef>
+        </p:style>
+        <p:txBody>
+          <a:bodyPr rtlCol="0" anchor="ctr"/>
+          <a:lstStyle/>
+          <a:p>
+            <a:pPr algn="ctr"/>
+            <a:endParaRPr lang="en-US"/>
+          </a:p>
+        </p:txBody>
+      </p:sp>
+      <p:sp>
+        <p:nvSpPr>
+          <p:cNvPr id="49" name="48 Flecha derecha"/>
+          <p:cNvSpPr/>
+          <p:nvPr/>
+        </p:nvSpPr>
+        <p:spPr>
+          <a:xfrm rot="2229753">
+            <a:off x="6476994" y="4630055"/>
+            <a:ext cx="1120388" cy="174320"/>
+          </a:xfrm>
+          <a:prstGeom prst="rightArrow">
+            <a:avLst/>
+          </a:prstGeom>
+        </p:spPr>
+        <p:style>
+          <a:lnRef idx="2">
+            <a:schemeClr val="accent1">
+              <a:shade val="50000"/>
+            </a:schemeClr>
+          </a:lnRef>
+          <a:fillRef idx="1">
+            <a:schemeClr val="accent1"/>
+          </a:fillRef>
+          <a:effectRef idx="0">
+            <a:schemeClr val="accent1"/>
+          </a:effectRef>
+          <a:fontRef idx="minor">
+            <a:schemeClr val="lt1"/>
+          </a:fontRef>
+        </p:style>
+        <p:txBody>
+          <a:bodyPr rtlCol="0" anchor="ctr"/>
+          <a:lstStyle/>
+          <a:p>
+            <a:pPr algn="ctr"/>
+            <a:endParaRPr lang="en-US"/>
+          </a:p>
+        </p:txBody>
+      </p:sp>
+      <p:sp>
+        <p:nvSpPr>
+          <p:cNvPr id="50" name="49 Flecha derecha"/>
+          <p:cNvSpPr/>
+          <p:nvPr/>
+        </p:nvSpPr>
+        <p:spPr>
+          <a:xfrm rot="8312628">
+            <a:off x="4331860" y="4658391"/>
+            <a:ext cx="1120388" cy="174320"/>
+          </a:xfrm>
+          <a:prstGeom prst="rightArrow">
+            <a:avLst/>
+          </a:prstGeom>
+        </p:spPr>
+        <p:style>
+          <a:lnRef idx="2">
+            <a:schemeClr val="accent1">
+              <a:shade val="50000"/>
+            </a:schemeClr>
+          </a:lnRef>
+          <a:fillRef idx="1">
+            <a:schemeClr val="accent1"/>
+          </a:fillRef>
+          <a:effectRef idx="0">
+            <a:schemeClr val="accent1"/>
+          </a:effectRef>
+          <a:fontRef idx="minor">
+            <a:schemeClr val="lt1"/>
+          </a:fontRef>
+        </p:style>
+        <p:txBody>
+          <a:bodyPr rtlCol="0" anchor="ctr"/>
+          <a:lstStyle/>
+          <a:p>
+            <a:pPr algn="ctr"/>
+            <a:endParaRPr lang="en-US"/>
+          </a:p>
+        </p:txBody>
+      </p:sp>
+      <p:sp>
+        <p:nvSpPr>
+          <p:cNvPr id="51" name="50 Flecha derecha"/>
+          <p:cNvSpPr/>
+          <p:nvPr/>
+        </p:nvSpPr>
+        <p:spPr>
+          <a:xfrm rot="8795905">
+            <a:off x="3268353" y="3020671"/>
+            <a:ext cx="1120388" cy="174320"/>
+          </a:xfrm>
+          <a:prstGeom prst="rightArrow">
+            <a:avLst/>
+          </a:prstGeom>
+        </p:spPr>
+        <p:style>
+          <a:lnRef idx="2">
+            <a:schemeClr val="accent1">
+              <a:shade val="50000"/>
+            </a:schemeClr>
+          </a:lnRef>
+          <a:fillRef idx="1">
+            <a:schemeClr val="accent1"/>
+          </a:fillRef>
+          <a:effectRef idx="0">
+            <a:schemeClr val="accent1"/>
+          </a:effectRef>
+          <a:fontRef idx="minor">
+            <a:schemeClr val="lt1"/>
+          </a:fontRef>
+        </p:style>
+        <p:txBody>
+          <a:bodyPr rtlCol="0" anchor="ctr"/>
+          <a:lstStyle/>
+          <a:p>
+            <a:pPr algn="ctr"/>
+            <a:endParaRPr lang="en-US"/>
+          </a:p>
+        </p:txBody>
+      </p:sp>
+      <p:sp>
+        <p:nvSpPr>
+          <p:cNvPr id="54" name="53 Flecha derecha"/>
+          <p:cNvSpPr/>
+          <p:nvPr/>
+        </p:nvSpPr>
+        <p:spPr>
+          <a:xfrm rot="8257568">
+            <a:off x="1980231" y="4668022"/>
+            <a:ext cx="1120388" cy="174320"/>
+          </a:xfrm>
+          <a:prstGeom prst="rightArrow">
+            <a:avLst/>
+          </a:prstGeom>
+        </p:spPr>
+        <p:style>
+          <a:lnRef idx="2">
+            <a:schemeClr val="accent1">
+              <a:shade val="50000"/>
+            </a:schemeClr>
+          </a:lnRef>
+          <a:fillRef idx="1">
+            <a:schemeClr val="accent1"/>
+          </a:fillRef>
+          <a:effectRef idx="0">
+            <a:schemeClr val="accent1"/>
+          </a:effectRef>
+          <a:fontRef idx="minor">
+            <a:schemeClr val="lt1"/>
+          </a:fontRef>
+        </p:style>
+        <p:txBody>
+          <a:bodyPr rtlCol="0" anchor="ctr"/>
+          <a:lstStyle/>
+          <a:p>
+            <a:pPr algn="ctr"/>
+            <a:endParaRPr lang="en-US"/>
+          </a:p>
+        </p:txBody>
+      </p:sp>
+      <p:sp>
+        <p:nvSpPr>
+          <p:cNvPr id="57" name="56 Flecha derecha"/>
+          <p:cNvSpPr/>
+          <p:nvPr/>
+        </p:nvSpPr>
+        <p:spPr>
+          <a:xfrm rot="19017866">
+            <a:off x="1136790" y="4668021"/>
+            <a:ext cx="1120388" cy="174320"/>
+          </a:xfrm>
+          <a:prstGeom prst="rightArrow">
+            <a:avLst/>
+          </a:prstGeom>
+        </p:spPr>
+        <p:style>
+          <a:lnRef idx="2">
+            <a:schemeClr val="accent3">
+              <a:shade val="50000"/>
+            </a:schemeClr>
+          </a:lnRef>
+          <a:fillRef idx="1">
+            <a:schemeClr val="accent3"/>
+          </a:fillRef>
+          <a:effectRef idx="0">
+            <a:schemeClr val="accent3"/>
+          </a:effectRef>
+          <a:fontRef idx="minor">
+            <a:schemeClr val="lt1"/>
+          </a:fontRef>
+        </p:style>
+        <p:txBody>
+          <a:bodyPr rtlCol="0" anchor="ctr"/>
+          <a:lstStyle/>
+          <a:p>
+            <a:pPr algn="ctr"/>
+            <a:endParaRPr lang="en-US"/>
+          </a:p>
+        </p:txBody>
+      </p:sp>
+      <p:sp>
+        <p:nvSpPr>
+          <p:cNvPr id="58" name="57 Flecha derecha"/>
+          <p:cNvSpPr/>
+          <p:nvPr/>
+        </p:nvSpPr>
+        <p:spPr>
+          <a:xfrm rot="19496232">
+            <a:off x="2323699" y="2966565"/>
+            <a:ext cx="1120388" cy="174320"/>
+          </a:xfrm>
+          <a:prstGeom prst="rightArrow">
+            <a:avLst/>
+          </a:prstGeom>
+        </p:spPr>
+        <p:style>
+          <a:lnRef idx="2">
+            <a:schemeClr val="accent3">
+              <a:shade val="50000"/>
+            </a:schemeClr>
+          </a:lnRef>
+          <a:fillRef idx="1">
+            <a:schemeClr val="accent3"/>
+          </a:fillRef>
+          <a:effectRef idx="0">
+            <a:schemeClr val="accent3"/>
+          </a:effectRef>
+          <a:fontRef idx="minor">
+            <a:schemeClr val="lt1"/>
+          </a:fontRef>
+        </p:style>
+        <p:txBody>
+          <a:bodyPr rtlCol="0" anchor="ctr"/>
+          <a:lstStyle/>
+          <a:p>
+            <a:pPr algn="ctr"/>
+            <a:endParaRPr lang="en-US"/>
+          </a:p>
+        </p:txBody>
+      </p:sp>
+      <p:sp>
+        <p:nvSpPr>
+          <p:cNvPr id="60" name="59 Rectángulo"/>
+          <p:cNvSpPr/>
+          <p:nvPr/>
+        </p:nvSpPr>
+        <p:spPr>
+          <a:xfrm>
+            <a:off x="562520" y="1960615"/>
+            <a:ext cx="304154" cy="342038"/>
+          </a:xfrm>
+          <a:prstGeom prst="rect">
+            <a:avLst/>
+          </a:prstGeom>
+        </p:spPr>
+        <p:style>
+          <a:lnRef idx="2">
+            <a:schemeClr val="accent3">
+              <a:shade val="50000"/>
+            </a:schemeClr>
+          </a:lnRef>
+          <a:fillRef idx="1">
+            <a:schemeClr val="accent3"/>
+          </a:fillRef>
+          <a:effectRef idx="0">
+            <a:schemeClr val="accent3"/>
+          </a:effectRef>
+          <a:fontRef idx="minor">
+            <a:schemeClr val="lt1"/>
+          </a:fontRef>
+        </p:style>
+        <p:txBody>
+          <a:bodyPr rtlCol="0" anchor="ctr"/>
+          <a:lstStyle/>
+          <a:p>
+            <a:pPr algn="ctr"/>
+            <a:endParaRPr lang="en-US"/>
+          </a:p>
+        </p:txBody>
+      </p:sp>
+      <p:sp>
+        <p:nvSpPr>
+          <p:cNvPr id="61" name="60 Rectángulo"/>
+          <p:cNvSpPr/>
+          <p:nvPr/>
+        </p:nvSpPr>
+        <p:spPr>
+          <a:xfrm>
+            <a:off x="564077" y="2473672"/>
+            <a:ext cx="304154" cy="342038"/>
+          </a:xfrm>
+          <a:prstGeom prst="rect">
+            <a:avLst/>
+          </a:prstGeom>
+        </p:spPr>
+        <p:style>
+          <a:lnRef idx="2">
+            <a:schemeClr val="accent1">
+              <a:shade val="50000"/>
+            </a:schemeClr>
+          </a:lnRef>
+          <a:fillRef idx="1">
+            <a:schemeClr val="accent1"/>
+          </a:fillRef>
+          <a:effectRef idx="0">
+            <a:schemeClr val="accent1"/>
+          </a:effectRef>
+          <a:fontRef idx="minor">
+            <a:schemeClr val="lt1"/>
+          </a:fontRef>
+        </p:style>
+        <p:txBody>
+          <a:bodyPr rtlCol="0" anchor="ctr"/>
+          <a:lstStyle/>
+          <a:p>
+            <a:pPr algn="ctr"/>
+            <a:endParaRPr lang="en-US"/>
+          </a:p>
+        </p:txBody>
+      </p:sp>
+      <p:sp>
+        <p:nvSpPr>
+          <p:cNvPr id="62" name="61 Flecha izquierda y arriba"/>
+          <p:cNvSpPr/>
+          <p:nvPr/>
+        </p:nvSpPr>
+        <p:spPr>
+          <a:xfrm rot="12869857">
+            <a:off x="5702413" y="4844927"/>
+            <a:ext cx="629966" cy="576441"/>
+          </a:xfrm>
+          <a:prstGeom prst="leftUpArrow">
+            <a:avLst/>
+          </a:prstGeom>
+        </p:spPr>
+        <p:style>
+          <a:lnRef idx="2">
+            <a:schemeClr val="accent6">
+              <a:shade val="50000"/>
+            </a:schemeClr>
+          </a:lnRef>
+          <a:fillRef idx="1">
+            <a:schemeClr val="accent6"/>
+          </a:fillRef>
+          <a:effectRef idx="0">
+            <a:schemeClr val="accent6"/>
+          </a:effectRef>
+          <a:fontRef idx="minor">
+            <a:schemeClr val="lt1"/>
+          </a:fontRef>
+        </p:style>
+        <p:txBody>
+          <a:bodyPr rtlCol="0" anchor="ctr"/>
+          <a:lstStyle/>
+          <a:p>
+            <a:pPr algn="ctr"/>
+            <a:endParaRPr lang="en-US"/>
           </a:p>
         </p:txBody>
       </p:sp>
@@ -33902,6 +35677,13 @@
   <p:clrMapOvr>
     <a:masterClrMapping/>
   </p:clrMapOvr>
+  <p:timing>
+    <p:tnLst>
+      <p:par>
+        <p:cTn id="1" dur="indefinite" restart="never" nodeType="tmRoot"/>
+      </p:par>
+    </p:tnLst>
+  </p:timing>
 </p:sld>
 </file>
 
@@ -34116,7 +35898,6 @@
               <a:rPr lang="es-ES" sz="2800" dirty="0" smtClean="0"/>
               <a:t>);</a:t>
             </a:r>
-            <a:endParaRPr lang="es-ES" sz="2800" dirty="0" smtClean="0"/>
           </a:p>
           <a:p>
             <a:pPr marL="0" indent="0">
@@ -34484,7 +36265,41 @@
           <a:bodyPr/>
           <a:lstStyle/>
           <a:p>
-            <a:endParaRPr lang="en-US"/>
+            <a:pPr marL="514350" indent="-514350">
+              <a:buFont typeface="+mj-lt"/>
+              <a:buAutoNum type="alphaLcParenR"/>
+            </a:pPr>
+            <a:r>
+              <a:rPr lang="en-US" dirty="0" smtClean="0"/>
+              <a:t>Create a Factory.</a:t>
+            </a:r>
+          </a:p>
+          <a:p>
+            <a:pPr marL="514350" indent="-514350">
+              <a:buFont typeface="+mj-lt"/>
+              <a:buAutoNum type="alphaLcParenR"/>
+            </a:pPr>
+            <a:r>
+              <a:rPr lang="en-US" dirty="0" smtClean="0"/>
+              <a:t>Create a Service that uses a promise.</a:t>
+            </a:r>
+          </a:p>
+          <a:p>
+            <a:pPr marL="514350" indent="-514350">
+              <a:buFont typeface="+mj-lt"/>
+              <a:buAutoNum type="alphaLcParenR"/>
+            </a:pPr>
+            <a:r>
+              <a:rPr lang="en-US" dirty="0" smtClean="0"/>
+              <a:t>Creates an event catcher triggered by $broadcast and $emit</a:t>
+            </a:r>
+          </a:p>
+          <a:p>
+            <a:pPr marL="514350" indent="-514350">
+              <a:buFont typeface="+mj-lt"/>
+              <a:buAutoNum type="alphaLcParenR"/>
+            </a:pPr>
+            <a:endParaRPr lang="en-US" dirty="0"/>
           </a:p>
         </p:txBody>
       </p:sp>
@@ -34498,6 +36313,13 @@
   <p:clrMapOvr>
     <a:masterClrMapping/>
   </p:clrMapOvr>
+  <p:timing>
+    <p:tnLst>
+      <p:par>
+        <p:cTn id="1" dur="indefinite" restart="never" nodeType="tmRoot"/>
+      </p:par>
+    </p:tnLst>
+  </p:timing>
 </p:sld>
 </file>
 
@@ -34556,20 +36378,242 @@
           <a:bodyPr/>
           <a:lstStyle/>
           <a:p>
-            <a:r>
-              <a:rPr lang="en-US" dirty="0" smtClean="0"/>
-              <a:t>Jasmine</a:t>
-            </a:r>
-          </a:p>
-          <a:p>
-            <a:r>
-              <a:rPr lang="en-US" dirty="0" smtClean="0"/>
-              <a:t>How to test</a:t>
-            </a:r>
+            <a:pPr marL="0" indent="0">
+              <a:buNone/>
+            </a:pPr>
+            <a:r>
+              <a:rPr lang="en-US" dirty="0"/>
+              <a:t>Why test</a:t>
+            </a:r>
+            <a:r>
+              <a:rPr lang="en-US" dirty="0" smtClean="0"/>
+              <a:t>?</a:t>
+            </a:r>
+          </a:p>
+          <a:p>
+            <a:pPr marL="0" indent="0">
+              <a:buNone/>
+            </a:pPr>
             <a:endParaRPr lang="en-US" dirty="0"/>
+          </a:p>
+          <a:p>
+            <a:pPr marL="0" indent="0">
+              <a:buNone/>
+            </a:pPr>
+            <a:endParaRPr lang="en-US" dirty="0" smtClean="0"/>
           </a:p>
         </p:txBody>
       </p:sp>
+      <p:graphicFrame>
+        <p:nvGraphicFramePr>
+          <p:cNvPr id="4" name="3 Tabla"/>
+          <p:cNvGraphicFramePr>
+            <a:graphicFrameLocks noGrp="1"/>
+          </p:cNvGraphicFramePr>
+          <p:nvPr>
+            <p:extLst>
+              <p:ext uri="{D42A27DB-BD31-4B8C-83A1-F6EECF244321}">
+                <p14:modId xmlns:p14="http://schemas.microsoft.com/office/powerpoint/2010/main" val="3853760457"/>
+              </p:ext>
+            </p:extLst>
+          </p:nvPr>
+        </p:nvGraphicFramePr>
+        <p:xfrm>
+          <a:off x="611560" y="2276874"/>
+          <a:ext cx="8136904" cy="3821448"/>
+        </p:xfrm>
+        <a:graphic>
+          <a:graphicData uri="http://schemas.openxmlformats.org/drawingml/2006/table">
+            <a:tbl>
+              <a:tblPr firstRow="1" bandRow="1">
+                <a:tableStyleId>{21E4AEA4-8DFA-4A89-87EB-49C32662AFE0}</a:tableStyleId>
+              </a:tblPr>
+              <a:tblGrid>
+                <a:gridCol w="4068452"/>
+                <a:gridCol w="4068452"/>
+              </a:tblGrid>
+              <a:tr h="569061">
+                <a:tc>
+                  <a:txBody>
+                    <a:bodyPr/>
+                    <a:lstStyle/>
+                    <a:p>
+                      <a:r>
+                        <a:rPr lang="en-US" dirty="0" smtClean="0"/>
+                        <a:t>Pros</a:t>
+                      </a:r>
+                      <a:endParaRPr lang="en-US" dirty="0"/>
+                    </a:p>
+                  </a:txBody>
+                  <a:tcPr/>
+                </a:tc>
+                <a:tc>
+                  <a:txBody>
+                    <a:bodyPr/>
+                    <a:lstStyle/>
+                    <a:p>
+                      <a:r>
+                        <a:rPr lang="en-US" dirty="0" smtClean="0"/>
+                        <a:t>Cons</a:t>
+                      </a:r>
+                      <a:endParaRPr lang="en-US" dirty="0"/>
+                    </a:p>
+                  </a:txBody>
+                  <a:tcPr/>
+                </a:tc>
+              </a:tr>
+              <a:tr h="1403166">
+                <a:tc>
+                  <a:txBody>
+                    <a:bodyPr/>
+                    <a:lstStyle/>
+                    <a:p>
+                      <a:r>
+                        <a:rPr lang="en-US" dirty="0" smtClean="0"/>
+                        <a:t>Give you a better knowledge on how your application works.</a:t>
+                      </a:r>
+                      <a:endParaRPr lang="en-US" dirty="0"/>
+                    </a:p>
+                  </a:txBody>
+                  <a:tcPr/>
+                </a:tc>
+                <a:tc>
+                  <a:txBody>
+                    <a:bodyPr/>
+                    <a:lstStyle/>
+                    <a:p>
+                      <a:r>
+                        <a:rPr lang="en-US" dirty="0" smtClean="0"/>
+                        <a:t>Takes </a:t>
+                      </a:r>
+                      <a:r>
+                        <a:rPr lang="en-US" baseline="0" dirty="0" smtClean="0"/>
+                        <a:t> a lot of time learning it.</a:t>
+                      </a:r>
+                      <a:endParaRPr lang="en-US" dirty="0"/>
+                    </a:p>
+                  </a:txBody>
+                  <a:tcPr/>
+                </a:tc>
+              </a:tr>
+              <a:tr h="569061">
+                <a:tc>
+                  <a:txBody>
+                    <a:bodyPr/>
+                    <a:lstStyle/>
+                    <a:p>
+                      <a:r>
+                        <a:rPr lang="en-US" dirty="0" smtClean="0"/>
+                        <a:t>It gives you </a:t>
+                      </a:r>
+                      <a:r>
+                        <a:rPr lang="en-US" baseline="0" dirty="0" smtClean="0"/>
+                        <a:t>a quality on your code.</a:t>
+                      </a:r>
+                      <a:endParaRPr lang="en-US" dirty="0"/>
+                    </a:p>
+                  </a:txBody>
+                  <a:tcPr/>
+                </a:tc>
+                <a:tc>
+                  <a:txBody>
+                    <a:bodyPr/>
+                    <a:lstStyle/>
+                    <a:p>
+                      <a:r>
+                        <a:rPr lang="en-US" dirty="0" smtClean="0"/>
+                        <a:t>Not friendly with quick</a:t>
+                      </a:r>
+                      <a:r>
+                        <a:rPr lang="en-US" baseline="0" dirty="0" smtClean="0"/>
+                        <a:t> changes.</a:t>
+                      </a:r>
+                      <a:endParaRPr lang="en-US" dirty="0"/>
+                    </a:p>
+                  </a:txBody>
+                  <a:tcPr/>
+                </a:tc>
+              </a:tr>
+              <a:tr h="569061">
+                <a:tc>
+                  <a:txBody>
+                    <a:bodyPr/>
+                    <a:lstStyle/>
+                    <a:p>
+                      <a:r>
+                        <a:rPr lang="en-US" dirty="0" smtClean="0"/>
+                        <a:t>Is a </a:t>
+                      </a:r>
+                      <a:r>
+                        <a:rPr lang="en-US" baseline="0" dirty="0" smtClean="0"/>
+                        <a:t>great way in large projects to makes sure that your code wont affect others</a:t>
+                      </a:r>
+                      <a:endParaRPr lang="en-US" dirty="0"/>
+                    </a:p>
+                  </a:txBody>
+                  <a:tcPr/>
+                </a:tc>
+                <a:tc>
+                  <a:txBody>
+                    <a:bodyPr/>
+                    <a:lstStyle/>
+                    <a:p>
+                      <a:r>
+                        <a:rPr lang="en-US" dirty="0" smtClean="0"/>
+                        <a:t>It gets tricky</a:t>
+                      </a:r>
+                      <a:r>
+                        <a:rPr lang="en-US" baseline="0" dirty="0" smtClean="0"/>
+                        <a:t> and give you false positives. (Is still programmed by a human)</a:t>
+                      </a:r>
+                      <a:endParaRPr lang="en-US" dirty="0"/>
+                    </a:p>
+                  </a:txBody>
+                  <a:tcPr/>
+                </a:tc>
+              </a:tr>
+              <a:tr h="569061">
+                <a:tc>
+                  <a:txBody>
+                    <a:bodyPr/>
+                    <a:lstStyle/>
+                    <a:p>
+                      <a:r>
+                        <a:rPr lang="en-US" dirty="0" smtClean="0"/>
+                        <a:t>Auto-document</a:t>
+                      </a:r>
+                      <a:r>
+                        <a:rPr lang="en-US" baseline="0" dirty="0" smtClean="0"/>
+                        <a:t> your code on what does</a:t>
+                      </a:r>
+                      <a:endParaRPr lang="en-US" dirty="0"/>
+                    </a:p>
+                  </a:txBody>
+                  <a:tcPr/>
+                </a:tc>
+                <a:tc>
+                  <a:txBody>
+                    <a:bodyPr/>
+                    <a:lstStyle/>
+                    <a:p>
+                      <a:r>
+                        <a:rPr lang="en-US" dirty="0" smtClean="0"/>
+                        <a:t>Takes a lot of time checking all the possibilities</a:t>
+                      </a:r>
+                      <a:r>
+                        <a:rPr lang="en-US" baseline="0" dirty="0" smtClean="0"/>
+                        <a:t>.</a:t>
+                      </a:r>
+                      <a:endParaRPr lang="en-US" dirty="0"/>
+                    </a:p>
+                  </a:txBody>
+                  <a:tcPr/>
+                </a:tc>
+              </a:tr>
+            </a:tbl>
+          </a:graphicData>
+        </a:graphic>
+      </p:graphicFrame>
     </p:spTree>
     <p:extLst>
       <p:ext uri="{BB962C8B-B14F-4D97-AF65-F5344CB8AC3E}">
@@ -34584,6 +36628,908 @@
 </file>
 
 <file path=ppt/slides/slide44.xml><?xml version="1.0" encoding="utf-8"?>
+<p:sld xmlns:a="http://schemas.openxmlformats.org/drawingml/2006/main" xmlns:r="http://schemas.openxmlformats.org/officeDocument/2006/relationships" xmlns:p="http://schemas.openxmlformats.org/presentationml/2006/main">
+  <p:cSld>
+    <p:spTree>
+      <p:nvGrpSpPr>
+        <p:cNvPr id="1" name=""/>
+        <p:cNvGrpSpPr/>
+        <p:nvPr/>
+      </p:nvGrpSpPr>
+      <p:grpSpPr>
+        <a:xfrm>
+          <a:off x="0" y="0"/>
+          <a:ext cx="0" cy="0"/>
+          <a:chOff x="0" y="0"/>
+          <a:chExt cx="0" cy="0"/>
+        </a:xfrm>
+      </p:grpSpPr>
+      <p:sp>
+        <p:nvSpPr>
+          <p:cNvPr id="5" name="4 Rectángulo"/>
+          <p:cNvSpPr/>
+          <p:nvPr/>
+        </p:nvSpPr>
+        <p:spPr>
+          <a:xfrm>
+            <a:off x="323528" y="1412776"/>
+            <a:ext cx="8496944" cy="4536504"/>
+          </a:xfrm>
+          <a:prstGeom prst="rect">
+            <a:avLst/>
+          </a:prstGeom>
+        </p:spPr>
+        <p:style>
+          <a:lnRef idx="2">
+            <a:schemeClr val="accent2"/>
+          </a:lnRef>
+          <a:fillRef idx="1">
+            <a:schemeClr val="lt1"/>
+          </a:fillRef>
+          <a:effectRef idx="0">
+            <a:schemeClr val="accent2"/>
+          </a:effectRef>
+          <a:fontRef idx="minor">
+            <a:schemeClr val="dk1"/>
+          </a:fontRef>
+        </p:style>
+        <p:txBody>
+          <a:bodyPr rtlCol="0" anchor="ctr"/>
+          <a:lstStyle/>
+          <a:p>
+            <a:pPr algn="ctr"/>
+            <a:endParaRPr lang="en-US"/>
+          </a:p>
+        </p:txBody>
+      </p:sp>
+      <p:sp>
+        <p:nvSpPr>
+          <p:cNvPr id="2" name="1 Título"/>
+          <p:cNvSpPr>
+            <a:spLocks noGrp="1"/>
+          </p:cNvSpPr>
+          <p:nvPr>
+            <p:ph type="title"/>
+          </p:nvPr>
+        </p:nvSpPr>
+        <p:spPr/>
+        <p:txBody>
+          <a:bodyPr/>
+          <a:lstStyle/>
+          <a:p>
+            <a:r>
+              <a:rPr lang="en-US" dirty="0" smtClean="0"/>
+              <a:t>Jasmine</a:t>
+            </a:r>
+            <a:endParaRPr lang="en-US" dirty="0"/>
+          </a:p>
+        </p:txBody>
+      </p:sp>
+      <p:sp>
+        <p:nvSpPr>
+          <p:cNvPr id="3" name="2 Marcador de contenido"/>
+          <p:cNvSpPr>
+            <a:spLocks noGrp="1"/>
+          </p:cNvSpPr>
+          <p:nvPr>
+            <p:ph idx="1"/>
+          </p:nvPr>
+        </p:nvSpPr>
+        <p:spPr/>
+        <p:txBody>
+          <a:bodyPr>
+            <a:normAutofit/>
+          </a:bodyPr>
+          <a:lstStyle/>
+          <a:p>
+            <a:pPr marL="0" indent="0">
+              <a:buNone/>
+            </a:pPr>
+            <a:r>
+              <a:rPr lang="en-US" dirty="0" smtClean="0"/>
+              <a:t>describe</a:t>
+            </a:r>
+            <a:r>
+              <a:rPr lang="en-US" dirty="0"/>
+              <a:t>(</a:t>
+            </a:r>
+            <a:r>
+              <a:rPr lang="en-US" dirty="0">
+                <a:solidFill>
+                  <a:srgbClr val="FF0000"/>
+                </a:solidFill>
+              </a:rPr>
+              <a:t>"A suite is just a function"</a:t>
+            </a:r>
+            <a:r>
+              <a:rPr lang="en-US" dirty="0"/>
+              <a:t>, function() {</a:t>
+            </a:r>
+          </a:p>
+          <a:p>
+            <a:pPr marL="0" indent="0">
+              <a:buNone/>
+            </a:pPr>
+            <a:r>
+              <a:rPr lang="en-US" dirty="0"/>
+              <a:t>  </a:t>
+            </a:r>
+            <a:r>
+              <a:rPr lang="en-US" dirty="0" err="1"/>
+              <a:t>var</a:t>
+            </a:r>
+            <a:r>
+              <a:rPr lang="en-US" dirty="0"/>
+              <a:t> a</a:t>
+            </a:r>
+            <a:r>
+              <a:rPr lang="en-US" dirty="0" smtClean="0"/>
+              <a:t>;</a:t>
+            </a:r>
+            <a:endParaRPr lang="en-US" dirty="0"/>
+          </a:p>
+          <a:p>
+            <a:pPr marL="0" indent="0">
+              <a:buNone/>
+            </a:pPr>
+            <a:r>
+              <a:rPr lang="en-US" dirty="0"/>
+              <a:t>  it(</a:t>
+            </a:r>
+            <a:r>
+              <a:rPr lang="en-US" dirty="0">
+                <a:solidFill>
+                  <a:srgbClr val="FF0000"/>
+                </a:solidFill>
+              </a:rPr>
+              <a:t>"and so is a spec"</a:t>
+            </a:r>
+            <a:r>
+              <a:rPr lang="en-US" dirty="0"/>
+              <a:t>, function() {</a:t>
+            </a:r>
+          </a:p>
+          <a:p>
+            <a:pPr marL="0" indent="0">
+              <a:buNone/>
+            </a:pPr>
+            <a:r>
+              <a:rPr lang="en-US" dirty="0"/>
+              <a:t>    a = true</a:t>
+            </a:r>
+            <a:r>
+              <a:rPr lang="en-US" dirty="0" smtClean="0"/>
+              <a:t>;</a:t>
+            </a:r>
+            <a:endParaRPr lang="en-US" dirty="0"/>
+          </a:p>
+          <a:p>
+            <a:pPr marL="0" indent="0">
+              <a:buNone/>
+            </a:pPr>
+            <a:r>
+              <a:rPr lang="en-US" dirty="0"/>
+              <a:t>    </a:t>
+            </a:r>
+            <a:r>
+              <a:rPr lang="en-US" dirty="0">
+                <a:solidFill>
+                  <a:srgbClr val="FF0000"/>
+                </a:solidFill>
+              </a:rPr>
+              <a:t>expect</a:t>
+            </a:r>
+            <a:r>
+              <a:rPr lang="en-US" dirty="0"/>
+              <a:t>(a).</a:t>
+            </a:r>
+            <a:r>
+              <a:rPr lang="en-US" dirty="0" err="1">
+                <a:solidFill>
+                  <a:srgbClr val="FF0000"/>
+                </a:solidFill>
+              </a:rPr>
+              <a:t>toBe</a:t>
+            </a:r>
+            <a:r>
+              <a:rPr lang="en-US" dirty="0"/>
+              <a:t>(true);</a:t>
+            </a:r>
+          </a:p>
+          <a:p>
+            <a:pPr marL="0" indent="0">
+              <a:buNone/>
+            </a:pPr>
+            <a:r>
+              <a:rPr lang="en-US" dirty="0"/>
+              <a:t>  });</a:t>
+            </a:r>
+          </a:p>
+          <a:p>
+            <a:pPr marL="0" indent="0">
+              <a:buNone/>
+            </a:pPr>
+            <a:r>
+              <a:rPr lang="en-US" dirty="0" smtClean="0"/>
+              <a:t>});</a:t>
+            </a:r>
+            <a:endParaRPr lang="en-US" dirty="0"/>
+          </a:p>
+        </p:txBody>
+      </p:sp>
+      <p:pic>
+        <p:nvPicPr>
+          <p:cNvPr id="4" name="Picture 2" descr="https://pbs.twimg.com/media/B-iWUjeIgAAiXn7.png"/>
+          <p:cNvPicPr>
+            <a:picLocks noChangeAspect="1" noChangeArrowheads="1"/>
+          </p:cNvPicPr>
+          <p:nvPr/>
+        </p:nvPicPr>
+        <p:blipFill>
+          <a:blip r:embed="rId3" cstate="print">
+            <a:extLst>
+              <a:ext uri="{28A0092B-C50C-407E-A947-70E740481C1C}">
+                <a14:useLocalDpi xmlns:a14="http://schemas.microsoft.com/office/drawing/2010/main" val="0"/>
+              </a:ext>
+            </a:extLst>
+          </a:blip>
+          <a:srcRect/>
+          <a:stretch>
+            <a:fillRect/>
+          </a:stretch>
+        </p:blipFill>
+        <p:spPr bwMode="auto">
+          <a:xfrm>
+            <a:off x="6660232" y="4077072"/>
+            <a:ext cx="1872208" cy="1550812"/>
+          </a:xfrm>
+          <a:prstGeom prst="rect">
+            <a:avLst/>
+          </a:prstGeom>
+          <a:noFill/>
+          <a:extLst>
+            <a:ext uri="{909E8E84-426E-40DD-AFC4-6F175D3DCCD1}">
+              <a14:hiddenFill xmlns:a14="http://schemas.microsoft.com/office/drawing/2010/main">
+                <a:solidFill>
+                  <a:srgbClr val="FFFFFF"/>
+                </a:solidFill>
+              </a14:hiddenFill>
+            </a:ext>
+          </a:extLst>
+        </p:spPr>
+      </p:pic>
+    </p:spTree>
+    <p:extLst>
+      <p:ext uri="{BB962C8B-B14F-4D97-AF65-F5344CB8AC3E}">
+        <p14:creationId xmlns:p14="http://schemas.microsoft.com/office/powerpoint/2010/main" val="1541020190"/>
+      </p:ext>
+    </p:extLst>
+  </p:cSld>
+  <p:clrMapOvr>
+    <a:masterClrMapping/>
+  </p:clrMapOvr>
+</p:sld>
+</file>
+
+<file path=ppt/slides/slide45.xml><?xml version="1.0" encoding="utf-8"?>
+<p:sld xmlns:a="http://schemas.openxmlformats.org/drawingml/2006/main" xmlns:r="http://schemas.openxmlformats.org/officeDocument/2006/relationships" xmlns:p="http://schemas.openxmlformats.org/presentationml/2006/main">
+  <p:cSld>
+    <p:spTree>
+      <p:nvGrpSpPr>
+        <p:cNvPr id="1" name=""/>
+        <p:cNvGrpSpPr/>
+        <p:nvPr/>
+      </p:nvGrpSpPr>
+      <p:grpSpPr>
+        <a:xfrm>
+          <a:off x="0" y="0"/>
+          <a:ext cx="0" cy="0"/>
+          <a:chOff x="0" y="0"/>
+          <a:chExt cx="0" cy="0"/>
+        </a:xfrm>
+      </p:grpSpPr>
+      <p:pic>
+        <p:nvPicPr>
+          <p:cNvPr id="5122" name="Picture 2" descr="https://s-media-cache-ak0.pinimg.com/564x/70/be/05/70be0532ba8bce9e88d14a0f1ec9b465.jpg"/>
+          <p:cNvPicPr>
+            <a:picLocks noChangeAspect="1" noChangeArrowheads="1"/>
+          </p:cNvPicPr>
+          <p:nvPr/>
+        </p:nvPicPr>
+        <p:blipFill rotWithShape="1">
+          <a:blip r:embed="rId3">
+            <a:extLst>
+              <a:ext uri="{28A0092B-C50C-407E-A947-70E740481C1C}">
+                <a14:useLocalDpi xmlns:a14="http://schemas.microsoft.com/office/drawing/2010/main" val="0"/>
+              </a:ext>
+            </a:extLst>
+          </a:blip>
+          <a:srcRect l="14399" r="13921"/>
+          <a:stretch/>
+        </p:blipFill>
+        <p:spPr bwMode="auto">
+          <a:xfrm>
+            <a:off x="5406712" y="2157938"/>
+            <a:ext cx="3413760" cy="3790950"/>
+          </a:xfrm>
+          <a:prstGeom prst="rect">
+            <a:avLst/>
+          </a:prstGeom>
+          <a:noFill/>
+          <a:extLst>
+            <a:ext uri="{909E8E84-426E-40DD-AFC4-6F175D3DCCD1}">
+              <a14:hiddenFill xmlns:a14="http://schemas.microsoft.com/office/drawing/2010/main">
+                <a:solidFill>
+                  <a:srgbClr val="FFFFFF"/>
+                </a:solidFill>
+              </a14:hiddenFill>
+            </a:ext>
+          </a:extLst>
+        </p:spPr>
+      </p:pic>
+      <p:sp>
+        <p:nvSpPr>
+          <p:cNvPr id="5" name="4 Rectángulo"/>
+          <p:cNvSpPr/>
+          <p:nvPr/>
+        </p:nvSpPr>
+        <p:spPr>
+          <a:xfrm>
+            <a:off x="323528" y="1412776"/>
+            <a:ext cx="8496944" cy="4536504"/>
+          </a:xfrm>
+          <a:prstGeom prst="rect">
+            <a:avLst/>
+          </a:prstGeom>
+          <a:noFill/>
+        </p:spPr>
+        <p:style>
+          <a:lnRef idx="2">
+            <a:schemeClr val="accent2"/>
+          </a:lnRef>
+          <a:fillRef idx="1">
+            <a:schemeClr val="lt1"/>
+          </a:fillRef>
+          <a:effectRef idx="0">
+            <a:schemeClr val="accent2"/>
+          </a:effectRef>
+          <a:fontRef idx="minor">
+            <a:schemeClr val="dk1"/>
+          </a:fontRef>
+        </p:style>
+        <p:txBody>
+          <a:bodyPr rtlCol="0" anchor="ctr"/>
+          <a:lstStyle/>
+          <a:p>
+            <a:pPr algn="ctr"/>
+            <a:endParaRPr lang="en-US"/>
+          </a:p>
+        </p:txBody>
+      </p:sp>
+      <p:sp>
+        <p:nvSpPr>
+          <p:cNvPr id="2" name="1 Título"/>
+          <p:cNvSpPr>
+            <a:spLocks noGrp="1"/>
+          </p:cNvSpPr>
+          <p:nvPr>
+            <p:ph type="title"/>
+          </p:nvPr>
+        </p:nvSpPr>
+        <p:spPr/>
+        <p:txBody>
+          <a:bodyPr/>
+          <a:lstStyle/>
+          <a:p>
+            <a:endParaRPr lang="en-US"/>
+          </a:p>
+        </p:txBody>
+      </p:sp>
+      <p:sp>
+        <p:nvSpPr>
+          <p:cNvPr id="3" name="2 Marcador de contenido"/>
+          <p:cNvSpPr>
+            <a:spLocks noGrp="1"/>
+          </p:cNvSpPr>
+          <p:nvPr>
+            <p:ph idx="1"/>
+          </p:nvPr>
+        </p:nvSpPr>
+        <p:spPr/>
+        <p:txBody>
+          <a:bodyPr>
+            <a:normAutofit lnSpcReduction="10000"/>
+          </a:bodyPr>
+          <a:lstStyle/>
+          <a:p>
+            <a:endParaRPr lang="en-US" dirty="0"/>
+          </a:p>
+          <a:p>
+            <a:r>
+              <a:rPr lang="en-US" dirty="0" err="1" smtClean="0"/>
+              <a:t>toBe</a:t>
+            </a:r>
+            <a:endParaRPr lang="en-US" dirty="0" smtClean="0"/>
+          </a:p>
+          <a:p>
+            <a:r>
+              <a:rPr lang="en-US" dirty="0" err="1" smtClean="0"/>
+              <a:t>toBeDefined</a:t>
+            </a:r>
+            <a:endParaRPr lang="en-US" dirty="0" smtClean="0"/>
+          </a:p>
+          <a:p>
+            <a:r>
+              <a:rPr lang="en-US" dirty="0" err="1" smtClean="0"/>
+              <a:t>toHaveBeenCalled</a:t>
+            </a:r>
+            <a:endParaRPr lang="en-US" dirty="0" smtClean="0"/>
+          </a:p>
+          <a:p>
+            <a:r>
+              <a:rPr lang="en-US" dirty="0" err="1"/>
+              <a:t>toHaveBeenCalledTimes</a:t>
+            </a:r>
+            <a:endParaRPr lang="en-US" dirty="0" smtClean="0"/>
+          </a:p>
+          <a:p>
+            <a:r>
+              <a:rPr lang="en-US" dirty="0" err="1" smtClean="0"/>
+              <a:t>toHaveBeenCalledWith</a:t>
+            </a:r>
+            <a:endParaRPr lang="en-US" dirty="0" smtClean="0"/>
+          </a:p>
+          <a:p>
+            <a:r>
+              <a:rPr lang="en-US" dirty="0" err="1" smtClean="0"/>
+              <a:t>toEqual</a:t>
+            </a:r>
+            <a:endParaRPr lang="en-US" dirty="0" smtClean="0"/>
+          </a:p>
+          <a:p>
+            <a:r>
+              <a:rPr lang="en-US" dirty="0" err="1"/>
+              <a:t>toThrowError</a:t>
+            </a:r>
+            <a:endParaRPr lang="en-US" dirty="0"/>
+          </a:p>
+        </p:txBody>
+      </p:sp>
+    </p:spTree>
+    <p:extLst>
+      <p:ext uri="{BB962C8B-B14F-4D97-AF65-F5344CB8AC3E}">
+        <p14:creationId xmlns:p14="http://schemas.microsoft.com/office/powerpoint/2010/main" val="646225339"/>
+      </p:ext>
+    </p:extLst>
+  </p:cSld>
+  <p:clrMapOvr>
+    <a:masterClrMapping/>
+  </p:clrMapOvr>
+</p:sld>
+</file>
+
+<file path=ppt/slides/slide46.xml><?xml version="1.0" encoding="utf-8"?>
+<p:sld xmlns:a="http://schemas.openxmlformats.org/drawingml/2006/main" xmlns:r="http://schemas.openxmlformats.org/officeDocument/2006/relationships" xmlns:p="http://schemas.openxmlformats.org/presentationml/2006/main">
+  <p:cSld>
+    <p:spTree>
+      <p:nvGrpSpPr>
+        <p:cNvPr id="1" name=""/>
+        <p:cNvGrpSpPr/>
+        <p:nvPr/>
+      </p:nvGrpSpPr>
+      <p:grpSpPr>
+        <a:xfrm>
+          <a:off x="0" y="0"/>
+          <a:ext cx="0" cy="0"/>
+          <a:chOff x="0" y="0"/>
+          <a:chExt cx="0" cy="0"/>
+        </a:xfrm>
+      </p:grpSpPr>
+      <p:pic>
+        <p:nvPicPr>
+          <p:cNvPr id="3074" name="Picture 2" descr="http://vignette1.wikia.nocookie.net/johnnyenglish/images/3/31/Johnny_english_bild_1.jpg/revision/latest?cb=20111021193413"/>
+          <p:cNvPicPr>
+            <a:picLocks noChangeAspect="1" noChangeArrowheads="1"/>
+          </p:cNvPicPr>
+          <p:nvPr/>
+        </p:nvPicPr>
+        <p:blipFill rotWithShape="1">
+          <a:blip r:embed="rId3">
+            <a:extLst>
+              <a:ext uri="{28A0092B-C50C-407E-A947-70E740481C1C}">
+                <a14:useLocalDpi xmlns:a14="http://schemas.microsoft.com/office/drawing/2010/main" val="0"/>
+              </a:ext>
+            </a:extLst>
+          </a:blip>
+          <a:srcRect r="3994" b="3208"/>
+          <a:stretch/>
+        </p:blipFill>
+        <p:spPr bwMode="auto">
+          <a:xfrm>
+            <a:off x="4464402" y="1557536"/>
+            <a:ext cx="4356070" cy="4391744"/>
+          </a:xfrm>
+          <a:prstGeom prst="rect">
+            <a:avLst/>
+          </a:prstGeom>
+          <a:noFill/>
+          <a:extLst>
+            <a:ext uri="{909E8E84-426E-40DD-AFC4-6F175D3DCCD1}">
+              <a14:hiddenFill xmlns:a14="http://schemas.microsoft.com/office/drawing/2010/main">
+                <a:solidFill>
+                  <a:srgbClr val="FFFFFF"/>
+                </a:solidFill>
+              </a14:hiddenFill>
+            </a:ext>
+          </a:extLst>
+        </p:spPr>
+      </p:pic>
+      <p:sp>
+        <p:nvSpPr>
+          <p:cNvPr id="5" name="4 Rectángulo"/>
+          <p:cNvSpPr/>
+          <p:nvPr/>
+        </p:nvSpPr>
+        <p:spPr>
+          <a:xfrm>
+            <a:off x="323528" y="1412776"/>
+            <a:ext cx="8496944" cy="4536504"/>
+          </a:xfrm>
+          <a:prstGeom prst="rect">
+            <a:avLst/>
+          </a:prstGeom>
+          <a:noFill/>
+        </p:spPr>
+        <p:style>
+          <a:lnRef idx="2">
+            <a:schemeClr val="accent2"/>
+          </a:lnRef>
+          <a:fillRef idx="1">
+            <a:schemeClr val="lt1"/>
+          </a:fillRef>
+          <a:effectRef idx="0">
+            <a:schemeClr val="accent2"/>
+          </a:effectRef>
+          <a:fontRef idx="minor">
+            <a:schemeClr val="dk1"/>
+          </a:fontRef>
+        </p:style>
+        <p:txBody>
+          <a:bodyPr rtlCol="0" anchor="ctr"/>
+          <a:lstStyle/>
+          <a:p>
+            <a:pPr algn="ctr"/>
+            <a:endParaRPr lang="en-US"/>
+          </a:p>
+        </p:txBody>
+      </p:sp>
+      <p:sp>
+        <p:nvSpPr>
+          <p:cNvPr id="2" name="1 Título"/>
+          <p:cNvSpPr>
+            <a:spLocks noGrp="1"/>
+          </p:cNvSpPr>
+          <p:nvPr>
+            <p:ph type="title"/>
+          </p:nvPr>
+        </p:nvSpPr>
+        <p:spPr/>
+        <p:txBody>
+          <a:bodyPr/>
+          <a:lstStyle/>
+          <a:p>
+            <a:r>
+              <a:rPr lang="en-US" dirty="0" smtClean="0"/>
+              <a:t>Spy</a:t>
+            </a:r>
+            <a:endParaRPr lang="en-US" dirty="0"/>
+          </a:p>
+        </p:txBody>
+      </p:sp>
+      <p:sp>
+        <p:nvSpPr>
+          <p:cNvPr id="3" name="2 Marcador de contenido"/>
+          <p:cNvSpPr>
+            <a:spLocks noGrp="1"/>
+          </p:cNvSpPr>
+          <p:nvPr>
+            <p:ph idx="1"/>
+          </p:nvPr>
+        </p:nvSpPr>
+        <p:spPr/>
+        <p:txBody>
+          <a:bodyPr/>
+          <a:lstStyle/>
+          <a:p>
+            <a:r>
+              <a:rPr lang="en-US" dirty="0" err="1"/>
+              <a:t>spyOn</a:t>
+            </a:r>
+            <a:r>
+              <a:rPr lang="en-US" dirty="0"/>
+              <a:t>(foo, '</a:t>
+            </a:r>
+            <a:r>
+              <a:rPr lang="en-US" dirty="0" err="1"/>
+              <a:t>setBar</a:t>
+            </a:r>
+            <a:r>
+              <a:rPr lang="en-US" dirty="0" smtClean="0"/>
+              <a:t>');</a:t>
+            </a:r>
+          </a:p>
+          <a:p>
+            <a:pPr lvl="1"/>
+            <a:r>
+              <a:rPr lang="en-US" dirty="0" err="1" smtClean="0"/>
+              <a:t>and.callThrough</a:t>
+            </a:r>
+            <a:endParaRPr lang="en-US" dirty="0" smtClean="0"/>
+          </a:p>
+          <a:p>
+            <a:pPr lvl="1"/>
+            <a:r>
+              <a:rPr lang="en-US" dirty="0" err="1" smtClean="0"/>
+              <a:t>and.returnValue</a:t>
+            </a:r>
+            <a:endParaRPr lang="en-US" dirty="0" smtClean="0"/>
+          </a:p>
+          <a:p>
+            <a:pPr lvl="1"/>
+            <a:r>
+              <a:rPr lang="en-US" dirty="0" err="1" smtClean="0"/>
+              <a:t>and.returnValues</a:t>
+            </a:r>
+            <a:endParaRPr lang="en-US" dirty="0" smtClean="0"/>
+          </a:p>
+          <a:p>
+            <a:pPr lvl="1"/>
+            <a:r>
+              <a:rPr lang="en-US" dirty="0" err="1" smtClean="0"/>
+              <a:t>and.callFake</a:t>
+            </a:r>
+            <a:endParaRPr lang="en-US" dirty="0" smtClean="0"/>
+          </a:p>
+          <a:p>
+            <a:pPr lvl="1"/>
+            <a:r>
+              <a:rPr lang="en-US" dirty="0" err="1" smtClean="0"/>
+              <a:t>and.throwError</a:t>
+            </a:r>
+            <a:endParaRPr lang="en-US" dirty="0"/>
+          </a:p>
+          <a:p>
+            <a:r>
+              <a:rPr lang="en-US" dirty="0" err="1" smtClean="0"/>
+              <a:t>jasmine.createSpy</a:t>
+            </a:r>
+            <a:r>
+              <a:rPr lang="en-US" dirty="0" smtClean="0"/>
+              <a:t>()</a:t>
+            </a:r>
+            <a:endParaRPr lang="en-US" dirty="0"/>
+          </a:p>
+          <a:p>
+            <a:endParaRPr lang="en-US" dirty="0"/>
+          </a:p>
+        </p:txBody>
+      </p:sp>
+    </p:spTree>
+    <p:extLst>
+      <p:ext uri="{BB962C8B-B14F-4D97-AF65-F5344CB8AC3E}">
+        <p14:creationId xmlns:p14="http://schemas.microsoft.com/office/powerpoint/2010/main" val="3663148921"/>
+      </p:ext>
+    </p:extLst>
+  </p:cSld>
+  <p:clrMapOvr>
+    <a:masterClrMapping/>
+  </p:clrMapOvr>
+</p:sld>
+</file>
+
+<file path=ppt/slides/slide47.xml><?xml version="1.0" encoding="utf-8"?>
+<p:sld xmlns:a="http://schemas.openxmlformats.org/drawingml/2006/main" xmlns:r="http://schemas.openxmlformats.org/officeDocument/2006/relationships" xmlns:p="http://schemas.openxmlformats.org/presentationml/2006/main">
+  <p:cSld>
+    <p:spTree>
+      <p:nvGrpSpPr>
+        <p:cNvPr id="1" name=""/>
+        <p:cNvGrpSpPr/>
+        <p:nvPr/>
+      </p:nvGrpSpPr>
+      <p:grpSpPr>
+        <a:xfrm>
+          <a:off x="0" y="0"/>
+          <a:ext cx="0" cy="0"/>
+          <a:chOff x="0" y="0"/>
+          <a:chExt cx="0" cy="0"/>
+        </a:xfrm>
+      </p:grpSpPr>
+      <p:sp>
+        <p:nvSpPr>
+          <p:cNvPr id="2" name="1 Título"/>
+          <p:cNvSpPr>
+            <a:spLocks noGrp="1"/>
+          </p:cNvSpPr>
+          <p:nvPr>
+            <p:ph type="title"/>
+          </p:nvPr>
+        </p:nvSpPr>
+        <p:spPr/>
+        <p:txBody>
+          <a:bodyPr vert="horz" lIns="91440" tIns="45720" rIns="91440" bIns="45720" rtlCol="0" anchor="ctr">
+            <a:normAutofit/>
+            <a:scene3d>
+              <a:camera prst="orthographicFront"/>
+              <a:lightRig rig="soft" dir="tl">
+                <a:rot lat="0" lon="0" rev="0"/>
+              </a:lightRig>
+            </a:scene3d>
+            <a:sp3d contourW="25400" prstMaterial="matte">
+              <a:bevelT w="25400" h="55880" prst="artDeco"/>
+              <a:contourClr>
+                <a:schemeClr val="accent2">
+                  <a:tint val="20000"/>
+                </a:schemeClr>
+              </a:contourClr>
+            </a:sp3d>
+          </a:bodyPr>
+          <a:lstStyle/>
+          <a:p>
+            <a:r>
+              <a:rPr lang="en-US" b="1" spc="50" dirty="0">
+                <a:ln w="11430"/>
+                <a:gradFill>
+                  <a:gsLst>
+                    <a:gs pos="25000">
+                      <a:schemeClr val="accent2">
+                        <a:satMod val="155000"/>
+                      </a:schemeClr>
+                    </a:gs>
+                    <a:gs pos="100000">
+                      <a:schemeClr val="accent2">
+                        <a:shade val="45000"/>
+                        <a:satMod val="165000"/>
+                      </a:schemeClr>
+                    </a:gs>
+                  </a:gsLst>
+                  <a:lin ang="5400000"/>
+                </a:gradFill>
+                <a:effectLst>
+                  <a:outerShdw blurRad="76200" dist="50800" dir="5400000" algn="tl" rotWithShape="0">
+                    <a:srgbClr val="000000">
+                      <a:alpha val="65000"/>
+                    </a:srgbClr>
+                  </a:outerShdw>
+                </a:effectLst>
+              </a:rPr>
+              <a:t>Practical example </a:t>
+            </a:r>
+            <a:r>
+              <a:rPr lang="en-US" b="1" spc="50" dirty="0" smtClean="0">
+                <a:ln w="11430"/>
+                <a:gradFill>
+                  <a:gsLst>
+                    <a:gs pos="25000">
+                      <a:schemeClr val="accent2">
+                        <a:satMod val="155000"/>
+                      </a:schemeClr>
+                    </a:gs>
+                    <a:gs pos="100000">
+                      <a:schemeClr val="accent2">
+                        <a:shade val="45000"/>
+                        <a:satMod val="165000"/>
+                      </a:schemeClr>
+                    </a:gs>
+                  </a:gsLst>
+                  <a:lin ang="5400000"/>
+                </a:gradFill>
+                <a:effectLst>
+                  <a:outerShdw blurRad="76200" dist="50800" dir="5400000" algn="tl" rotWithShape="0">
+                    <a:srgbClr val="000000">
+                      <a:alpha val="65000"/>
+                    </a:srgbClr>
+                  </a:outerShdw>
+                </a:effectLst>
+              </a:rPr>
+              <a:t>8</a:t>
+            </a:r>
+            <a:endParaRPr lang="en-US" b="1" spc="50" dirty="0">
+              <a:ln w="11430"/>
+              <a:gradFill>
+                <a:gsLst>
+                  <a:gs pos="25000">
+                    <a:schemeClr val="accent2">
+                      <a:satMod val="155000"/>
+                    </a:schemeClr>
+                  </a:gs>
+                  <a:gs pos="100000">
+                    <a:schemeClr val="accent2">
+                      <a:shade val="45000"/>
+                      <a:satMod val="165000"/>
+                    </a:schemeClr>
+                  </a:gs>
+                </a:gsLst>
+                <a:lin ang="5400000"/>
+              </a:gradFill>
+              <a:effectLst>
+                <a:outerShdw blurRad="76200" dist="50800" dir="5400000" algn="tl" rotWithShape="0">
+                  <a:srgbClr val="000000">
+                    <a:alpha val="65000"/>
+                  </a:srgbClr>
+                </a:outerShdw>
+              </a:effectLst>
+            </a:endParaRPr>
+          </a:p>
+        </p:txBody>
+      </p:sp>
+      <p:sp>
+        <p:nvSpPr>
+          <p:cNvPr id="3" name="2 Marcador de contenido"/>
+          <p:cNvSpPr>
+            <a:spLocks noGrp="1"/>
+          </p:cNvSpPr>
+          <p:nvPr>
+            <p:ph idx="1"/>
+          </p:nvPr>
+        </p:nvSpPr>
+        <p:spPr/>
+        <p:txBody>
+          <a:bodyPr/>
+          <a:lstStyle/>
+          <a:p>
+            <a:pPr marL="514350" indent="-514350">
+              <a:buFont typeface="+mj-lt"/>
+              <a:buAutoNum type="alphaLcParenR"/>
+            </a:pPr>
+            <a:r>
+              <a:rPr lang="en-US" dirty="0"/>
+              <a:t>T</a:t>
+            </a:r>
+            <a:r>
+              <a:rPr lang="en-US" dirty="0" smtClean="0"/>
+              <a:t>est a Service</a:t>
+            </a:r>
+          </a:p>
+          <a:p>
+            <a:pPr marL="514350" indent="-514350">
+              <a:buFont typeface="+mj-lt"/>
+              <a:buAutoNum type="alphaLcParenR"/>
+            </a:pPr>
+            <a:r>
+              <a:rPr lang="en-US" dirty="0"/>
+              <a:t>T</a:t>
+            </a:r>
+            <a:r>
+              <a:rPr lang="en-US" dirty="0" smtClean="0"/>
+              <a:t>est a Controller</a:t>
+            </a:r>
+          </a:p>
+          <a:p>
+            <a:pPr marL="514350" indent="-514350">
+              <a:buFont typeface="+mj-lt"/>
+              <a:buAutoNum type="alphaLcParenR"/>
+            </a:pPr>
+            <a:r>
+              <a:rPr lang="en-US" dirty="0" smtClean="0"/>
+              <a:t>Test a directive using a mock</a:t>
+            </a:r>
+          </a:p>
+        </p:txBody>
+      </p:sp>
+    </p:spTree>
+    <p:extLst>
+      <p:ext uri="{BB962C8B-B14F-4D97-AF65-F5344CB8AC3E}">
+        <p14:creationId xmlns:p14="http://schemas.microsoft.com/office/powerpoint/2010/main" val="719970525"/>
+      </p:ext>
+    </p:extLst>
+  </p:cSld>
+  <p:clrMapOvr>
+    <a:masterClrMapping/>
+  </p:clrMapOvr>
+</p:sld>
+</file>
+
+<file path=ppt/slides/slide48.xml><?xml version="1.0" encoding="utf-8"?>
 <p:sld xmlns:a="http://schemas.openxmlformats.org/drawingml/2006/main" xmlns:r="http://schemas.openxmlformats.org/officeDocument/2006/relationships" xmlns:p="http://schemas.openxmlformats.org/presentationml/2006/main">
   <p:cSld>
     <p:spTree>

</xml_diff>

<commit_message>
Add unit tests practice
</commit_message>
<xml_diff>
--- a/material/AngularJS Taller.pptx
+++ b/material/AngularJS Taller.pptx
@@ -5,7 +5,7 @@
     <p:sldMasterId id="2147483648" r:id="rId1"/>
   </p:sldMasterIdLst>
   <p:notesMasterIdLst>
-    <p:notesMasterId r:id="rId50"/>
+    <p:notesMasterId r:id="rId52"/>
   </p:notesMasterIdLst>
   <p:sldIdLst>
     <p:sldId id="256" r:id="rId2"/>
@@ -54,8 +54,10 @@
     <p:sldId id="302" r:id="rId45"/>
     <p:sldId id="303" r:id="rId46"/>
     <p:sldId id="304" r:id="rId47"/>
-    <p:sldId id="305" r:id="rId48"/>
-    <p:sldId id="281" r:id="rId49"/>
+    <p:sldId id="306" r:id="rId48"/>
+    <p:sldId id="307" r:id="rId49"/>
+    <p:sldId id="305" r:id="rId50"/>
+    <p:sldId id="281" r:id="rId51"/>
   </p:sldIdLst>
   <p:sldSz cx="9144000" cy="6858000" type="screen4x3"/>
   <p:notesSz cx="6858000" cy="9144000"/>
@@ -19596,17 +19598,8 @@
           <a:p>
             <a:r>
               <a:rPr lang="en-US" u="sng" dirty="0" smtClean="0"/>
-              <a:t>b) Create </a:t>
-            </a:r>
-            <a:r>
-              <a:rPr lang="en-US" u="sng" dirty="0" smtClean="0"/>
-              <a:t>a Service that uses a </a:t>
-            </a:r>
-            <a:r>
-              <a:rPr lang="en-US" u="sng" dirty="0" smtClean="0"/>
-              <a:t>$resource promise.</a:t>
-            </a:r>
-            <a:endParaRPr lang="en-US" u="sng" dirty="0" smtClean="0"/>
+              <a:t>b) Create a Service that uses a $resource promise.</a:t>
+            </a:r>
           </a:p>
           <a:p>
             <a:endParaRPr lang="en-US" dirty="0" smtClean="0"/>
@@ -19675,11 +19668,7 @@
             </a:pPr>
             <a:r>
               <a:rPr lang="en-US" u="none" dirty="0" smtClean="0"/>
-              <a:t>Change the default name to camel case in the file name and in the index.html</a:t>
-            </a:r>
-            <a:r>
-              <a:rPr lang="en-US" u="none" dirty="0" smtClean="0"/>
-              <a:t>.</a:t>
+              <a:t>Change the default name to camel case in the file name and in the index.html.</a:t>
             </a:r>
           </a:p>
           <a:p>
@@ -20923,15 +20912,7 @@
           <a:p>
             <a:r>
               <a:rPr lang="en-US" u="sng" dirty="0" smtClean="0"/>
-              <a:t>d) Creates </a:t>
-            </a:r>
-            <a:r>
-              <a:rPr lang="en-US" u="sng" dirty="0" smtClean="0"/>
-              <a:t>an event listener triggered by $broadcast and $</a:t>
-            </a:r>
-            <a:r>
-              <a:rPr lang="en-US" u="sng" dirty="0" smtClean="0"/>
-              <a:t>emit.</a:t>
+              <a:t>d) Creates an event listener triggered by $broadcast and $emit.</a:t>
             </a:r>
           </a:p>
           <a:p>
@@ -22032,6 +22013,3713 @@
     <p:extLst>
       <p:ext uri="{BB962C8B-B14F-4D97-AF65-F5344CB8AC3E}">
         <p14:creationId xmlns:p14="http://schemas.microsoft.com/office/powerpoint/2010/main" val="2989888369"/>
+      </p:ext>
+    </p:extLst>
+  </p:cSld>
+  <p:clrMapOvr>
+    <a:masterClrMapping/>
+  </p:clrMapOvr>
+</p:notes>
+</file>
+
+<file path=ppt/notesSlides/notesSlide45.xml><?xml version="1.0" encoding="utf-8"?>
+<p:notes xmlns:a="http://schemas.openxmlformats.org/drawingml/2006/main" xmlns:r="http://schemas.openxmlformats.org/officeDocument/2006/relationships" xmlns:p="http://schemas.openxmlformats.org/presentationml/2006/main">
+  <p:cSld>
+    <p:spTree>
+      <p:nvGrpSpPr>
+        <p:cNvPr id="1" name=""/>
+        <p:cNvGrpSpPr/>
+        <p:nvPr/>
+      </p:nvGrpSpPr>
+      <p:grpSpPr>
+        <a:xfrm>
+          <a:off x="0" y="0"/>
+          <a:ext cx="0" cy="0"/>
+          <a:chOff x="0" y="0"/>
+          <a:chExt cx="0" cy="0"/>
+        </a:xfrm>
+      </p:grpSpPr>
+      <p:sp>
+        <p:nvSpPr>
+          <p:cNvPr id="2" name="1 Marcador de imagen de diapositiva"/>
+          <p:cNvSpPr>
+            <a:spLocks noGrp="1" noRot="1" noChangeAspect="1"/>
+          </p:cNvSpPr>
+          <p:nvPr>
+            <p:ph type="sldImg"/>
+          </p:nvPr>
+        </p:nvSpPr>
+        <p:spPr/>
+      </p:sp>
+      <p:sp>
+        <p:nvSpPr>
+          <p:cNvPr id="3" name="2 Marcador de notas"/>
+          <p:cNvSpPr>
+            <a:spLocks noGrp="1"/>
+          </p:cNvSpPr>
+          <p:nvPr>
+            <p:ph type="body" idx="1"/>
+          </p:nvPr>
+        </p:nvSpPr>
+        <p:spPr/>
+        <p:txBody>
+          <a:bodyPr/>
+          <a:lstStyle/>
+          <a:p>
+            <a:r>
+              <a:rPr lang="en-US" dirty="0" smtClean="0"/>
+              <a:t>The unit test coverage</a:t>
+            </a:r>
+            <a:r>
+              <a:rPr lang="en-US" baseline="0" dirty="0" smtClean="0"/>
+              <a:t> it's a way to supervise how much code do you have tested with your unit tests: statements, branches, functions and lines. </a:t>
+            </a:r>
+          </a:p>
+          <a:p>
+            <a:endParaRPr lang="en-US" baseline="0" dirty="0" smtClean="0"/>
+          </a:p>
+          <a:p>
+            <a:r>
+              <a:rPr lang="en-US" baseline="0" dirty="0" smtClean="0"/>
+              <a:t>This could be generated in text or html.</a:t>
+            </a:r>
+            <a:endParaRPr lang="en-US" dirty="0"/>
+          </a:p>
+        </p:txBody>
+      </p:sp>
+      <p:sp>
+        <p:nvSpPr>
+          <p:cNvPr id="4" name="3 Marcador de número de diapositiva"/>
+          <p:cNvSpPr>
+            <a:spLocks noGrp="1"/>
+          </p:cNvSpPr>
+          <p:nvPr>
+            <p:ph type="sldNum" sz="quarter" idx="10"/>
+          </p:nvPr>
+        </p:nvSpPr>
+        <p:spPr/>
+        <p:txBody>
+          <a:bodyPr/>
+          <a:lstStyle/>
+          <a:p>
+            <a:fld id="{212C6109-0EF7-4E6B-B279-6389DF78298C}" type="slidenum">
+              <a:rPr lang="en-US" smtClean="0"/>
+              <a:t>47</a:t>
+            </a:fld>
+            <a:endParaRPr lang="en-US"/>
+          </a:p>
+        </p:txBody>
+      </p:sp>
+    </p:spTree>
+    <p:extLst>
+      <p:ext uri="{BB962C8B-B14F-4D97-AF65-F5344CB8AC3E}">
+        <p14:creationId xmlns:p14="http://schemas.microsoft.com/office/powerpoint/2010/main" val="649987739"/>
+      </p:ext>
+    </p:extLst>
+  </p:cSld>
+  <p:clrMapOvr>
+    <a:masterClrMapping/>
+  </p:clrMapOvr>
+</p:notes>
+</file>
+
+<file path=ppt/notesSlides/notesSlide46.xml><?xml version="1.0" encoding="utf-8"?>
+<p:notes xmlns:a="http://schemas.openxmlformats.org/drawingml/2006/main" xmlns:r="http://schemas.openxmlformats.org/officeDocument/2006/relationships" xmlns:p="http://schemas.openxmlformats.org/presentationml/2006/main">
+  <p:cSld>
+    <p:spTree>
+      <p:nvGrpSpPr>
+        <p:cNvPr id="1" name=""/>
+        <p:cNvGrpSpPr/>
+        <p:nvPr/>
+      </p:nvGrpSpPr>
+      <p:grpSpPr>
+        <a:xfrm>
+          <a:off x="0" y="0"/>
+          <a:ext cx="0" cy="0"/>
+          <a:chOff x="0" y="0"/>
+          <a:chExt cx="0" cy="0"/>
+        </a:xfrm>
+      </p:grpSpPr>
+      <p:sp>
+        <p:nvSpPr>
+          <p:cNvPr id="2" name="1 Marcador de imagen de diapositiva"/>
+          <p:cNvSpPr>
+            <a:spLocks noGrp="1" noRot="1" noChangeAspect="1"/>
+          </p:cNvSpPr>
+          <p:nvPr>
+            <p:ph type="sldImg"/>
+          </p:nvPr>
+        </p:nvSpPr>
+        <p:spPr/>
+      </p:sp>
+      <p:sp>
+        <p:nvSpPr>
+          <p:cNvPr id="3" name="2 Marcador de notas"/>
+          <p:cNvSpPr>
+            <a:spLocks noGrp="1"/>
+          </p:cNvSpPr>
+          <p:nvPr>
+            <p:ph type="body" idx="1"/>
+          </p:nvPr>
+        </p:nvSpPr>
+        <p:spPr/>
+        <p:txBody>
+          <a:bodyPr/>
+          <a:lstStyle/>
+          <a:p>
+            <a:r>
+              <a:rPr lang="en-US" dirty="0" smtClean="0"/>
+              <a:t>You can navigate in the index.html and found the files you want to </a:t>
+            </a:r>
+            <a:r>
+              <a:rPr lang="en-US" dirty="0" err="1" smtClean="0"/>
+              <a:t>chek</a:t>
+            </a:r>
+            <a:r>
+              <a:rPr lang="en-US" dirty="0" smtClean="0"/>
+              <a:t> the coverage that will give you line by line what needs</a:t>
+            </a:r>
+            <a:r>
+              <a:rPr lang="en-US" baseline="0" dirty="0" smtClean="0"/>
+              <a:t> to be tested.</a:t>
+            </a:r>
+            <a:endParaRPr lang="en-US" dirty="0"/>
+          </a:p>
+        </p:txBody>
+      </p:sp>
+      <p:sp>
+        <p:nvSpPr>
+          <p:cNvPr id="4" name="3 Marcador de número de diapositiva"/>
+          <p:cNvSpPr>
+            <a:spLocks noGrp="1"/>
+          </p:cNvSpPr>
+          <p:nvPr>
+            <p:ph type="sldNum" sz="quarter" idx="10"/>
+          </p:nvPr>
+        </p:nvSpPr>
+        <p:spPr/>
+        <p:txBody>
+          <a:bodyPr/>
+          <a:lstStyle/>
+          <a:p>
+            <a:fld id="{212C6109-0EF7-4E6B-B279-6389DF78298C}" type="slidenum">
+              <a:rPr lang="en-US" smtClean="0"/>
+              <a:t>48</a:t>
+            </a:fld>
+            <a:endParaRPr lang="en-US"/>
+          </a:p>
+        </p:txBody>
+      </p:sp>
+    </p:spTree>
+    <p:extLst>
+      <p:ext uri="{BB962C8B-B14F-4D97-AF65-F5344CB8AC3E}">
+        <p14:creationId xmlns:p14="http://schemas.microsoft.com/office/powerpoint/2010/main" val="3007073921"/>
+      </p:ext>
+    </p:extLst>
+  </p:cSld>
+  <p:clrMapOvr>
+    <a:masterClrMapping/>
+  </p:clrMapOvr>
+</p:notes>
+</file>
+
+<file path=ppt/notesSlides/notesSlide47.xml><?xml version="1.0" encoding="utf-8"?>
+<p:notes xmlns:a="http://schemas.openxmlformats.org/drawingml/2006/main" xmlns:r="http://schemas.openxmlformats.org/officeDocument/2006/relationships" xmlns:p="http://schemas.openxmlformats.org/presentationml/2006/main">
+  <p:cSld>
+    <p:spTree>
+      <p:nvGrpSpPr>
+        <p:cNvPr id="1" name=""/>
+        <p:cNvGrpSpPr/>
+        <p:nvPr/>
+      </p:nvGrpSpPr>
+      <p:grpSpPr>
+        <a:xfrm>
+          <a:off x="0" y="0"/>
+          <a:ext cx="0" cy="0"/>
+          <a:chOff x="0" y="0"/>
+          <a:chExt cx="0" cy="0"/>
+        </a:xfrm>
+      </p:grpSpPr>
+      <p:sp>
+        <p:nvSpPr>
+          <p:cNvPr id="2" name="1 Marcador de imagen de diapositiva"/>
+          <p:cNvSpPr>
+            <a:spLocks noGrp="1" noRot="1" noChangeAspect="1"/>
+          </p:cNvSpPr>
+          <p:nvPr>
+            <p:ph type="sldImg"/>
+          </p:nvPr>
+        </p:nvSpPr>
+        <p:spPr/>
+      </p:sp>
+      <p:sp>
+        <p:nvSpPr>
+          <p:cNvPr id="3" name="2 Marcador de notas"/>
+          <p:cNvSpPr>
+            <a:spLocks noGrp="1"/>
+          </p:cNvSpPr>
+          <p:nvPr>
+            <p:ph type="body" idx="1"/>
+          </p:nvPr>
+        </p:nvSpPr>
+        <p:spPr/>
+        <p:txBody>
+          <a:bodyPr/>
+          <a:lstStyle/>
+          <a:p>
+            <a:r>
+              <a:rPr lang="en-US" u="sng" dirty="0" smtClean="0"/>
+              <a:t>a) Set up karma coverage.</a:t>
+            </a:r>
+          </a:p>
+          <a:p>
+            <a:endParaRPr lang="en-US" dirty="0" smtClean="0"/>
+          </a:p>
+          <a:p>
+            <a:pPr marL="228600" indent="-228600">
+              <a:buFont typeface="+mj-lt"/>
+              <a:buAutoNum type="arabicPeriod"/>
+            </a:pPr>
+            <a:r>
+              <a:rPr lang="en-US" dirty="0" smtClean="0"/>
+              <a:t>I</a:t>
+            </a:r>
+            <a:r>
+              <a:rPr lang="en-US" baseline="0" dirty="0" smtClean="0"/>
+              <a:t>nstall the karma-coverage package with: "</a:t>
+            </a:r>
+            <a:r>
+              <a:rPr lang="en-US" baseline="0" dirty="0" err="1" smtClean="0"/>
+              <a:t>npm</a:t>
+            </a:r>
+            <a:r>
+              <a:rPr lang="en-US" baseline="0" dirty="0" smtClean="0"/>
+              <a:t> install karma-coverage –save-</a:t>
+            </a:r>
+            <a:r>
+              <a:rPr lang="en-US" baseline="0" dirty="0" err="1" smtClean="0"/>
+              <a:t>dev</a:t>
+            </a:r>
+            <a:r>
+              <a:rPr lang="en-US" baseline="0" dirty="0" smtClean="0"/>
+              <a:t>".</a:t>
+            </a:r>
+          </a:p>
+          <a:p>
+            <a:pPr marL="228600" indent="-228600">
+              <a:buFont typeface="+mj-lt"/>
+              <a:buAutoNum type="arabicPeriod"/>
+            </a:pPr>
+            <a:r>
+              <a:rPr lang="en-US" baseline="0" dirty="0" smtClean="0"/>
+              <a:t>Open the test/karma.config.js file and add:</a:t>
+            </a:r>
+          </a:p>
+          <a:p>
+            <a:endParaRPr lang="en-US" baseline="0" dirty="0" smtClean="0"/>
+          </a:p>
+          <a:p>
+            <a:r>
+              <a:rPr lang="en-US" baseline="0" dirty="0" smtClean="0"/>
+              <a:t>    preprocessors: {</a:t>
+            </a:r>
+          </a:p>
+          <a:p>
+            <a:r>
+              <a:rPr lang="en-US" baseline="0" dirty="0" smtClean="0"/>
+              <a:t>      'app/scripts/**/*.</a:t>
+            </a:r>
+            <a:r>
+              <a:rPr lang="en-US" baseline="0" dirty="0" err="1" smtClean="0"/>
+              <a:t>js</a:t>
+            </a:r>
+            <a:r>
+              <a:rPr lang="en-US" baseline="0" dirty="0" smtClean="0"/>
+              <a:t>': ['coverage']</a:t>
+            </a:r>
+          </a:p>
+          <a:p>
+            <a:r>
+              <a:rPr lang="en-US" baseline="0" dirty="0" smtClean="0"/>
+              <a:t>    },</a:t>
+            </a:r>
+          </a:p>
+          <a:p>
+            <a:r>
+              <a:rPr lang="en-US" baseline="0" dirty="0" smtClean="0"/>
+              <a:t>    </a:t>
+            </a:r>
+          </a:p>
+          <a:p>
+            <a:r>
+              <a:rPr lang="en-US" baseline="0" dirty="0" smtClean="0"/>
+              <a:t>    </a:t>
+            </a:r>
+            <a:r>
+              <a:rPr lang="en-US" baseline="0" dirty="0" err="1" smtClean="0"/>
+              <a:t>coverageReporter</a:t>
+            </a:r>
+            <a:r>
+              <a:rPr lang="en-US" baseline="0" dirty="0" smtClean="0"/>
+              <a:t>: {</a:t>
+            </a:r>
+          </a:p>
+          <a:p>
+            <a:r>
+              <a:rPr lang="en-US" baseline="0" dirty="0" smtClean="0"/>
+              <a:t>      type: 'html',</a:t>
+            </a:r>
+          </a:p>
+          <a:p>
+            <a:r>
+              <a:rPr lang="en-US" baseline="0" dirty="0" smtClean="0"/>
+              <a:t>      </a:t>
+            </a:r>
+            <a:r>
+              <a:rPr lang="en-US" baseline="0" dirty="0" err="1" smtClean="0"/>
+              <a:t>dir</a:t>
+            </a:r>
+            <a:r>
+              <a:rPr lang="en-US" baseline="0" dirty="0" smtClean="0"/>
+              <a:t>: 'test/coverage/'</a:t>
+            </a:r>
+          </a:p>
+          <a:p>
+            <a:r>
+              <a:rPr lang="en-US" baseline="0" dirty="0" smtClean="0"/>
+              <a:t>    },</a:t>
+            </a:r>
+          </a:p>
+          <a:p>
+            <a:r>
+              <a:rPr lang="en-US" baseline="0" dirty="0" smtClean="0"/>
+              <a:t>    </a:t>
+            </a:r>
+          </a:p>
+          <a:p>
+            <a:r>
+              <a:rPr lang="en-US" baseline="0" dirty="0" smtClean="0"/>
+              <a:t>    reporters: ['progress', 'coverage'],</a:t>
+            </a:r>
+          </a:p>
+          <a:p>
+            <a:endParaRPr lang="en-US" baseline="0" dirty="0" smtClean="0"/>
+          </a:p>
+          <a:p>
+            <a:pPr marL="228600" indent="-228600">
+              <a:buFont typeface="+mj-lt"/>
+              <a:buAutoNum type="arabicPeriod" startAt="3"/>
+            </a:pPr>
+            <a:r>
+              <a:rPr lang="en-US" baseline="0" dirty="0" smtClean="0"/>
+              <a:t>Add "karma-coverage" in the plugins.</a:t>
+            </a:r>
+          </a:p>
+          <a:p>
+            <a:pPr marL="228600" indent="-228600">
+              <a:buFont typeface="+mj-lt"/>
+              <a:buAutoNum type="arabicPeriod" startAt="3"/>
+            </a:pPr>
+            <a:r>
+              <a:rPr lang="en-US" baseline="0" dirty="0" smtClean="0"/>
+              <a:t>Replace the files last lines (after the //</a:t>
+            </a:r>
+            <a:r>
+              <a:rPr lang="en-US" baseline="0" dirty="0" err="1" smtClean="0"/>
+              <a:t>endbower</a:t>
+            </a:r>
+            <a:r>
+              <a:rPr lang="en-US" baseline="0" dirty="0" smtClean="0"/>
+              <a:t>) with:</a:t>
+            </a:r>
+          </a:p>
+          <a:p>
+            <a:endParaRPr lang="en-US" baseline="0" dirty="0" smtClean="0"/>
+          </a:p>
+          <a:p>
+            <a:r>
+              <a:rPr lang="en-US" baseline="0" dirty="0" smtClean="0"/>
+              <a:t>      // </a:t>
+            </a:r>
+            <a:r>
+              <a:rPr lang="en-US" baseline="0" dirty="0" err="1" smtClean="0"/>
+              <a:t>endbower</a:t>
+            </a:r>
+            <a:endParaRPr lang="en-US" baseline="0" dirty="0" smtClean="0"/>
+          </a:p>
+          <a:p>
+            <a:r>
+              <a:rPr lang="en-US" baseline="0" dirty="0" smtClean="0"/>
+              <a:t>      'app/scripts/**/*.</a:t>
+            </a:r>
+            <a:r>
+              <a:rPr lang="en-US" baseline="0" dirty="0" err="1" smtClean="0"/>
+              <a:t>js</a:t>
+            </a:r>
+            <a:r>
+              <a:rPr lang="en-US" baseline="0" dirty="0" smtClean="0"/>
+              <a:t>',</a:t>
+            </a:r>
+          </a:p>
+          <a:p>
+            <a:r>
+              <a:rPr lang="en-US" baseline="0" dirty="0" smtClean="0"/>
+              <a:t>      'test/spec/**/*.spec.js'</a:t>
+            </a:r>
+          </a:p>
+          <a:p>
+            <a:endParaRPr lang="en-US" baseline="0" dirty="0" smtClean="0"/>
+          </a:p>
+          <a:p>
+            <a:pPr marL="228600" indent="-228600">
+              <a:buFont typeface="+mj-lt"/>
+              <a:buAutoNum type="arabicPeriod" startAt="5"/>
+            </a:pPr>
+            <a:r>
+              <a:rPr lang="en-US" baseline="0" dirty="0" smtClean="0"/>
+              <a:t>Open Gruntfile.js and search for the "spec" word, this will point to every task related with unit test.</a:t>
+            </a:r>
+          </a:p>
+          <a:p>
+            <a:pPr marL="228600" indent="-228600">
+              <a:buFont typeface="+mj-lt"/>
+              <a:buAutoNum type="arabicPeriod" startAt="5"/>
+            </a:pPr>
+            <a:r>
+              <a:rPr lang="en-US" baseline="0" dirty="0" smtClean="0"/>
+              <a:t>In every appearance add ".spec.js" as a type for searching, this could be useful for modularization, and search test all over the root folder.</a:t>
+            </a:r>
+          </a:p>
+          <a:p>
+            <a:pPr marL="228600" indent="-228600">
+              <a:buFont typeface="+mj-lt"/>
+              <a:buAutoNum type="arabicPeriod" startAt="5"/>
+            </a:pPr>
+            <a:r>
+              <a:rPr lang="en-US" baseline="0" dirty="0" smtClean="0"/>
+              <a:t>Open the "test/spec/directives" folder and rename the no-scope-directive.js file to have the ".spec.js".</a:t>
+            </a:r>
+          </a:p>
+          <a:p>
+            <a:pPr marL="228600" indent="-228600">
+              <a:buFont typeface="+mj-lt"/>
+              <a:buAutoNum type="arabicPeriod" startAt="5"/>
+            </a:pPr>
+            <a:r>
+              <a:rPr lang="en-US" baseline="0" dirty="0" smtClean="0"/>
+              <a:t>Run "grunt test".</a:t>
+            </a:r>
+          </a:p>
+          <a:p>
+            <a:r>
+              <a:rPr lang="en-US" baseline="0" dirty="0" smtClean="0"/>
+              <a:t>This will create the "test/coverage" folder, inside you'll have a folder with the name of the </a:t>
+            </a:r>
+            <a:r>
+              <a:rPr lang="en-US" baseline="0" dirty="0" err="1" smtClean="0"/>
+              <a:t>PhantomJS</a:t>
+            </a:r>
+            <a:r>
+              <a:rPr lang="en-US" baseline="0" dirty="0" smtClean="0"/>
+              <a:t> version.</a:t>
+            </a:r>
+          </a:p>
+          <a:p>
+            <a:pPr marL="228600" indent="-228600">
+              <a:buFont typeface="+mj-lt"/>
+              <a:buAutoNum type="arabicPeriod" startAt="9"/>
+            </a:pPr>
+            <a:r>
+              <a:rPr lang="en-US" baseline="0" dirty="0" smtClean="0"/>
+              <a:t>Open until you see an index.html file.</a:t>
+            </a:r>
+          </a:p>
+          <a:p>
+            <a:pPr marL="228600" indent="-228600">
+              <a:buFont typeface="+mj-lt"/>
+              <a:buAutoNum type="arabicPeriod" startAt="9"/>
+            </a:pPr>
+            <a:r>
+              <a:rPr lang="en-US" baseline="0" dirty="0" smtClean="0"/>
+              <a:t>Open the index.html with a browser.</a:t>
+            </a:r>
+          </a:p>
+          <a:p>
+            <a:r>
+              <a:rPr lang="en-US" baseline="0" dirty="0" smtClean="0"/>
+              <a:t>You should see a table that will give you every file, showing you the coverage of your unit tests, Every time you run "grunt test" you can refresh the page to get the recent status.</a:t>
+            </a:r>
+            <a:endParaRPr lang="en-US" dirty="0" smtClean="0"/>
+          </a:p>
+          <a:p>
+            <a:endParaRPr lang="en-US" dirty="0" smtClean="0"/>
+          </a:p>
+          <a:p>
+            <a:r>
+              <a:rPr lang="en-US" u="sng" dirty="0" smtClean="0"/>
+              <a:t>b) Test a Service.</a:t>
+            </a:r>
+          </a:p>
+          <a:p>
+            <a:endParaRPr lang="en-US" dirty="0" smtClean="0"/>
+          </a:p>
+          <a:p>
+            <a:pPr marL="228600" indent="-228600">
+              <a:buFont typeface="+mj-lt"/>
+              <a:buAutoNum type="arabicPeriod"/>
+            </a:pPr>
+            <a:r>
+              <a:rPr lang="en-US" dirty="0" smtClean="0"/>
+              <a:t>Open/Create</a:t>
+            </a:r>
+            <a:r>
+              <a:rPr lang="en-US" baseline="0" dirty="0" smtClean="0"/>
+              <a:t> the "test/spec/services/apiservices.spec.js" and add:</a:t>
+            </a:r>
+          </a:p>
+          <a:p>
+            <a:endParaRPr lang="en-US" baseline="0" dirty="0" smtClean="0"/>
+          </a:p>
+          <a:p>
+            <a:pPr marL="0" marR="0" indent="0" algn="l" defTabSz="914400" rtl="0" eaLnBrk="1" fontAlgn="auto" latinLnBrk="0" hangingPunct="1">
+              <a:lnSpc>
+                <a:spcPct val="100000"/>
+              </a:lnSpc>
+              <a:spcBef>
+                <a:spcPts val="0"/>
+              </a:spcBef>
+              <a:spcAft>
+                <a:spcPts val="0"/>
+              </a:spcAft>
+              <a:buClrTx/>
+              <a:buSzTx/>
+              <a:buFontTx/>
+              <a:buNone/>
+              <a:tabLst/>
+              <a:defRPr/>
+            </a:pPr>
+            <a:r>
+              <a:rPr lang="en-US" dirty="0" smtClean="0"/>
+              <a:t>------------------------------------------------------------------------------------------------------------------------------------------------------</a:t>
+            </a:r>
+            <a:endParaRPr lang="en-US" baseline="0" dirty="0" smtClean="0"/>
+          </a:p>
+          <a:p>
+            <a:endParaRPr lang="en-US" baseline="0" dirty="0" smtClean="0"/>
+          </a:p>
+          <a:p>
+            <a:pPr lvl="2"/>
+            <a:r>
+              <a:rPr lang="en-US" dirty="0" smtClean="0"/>
+              <a:t>'use strict';</a:t>
+            </a:r>
+          </a:p>
+          <a:p>
+            <a:pPr lvl="2"/>
+            <a:endParaRPr lang="en-US" dirty="0" smtClean="0"/>
+          </a:p>
+          <a:p>
+            <a:pPr lvl="2"/>
+            <a:r>
+              <a:rPr lang="en-US" dirty="0" smtClean="0"/>
+              <a:t>describe('Service: </a:t>
+            </a:r>
+            <a:r>
+              <a:rPr lang="en-US" dirty="0" err="1" smtClean="0"/>
+              <a:t>apiService</a:t>
+            </a:r>
+            <a:r>
+              <a:rPr lang="en-US" dirty="0" smtClean="0"/>
+              <a:t>', function () {</a:t>
+            </a:r>
+          </a:p>
+          <a:p>
+            <a:pPr lvl="2"/>
+            <a:r>
+              <a:rPr lang="en-US" dirty="0" smtClean="0"/>
+              <a:t>  </a:t>
+            </a:r>
+            <a:r>
+              <a:rPr lang="en-US" dirty="0" err="1" smtClean="0"/>
+              <a:t>var</a:t>
+            </a:r>
+            <a:r>
+              <a:rPr lang="en-US" dirty="0" smtClean="0"/>
+              <a:t> $</a:t>
+            </a:r>
+            <a:r>
+              <a:rPr lang="en-US" dirty="0" err="1" smtClean="0"/>
+              <a:t>httpBackend</a:t>
+            </a:r>
+            <a:r>
+              <a:rPr lang="en-US" dirty="0" smtClean="0"/>
+              <a:t>, $timeout;</a:t>
+            </a:r>
+          </a:p>
+          <a:p>
+            <a:pPr lvl="2"/>
+            <a:endParaRPr lang="en-US" dirty="0" smtClean="0"/>
+          </a:p>
+          <a:p>
+            <a:pPr lvl="2"/>
+            <a:r>
+              <a:rPr lang="en-US" dirty="0" smtClean="0"/>
+              <a:t>  // load the service's module</a:t>
+            </a:r>
+          </a:p>
+          <a:p>
+            <a:pPr lvl="2"/>
+            <a:r>
+              <a:rPr lang="en-US" dirty="0" smtClean="0"/>
+              <a:t>  </a:t>
+            </a:r>
+            <a:r>
+              <a:rPr lang="en-US" dirty="0" err="1" smtClean="0"/>
+              <a:t>beforeEach</a:t>
+            </a:r>
+            <a:r>
+              <a:rPr lang="en-US" dirty="0" smtClean="0"/>
+              <a:t>(module('</a:t>
+            </a:r>
+            <a:r>
+              <a:rPr lang="en-US" dirty="0" err="1" smtClean="0"/>
+              <a:t>practiceBApp</a:t>
+            </a:r>
+            <a:r>
+              <a:rPr lang="en-US" dirty="0" smtClean="0"/>
+              <a:t>'));</a:t>
+            </a:r>
+          </a:p>
+          <a:p>
+            <a:pPr lvl="2"/>
+            <a:endParaRPr lang="en-US" dirty="0" smtClean="0"/>
+          </a:p>
+          <a:p>
+            <a:pPr lvl="2"/>
+            <a:r>
+              <a:rPr lang="en-US" dirty="0" smtClean="0"/>
+              <a:t>  </a:t>
+            </a:r>
+            <a:r>
+              <a:rPr lang="en-US" dirty="0" err="1" smtClean="0"/>
+              <a:t>beforeEach</a:t>
+            </a:r>
+            <a:r>
+              <a:rPr lang="en-US" dirty="0" smtClean="0"/>
+              <a:t>(function () {</a:t>
+            </a:r>
+          </a:p>
+          <a:p>
+            <a:pPr lvl="2"/>
+            <a:r>
+              <a:rPr lang="en-US" dirty="0" smtClean="0"/>
+              <a:t>    </a:t>
+            </a:r>
+            <a:r>
+              <a:rPr lang="en-US" dirty="0" err="1" smtClean="0"/>
+              <a:t>angular.mock.inject</a:t>
+            </a:r>
+            <a:r>
+              <a:rPr lang="en-US" dirty="0" smtClean="0"/>
+              <a:t>(function ($injector) {</a:t>
+            </a:r>
+          </a:p>
+          <a:p>
+            <a:pPr lvl="2"/>
+            <a:r>
+              <a:rPr lang="en-US" dirty="0" smtClean="0"/>
+              <a:t>      $</a:t>
+            </a:r>
+            <a:r>
+              <a:rPr lang="en-US" dirty="0" err="1" smtClean="0"/>
+              <a:t>httpBackend</a:t>
+            </a:r>
+            <a:r>
+              <a:rPr lang="en-US" dirty="0" smtClean="0"/>
+              <a:t> = $</a:t>
+            </a:r>
+            <a:r>
+              <a:rPr lang="en-US" dirty="0" err="1" smtClean="0"/>
+              <a:t>injector.get</a:t>
+            </a:r>
+            <a:r>
+              <a:rPr lang="en-US" dirty="0" smtClean="0"/>
+              <a:t>('$</a:t>
+            </a:r>
+            <a:r>
+              <a:rPr lang="en-US" dirty="0" err="1" smtClean="0"/>
+              <a:t>httpBackend</a:t>
+            </a:r>
+            <a:r>
+              <a:rPr lang="en-US" dirty="0" smtClean="0"/>
+              <a:t>');</a:t>
+            </a:r>
+          </a:p>
+          <a:p>
+            <a:pPr lvl="2"/>
+            <a:r>
+              <a:rPr lang="en-US" dirty="0" smtClean="0"/>
+              <a:t>      $</a:t>
+            </a:r>
+            <a:r>
+              <a:rPr lang="en-US" dirty="0" err="1" smtClean="0"/>
+              <a:t>httpBackend.whenGET</a:t>
+            </a:r>
+            <a:r>
+              <a:rPr lang="en-US" dirty="0" smtClean="0"/>
+              <a:t>(/views.*/).respond(200, '');</a:t>
+            </a:r>
+          </a:p>
+          <a:p>
+            <a:pPr lvl="2"/>
+            <a:r>
+              <a:rPr lang="en-US" dirty="0" smtClean="0"/>
+              <a:t>    })</a:t>
+            </a:r>
+          </a:p>
+          <a:p>
+            <a:pPr lvl="2"/>
+            <a:r>
+              <a:rPr lang="en-US" dirty="0" smtClean="0"/>
+              <a:t>  });</a:t>
+            </a:r>
+          </a:p>
+          <a:p>
+            <a:pPr lvl="2"/>
+            <a:endParaRPr lang="en-US" dirty="0" smtClean="0"/>
+          </a:p>
+          <a:p>
+            <a:pPr lvl="2"/>
+            <a:r>
+              <a:rPr lang="en-US" dirty="0" smtClean="0"/>
+              <a:t>  // instantiate service</a:t>
+            </a:r>
+          </a:p>
+          <a:p>
+            <a:pPr lvl="2"/>
+            <a:r>
+              <a:rPr lang="en-US" dirty="0" smtClean="0"/>
+              <a:t>  </a:t>
+            </a:r>
+            <a:r>
+              <a:rPr lang="en-US" dirty="0" err="1" smtClean="0"/>
+              <a:t>var</a:t>
+            </a:r>
+            <a:r>
+              <a:rPr lang="en-US" dirty="0" smtClean="0"/>
+              <a:t> </a:t>
+            </a:r>
+            <a:r>
+              <a:rPr lang="en-US" dirty="0" err="1" smtClean="0"/>
+              <a:t>apiService</a:t>
+            </a:r>
+            <a:r>
+              <a:rPr lang="en-US" dirty="0" smtClean="0"/>
+              <a:t>;</a:t>
+            </a:r>
+          </a:p>
+          <a:p>
+            <a:pPr lvl="2"/>
+            <a:r>
+              <a:rPr lang="en-US" dirty="0" smtClean="0"/>
+              <a:t>  </a:t>
+            </a:r>
+            <a:r>
+              <a:rPr lang="en-US" dirty="0" err="1" smtClean="0"/>
+              <a:t>beforeEach</a:t>
+            </a:r>
+            <a:r>
+              <a:rPr lang="en-US" dirty="0" smtClean="0"/>
+              <a:t>(inject(function (_$timeout_, _</a:t>
+            </a:r>
+            <a:r>
+              <a:rPr lang="en-US" dirty="0" err="1" smtClean="0"/>
+              <a:t>apiService</a:t>
+            </a:r>
+            <a:r>
+              <a:rPr lang="en-US" dirty="0" smtClean="0"/>
+              <a:t>_) {</a:t>
+            </a:r>
+          </a:p>
+          <a:p>
+            <a:pPr lvl="2"/>
+            <a:r>
+              <a:rPr lang="en-US" dirty="0" smtClean="0"/>
+              <a:t>    $timeout = _$timeout_;</a:t>
+            </a:r>
+          </a:p>
+          <a:p>
+            <a:pPr lvl="2"/>
+            <a:r>
+              <a:rPr lang="en-US" dirty="0" smtClean="0"/>
+              <a:t>    </a:t>
+            </a:r>
+            <a:r>
+              <a:rPr lang="en-US" dirty="0" err="1" smtClean="0"/>
+              <a:t>apiService</a:t>
+            </a:r>
+            <a:r>
+              <a:rPr lang="en-US" dirty="0" smtClean="0"/>
+              <a:t> = _</a:t>
+            </a:r>
+            <a:r>
+              <a:rPr lang="en-US" dirty="0" err="1" smtClean="0"/>
+              <a:t>apiService</a:t>
+            </a:r>
+            <a:r>
+              <a:rPr lang="en-US" dirty="0" smtClean="0"/>
+              <a:t>_;</a:t>
+            </a:r>
+          </a:p>
+          <a:p>
+            <a:pPr lvl="2"/>
+            <a:r>
+              <a:rPr lang="en-US" dirty="0" smtClean="0"/>
+              <a:t>  }));</a:t>
+            </a:r>
+          </a:p>
+          <a:p>
+            <a:pPr lvl="2"/>
+            <a:endParaRPr lang="en-US" dirty="0" smtClean="0"/>
+          </a:p>
+          <a:p>
+            <a:pPr lvl="2"/>
+            <a:r>
+              <a:rPr lang="en-US" dirty="0" smtClean="0"/>
+              <a:t>  it('should do something', function () {</a:t>
+            </a:r>
+          </a:p>
+          <a:p>
+            <a:pPr lvl="2"/>
+            <a:r>
+              <a:rPr lang="en-US" dirty="0" smtClean="0"/>
+              <a:t>    expect(!!</a:t>
+            </a:r>
+            <a:r>
+              <a:rPr lang="en-US" dirty="0" err="1" smtClean="0"/>
+              <a:t>apiService</a:t>
+            </a:r>
+            <a:r>
+              <a:rPr lang="en-US" dirty="0" smtClean="0"/>
+              <a:t>).</a:t>
+            </a:r>
+            <a:r>
+              <a:rPr lang="en-US" dirty="0" err="1" smtClean="0"/>
+              <a:t>toBe</a:t>
+            </a:r>
+            <a:r>
+              <a:rPr lang="en-US" dirty="0" smtClean="0"/>
+              <a:t>(true);</a:t>
+            </a:r>
+          </a:p>
+          <a:p>
+            <a:pPr lvl="2"/>
+            <a:r>
+              <a:rPr lang="en-US" dirty="0" smtClean="0"/>
+              <a:t>  });</a:t>
+            </a:r>
+          </a:p>
+          <a:p>
+            <a:pPr lvl="2"/>
+            <a:endParaRPr lang="en-US" dirty="0" smtClean="0"/>
+          </a:p>
+          <a:p>
+            <a:pPr lvl="2"/>
+            <a:r>
+              <a:rPr lang="en-US" dirty="0" smtClean="0"/>
+              <a:t>  describe('get', function () {</a:t>
+            </a:r>
+          </a:p>
+          <a:p>
+            <a:pPr lvl="2"/>
+            <a:r>
+              <a:rPr lang="en-US" dirty="0" smtClean="0"/>
+              <a:t>    it('should call </a:t>
+            </a:r>
+            <a:r>
+              <a:rPr lang="en-US" dirty="0" err="1" smtClean="0"/>
+              <a:t>getUser</a:t>
+            </a:r>
+            <a:r>
+              <a:rPr lang="en-US" dirty="0" smtClean="0"/>
+              <a:t> with username', inject(function () {</a:t>
+            </a:r>
+          </a:p>
+          <a:p>
+            <a:pPr lvl="2"/>
+            <a:r>
+              <a:rPr lang="en-US" dirty="0" smtClean="0"/>
+              <a:t>      $</a:t>
+            </a:r>
+            <a:r>
+              <a:rPr lang="en-US" dirty="0" err="1" smtClean="0"/>
+              <a:t>httpBackend.whenGET</a:t>
+            </a:r>
+            <a:r>
+              <a:rPr lang="en-US" dirty="0" smtClean="0"/>
+              <a:t>('http://127.0.0.1:8084/users').respond({</a:t>
+            </a:r>
+          </a:p>
+          <a:p>
+            <a:pPr lvl="2"/>
+            <a:r>
+              <a:rPr lang="en-US" dirty="0" smtClean="0"/>
+              <a:t>        data: 'test'</a:t>
+            </a:r>
+          </a:p>
+          <a:p>
+            <a:pPr lvl="2"/>
+            <a:r>
+              <a:rPr lang="en-US" dirty="0" smtClean="0"/>
+              <a:t>      });</a:t>
+            </a:r>
+          </a:p>
+          <a:p>
+            <a:pPr lvl="2"/>
+            <a:endParaRPr lang="en-US" dirty="0" smtClean="0"/>
+          </a:p>
+          <a:p>
+            <a:pPr lvl="2"/>
+            <a:r>
+              <a:rPr lang="en-US" dirty="0" smtClean="0"/>
+              <a:t>      </a:t>
+            </a:r>
+            <a:r>
+              <a:rPr lang="en-US" dirty="0" err="1" smtClean="0"/>
+              <a:t>var</a:t>
+            </a:r>
+            <a:r>
+              <a:rPr lang="en-US" dirty="0" smtClean="0"/>
+              <a:t> result =</a:t>
+            </a:r>
+            <a:r>
+              <a:rPr lang="en-US" dirty="0" err="1" smtClean="0"/>
+              <a:t>apiService.get</a:t>
+            </a:r>
+            <a:r>
+              <a:rPr lang="en-US" dirty="0" smtClean="0"/>
+              <a:t>('users/', {});</a:t>
+            </a:r>
+          </a:p>
+          <a:p>
+            <a:pPr lvl="2"/>
+            <a:endParaRPr lang="en-US" dirty="0" smtClean="0"/>
+          </a:p>
+          <a:p>
+            <a:pPr lvl="2"/>
+            <a:r>
+              <a:rPr lang="en-US" dirty="0" smtClean="0"/>
+              <a:t>      $</a:t>
+            </a:r>
+            <a:r>
+              <a:rPr lang="en-US" dirty="0" err="1" smtClean="0"/>
+              <a:t>httpBackend.flush</a:t>
+            </a:r>
+            <a:r>
+              <a:rPr lang="en-US" dirty="0" smtClean="0"/>
+              <a:t>();</a:t>
+            </a:r>
+          </a:p>
+          <a:p>
+            <a:pPr lvl="2"/>
+            <a:endParaRPr lang="en-US" dirty="0" smtClean="0"/>
+          </a:p>
+          <a:p>
+            <a:pPr lvl="2"/>
+            <a:r>
+              <a:rPr lang="en-US" dirty="0" smtClean="0"/>
+              <a:t>      </a:t>
+            </a:r>
+            <a:r>
+              <a:rPr lang="en-US" dirty="0" err="1" smtClean="0"/>
+              <a:t>result.then</a:t>
+            </a:r>
+            <a:r>
+              <a:rPr lang="en-US" dirty="0" smtClean="0"/>
+              <a:t>(function(response){</a:t>
+            </a:r>
+          </a:p>
+          <a:p>
+            <a:pPr lvl="2"/>
+            <a:r>
+              <a:rPr lang="en-US" dirty="0" smtClean="0"/>
+              <a:t>        expect(</a:t>
+            </a:r>
+            <a:r>
+              <a:rPr lang="en-US" dirty="0" err="1" smtClean="0"/>
+              <a:t>response.data</a:t>
+            </a:r>
+            <a:r>
+              <a:rPr lang="en-US" dirty="0" smtClean="0"/>
+              <a:t>).</a:t>
+            </a:r>
+            <a:r>
+              <a:rPr lang="en-US" dirty="0" err="1" smtClean="0"/>
+              <a:t>toEqual</a:t>
+            </a:r>
+            <a:r>
+              <a:rPr lang="en-US" dirty="0" smtClean="0"/>
+              <a:t>('test');</a:t>
+            </a:r>
+          </a:p>
+          <a:p>
+            <a:pPr lvl="2"/>
+            <a:r>
+              <a:rPr lang="en-US" dirty="0" smtClean="0"/>
+              <a:t>      });</a:t>
+            </a:r>
+          </a:p>
+          <a:p>
+            <a:pPr lvl="2"/>
+            <a:r>
+              <a:rPr lang="en-US" dirty="0" smtClean="0"/>
+              <a:t>      </a:t>
+            </a:r>
+          </a:p>
+          <a:p>
+            <a:pPr lvl="2"/>
+            <a:r>
+              <a:rPr lang="en-US" dirty="0" smtClean="0"/>
+              <a:t>    }));</a:t>
+            </a:r>
+          </a:p>
+          <a:p>
+            <a:pPr lvl="2"/>
+            <a:endParaRPr lang="en-US" dirty="0" smtClean="0"/>
+          </a:p>
+          <a:p>
+            <a:pPr lvl="2"/>
+            <a:r>
+              <a:rPr lang="en-US" dirty="0" smtClean="0"/>
+              <a:t>  });</a:t>
+            </a:r>
+          </a:p>
+          <a:p>
+            <a:pPr lvl="2"/>
+            <a:r>
+              <a:rPr lang="en-US" dirty="0" smtClean="0"/>
+              <a:t>  </a:t>
+            </a:r>
+          </a:p>
+          <a:p>
+            <a:pPr lvl="2"/>
+            <a:r>
+              <a:rPr lang="en-US" dirty="0" smtClean="0"/>
+              <a:t>  describe('wait', function () {</a:t>
+            </a:r>
+          </a:p>
+          <a:p>
+            <a:pPr lvl="2"/>
+            <a:r>
+              <a:rPr lang="en-US" dirty="0" smtClean="0"/>
+              <a:t>    it('should call </a:t>
+            </a:r>
+            <a:r>
+              <a:rPr lang="en-US" dirty="0" err="1" smtClean="0"/>
+              <a:t>getUser</a:t>
+            </a:r>
+            <a:r>
+              <a:rPr lang="en-US" dirty="0" smtClean="0"/>
+              <a:t> with username', inject(function () {</a:t>
+            </a:r>
+          </a:p>
+          <a:p>
+            <a:pPr lvl="2"/>
+            <a:r>
+              <a:rPr lang="en-US" dirty="0" smtClean="0"/>
+              <a:t>      </a:t>
+            </a:r>
+            <a:r>
+              <a:rPr lang="en-US" dirty="0" err="1" smtClean="0"/>
+              <a:t>var</a:t>
+            </a:r>
+            <a:r>
+              <a:rPr lang="en-US" dirty="0" smtClean="0"/>
+              <a:t> result =</a:t>
+            </a:r>
+            <a:r>
+              <a:rPr lang="en-US" dirty="0" err="1" smtClean="0"/>
+              <a:t>apiService.wait</a:t>
+            </a:r>
+            <a:r>
+              <a:rPr lang="en-US" dirty="0" smtClean="0"/>
+              <a:t>(1000);</a:t>
+            </a:r>
+          </a:p>
+          <a:p>
+            <a:pPr lvl="2"/>
+            <a:endParaRPr lang="en-US" dirty="0" smtClean="0"/>
+          </a:p>
+          <a:p>
+            <a:pPr lvl="2"/>
+            <a:r>
+              <a:rPr lang="en-US" dirty="0" smtClean="0"/>
+              <a:t>      $</a:t>
+            </a:r>
+            <a:r>
+              <a:rPr lang="en-US" dirty="0" err="1" smtClean="0"/>
+              <a:t>timeout.flush</a:t>
+            </a:r>
+            <a:r>
+              <a:rPr lang="en-US" dirty="0" smtClean="0"/>
+              <a:t>();</a:t>
+            </a:r>
+          </a:p>
+          <a:p>
+            <a:pPr lvl="2"/>
+            <a:endParaRPr lang="en-US" dirty="0" smtClean="0"/>
+          </a:p>
+          <a:p>
+            <a:pPr lvl="2"/>
+            <a:r>
+              <a:rPr lang="en-US" dirty="0" smtClean="0"/>
+              <a:t>      </a:t>
+            </a:r>
+            <a:r>
+              <a:rPr lang="en-US" dirty="0" err="1" smtClean="0"/>
+              <a:t>result.then</a:t>
+            </a:r>
+            <a:r>
+              <a:rPr lang="en-US" dirty="0" smtClean="0"/>
+              <a:t>(function(response){</a:t>
+            </a:r>
+          </a:p>
+          <a:p>
+            <a:pPr lvl="2"/>
+            <a:r>
+              <a:rPr lang="en-US" dirty="0" smtClean="0"/>
+              <a:t>        expect(response).</a:t>
+            </a:r>
+            <a:r>
+              <a:rPr lang="en-US" dirty="0" err="1" smtClean="0"/>
+              <a:t>toEqual</a:t>
+            </a:r>
+            <a:r>
+              <a:rPr lang="en-US" dirty="0" smtClean="0"/>
+              <a:t>('variable to be returned');</a:t>
+            </a:r>
+          </a:p>
+          <a:p>
+            <a:pPr lvl="2"/>
+            <a:r>
+              <a:rPr lang="en-US" dirty="0" smtClean="0"/>
+              <a:t>      });</a:t>
+            </a:r>
+          </a:p>
+          <a:p>
+            <a:pPr lvl="2"/>
+            <a:endParaRPr lang="en-US" dirty="0" smtClean="0"/>
+          </a:p>
+          <a:p>
+            <a:pPr lvl="2"/>
+            <a:r>
+              <a:rPr lang="en-US" dirty="0" smtClean="0"/>
+              <a:t>    }));</a:t>
+            </a:r>
+          </a:p>
+          <a:p>
+            <a:pPr lvl="2"/>
+            <a:endParaRPr lang="en-US" dirty="0" smtClean="0"/>
+          </a:p>
+          <a:p>
+            <a:pPr lvl="2"/>
+            <a:r>
+              <a:rPr lang="en-US" dirty="0" smtClean="0"/>
+              <a:t>  });</a:t>
+            </a:r>
+          </a:p>
+          <a:p>
+            <a:pPr lvl="2"/>
+            <a:endParaRPr lang="en-US" dirty="0" smtClean="0"/>
+          </a:p>
+          <a:p>
+            <a:pPr lvl="2"/>
+            <a:r>
+              <a:rPr lang="en-US" dirty="0" smtClean="0"/>
+              <a:t>});</a:t>
+            </a:r>
+          </a:p>
+          <a:p>
+            <a:pPr lvl="2"/>
+            <a:endParaRPr lang="en-US" dirty="0" smtClean="0"/>
+          </a:p>
+          <a:p>
+            <a:pPr marL="0" marR="0" lvl="0" indent="0" algn="l" defTabSz="914400" rtl="0" eaLnBrk="1" fontAlgn="auto" latinLnBrk="0" hangingPunct="1">
+              <a:lnSpc>
+                <a:spcPct val="100000"/>
+              </a:lnSpc>
+              <a:spcBef>
+                <a:spcPts val="0"/>
+              </a:spcBef>
+              <a:spcAft>
+                <a:spcPts val="0"/>
+              </a:spcAft>
+              <a:buClrTx/>
+              <a:buSzTx/>
+              <a:buFontTx/>
+              <a:buNone/>
+              <a:tabLst/>
+              <a:defRPr/>
+            </a:pPr>
+            <a:r>
+              <a:rPr lang="en-US" dirty="0" smtClean="0"/>
+              <a:t>------------------------------------------------------------------------------------------------------------------------------------------------------</a:t>
+            </a:r>
+          </a:p>
+          <a:p>
+            <a:pPr marL="0" marR="0" lvl="0" indent="0" algn="l" defTabSz="914400" rtl="0" eaLnBrk="1" fontAlgn="auto" latinLnBrk="0" hangingPunct="1">
+              <a:lnSpc>
+                <a:spcPct val="100000"/>
+              </a:lnSpc>
+              <a:spcBef>
+                <a:spcPts val="0"/>
+              </a:spcBef>
+              <a:spcAft>
+                <a:spcPts val="0"/>
+              </a:spcAft>
+              <a:buClrTx/>
+              <a:buSzTx/>
+              <a:buFontTx/>
+              <a:buNone/>
+              <a:tabLst/>
+              <a:defRPr/>
+            </a:pPr>
+            <a:r>
+              <a:rPr lang="en-US" dirty="0" smtClean="0"/>
+              <a:t>When you</a:t>
+            </a:r>
+            <a:r>
+              <a:rPr lang="en-US" baseline="0" dirty="0" smtClean="0"/>
+              <a:t> use the $resource you'll need to mock the $</a:t>
+            </a:r>
+            <a:r>
+              <a:rPr lang="en-US" baseline="0" dirty="0" err="1" smtClean="0"/>
+              <a:t>httpBackend</a:t>
+            </a:r>
+            <a:r>
+              <a:rPr lang="en-US" baseline="0" dirty="0" smtClean="0"/>
+              <a:t> and to do that you use the </a:t>
+            </a:r>
+            <a:r>
+              <a:rPr lang="en-US" baseline="0" dirty="0" err="1" smtClean="0"/>
+              <a:t>whenGET</a:t>
+            </a:r>
+            <a:r>
+              <a:rPr lang="en-US" baseline="0" dirty="0" smtClean="0"/>
+              <a:t>, </a:t>
+            </a:r>
+            <a:r>
+              <a:rPr lang="en-US" baseline="0" dirty="0" err="1" smtClean="0"/>
+              <a:t>whenPOST</a:t>
+            </a:r>
+            <a:r>
+              <a:rPr lang="en-US" baseline="0" dirty="0" smtClean="0"/>
+              <a:t>, etc. With that, you can customize the responses, and test properly your application.</a:t>
+            </a:r>
+          </a:p>
+          <a:p>
+            <a:pPr marL="0" marR="0" lvl="0" indent="0" algn="l" defTabSz="914400" rtl="0" eaLnBrk="1" fontAlgn="auto" latinLnBrk="0" hangingPunct="1">
+              <a:lnSpc>
+                <a:spcPct val="100000"/>
+              </a:lnSpc>
+              <a:spcBef>
+                <a:spcPts val="0"/>
+              </a:spcBef>
+              <a:spcAft>
+                <a:spcPts val="0"/>
+              </a:spcAft>
+              <a:buClrTx/>
+              <a:buSzTx/>
+              <a:buFontTx/>
+              <a:buNone/>
+              <a:tabLst/>
+              <a:defRPr/>
+            </a:pPr>
+            <a:r>
+              <a:rPr lang="en-US" baseline="0" dirty="0" smtClean="0"/>
+              <a:t>The $</a:t>
+            </a:r>
+            <a:r>
+              <a:rPr lang="en-US" baseline="0" dirty="0" err="1" smtClean="0"/>
+              <a:t>httpBackend</a:t>
+            </a:r>
+            <a:r>
+              <a:rPr lang="en-US" baseline="0" dirty="0" smtClean="0"/>
+              <a:t> and the $timeout have the flush function that will terminate the waiting.</a:t>
+            </a:r>
+          </a:p>
+          <a:p>
+            <a:pPr marL="0" marR="0" lvl="0" indent="0" algn="l" defTabSz="914400" rtl="0" eaLnBrk="1" fontAlgn="auto" latinLnBrk="0" hangingPunct="1">
+              <a:lnSpc>
+                <a:spcPct val="100000"/>
+              </a:lnSpc>
+              <a:spcBef>
+                <a:spcPts val="0"/>
+              </a:spcBef>
+              <a:spcAft>
+                <a:spcPts val="0"/>
+              </a:spcAft>
+              <a:buClrTx/>
+              <a:buSzTx/>
+              <a:buFontTx/>
+              <a:buNone/>
+              <a:tabLst/>
+              <a:defRPr/>
+            </a:pPr>
+            <a:r>
+              <a:rPr lang="en-US" baseline="0" dirty="0" smtClean="0"/>
+              <a:t>You can add "describe" and "it" as you want to keep your tests organized.</a:t>
+            </a:r>
+          </a:p>
+          <a:p>
+            <a:pPr marL="0" marR="0" lvl="0" indent="0" algn="l" defTabSz="914400" rtl="0" eaLnBrk="1" fontAlgn="auto" latinLnBrk="0" hangingPunct="1">
+              <a:lnSpc>
+                <a:spcPct val="100000"/>
+              </a:lnSpc>
+              <a:spcBef>
+                <a:spcPts val="0"/>
+              </a:spcBef>
+              <a:spcAft>
+                <a:spcPts val="0"/>
+              </a:spcAft>
+              <a:buClrTx/>
+              <a:buSzTx/>
+              <a:buFontTx/>
+              <a:buNone/>
+              <a:tabLst/>
+              <a:defRPr/>
+            </a:pPr>
+            <a:r>
+              <a:rPr lang="en-US" baseline="0" dirty="0" smtClean="0"/>
+              <a:t>The "</a:t>
+            </a:r>
+            <a:r>
+              <a:rPr lang="en-US" baseline="0" dirty="0" err="1" smtClean="0"/>
+              <a:t>beforeEach</a:t>
+            </a:r>
+            <a:r>
+              <a:rPr lang="en-US" baseline="0" dirty="0" smtClean="0"/>
+              <a:t>", is a way to execute code before every "it" at the level of a "describe", you can group with "describe" to make a "</a:t>
+            </a:r>
+            <a:r>
+              <a:rPr lang="en-US" baseline="0" dirty="0" err="1" smtClean="0"/>
+              <a:t>beforeEach</a:t>
+            </a:r>
+            <a:r>
+              <a:rPr lang="en-US" baseline="0" dirty="0" smtClean="0"/>
+              <a:t>" different from a bunch of "it".</a:t>
+            </a:r>
+          </a:p>
+          <a:p>
+            <a:pPr marL="0" marR="0" lvl="0" indent="0" algn="l" defTabSz="914400" rtl="0" eaLnBrk="1" fontAlgn="auto" latinLnBrk="0" hangingPunct="1">
+              <a:lnSpc>
+                <a:spcPct val="100000"/>
+              </a:lnSpc>
+              <a:spcBef>
+                <a:spcPts val="0"/>
+              </a:spcBef>
+              <a:spcAft>
+                <a:spcPts val="0"/>
+              </a:spcAft>
+              <a:buClrTx/>
+              <a:buSzTx/>
+              <a:buFontTx/>
+              <a:buNone/>
+              <a:tabLst/>
+              <a:defRPr/>
+            </a:pPr>
+            <a:r>
+              <a:rPr lang="en-US" baseline="0" dirty="0" smtClean="0"/>
+              <a:t>IMPORTANT: a </a:t>
+            </a:r>
+            <a:r>
+              <a:rPr lang="en-US" baseline="0" dirty="0" err="1" smtClean="0"/>
+              <a:t>beforeEach</a:t>
+            </a:r>
+            <a:r>
+              <a:rPr lang="en-US" baseline="0" dirty="0" smtClean="0"/>
+              <a:t> inside a </a:t>
+            </a:r>
+            <a:r>
+              <a:rPr lang="en-US" baseline="0" dirty="0" err="1" smtClean="0"/>
+              <a:t>beforeEach</a:t>
+            </a:r>
+            <a:r>
+              <a:rPr lang="en-US" baseline="0" dirty="0" smtClean="0"/>
+              <a:t> could broke your tests.</a:t>
+            </a:r>
+          </a:p>
+          <a:p>
+            <a:pPr marL="0" marR="0" lvl="0" indent="0" algn="l" defTabSz="914400" rtl="0" eaLnBrk="1" fontAlgn="auto" latinLnBrk="0" hangingPunct="1">
+              <a:lnSpc>
+                <a:spcPct val="100000"/>
+              </a:lnSpc>
+              <a:spcBef>
+                <a:spcPts val="0"/>
+              </a:spcBef>
+              <a:spcAft>
+                <a:spcPts val="0"/>
+              </a:spcAft>
+              <a:buClrTx/>
+              <a:buSzTx/>
+              <a:buFontTx/>
+              <a:buNone/>
+              <a:tabLst/>
+              <a:defRPr/>
+            </a:pPr>
+            <a:endParaRPr lang="en-US" baseline="0" dirty="0" smtClean="0"/>
+          </a:p>
+          <a:p>
+            <a:pPr marL="228600" marR="0" lvl="0" indent="-228600" algn="l" defTabSz="914400" rtl="0" eaLnBrk="1" fontAlgn="auto" latinLnBrk="0" hangingPunct="1">
+              <a:lnSpc>
+                <a:spcPct val="100000"/>
+              </a:lnSpc>
+              <a:spcBef>
+                <a:spcPts val="0"/>
+              </a:spcBef>
+              <a:spcAft>
+                <a:spcPts val="0"/>
+              </a:spcAft>
+              <a:buClrTx/>
+              <a:buSzTx/>
+              <a:buFont typeface="+mj-lt"/>
+              <a:buAutoNum type="arabicPeriod" startAt="2"/>
+              <a:tabLst/>
+              <a:defRPr/>
+            </a:pPr>
+            <a:r>
+              <a:rPr lang="en-US" baseline="0" dirty="0" smtClean="0"/>
+              <a:t>Run "grunt test".</a:t>
+            </a:r>
+          </a:p>
+          <a:p>
+            <a:pPr marL="228600" marR="0" lvl="0" indent="-228600" algn="l" defTabSz="914400" rtl="0" eaLnBrk="1" fontAlgn="auto" latinLnBrk="0" hangingPunct="1">
+              <a:lnSpc>
+                <a:spcPct val="100000"/>
+              </a:lnSpc>
+              <a:spcBef>
+                <a:spcPts val="0"/>
+              </a:spcBef>
+              <a:spcAft>
+                <a:spcPts val="0"/>
+              </a:spcAft>
+              <a:buClrTx/>
+              <a:buSzTx/>
+              <a:buFont typeface="+mj-lt"/>
+              <a:buAutoNum type="arabicPeriod" startAt="2"/>
+              <a:tabLst/>
+              <a:defRPr/>
+            </a:pPr>
+            <a:r>
+              <a:rPr lang="en-US" baseline="0" dirty="0" smtClean="0"/>
+              <a:t>Checkout the coverage, as you can see you get an almost 100% coverage, except for testing a private variables and functions, so you should keep this in mind, you don't need to public every thing you do for unit testing coverage.</a:t>
+            </a:r>
+            <a:endParaRPr lang="en-US" dirty="0" smtClean="0"/>
+          </a:p>
+          <a:p>
+            <a:endParaRPr lang="en-US" dirty="0" smtClean="0"/>
+          </a:p>
+          <a:p>
+            <a:r>
+              <a:rPr lang="en-US" u="sng" dirty="0" smtClean="0"/>
+              <a:t>c)</a:t>
+            </a:r>
+            <a:r>
+              <a:rPr lang="en-US" u="sng" baseline="0" dirty="0" smtClean="0"/>
+              <a:t> </a:t>
+            </a:r>
+            <a:r>
+              <a:rPr lang="en-US" u="sng" dirty="0" smtClean="0"/>
+              <a:t>Test a Controller.</a:t>
+            </a:r>
+          </a:p>
+          <a:p>
+            <a:endParaRPr lang="en-US" dirty="0" smtClean="0"/>
+          </a:p>
+          <a:p>
+            <a:pPr marL="228600" marR="0" indent="-228600" algn="l" defTabSz="914400" rtl="0" eaLnBrk="1" fontAlgn="auto" latinLnBrk="0" hangingPunct="1">
+              <a:lnSpc>
+                <a:spcPct val="100000"/>
+              </a:lnSpc>
+              <a:spcBef>
+                <a:spcPts val="0"/>
+              </a:spcBef>
+              <a:spcAft>
+                <a:spcPts val="0"/>
+              </a:spcAft>
+              <a:buClrTx/>
+              <a:buSzTx/>
+              <a:buFont typeface="+mj-lt"/>
+              <a:buAutoNum type="arabicPeriod"/>
+              <a:tabLst/>
+              <a:defRPr/>
+            </a:pPr>
+            <a:r>
+              <a:rPr lang="en-US" dirty="0" smtClean="0"/>
+              <a:t>Open/Create</a:t>
+            </a:r>
+            <a:r>
+              <a:rPr lang="en-US" baseline="0" dirty="0" smtClean="0"/>
+              <a:t> the "</a:t>
+            </a:r>
+            <a:r>
+              <a:rPr lang="en-US" u="none" baseline="0" dirty="0" smtClean="0"/>
+              <a:t>test/spec/controllers/about.spec.js</a:t>
+            </a:r>
+            <a:r>
+              <a:rPr lang="en-US" baseline="0" dirty="0" smtClean="0"/>
+              <a:t>" and add:</a:t>
+            </a:r>
+          </a:p>
+          <a:p>
+            <a:pPr marL="0" marR="0" indent="0" algn="l" defTabSz="914400" rtl="0" eaLnBrk="1" fontAlgn="auto" latinLnBrk="0" hangingPunct="1">
+              <a:lnSpc>
+                <a:spcPct val="100000"/>
+              </a:lnSpc>
+              <a:spcBef>
+                <a:spcPts val="0"/>
+              </a:spcBef>
+              <a:spcAft>
+                <a:spcPts val="0"/>
+              </a:spcAft>
+              <a:buClrTx/>
+              <a:buSzTx/>
+              <a:buFontTx/>
+              <a:buNone/>
+              <a:tabLst/>
+              <a:defRPr/>
+            </a:pPr>
+            <a:endParaRPr lang="en-US" dirty="0" smtClean="0"/>
+          </a:p>
+          <a:p>
+            <a:pPr marL="0" marR="0" lvl="0" indent="0" algn="l" defTabSz="914400" rtl="0" eaLnBrk="1" fontAlgn="auto" latinLnBrk="0" hangingPunct="1">
+              <a:lnSpc>
+                <a:spcPct val="100000"/>
+              </a:lnSpc>
+              <a:spcBef>
+                <a:spcPts val="0"/>
+              </a:spcBef>
+              <a:spcAft>
+                <a:spcPts val="0"/>
+              </a:spcAft>
+              <a:buClrTx/>
+              <a:buSzTx/>
+              <a:buFontTx/>
+              <a:buNone/>
+              <a:tabLst/>
+              <a:defRPr/>
+            </a:pPr>
+            <a:r>
+              <a:rPr lang="en-US" dirty="0" smtClean="0"/>
+              <a:t>------------------------------------------------------------------------------------------------------------------------------------------------------</a:t>
+            </a:r>
+          </a:p>
+          <a:p>
+            <a:pPr marL="0" marR="0" lvl="0" indent="0" algn="l" defTabSz="914400" rtl="0" eaLnBrk="1" fontAlgn="auto" latinLnBrk="0" hangingPunct="1">
+              <a:lnSpc>
+                <a:spcPct val="100000"/>
+              </a:lnSpc>
+              <a:spcBef>
+                <a:spcPts val="0"/>
+              </a:spcBef>
+              <a:spcAft>
+                <a:spcPts val="0"/>
+              </a:spcAft>
+              <a:buClrTx/>
+              <a:buSzTx/>
+              <a:buFontTx/>
+              <a:buNone/>
+              <a:tabLst/>
+              <a:defRPr/>
+            </a:pPr>
+            <a:endParaRPr lang="en-US" dirty="0" smtClean="0"/>
+          </a:p>
+          <a:p>
+            <a:pPr lvl="2"/>
+            <a:r>
+              <a:rPr lang="en-US" dirty="0" smtClean="0"/>
+              <a:t>'use strict';</a:t>
+            </a:r>
+          </a:p>
+          <a:p>
+            <a:pPr lvl="2"/>
+            <a:endParaRPr lang="en-US" dirty="0" smtClean="0"/>
+          </a:p>
+          <a:p>
+            <a:pPr lvl="2"/>
+            <a:r>
+              <a:rPr lang="en-US" dirty="0" smtClean="0"/>
+              <a:t>describe('Controller: </a:t>
+            </a:r>
+            <a:r>
+              <a:rPr lang="en-US" dirty="0" err="1" smtClean="0"/>
+              <a:t>AboutCtrl</a:t>
+            </a:r>
+            <a:r>
+              <a:rPr lang="en-US" dirty="0" smtClean="0"/>
+              <a:t>', function () {</a:t>
+            </a:r>
+          </a:p>
+          <a:p>
+            <a:pPr lvl="2"/>
+            <a:endParaRPr lang="en-US" dirty="0" smtClean="0"/>
+          </a:p>
+          <a:p>
+            <a:pPr lvl="2"/>
+            <a:r>
+              <a:rPr lang="en-US" dirty="0" smtClean="0"/>
+              <a:t>  </a:t>
+            </a:r>
+            <a:r>
+              <a:rPr lang="en-US" dirty="0" err="1" smtClean="0"/>
+              <a:t>var</a:t>
+            </a:r>
+            <a:r>
+              <a:rPr lang="en-US" dirty="0" smtClean="0"/>
+              <a:t> $</a:t>
+            </a:r>
+            <a:r>
+              <a:rPr lang="en-US" dirty="0" err="1" smtClean="0"/>
+              <a:t>httpBackend</a:t>
+            </a:r>
+            <a:r>
+              <a:rPr lang="en-US" dirty="0" smtClean="0"/>
+              <a:t>;</a:t>
+            </a:r>
+          </a:p>
+          <a:p>
+            <a:pPr lvl="2"/>
+            <a:r>
+              <a:rPr lang="en-US" dirty="0" smtClean="0"/>
+              <a:t>  // load the controller's module</a:t>
+            </a:r>
+          </a:p>
+          <a:p>
+            <a:pPr lvl="2"/>
+            <a:r>
+              <a:rPr lang="en-US" dirty="0" smtClean="0"/>
+              <a:t>  </a:t>
+            </a:r>
+            <a:r>
+              <a:rPr lang="en-US" dirty="0" err="1" smtClean="0"/>
+              <a:t>beforeEach</a:t>
+            </a:r>
+            <a:r>
+              <a:rPr lang="en-US" dirty="0" smtClean="0"/>
+              <a:t>(module('</a:t>
+            </a:r>
+            <a:r>
+              <a:rPr lang="en-US" dirty="0" err="1" smtClean="0"/>
+              <a:t>practiceBApp</a:t>
+            </a:r>
+            <a:r>
+              <a:rPr lang="en-US" dirty="0" smtClean="0"/>
+              <a:t>'));</a:t>
+            </a:r>
+          </a:p>
+          <a:p>
+            <a:pPr lvl="2"/>
+            <a:r>
+              <a:rPr lang="en-US" dirty="0" smtClean="0"/>
+              <a:t>  </a:t>
+            </a:r>
+          </a:p>
+          <a:p>
+            <a:pPr lvl="2"/>
+            <a:r>
+              <a:rPr lang="en-US" dirty="0" smtClean="0"/>
+              <a:t>  </a:t>
+            </a:r>
+            <a:r>
+              <a:rPr lang="en-US" dirty="0" err="1" smtClean="0"/>
+              <a:t>beforeEach</a:t>
+            </a:r>
+            <a:r>
+              <a:rPr lang="en-US" dirty="0" smtClean="0"/>
+              <a:t>(function() {</a:t>
+            </a:r>
+          </a:p>
+          <a:p>
+            <a:pPr lvl="2"/>
+            <a:r>
+              <a:rPr lang="en-US" dirty="0" smtClean="0"/>
+              <a:t>    module(function($provide) {</a:t>
+            </a:r>
+          </a:p>
+          <a:p>
+            <a:pPr lvl="2"/>
+            <a:r>
+              <a:rPr lang="en-US" dirty="0" smtClean="0"/>
+              <a:t>      $</a:t>
+            </a:r>
+            <a:r>
+              <a:rPr lang="en-US" dirty="0" err="1" smtClean="0"/>
+              <a:t>provide.service</a:t>
+            </a:r>
+            <a:r>
+              <a:rPr lang="en-US" dirty="0" smtClean="0"/>
+              <a:t>('wait', function() {</a:t>
+            </a:r>
+          </a:p>
+          <a:p>
+            <a:pPr lvl="2"/>
+            <a:r>
+              <a:rPr lang="en-US" dirty="0" smtClean="0"/>
+              <a:t>        return '1'</a:t>
+            </a:r>
+          </a:p>
+          <a:p>
+            <a:pPr lvl="2"/>
+            <a:r>
+              <a:rPr lang="en-US" dirty="0" smtClean="0"/>
+              <a:t>      });</a:t>
+            </a:r>
+          </a:p>
+          <a:p>
+            <a:pPr lvl="2"/>
+            <a:r>
+              <a:rPr lang="en-US" dirty="0" smtClean="0"/>
+              <a:t>    });</a:t>
+            </a:r>
+          </a:p>
+          <a:p>
+            <a:pPr lvl="2"/>
+            <a:r>
+              <a:rPr lang="en-US" dirty="0" smtClean="0"/>
+              <a:t>  });</a:t>
+            </a:r>
+          </a:p>
+          <a:p>
+            <a:pPr lvl="2"/>
+            <a:r>
+              <a:rPr lang="en-US" dirty="0" smtClean="0"/>
+              <a:t>  </a:t>
+            </a:r>
+          </a:p>
+          <a:p>
+            <a:pPr lvl="2"/>
+            <a:r>
+              <a:rPr lang="en-US" dirty="0" smtClean="0"/>
+              <a:t>  </a:t>
+            </a:r>
+            <a:r>
+              <a:rPr lang="en-US" dirty="0" err="1" smtClean="0"/>
+              <a:t>beforeEach</a:t>
+            </a:r>
+            <a:r>
+              <a:rPr lang="en-US" dirty="0" smtClean="0"/>
+              <a:t>(function () {</a:t>
+            </a:r>
+          </a:p>
+          <a:p>
+            <a:pPr lvl="2"/>
+            <a:r>
+              <a:rPr lang="en-US" dirty="0" smtClean="0"/>
+              <a:t>    </a:t>
+            </a:r>
+            <a:r>
+              <a:rPr lang="en-US" dirty="0" err="1" smtClean="0"/>
+              <a:t>angular.mock.inject</a:t>
+            </a:r>
+            <a:r>
+              <a:rPr lang="en-US" dirty="0" smtClean="0"/>
+              <a:t>(function ($injector) {</a:t>
+            </a:r>
+          </a:p>
+          <a:p>
+            <a:pPr lvl="2"/>
+            <a:r>
+              <a:rPr lang="en-US" dirty="0" smtClean="0"/>
+              <a:t>      $</a:t>
+            </a:r>
+            <a:r>
+              <a:rPr lang="en-US" dirty="0" err="1" smtClean="0"/>
+              <a:t>httpBackend</a:t>
+            </a:r>
+            <a:r>
+              <a:rPr lang="en-US" dirty="0" smtClean="0"/>
+              <a:t> = $</a:t>
+            </a:r>
+            <a:r>
+              <a:rPr lang="en-US" dirty="0" err="1" smtClean="0"/>
+              <a:t>injector.get</a:t>
+            </a:r>
+            <a:r>
+              <a:rPr lang="en-US" dirty="0" smtClean="0"/>
+              <a:t>('$</a:t>
+            </a:r>
+            <a:r>
+              <a:rPr lang="en-US" dirty="0" err="1" smtClean="0"/>
+              <a:t>httpBackend</a:t>
+            </a:r>
+            <a:r>
+              <a:rPr lang="en-US" dirty="0" smtClean="0"/>
+              <a:t>');</a:t>
+            </a:r>
+          </a:p>
+          <a:p>
+            <a:pPr lvl="2"/>
+            <a:r>
+              <a:rPr lang="en-US" dirty="0" smtClean="0"/>
+              <a:t>      $</a:t>
+            </a:r>
+            <a:r>
+              <a:rPr lang="en-US" dirty="0" err="1" smtClean="0"/>
+              <a:t>httpBackend.whenGET</a:t>
+            </a:r>
+            <a:r>
+              <a:rPr lang="en-US" dirty="0" smtClean="0"/>
+              <a:t>(/views.*/).respond(200, '');</a:t>
+            </a:r>
+          </a:p>
+          <a:p>
+            <a:pPr lvl="2"/>
+            <a:r>
+              <a:rPr lang="en-US" dirty="0" smtClean="0"/>
+              <a:t>    })</a:t>
+            </a:r>
+          </a:p>
+          <a:p>
+            <a:pPr lvl="2"/>
+            <a:r>
+              <a:rPr lang="en-US" dirty="0" smtClean="0"/>
+              <a:t>  });</a:t>
+            </a:r>
+          </a:p>
+          <a:p>
+            <a:pPr lvl="2"/>
+            <a:endParaRPr lang="en-US" dirty="0" smtClean="0"/>
+          </a:p>
+          <a:p>
+            <a:pPr lvl="2"/>
+            <a:r>
+              <a:rPr lang="en-US" dirty="0" smtClean="0"/>
+              <a:t>  </a:t>
+            </a:r>
+            <a:r>
+              <a:rPr lang="en-US" dirty="0" err="1" smtClean="0"/>
+              <a:t>var</a:t>
+            </a:r>
+            <a:r>
+              <a:rPr lang="en-US" dirty="0" smtClean="0"/>
+              <a:t> </a:t>
+            </a:r>
+            <a:r>
+              <a:rPr lang="en-US" dirty="0" err="1" smtClean="0"/>
+              <a:t>AboutCtrl</a:t>
+            </a:r>
+            <a:r>
+              <a:rPr lang="en-US" dirty="0" smtClean="0"/>
+              <a:t>,</a:t>
+            </a:r>
+          </a:p>
+          <a:p>
+            <a:pPr lvl="2"/>
+            <a:r>
+              <a:rPr lang="en-US" dirty="0" smtClean="0"/>
+              <a:t>      scope, $</a:t>
+            </a:r>
+            <a:r>
+              <a:rPr lang="en-US" dirty="0" err="1" smtClean="0"/>
+              <a:t>rootScope</a:t>
+            </a:r>
+            <a:r>
+              <a:rPr lang="en-US" dirty="0" smtClean="0"/>
+              <a:t>;</a:t>
+            </a:r>
+          </a:p>
+          <a:p>
+            <a:pPr lvl="2"/>
+            <a:endParaRPr lang="en-US" dirty="0" smtClean="0"/>
+          </a:p>
+          <a:p>
+            <a:pPr lvl="2"/>
+            <a:r>
+              <a:rPr lang="en-US" dirty="0" smtClean="0"/>
+              <a:t>  // Initialize the controller and a mock scope</a:t>
+            </a:r>
+          </a:p>
+          <a:p>
+            <a:pPr lvl="2"/>
+            <a:r>
+              <a:rPr lang="en-US" dirty="0" smtClean="0"/>
+              <a:t>  </a:t>
+            </a:r>
+            <a:r>
+              <a:rPr lang="en-US" dirty="0" err="1" smtClean="0"/>
+              <a:t>beforeEach</a:t>
+            </a:r>
+            <a:r>
+              <a:rPr lang="en-US" dirty="0" smtClean="0"/>
+              <a:t>(inject(function ($controller, _$</a:t>
+            </a:r>
+            <a:r>
+              <a:rPr lang="en-US" dirty="0" err="1" smtClean="0"/>
+              <a:t>rootScope</a:t>
+            </a:r>
+            <a:r>
+              <a:rPr lang="en-US" dirty="0" smtClean="0"/>
+              <a:t>_) {</a:t>
+            </a:r>
+          </a:p>
+          <a:p>
+            <a:pPr lvl="2"/>
+            <a:r>
+              <a:rPr lang="en-US" dirty="0" smtClean="0"/>
+              <a:t>    $</a:t>
+            </a:r>
+            <a:r>
+              <a:rPr lang="en-US" dirty="0" err="1" smtClean="0"/>
+              <a:t>rootScope</a:t>
+            </a:r>
+            <a:r>
+              <a:rPr lang="en-US" dirty="0" smtClean="0"/>
+              <a:t> = _$</a:t>
+            </a:r>
+            <a:r>
+              <a:rPr lang="en-US" dirty="0" err="1" smtClean="0"/>
+              <a:t>rootScope</a:t>
+            </a:r>
+            <a:r>
+              <a:rPr lang="en-US" dirty="0" smtClean="0"/>
+              <a:t>_;</a:t>
+            </a:r>
+          </a:p>
+          <a:p>
+            <a:pPr lvl="2"/>
+            <a:r>
+              <a:rPr lang="en-US" dirty="0" smtClean="0"/>
+              <a:t>    scope = $</a:t>
+            </a:r>
+            <a:r>
+              <a:rPr lang="en-US" dirty="0" err="1" smtClean="0"/>
+              <a:t>rootScope</a:t>
+            </a:r>
+            <a:r>
+              <a:rPr lang="en-US" dirty="0" smtClean="0"/>
+              <a:t>.$new();</a:t>
+            </a:r>
+          </a:p>
+          <a:p>
+            <a:pPr lvl="2"/>
+            <a:r>
+              <a:rPr lang="en-US" dirty="0" smtClean="0"/>
+              <a:t>    </a:t>
+            </a:r>
+            <a:r>
+              <a:rPr lang="en-US" dirty="0" err="1" smtClean="0"/>
+              <a:t>spyOn</a:t>
+            </a:r>
+            <a:r>
+              <a:rPr lang="en-US" dirty="0" smtClean="0"/>
+              <a:t>(</a:t>
+            </a:r>
+            <a:r>
+              <a:rPr lang="en-US" dirty="0" err="1" smtClean="0"/>
+              <a:t>scope,'$on</a:t>
+            </a:r>
+            <a:r>
+              <a:rPr lang="en-US" dirty="0" smtClean="0"/>
+              <a:t>').</a:t>
+            </a:r>
+            <a:r>
+              <a:rPr lang="en-US" dirty="0" err="1" smtClean="0"/>
+              <a:t>and.callThrough</a:t>
+            </a:r>
+            <a:r>
+              <a:rPr lang="en-US" dirty="0" smtClean="0"/>
+              <a:t>();</a:t>
+            </a:r>
+          </a:p>
+          <a:p>
+            <a:pPr lvl="2"/>
+            <a:r>
+              <a:rPr lang="en-US" dirty="0" smtClean="0"/>
+              <a:t>    </a:t>
+            </a:r>
+            <a:r>
+              <a:rPr lang="en-US" dirty="0" err="1" smtClean="0"/>
+              <a:t>AboutCtrl</a:t>
+            </a:r>
+            <a:r>
+              <a:rPr lang="en-US" dirty="0" smtClean="0"/>
+              <a:t> = $controller('</a:t>
+            </a:r>
+            <a:r>
+              <a:rPr lang="en-US" dirty="0" err="1" smtClean="0"/>
+              <a:t>AboutCtrl</a:t>
+            </a:r>
+            <a:r>
+              <a:rPr lang="en-US" dirty="0" smtClean="0"/>
+              <a:t>', {</a:t>
+            </a:r>
+          </a:p>
+          <a:p>
+            <a:pPr lvl="2"/>
+            <a:r>
+              <a:rPr lang="en-US" dirty="0" smtClean="0"/>
+              <a:t>      $scope: scope</a:t>
+            </a:r>
+          </a:p>
+          <a:p>
+            <a:pPr lvl="2"/>
+            <a:r>
+              <a:rPr lang="en-US" dirty="0" smtClean="0"/>
+              <a:t>      // place here mocked dependencies</a:t>
+            </a:r>
+          </a:p>
+          <a:p>
+            <a:pPr lvl="2"/>
+            <a:r>
+              <a:rPr lang="en-US" dirty="0" smtClean="0"/>
+              <a:t>    });</a:t>
+            </a:r>
+          </a:p>
+          <a:p>
+            <a:pPr lvl="2"/>
+            <a:r>
+              <a:rPr lang="en-US" dirty="0" smtClean="0"/>
+              <a:t>  }));</a:t>
+            </a:r>
+          </a:p>
+          <a:p>
+            <a:pPr lvl="2"/>
+            <a:endParaRPr lang="en-US" dirty="0" smtClean="0"/>
+          </a:p>
+          <a:p>
+            <a:pPr lvl="2"/>
+            <a:r>
+              <a:rPr lang="en-US" dirty="0" smtClean="0"/>
+              <a:t>  it('should be defined', function () {</a:t>
+            </a:r>
+          </a:p>
+          <a:p>
+            <a:pPr lvl="2"/>
+            <a:r>
+              <a:rPr lang="en-US" dirty="0" smtClean="0"/>
+              <a:t>    expect(</a:t>
+            </a:r>
+            <a:r>
+              <a:rPr lang="en-US" dirty="0" err="1" smtClean="0"/>
+              <a:t>AboutCtrl</a:t>
+            </a:r>
+            <a:r>
+              <a:rPr lang="en-US" dirty="0" smtClean="0"/>
+              <a:t>).</a:t>
+            </a:r>
+            <a:r>
+              <a:rPr lang="en-US" dirty="0" err="1" smtClean="0"/>
+              <a:t>toBeDefined</a:t>
+            </a:r>
+            <a:r>
+              <a:rPr lang="en-US" dirty="0" smtClean="0"/>
+              <a:t>();</a:t>
+            </a:r>
+          </a:p>
+          <a:p>
+            <a:pPr lvl="2"/>
+            <a:r>
+              <a:rPr lang="en-US" dirty="0" smtClean="0"/>
+              <a:t>  });</a:t>
+            </a:r>
+          </a:p>
+          <a:p>
+            <a:pPr lvl="2"/>
+            <a:r>
+              <a:rPr lang="en-US" dirty="0" smtClean="0"/>
+              <a:t>  </a:t>
+            </a:r>
+          </a:p>
+          <a:p>
+            <a:pPr lvl="2"/>
+            <a:r>
+              <a:rPr lang="en-US" dirty="0" smtClean="0"/>
+              <a:t>  describe('Controller: </a:t>
+            </a:r>
+            <a:r>
+              <a:rPr lang="en-US" dirty="0" err="1" smtClean="0"/>
+              <a:t>AboutCtrl</a:t>
+            </a:r>
+            <a:r>
+              <a:rPr lang="en-US" dirty="0" smtClean="0"/>
+              <a:t>', function () {</a:t>
+            </a:r>
+          </a:p>
+          <a:p>
+            <a:pPr lvl="2"/>
+            <a:r>
+              <a:rPr lang="en-US" dirty="0" smtClean="0"/>
+              <a:t>    it('should called console.log', function () {</a:t>
+            </a:r>
+          </a:p>
+          <a:p>
+            <a:pPr lvl="2"/>
+            <a:r>
+              <a:rPr lang="en-US" dirty="0" smtClean="0"/>
+              <a:t>      $</a:t>
+            </a:r>
+            <a:r>
+              <a:rPr lang="en-US" dirty="0" err="1" smtClean="0"/>
+              <a:t>rootScope</a:t>
+            </a:r>
+            <a:r>
+              <a:rPr lang="en-US" dirty="0" smtClean="0"/>
+              <a:t>.$broadcast('</a:t>
+            </a:r>
+            <a:r>
+              <a:rPr lang="en-US" dirty="0" err="1" smtClean="0"/>
+              <a:t>aboutCtrlListener</a:t>
+            </a:r>
+            <a:r>
+              <a:rPr lang="en-US" dirty="0" smtClean="0"/>
+              <a:t>');</a:t>
+            </a:r>
+          </a:p>
+          <a:p>
+            <a:pPr lvl="2"/>
+            <a:r>
+              <a:rPr lang="en-US" dirty="0" smtClean="0"/>
+              <a:t>      expect(</a:t>
+            </a:r>
+            <a:r>
+              <a:rPr lang="en-US" dirty="0" err="1" smtClean="0"/>
+              <a:t>scope.$on</a:t>
+            </a:r>
+            <a:r>
+              <a:rPr lang="en-US" dirty="0" smtClean="0"/>
+              <a:t>).</a:t>
+            </a:r>
+            <a:r>
+              <a:rPr lang="en-US" dirty="0" err="1" smtClean="0"/>
+              <a:t>toHaveBeenCalledWith</a:t>
+            </a:r>
+            <a:r>
+              <a:rPr lang="en-US" dirty="0" smtClean="0"/>
+              <a:t>('</a:t>
+            </a:r>
+            <a:r>
+              <a:rPr lang="en-US" dirty="0" err="1" smtClean="0"/>
+              <a:t>aboutCtrlListener</a:t>
+            </a:r>
+            <a:r>
+              <a:rPr lang="en-US" dirty="0" smtClean="0"/>
+              <a:t>', </a:t>
+            </a:r>
+            <a:r>
+              <a:rPr lang="en-US" dirty="0" err="1" smtClean="0"/>
+              <a:t>jasmine.any</a:t>
+            </a:r>
+            <a:r>
+              <a:rPr lang="en-US" dirty="0" smtClean="0"/>
+              <a:t>(Function));</a:t>
+            </a:r>
+          </a:p>
+          <a:p>
+            <a:pPr lvl="2"/>
+            <a:r>
+              <a:rPr lang="en-US" dirty="0" smtClean="0"/>
+              <a:t>    });</a:t>
+            </a:r>
+          </a:p>
+          <a:p>
+            <a:pPr lvl="2"/>
+            <a:r>
+              <a:rPr lang="en-US" dirty="0" smtClean="0"/>
+              <a:t>  });</a:t>
+            </a:r>
+          </a:p>
+          <a:p>
+            <a:pPr lvl="2"/>
+            <a:r>
+              <a:rPr lang="en-US" dirty="0" smtClean="0"/>
+              <a:t>});</a:t>
+            </a:r>
+          </a:p>
+          <a:p>
+            <a:pPr lvl="2"/>
+            <a:endParaRPr lang="en-US" dirty="0" smtClean="0"/>
+          </a:p>
+          <a:p>
+            <a:pPr marL="0" marR="0" lvl="0" indent="0" algn="l" defTabSz="914400" rtl="0" eaLnBrk="1" fontAlgn="auto" latinLnBrk="0" hangingPunct="1">
+              <a:lnSpc>
+                <a:spcPct val="100000"/>
+              </a:lnSpc>
+              <a:spcBef>
+                <a:spcPts val="0"/>
+              </a:spcBef>
+              <a:spcAft>
+                <a:spcPts val="0"/>
+              </a:spcAft>
+              <a:buClrTx/>
+              <a:buSzTx/>
+              <a:buFontTx/>
+              <a:buNone/>
+              <a:tabLst/>
+              <a:defRPr/>
+            </a:pPr>
+            <a:r>
+              <a:rPr lang="en-US" dirty="0" smtClean="0"/>
+              <a:t>------------------------------------------------------------------------------------------------------------------------------------------------------</a:t>
+            </a:r>
+          </a:p>
+          <a:p>
+            <a:pPr lvl="0"/>
+            <a:endParaRPr lang="en-US" dirty="0" smtClean="0"/>
+          </a:p>
+          <a:p>
+            <a:pPr marL="228600" marR="0" lvl="0" indent="-228600" algn="l" defTabSz="914400" rtl="0" eaLnBrk="1" fontAlgn="auto" latinLnBrk="0" hangingPunct="1">
+              <a:lnSpc>
+                <a:spcPct val="100000"/>
+              </a:lnSpc>
+              <a:spcBef>
+                <a:spcPts val="0"/>
+              </a:spcBef>
+              <a:spcAft>
+                <a:spcPts val="0"/>
+              </a:spcAft>
+              <a:buClrTx/>
+              <a:buSzTx/>
+              <a:buFont typeface="+mj-lt"/>
+              <a:buAutoNum type="arabicPeriod" startAt="2"/>
+              <a:tabLst/>
+              <a:defRPr/>
+            </a:pPr>
+            <a:r>
+              <a:rPr lang="en-US" baseline="0" dirty="0" smtClean="0"/>
+              <a:t>Run "grunt test".</a:t>
+            </a:r>
+          </a:p>
+          <a:p>
+            <a:pPr marL="228600" marR="0" lvl="0" indent="-228600" algn="l" defTabSz="914400" rtl="0" eaLnBrk="1" fontAlgn="auto" latinLnBrk="0" hangingPunct="1">
+              <a:lnSpc>
+                <a:spcPct val="100000"/>
+              </a:lnSpc>
+              <a:spcBef>
+                <a:spcPts val="0"/>
+              </a:spcBef>
+              <a:spcAft>
+                <a:spcPts val="0"/>
+              </a:spcAft>
+              <a:buClrTx/>
+              <a:buSzTx/>
+              <a:buFont typeface="+mj-lt"/>
+              <a:buAutoNum type="arabicPeriod" startAt="2"/>
+              <a:tabLst/>
+              <a:defRPr/>
+            </a:pPr>
+            <a:r>
+              <a:rPr lang="en-US" baseline="0" dirty="0" smtClean="0"/>
+              <a:t>Checkout the coverage, as you can see you get an 100% coverage.</a:t>
+            </a:r>
+            <a:endParaRPr lang="en-US" dirty="0" smtClean="0"/>
+          </a:p>
+          <a:p>
+            <a:endParaRPr lang="en-US" dirty="0" smtClean="0"/>
+          </a:p>
+          <a:p>
+            <a:r>
+              <a:rPr lang="en-US" dirty="0" smtClean="0"/>
+              <a:t>Test a directive using a mock</a:t>
+            </a:r>
+            <a:r>
+              <a:rPr lang="en-US" dirty="0" smtClean="0"/>
+              <a:t>.</a:t>
+            </a:r>
+          </a:p>
+          <a:p>
+            <a:endParaRPr lang="en-US" dirty="0" smtClean="0"/>
+          </a:p>
+          <a:p>
+            <a:pPr marL="228600" marR="0" indent="-228600" algn="l" defTabSz="914400" rtl="0" eaLnBrk="1" fontAlgn="auto" latinLnBrk="0" hangingPunct="1">
+              <a:lnSpc>
+                <a:spcPct val="100000"/>
+              </a:lnSpc>
+              <a:spcBef>
+                <a:spcPts val="0"/>
+              </a:spcBef>
+              <a:spcAft>
+                <a:spcPts val="0"/>
+              </a:spcAft>
+              <a:buClrTx/>
+              <a:buSzTx/>
+              <a:buFont typeface="+mj-lt"/>
+              <a:buAutoNum type="arabicPeriod"/>
+              <a:tabLst/>
+              <a:defRPr/>
+            </a:pPr>
+            <a:r>
+              <a:rPr lang="en-US" dirty="0" smtClean="0"/>
+              <a:t>Open/Create</a:t>
+            </a:r>
+            <a:r>
+              <a:rPr lang="en-US" baseline="0" dirty="0" smtClean="0"/>
+              <a:t> the "</a:t>
+            </a:r>
+            <a:r>
+              <a:rPr lang="en-US" u="none" baseline="0" dirty="0" smtClean="0"/>
+              <a:t>test/spec/directives/isolated-scope-directive.spec.js</a:t>
+            </a:r>
+            <a:r>
+              <a:rPr lang="en-US" baseline="0" dirty="0" smtClean="0"/>
+              <a:t>" and add:</a:t>
+            </a:r>
+          </a:p>
+          <a:p>
+            <a:pPr marL="228600" marR="0" indent="-228600" algn="l" defTabSz="914400" rtl="0" eaLnBrk="1" fontAlgn="auto" latinLnBrk="0" hangingPunct="1">
+              <a:lnSpc>
+                <a:spcPct val="100000"/>
+              </a:lnSpc>
+              <a:spcBef>
+                <a:spcPts val="0"/>
+              </a:spcBef>
+              <a:spcAft>
+                <a:spcPts val="0"/>
+              </a:spcAft>
+              <a:buClrTx/>
+              <a:buSzTx/>
+              <a:buFont typeface="+mj-lt"/>
+              <a:buAutoNum type="arabicPeriod"/>
+              <a:tabLst/>
+              <a:defRPr/>
+            </a:pPr>
+            <a:endParaRPr lang="en-US" baseline="0" dirty="0" smtClean="0"/>
+          </a:p>
+          <a:p>
+            <a:pPr marL="0" marR="0" lvl="0" indent="0" algn="l" defTabSz="914400" rtl="0" eaLnBrk="1" fontAlgn="auto" latinLnBrk="0" hangingPunct="1">
+              <a:lnSpc>
+                <a:spcPct val="100000"/>
+              </a:lnSpc>
+              <a:spcBef>
+                <a:spcPts val="0"/>
+              </a:spcBef>
+              <a:spcAft>
+                <a:spcPts val="0"/>
+              </a:spcAft>
+              <a:buClrTx/>
+              <a:buSzTx/>
+              <a:buFont typeface="+mj-lt"/>
+              <a:buNone/>
+              <a:tabLst/>
+              <a:defRPr/>
+            </a:pPr>
+            <a:r>
+              <a:rPr lang="en-US" dirty="0" smtClean="0"/>
+              <a:t>------------------------------------------------------------------------------------------------------------------------------------------------------</a:t>
+            </a:r>
+          </a:p>
+          <a:p>
+            <a:pPr marL="0" marR="0" lvl="0" indent="0" algn="l" defTabSz="914400" rtl="0" eaLnBrk="1" fontAlgn="auto" latinLnBrk="0" hangingPunct="1">
+              <a:lnSpc>
+                <a:spcPct val="100000"/>
+              </a:lnSpc>
+              <a:spcBef>
+                <a:spcPts val="0"/>
+              </a:spcBef>
+              <a:spcAft>
+                <a:spcPts val="0"/>
+              </a:spcAft>
+              <a:buClrTx/>
+              <a:buSzTx/>
+              <a:buFont typeface="+mj-lt"/>
+              <a:buNone/>
+              <a:tabLst/>
+              <a:defRPr/>
+            </a:pPr>
+            <a:endParaRPr lang="en-US" dirty="0" smtClean="0"/>
+          </a:p>
+          <a:p>
+            <a:pPr marL="914400" marR="0" lvl="2" indent="0" algn="l" defTabSz="914400" rtl="0" eaLnBrk="1" fontAlgn="auto" latinLnBrk="0" hangingPunct="1">
+              <a:lnSpc>
+                <a:spcPct val="100000"/>
+              </a:lnSpc>
+              <a:spcBef>
+                <a:spcPts val="0"/>
+              </a:spcBef>
+              <a:spcAft>
+                <a:spcPts val="0"/>
+              </a:spcAft>
+              <a:buClrTx/>
+              <a:buSzTx/>
+              <a:buFont typeface="+mj-lt"/>
+              <a:buNone/>
+              <a:tabLst/>
+              <a:defRPr/>
+            </a:pPr>
+            <a:r>
+              <a:rPr lang="en-US" u="none" dirty="0" smtClean="0"/>
+              <a:t>'use strict';</a:t>
+            </a:r>
+          </a:p>
+          <a:p>
+            <a:pPr marL="914400" marR="0" lvl="2" indent="0" algn="l" defTabSz="914400" rtl="0" eaLnBrk="1" fontAlgn="auto" latinLnBrk="0" hangingPunct="1">
+              <a:lnSpc>
+                <a:spcPct val="100000"/>
+              </a:lnSpc>
+              <a:spcBef>
+                <a:spcPts val="0"/>
+              </a:spcBef>
+              <a:spcAft>
+                <a:spcPts val="0"/>
+              </a:spcAft>
+              <a:buClrTx/>
+              <a:buSzTx/>
+              <a:buFont typeface="+mj-lt"/>
+              <a:buNone/>
+              <a:tabLst/>
+              <a:defRPr/>
+            </a:pPr>
+            <a:endParaRPr lang="en-US" u="none" dirty="0" smtClean="0"/>
+          </a:p>
+          <a:p>
+            <a:pPr marL="914400" marR="0" lvl="2" indent="0" algn="l" defTabSz="914400" rtl="0" eaLnBrk="1" fontAlgn="auto" latinLnBrk="0" hangingPunct="1">
+              <a:lnSpc>
+                <a:spcPct val="100000"/>
+              </a:lnSpc>
+              <a:spcBef>
+                <a:spcPts val="0"/>
+              </a:spcBef>
+              <a:spcAft>
+                <a:spcPts val="0"/>
+              </a:spcAft>
+              <a:buClrTx/>
+              <a:buSzTx/>
+              <a:buFont typeface="+mj-lt"/>
+              <a:buNone/>
+              <a:tabLst/>
+              <a:defRPr/>
+            </a:pPr>
+            <a:r>
+              <a:rPr lang="en-US" u="none" dirty="0" smtClean="0"/>
+              <a:t>describe('Directive: </a:t>
+            </a:r>
+            <a:r>
+              <a:rPr lang="en-US" u="none" dirty="0" err="1" smtClean="0"/>
+              <a:t>isolatedScopeDirective</a:t>
+            </a:r>
+            <a:r>
+              <a:rPr lang="en-US" u="none" dirty="0" smtClean="0"/>
+              <a:t>', function () {</a:t>
+            </a:r>
+          </a:p>
+          <a:p>
+            <a:pPr marL="914400" marR="0" lvl="2" indent="0" algn="l" defTabSz="914400" rtl="0" eaLnBrk="1" fontAlgn="auto" latinLnBrk="0" hangingPunct="1">
+              <a:lnSpc>
+                <a:spcPct val="100000"/>
+              </a:lnSpc>
+              <a:spcBef>
+                <a:spcPts val="0"/>
+              </a:spcBef>
+              <a:spcAft>
+                <a:spcPts val="0"/>
+              </a:spcAft>
+              <a:buClrTx/>
+              <a:buSzTx/>
+              <a:buFont typeface="+mj-lt"/>
+              <a:buNone/>
+              <a:tabLst/>
+              <a:defRPr/>
+            </a:pPr>
+            <a:r>
+              <a:rPr lang="en-US" u="none" dirty="0" smtClean="0"/>
+              <a:t>  </a:t>
+            </a:r>
+          </a:p>
+          <a:p>
+            <a:pPr marL="914400" marR="0" lvl="2" indent="0" algn="l" defTabSz="914400" rtl="0" eaLnBrk="1" fontAlgn="auto" latinLnBrk="0" hangingPunct="1">
+              <a:lnSpc>
+                <a:spcPct val="100000"/>
+              </a:lnSpc>
+              <a:spcBef>
+                <a:spcPts val="0"/>
+              </a:spcBef>
+              <a:spcAft>
+                <a:spcPts val="0"/>
+              </a:spcAft>
+              <a:buClrTx/>
+              <a:buSzTx/>
+              <a:buFont typeface="+mj-lt"/>
+              <a:buNone/>
+              <a:tabLst/>
+              <a:defRPr/>
+            </a:pPr>
+            <a:r>
+              <a:rPr lang="en-US" u="none" dirty="0" smtClean="0"/>
+              <a:t>  </a:t>
+            </a:r>
+            <a:r>
+              <a:rPr lang="en-US" u="none" dirty="0" err="1" smtClean="0"/>
+              <a:t>var</a:t>
+            </a:r>
+            <a:r>
+              <a:rPr lang="en-US" u="none" dirty="0" smtClean="0"/>
+              <a:t> $</a:t>
+            </a:r>
+            <a:r>
+              <a:rPr lang="en-US" u="none" dirty="0" err="1" smtClean="0"/>
+              <a:t>httpBackend</a:t>
+            </a:r>
+            <a:r>
+              <a:rPr lang="en-US" u="none" dirty="0" smtClean="0"/>
+              <a:t>;</a:t>
+            </a:r>
+          </a:p>
+          <a:p>
+            <a:pPr marL="914400" marR="0" lvl="2" indent="0" algn="l" defTabSz="914400" rtl="0" eaLnBrk="1" fontAlgn="auto" latinLnBrk="0" hangingPunct="1">
+              <a:lnSpc>
+                <a:spcPct val="100000"/>
+              </a:lnSpc>
+              <a:spcBef>
+                <a:spcPts val="0"/>
+              </a:spcBef>
+              <a:spcAft>
+                <a:spcPts val="0"/>
+              </a:spcAft>
+              <a:buClrTx/>
+              <a:buSzTx/>
+              <a:buFont typeface="+mj-lt"/>
+              <a:buNone/>
+              <a:tabLst/>
+              <a:defRPr/>
+            </a:pPr>
+            <a:endParaRPr lang="en-US" u="none" dirty="0" smtClean="0"/>
+          </a:p>
+          <a:p>
+            <a:pPr marL="914400" marR="0" lvl="2" indent="0" algn="l" defTabSz="914400" rtl="0" eaLnBrk="1" fontAlgn="auto" latinLnBrk="0" hangingPunct="1">
+              <a:lnSpc>
+                <a:spcPct val="100000"/>
+              </a:lnSpc>
+              <a:spcBef>
+                <a:spcPts val="0"/>
+              </a:spcBef>
+              <a:spcAft>
+                <a:spcPts val="0"/>
+              </a:spcAft>
+              <a:buClrTx/>
+              <a:buSzTx/>
+              <a:buFont typeface="+mj-lt"/>
+              <a:buNone/>
+              <a:tabLst/>
+              <a:defRPr/>
+            </a:pPr>
+            <a:r>
+              <a:rPr lang="en-US" u="none" dirty="0" smtClean="0"/>
+              <a:t>  // load the directive's module</a:t>
+            </a:r>
+          </a:p>
+          <a:p>
+            <a:pPr marL="914400" marR="0" lvl="2" indent="0" algn="l" defTabSz="914400" rtl="0" eaLnBrk="1" fontAlgn="auto" latinLnBrk="0" hangingPunct="1">
+              <a:lnSpc>
+                <a:spcPct val="100000"/>
+              </a:lnSpc>
+              <a:spcBef>
+                <a:spcPts val="0"/>
+              </a:spcBef>
+              <a:spcAft>
+                <a:spcPts val="0"/>
+              </a:spcAft>
+              <a:buClrTx/>
+              <a:buSzTx/>
+              <a:buFont typeface="+mj-lt"/>
+              <a:buNone/>
+              <a:tabLst/>
+              <a:defRPr/>
+            </a:pPr>
+            <a:r>
+              <a:rPr lang="en-US" u="none" dirty="0" smtClean="0"/>
+              <a:t>  </a:t>
+            </a:r>
+            <a:r>
+              <a:rPr lang="en-US" u="none" dirty="0" err="1" smtClean="0"/>
+              <a:t>beforeEach</a:t>
+            </a:r>
+            <a:r>
+              <a:rPr lang="en-US" u="none" dirty="0" smtClean="0"/>
+              <a:t>(module('</a:t>
+            </a:r>
+            <a:r>
+              <a:rPr lang="en-US" u="none" dirty="0" err="1" smtClean="0"/>
+              <a:t>practiceBApp</a:t>
+            </a:r>
+            <a:r>
+              <a:rPr lang="en-US" u="none" dirty="0" smtClean="0"/>
+              <a:t>'));</a:t>
+            </a:r>
+          </a:p>
+          <a:p>
+            <a:pPr marL="914400" marR="0" lvl="2" indent="0" algn="l" defTabSz="914400" rtl="0" eaLnBrk="1" fontAlgn="auto" latinLnBrk="0" hangingPunct="1">
+              <a:lnSpc>
+                <a:spcPct val="100000"/>
+              </a:lnSpc>
+              <a:spcBef>
+                <a:spcPts val="0"/>
+              </a:spcBef>
+              <a:spcAft>
+                <a:spcPts val="0"/>
+              </a:spcAft>
+              <a:buClrTx/>
+              <a:buSzTx/>
+              <a:buFont typeface="+mj-lt"/>
+              <a:buNone/>
+              <a:tabLst/>
+              <a:defRPr/>
+            </a:pPr>
+            <a:r>
+              <a:rPr lang="en-US" u="none" dirty="0" smtClean="0"/>
+              <a:t>  </a:t>
+            </a:r>
+          </a:p>
+          <a:p>
+            <a:pPr marL="914400" marR="0" lvl="2" indent="0" algn="l" defTabSz="914400" rtl="0" eaLnBrk="1" fontAlgn="auto" latinLnBrk="0" hangingPunct="1">
+              <a:lnSpc>
+                <a:spcPct val="100000"/>
+              </a:lnSpc>
+              <a:spcBef>
+                <a:spcPts val="0"/>
+              </a:spcBef>
+              <a:spcAft>
+                <a:spcPts val="0"/>
+              </a:spcAft>
+              <a:buClrTx/>
+              <a:buSzTx/>
+              <a:buFont typeface="+mj-lt"/>
+              <a:buNone/>
+              <a:tabLst/>
+              <a:defRPr/>
+            </a:pPr>
+            <a:r>
+              <a:rPr lang="en-US" u="none" dirty="0" smtClean="0"/>
+              <a:t>  </a:t>
+            </a:r>
+            <a:r>
+              <a:rPr lang="en-US" u="none" dirty="0" err="1" smtClean="0"/>
+              <a:t>beforeEach</a:t>
+            </a:r>
+            <a:r>
+              <a:rPr lang="en-US" u="none" dirty="0" smtClean="0"/>
+              <a:t>(function () {</a:t>
+            </a:r>
+          </a:p>
+          <a:p>
+            <a:pPr marL="914400" marR="0" lvl="2" indent="0" algn="l" defTabSz="914400" rtl="0" eaLnBrk="1" fontAlgn="auto" latinLnBrk="0" hangingPunct="1">
+              <a:lnSpc>
+                <a:spcPct val="100000"/>
+              </a:lnSpc>
+              <a:spcBef>
+                <a:spcPts val="0"/>
+              </a:spcBef>
+              <a:spcAft>
+                <a:spcPts val="0"/>
+              </a:spcAft>
+              <a:buClrTx/>
+              <a:buSzTx/>
+              <a:buFont typeface="+mj-lt"/>
+              <a:buNone/>
+              <a:tabLst/>
+              <a:defRPr/>
+            </a:pPr>
+            <a:r>
+              <a:rPr lang="en-US" u="none" dirty="0" smtClean="0"/>
+              <a:t>    </a:t>
+            </a:r>
+            <a:r>
+              <a:rPr lang="en-US" u="none" dirty="0" err="1" smtClean="0"/>
+              <a:t>angular.mock.inject</a:t>
+            </a:r>
+            <a:r>
+              <a:rPr lang="en-US" u="none" dirty="0" smtClean="0"/>
+              <a:t>(function ($injector) {</a:t>
+            </a:r>
+          </a:p>
+          <a:p>
+            <a:pPr marL="914400" marR="0" lvl="2" indent="0" algn="l" defTabSz="914400" rtl="0" eaLnBrk="1" fontAlgn="auto" latinLnBrk="0" hangingPunct="1">
+              <a:lnSpc>
+                <a:spcPct val="100000"/>
+              </a:lnSpc>
+              <a:spcBef>
+                <a:spcPts val="0"/>
+              </a:spcBef>
+              <a:spcAft>
+                <a:spcPts val="0"/>
+              </a:spcAft>
+              <a:buClrTx/>
+              <a:buSzTx/>
+              <a:buFont typeface="+mj-lt"/>
+              <a:buNone/>
+              <a:tabLst/>
+              <a:defRPr/>
+            </a:pPr>
+            <a:r>
+              <a:rPr lang="en-US" u="none" dirty="0" smtClean="0"/>
+              <a:t>      $</a:t>
+            </a:r>
+            <a:r>
+              <a:rPr lang="en-US" u="none" dirty="0" err="1" smtClean="0"/>
+              <a:t>httpBackend</a:t>
+            </a:r>
+            <a:r>
+              <a:rPr lang="en-US" u="none" dirty="0" smtClean="0"/>
+              <a:t> = $</a:t>
+            </a:r>
+            <a:r>
+              <a:rPr lang="en-US" u="none" dirty="0" err="1" smtClean="0"/>
+              <a:t>injector.get</a:t>
+            </a:r>
+            <a:r>
+              <a:rPr lang="en-US" u="none" dirty="0" smtClean="0"/>
+              <a:t>('$</a:t>
+            </a:r>
+            <a:r>
+              <a:rPr lang="en-US" u="none" dirty="0" err="1" smtClean="0"/>
+              <a:t>httpBackend</a:t>
+            </a:r>
+            <a:r>
+              <a:rPr lang="en-US" u="none" dirty="0" smtClean="0"/>
+              <a:t>');</a:t>
+            </a:r>
+          </a:p>
+          <a:p>
+            <a:pPr marL="914400" marR="0" lvl="2" indent="0" algn="l" defTabSz="914400" rtl="0" eaLnBrk="1" fontAlgn="auto" latinLnBrk="0" hangingPunct="1">
+              <a:lnSpc>
+                <a:spcPct val="100000"/>
+              </a:lnSpc>
+              <a:spcBef>
+                <a:spcPts val="0"/>
+              </a:spcBef>
+              <a:spcAft>
+                <a:spcPts val="0"/>
+              </a:spcAft>
+              <a:buClrTx/>
+              <a:buSzTx/>
+              <a:buFont typeface="+mj-lt"/>
+              <a:buNone/>
+              <a:tabLst/>
+              <a:defRPr/>
+            </a:pPr>
+            <a:r>
+              <a:rPr lang="en-US" u="none" dirty="0" smtClean="0"/>
+              <a:t>      $</a:t>
+            </a:r>
+            <a:r>
+              <a:rPr lang="en-US" u="none" dirty="0" err="1" smtClean="0"/>
+              <a:t>httpBackend.whenGET</a:t>
+            </a:r>
+            <a:r>
+              <a:rPr lang="en-US" u="none" dirty="0" smtClean="0"/>
+              <a:t>(/views.*/).respond(200, '');</a:t>
+            </a:r>
+          </a:p>
+          <a:p>
+            <a:pPr marL="914400" marR="0" lvl="2" indent="0" algn="l" defTabSz="914400" rtl="0" eaLnBrk="1" fontAlgn="auto" latinLnBrk="0" hangingPunct="1">
+              <a:lnSpc>
+                <a:spcPct val="100000"/>
+              </a:lnSpc>
+              <a:spcBef>
+                <a:spcPts val="0"/>
+              </a:spcBef>
+              <a:spcAft>
+                <a:spcPts val="0"/>
+              </a:spcAft>
+              <a:buClrTx/>
+              <a:buSzTx/>
+              <a:buFont typeface="+mj-lt"/>
+              <a:buNone/>
+              <a:tabLst/>
+              <a:defRPr/>
+            </a:pPr>
+            <a:r>
+              <a:rPr lang="en-US" u="none" dirty="0" smtClean="0"/>
+              <a:t>      $</a:t>
+            </a:r>
+            <a:r>
+              <a:rPr lang="en-US" u="none" dirty="0" err="1" smtClean="0"/>
+              <a:t>httpBackend.whenGET</a:t>
+            </a:r>
+            <a:r>
+              <a:rPr lang="en-US" u="none" dirty="0" smtClean="0"/>
+              <a:t>(/scripts.*/).respond(200, '&lt;div&gt;&lt;/div&gt;');</a:t>
+            </a:r>
+          </a:p>
+          <a:p>
+            <a:pPr marL="914400" marR="0" lvl="2" indent="0" algn="l" defTabSz="914400" rtl="0" eaLnBrk="1" fontAlgn="auto" latinLnBrk="0" hangingPunct="1">
+              <a:lnSpc>
+                <a:spcPct val="100000"/>
+              </a:lnSpc>
+              <a:spcBef>
+                <a:spcPts val="0"/>
+              </a:spcBef>
+              <a:spcAft>
+                <a:spcPts val="0"/>
+              </a:spcAft>
+              <a:buClrTx/>
+              <a:buSzTx/>
+              <a:buFont typeface="+mj-lt"/>
+              <a:buNone/>
+              <a:tabLst/>
+              <a:defRPr/>
+            </a:pPr>
+            <a:r>
+              <a:rPr lang="en-US" u="none" dirty="0" smtClean="0"/>
+              <a:t>    })</a:t>
+            </a:r>
+          </a:p>
+          <a:p>
+            <a:pPr marL="914400" marR="0" lvl="2" indent="0" algn="l" defTabSz="914400" rtl="0" eaLnBrk="1" fontAlgn="auto" latinLnBrk="0" hangingPunct="1">
+              <a:lnSpc>
+                <a:spcPct val="100000"/>
+              </a:lnSpc>
+              <a:spcBef>
+                <a:spcPts val="0"/>
+              </a:spcBef>
+              <a:spcAft>
+                <a:spcPts val="0"/>
+              </a:spcAft>
+              <a:buClrTx/>
+              <a:buSzTx/>
+              <a:buFont typeface="+mj-lt"/>
+              <a:buNone/>
+              <a:tabLst/>
+              <a:defRPr/>
+            </a:pPr>
+            <a:r>
+              <a:rPr lang="en-US" u="none" dirty="0" smtClean="0"/>
+              <a:t>  });</a:t>
+            </a:r>
+          </a:p>
+          <a:p>
+            <a:pPr marL="914400" marR="0" lvl="2" indent="0" algn="l" defTabSz="914400" rtl="0" eaLnBrk="1" fontAlgn="auto" latinLnBrk="0" hangingPunct="1">
+              <a:lnSpc>
+                <a:spcPct val="100000"/>
+              </a:lnSpc>
+              <a:spcBef>
+                <a:spcPts val="0"/>
+              </a:spcBef>
+              <a:spcAft>
+                <a:spcPts val="0"/>
+              </a:spcAft>
+              <a:buClrTx/>
+              <a:buSzTx/>
+              <a:buFont typeface="+mj-lt"/>
+              <a:buNone/>
+              <a:tabLst/>
+              <a:defRPr/>
+            </a:pPr>
+            <a:endParaRPr lang="en-US" u="none" dirty="0" smtClean="0"/>
+          </a:p>
+          <a:p>
+            <a:pPr marL="914400" marR="0" lvl="2" indent="0" algn="l" defTabSz="914400" rtl="0" eaLnBrk="1" fontAlgn="auto" latinLnBrk="0" hangingPunct="1">
+              <a:lnSpc>
+                <a:spcPct val="100000"/>
+              </a:lnSpc>
+              <a:spcBef>
+                <a:spcPts val="0"/>
+              </a:spcBef>
+              <a:spcAft>
+                <a:spcPts val="0"/>
+              </a:spcAft>
+              <a:buClrTx/>
+              <a:buSzTx/>
+              <a:buFont typeface="+mj-lt"/>
+              <a:buNone/>
+              <a:tabLst/>
+              <a:defRPr/>
+            </a:pPr>
+            <a:r>
+              <a:rPr lang="en-US" u="none" dirty="0" smtClean="0"/>
+              <a:t>  </a:t>
+            </a:r>
+            <a:r>
+              <a:rPr lang="en-US" u="none" dirty="0" err="1" smtClean="0"/>
+              <a:t>var</a:t>
+            </a:r>
+            <a:r>
+              <a:rPr lang="en-US" u="none" dirty="0" smtClean="0"/>
+              <a:t> element,</a:t>
+            </a:r>
+          </a:p>
+          <a:p>
+            <a:pPr marL="914400" marR="0" lvl="2" indent="0" algn="l" defTabSz="914400" rtl="0" eaLnBrk="1" fontAlgn="auto" latinLnBrk="0" hangingPunct="1">
+              <a:lnSpc>
+                <a:spcPct val="100000"/>
+              </a:lnSpc>
+              <a:spcBef>
+                <a:spcPts val="0"/>
+              </a:spcBef>
+              <a:spcAft>
+                <a:spcPts val="0"/>
+              </a:spcAft>
+              <a:buClrTx/>
+              <a:buSzTx/>
+              <a:buFont typeface="+mj-lt"/>
+              <a:buNone/>
+              <a:tabLst/>
+              <a:defRPr/>
+            </a:pPr>
+            <a:r>
+              <a:rPr lang="en-US" u="none" dirty="0" smtClean="0"/>
+              <a:t>    scope;</a:t>
+            </a:r>
+          </a:p>
+          <a:p>
+            <a:pPr marL="914400" marR="0" lvl="2" indent="0" algn="l" defTabSz="914400" rtl="0" eaLnBrk="1" fontAlgn="auto" latinLnBrk="0" hangingPunct="1">
+              <a:lnSpc>
+                <a:spcPct val="100000"/>
+              </a:lnSpc>
+              <a:spcBef>
+                <a:spcPts val="0"/>
+              </a:spcBef>
+              <a:spcAft>
+                <a:spcPts val="0"/>
+              </a:spcAft>
+              <a:buClrTx/>
+              <a:buSzTx/>
+              <a:buFont typeface="+mj-lt"/>
+              <a:buNone/>
+              <a:tabLst/>
+              <a:defRPr/>
+            </a:pPr>
+            <a:endParaRPr lang="en-US" u="none" dirty="0" smtClean="0"/>
+          </a:p>
+          <a:p>
+            <a:pPr marL="914400" marR="0" lvl="2" indent="0" algn="l" defTabSz="914400" rtl="0" eaLnBrk="1" fontAlgn="auto" latinLnBrk="0" hangingPunct="1">
+              <a:lnSpc>
+                <a:spcPct val="100000"/>
+              </a:lnSpc>
+              <a:spcBef>
+                <a:spcPts val="0"/>
+              </a:spcBef>
+              <a:spcAft>
+                <a:spcPts val="0"/>
+              </a:spcAft>
+              <a:buClrTx/>
+              <a:buSzTx/>
+              <a:buFont typeface="+mj-lt"/>
+              <a:buNone/>
+              <a:tabLst/>
+              <a:defRPr/>
+            </a:pPr>
+            <a:r>
+              <a:rPr lang="en-US" u="none" dirty="0" smtClean="0"/>
+              <a:t>  </a:t>
+            </a:r>
+            <a:r>
+              <a:rPr lang="en-US" u="none" dirty="0" err="1" smtClean="0"/>
+              <a:t>beforeEach</a:t>
+            </a:r>
+            <a:r>
+              <a:rPr lang="en-US" u="none" dirty="0" smtClean="0"/>
+              <a:t>(inject(function ($</a:t>
+            </a:r>
+            <a:r>
+              <a:rPr lang="en-US" u="none" dirty="0" err="1" smtClean="0"/>
+              <a:t>rootScope</a:t>
+            </a:r>
+            <a:r>
+              <a:rPr lang="en-US" u="none" dirty="0" smtClean="0"/>
+              <a:t>, $compile) {</a:t>
+            </a:r>
+          </a:p>
+          <a:p>
+            <a:pPr marL="914400" marR="0" lvl="2" indent="0" algn="l" defTabSz="914400" rtl="0" eaLnBrk="1" fontAlgn="auto" latinLnBrk="0" hangingPunct="1">
+              <a:lnSpc>
+                <a:spcPct val="100000"/>
+              </a:lnSpc>
+              <a:spcBef>
+                <a:spcPts val="0"/>
+              </a:spcBef>
+              <a:spcAft>
+                <a:spcPts val="0"/>
+              </a:spcAft>
+              <a:buClrTx/>
+              <a:buSzTx/>
+              <a:buFont typeface="+mj-lt"/>
+              <a:buNone/>
+              <a:tabLst/>
+              <a:defRPr/>
+            </a:pPr>
+            <a:r>
+              <a:rPr lang="en-US" u="none" dirty="0" smtClean="0"/>
+              <a:t>    scope = $</a:t>
+            </a:r>
+            <a:r>
+              <a:rPr lang="en-US" u="none" dirty="0" err="1" smtClean="0"/>
+              <a:t>rootScope</a:t>
+            </a:r>
+            <a:r>
+              <a:rPr lang="en-US" u="none" dirty="0" smtClean="0"/>
+              <a:t>.$new();</a:t>
+            </a:r>
+          </a:p>
+          <a:p>
+            <a:pPr marL="914400" marR="0" lvl="2" indent="0" algn="l" defTabSz="914400" rtl="0" eaLnBrk="1" fontAlgn="auto" latinLnBrk="0" hangingPunct="1">
+              <a:lnSpc>
+                <a:spcPct val="100000"/>
+              </a:lnSpc>
+              <a:spcBef>
+                <a:spcPts val="0"/>
+              </a:spcBef>
+              <a:spcAft>
+                <a:spcPts val="0"/>
+              </a:spcAft>
+              <a:buClrTx/>
+              <a:buSzTx/>
+              <a:buFont typeface="+mj-lt"/>
+              <a:buNone/>
+              <a:tabLst/>
+              <a:defRPr/>
+            </a:pPr>
+            <a:r>
+              <a:rPr lang="en-US" u="none" dirty="0" smtClean="0"/>
+              <a:t>    </a:t>
+            </a:r>
+            <a:r>
+              <a:rPr lang="en-US" u="none" dirty="0" err="1" smtClean="0"/>
+              <a:t>scope.isolatedScopeDirectiveValue</a:t>
+            </a:r>
+            <a:r>
+              <a:rPr lang="en-US" u="none" dirty="0" smtClean="0"/>
+              <a:t> = 2;</a:t>
+            </a:r>
+          </a:p>
+          <a:p>
+            <a:pPr marL="914400" marR="0" lvl="2" indent="0" algn="l" defTabSz="914400" rtl="0" eaLnBrk="1" fontAlgn="auto" latinLnBrk="0" hangingPunct="1">
+              <a:lnSpc>
+                <a:spcPct val="100000"/>
+              </a:lnSpc>
+              <a:spcBef>
+                <a:spcPts val="0"/>
+              </a:spcBef>
+              <a:spcAft>
+                <a:spcPts val="0"/>
+              </a:spcAft>
+              <a:buClrTx/>
+              <a:buSzTx/>
+              <a:buFont typeface="+mj-lt"/>
+              <a:buNone/>
+              <a:tabLst/>
+              <a:defRPr/>
+            </a:pPr>
+            <a:r>
+              <a:rPr lang="en-US" u="none" dirty="0" smtClean="0"/>
+              <a:t>    element = </a:t>
+            </a:r>
+            <a:r>
+              <a:rPr lang="en-US" u="none" dirty="0" err="1" smtClean="0"/>
+              <a:t>angular.element</a:t>
+            </a:r>
+            <a:r>
+              <a:rPr lang="en-US" u="none" dirty="0" smtClean="0"/>
+              <a:t>('&lt;isolated-scope-directive&gt;&lt;/isolated-scope-directive&gt;');</a:t>
+            </a:r>
+          </a:p>
+          <a:p>
+            <a:pPr marL="914400" marR="0" lvl="2" indent="0" algn="l" defTabSz="914400" rtl="0" eaLnBrk="1" fontAlgn="auto" latinLnBrk="0" hangingPunct="1">
+              <a:lnSpc>
+                <a:spcPct val="100000"/>
+              </a:lnSpc>
+              <a:spcBef>
+                <a:spcPts val="0"/>
+              </a:spcBef>
+              <a:spcAft>
+                <a:spcPts val="0"/>
+              </a:spcAft>
+              <a:buClrTx/>
+              <a:buSzTx/>
+              <a:buFont typeface="+mj-lt"/>
+              <a:buNone/>
+              <a:tabLst/>
+              <a:defRPr/>
+            </a:pPr>
+            <a:r>
+              <a:rPr lang="en-US" u="none" dirty="0" smtClean="0"/>
+              <a:t>    element = $compile(element)(scope);</a:t>
+            </a:r>
+          </a:p>
+          <a:p>
+            <a:pPr marL="914400" marR="0" lvl="2" indent="0" algn="l" defTabSz="914400" rtl="0" eaLnBrk="1" fontAlgn="auto" latinLnBrk="0" hangingPunct="1">
+              <a:lnSpc>
+                <a:spcPct val="100000"/>
+              </a:lnSpc>
+              <a:spcBef>
+                <a:spcPts val="0"/>
+              </a:spcBef>
+              <a:spcAft>
+                <a:spcPts val="0"/>
+              </a:spcAft>
+              <a:buClrTx/>
+              <a:buSzTx/>
+              <a:buFont typeface="+mj-lt"/>
+              <a:buNone/>
+              <a:tabLst/>
+              <a:defRPr/>
+            </a:pPr>
+            <a:r>
+              <a:rPr lang="en-US" u="none" dirty="0" smtClean="0"/>
+              <a:t>    </a:t>
+            </a:r>
+            <a:r>
+              <a:rPr lang="en-US" u="none" dirty="0" err="1" smtClean="0"/>
+              <a:t>scope.$digest</a:t>
+            </a:r>
+            <a:r>
+              <a:rPr lang="en-US" u="none" dirty="0" smtClean="0"/>
+              <a:t>();</a:t>
+            </a:r>
+          </a:p>
+          <a:p>
+            <a:pPr marL="914400" marR="0" lvl="2" indent="0" algn="l" defTabSz="914400" rtl="0" eaLnBrk="1" fontAlgn="auto" latinLnBrk="0" hangingPunct="1">
+              <a:lnSpc>
+                <a:spcPct val="100000"/>
+              </a:lnSpc>
+              <a:spcBef>
+                <a:spcPts val="0"/>
+              </a:spcBef>
+              <a:spcAft>
+                <a:spcPts val="0"/>
+              </a:spcAft>
+              <a:buClrTx/>
+              <a:buSzTx/>
+              <a:buFont typeface="+mj-lt"/>
+              <a:buNone/>
+              <a:tabLst/>
+              <a:defRPr/>
+            </a:pPr>
+            <a:r>
+              <a:rPr lang="en-US" u="none" dirty="0" smtClean="0"/>
+              <a:t>    $</a:t>
+            </a:r>
+            <a:r>
+              <a:rPr lang="en-US" u="none" dirty="0" err="1" smtClean="0"/>
+              <a:t>httpBackend.flush</a:t>
+            </a:r>
+            <a:r>
+              <a:rPr lang="en-US" u="none" dirty="0" smtClean="0"/>
+              <a:t>();</a:t>
+            </a:r>
+          </a:p>
+          <a:p>
+            <a:pPr marL="914400" marR="0" lvl="2" indent="0" algn="l" defTabSz="914400" rtl="0" eaLnBrk="1" fontAlgn="auto" latinLnBrk="0" hangingPunct="1">
+              <a:lnSpc>
+                <a:spcPct val="100000"/>
+              </a:lnSpc>
+              <a:spcBef>
+                <a:spcPts val="0"/>
+              </a:spcBef>
+              <a:spcAft>
+                <a:spcPts val="0"/>
+              </a:spcAft>
+              <a:buClrTx/>
+              <a:buSzTx/>
+              <a:buFont typeface="+mj-lt"/>
+              <a:buNone/>
+              <a:tabLst/>
+              <a:defRPr/>
+            </a:pPr>
+            <a:r>
+              <a:rPr lang="en-US" u="none" dirty="0" smtClean="0"/>
+              <a:t>  }));</a:t>
+            </a:r>
+          </a:p>
+          <a:p>
+            <a:pPr marL="914400" marR="0" lvl="2" indent="0" algn="l" defTabSz="914400" rtl="0" eaLnBrk="1" fontAlgn="auto" latinLnBrk="0" hangingPunct="1">
+              <a:lnSpc>
+                <a:spcPct val="100000"/>
+              </a:lnSpc>
+              <a:spcBef>
+                <a:spcPts val="0"/>
+              </a:spcBef>
+              <a:spcAft>
+                <a:spcPts val="0"/>
+              </a:spcAft>
+              <a:buClrTx/>
+              <a:buSzTx/>
+              <a:buFont typeface="+mj-lt"/>
+              <a:buNone/>
+              <a:tabLst/>
+              <a:defRPr/>
+            </a:pPr>
+            <a:r>
+              <a:rPr lang="en-US" u="none" dirty="0" smtClean="0"/>
+              <a:t>  </a:t>
+            </a:r>
+          </a:p>
+          <a:p>
+            <a:pPr marL="914400" marR="0" lvl="2" indent="0" algn="l" defTabSz="914400" rtl="0" eaLnBrk="1" fontAlgn="auto" latinLnBrk="0" hangingPunct="1">
+              <a:lnSpc>
+                <a:spcPct val="100000"/>
+              </a:lnSpc>
+              <a:spcBef>
+                <a:spcPts val="0"/>
+              </a:spcBef>
+              <a:spcAft>
+                <a:spcPts val="0"/>
+              </a:spcAft>
+              <a:buClrTx/>
+              <a:buSzTx/>
+              <a:buFont typeface="+mj-lt"/>
+              <a:buNone/>
+              <a:tabLst/>
+              <a:defRPr/>
+            </a:pPr>
+            <a:r>
+              <a:rPr lang="en-US" u="none" dirty="0" smtClean="0"/>
+              <a:t>  it('should have an isolated scope', function () {</a:t>
+            </a:r>
+          </a:p>
+          <a:p>
+            <a:pPr marL="914400" marR="0" lvl="2" indent="0" algn="l" defTabSz="914400" rtl="0" eaLnBrk="1" fontAlgn="auto" latinLnBrk="0" hangingPunct="1">
+              <a:lnSpc>
+                <a:spcPct val="100000"/>
+              </a:lnSpc>
+              <a:spcBef>
+                <a:spcPts val="0"/>
+              </a:spcBef>
+              <a:spcAft>
+                <a:spcPts val="0"/>
+              </a:spcAft>
+              <a:buClrTx/>
+              <a:buSzTx/>
+              <a:buFont typeface="+mj-lt"/>
+              <a:buNone/>
+              <a:tabLst/>
+              <a:defRPr/>
+            </a:pPr>
+            <a:r>
+              <a:rPr lang="en-US" u="none" dirty="0" smtClean="0"/>
+              <a:t>    </a:t>
+            </a:r>
+            <a:r>
+              <a:rPr lang="en-US" u="none" dirty="0" err="1" smtClean="0"/>
+              <a:t>var</a:t>
+            </a:r>
+            <a:r>
+              <a:rPr lang="en-US" u="none" dirty="0" smtClean="0"/>
+              <a:t> </a:t>
+            </a:r>
+            <a:r>
+              <a:rPr lang="en-US" u="none" dirty="0" err="1" smtClean="0"/>
+              <a:t>isolatedScope</a:t>
+            </a:r>
+            <a:r>
+              <a:rPr lang="en-US" u="none" dirty="0" smtClean="0"/>
+              <a:t> = </a:t>
+            </a:r>
+            <a:r>
+              <a:rPr lang="en-US" u="none" dirty="0" err="1" smtClean="0"/>
+              <a:t>element.isolateScope</a:t>
+            </a:r>
+            <a:r>
+              <a:rPr lang="en-US" u="none" dirty="0" smtClean="0"/>
+              <a:t>();</a:t>
+            </a:r>
+          </a:p>
+          <a:p>
+            <a:pPr marL="914400" marR="0" lvl="2" indent="0" algn="l" defTabSz="914400" rtl="0" eaLnBrk="1" fontAlgn="auto" latinLnBrk="0" hangingPunct="1">
+              <a:lnSpc>
+                <a:spcPct val="100000"/>
+              </a:lnSpc>
+              <a:spcBef>
+                <a:spcPts val="0"/>
+              </a:spcBef>
+              <a:spcAft>
+                <a:spcPts val="0"/>
+              </a:spcAft>
+              <a:buClrTx/>
+              <a:buSzTx/>
+              <a:buFont typeface="+mj-lt"/>
+              <a:buNone/>
+              <a:tabLst/>
+              <a:defRPr/>
+            </a:pPr>
+            <a:r>
+              <a:rPr lang="en-US" u="none" dirty="0" smtClean="0"/>
+              <a:t>    expect(</a:t>
+            </a:r>
+            <a:r>
+              <a:rPr lang="en-US" u="none" dirty="0" err="1" smtClean="0"/>
+              <a:t>isolatedScope</a:t>
+            </a:r>
+            <a:r>
+              <a:rPr lang="en-US" u="none" dirty="0" smtClean="0"/>
+              <a:t>).</a:t>
+            </a:r>
+            <a:r>
+              <a:rPr lang="en-US" u="none" dirty="0" err="1" smtClean="0"/>
+              <a:t>toBeDefined</a:t>
+            </a:r>
+            <a:r>
+              <a:rPr lang="en-US" u="none" dirty="0" smtClean="0"/>
+              <a:t>();</a:t>
+            </a:r>
+          </a:p>
+          <a:p>
+            <a:pPr marL="914400" marR="0" lvl="2" indent="0" algn="l" defTabSz="914400" rtl="0" eaLnBrk="1" fontAlgn="auto" latinLnBrk="0" hangingPunct="1">
+              <a:lnSpc>
+                <a:spcPct val="100000"/>
+              </a:lnSpc>
+              <a:spcBef>
+                <a:spcPts val="0"/>
+              </a:spcBef>
+              <a:spcAft>
+                <a:spcPts val="0"/>
+              </a:spcAft>
+              <a:buClrTx/>
+              <a:buSzTx/>
+              <a:buFont typeface="+mj-lt"/>
+              <a:buNone/>
+              <a:tabLst/>
+              <a:defRPr/>
+            </a:pPr>
+            <a:r>
+              <a:rPr lang="en-US" u="none" dirty="0" smtClean="0"/>
+              <a:t>  });</a:t>
+            </a:r>
+          </a:p>
+          <a:p>
+            <a:pPr marL="914400" marR="0" lvl="2" indent="0" algn="l" defTabSz="914400" rtl="0" eaLnBrk="1" fontAlgn="auto" latinLnBrk="0" hangingPunct="1">
+              <a:lnSpc>
+                <a:spcPct val="100000"/>
+              </a:lnSpc>
+              <a:spcBef>
+                <a:spcPts val="0"/>
+              </a:spcBef>
+              <a:spcAft>
+                <a:spcPts val="0"/>
+              </a:spcAft>
+              <a:buClrTx/>
+              <a:buSzTx/>
+              <a:buFont typeface="+mj-lt"/>
+              <a:buNone/>
+              <a:tabLst/>
+              <a:defRPr/>
+            </a:pPr>
+            <a:endParaRPr lang="en-US" u="none" dirty="0" smtClean="0"/>
+          </a:p>
+          <a:p>
+            <a:pPr marL="914400" marR="0" lvl="2" indent="0" algn="l" defTabSz="914400" rtl="0" eaLnBrk="1" fontAlgn="auto" latinLnBrk="0" hangingPunct="1">
+              <a:lnSpc>
+                <a:spcPct val="100000"/>
+              </a:lnSpc>
+              <a:spcBef>
+                <a:spcPts val="0"/>
+              </a:spcBef>
+              <a:spcAft>
+                <a:spcPts val="0"/>
+              </a:spcAft>
+              <a:buClrTx/>
+              <a:buSzTx/>
+              <a:buFont typeface="+mj-lt"/>
+              <a:buNone/>
+              <a:tabLst/>
+              <a:defRPr/>
+            </a:pPr>
+            <a:r>
+              <a:rPr lang="en-US" u="none" dirty="0" smtClean="0"/>
+              <a:t>  it('should make hidden element visible', function () {</a:t>
+            </a:r>
+          </a:p>
+          <a:p>
+            <a:pPr marL="914400" marR="0" lvl="2" indent="0" algn="l" defTabSz="914400" rtl="0" eaLnBrk="1" fontAlgn="auto" latinLnBrk="0" hangingPunct="1">
+              <a:lnSpc>
+                <a:spcPct val="100000"/>
+              </a:lnSpc>
+              <a:spcBef>
+                <a:spcPts val="0"/>
+              </a:spcBef>
+              <a:spcAft>
+                <a:spcPts val="0"/>
+              </a:spcAft>
+              <a:buClrTx/>
+              <a:buSzTx/>
+              <a:buFont typeface="+mj-lt"/>
+              <a:buNone/>
+              <a:tabLst/>
+              <a:defRPr/>
+            </a:pPr>
+            <a:r>
+              <a:rPr lang="en-US" u="none" dirty="0" smtClean="0"/>
+              <a:t>    </a:t>
+            </a:r>
+            <a:r>
+              <a:rPr lang="en-US" u="none" dirty="0" err="1" smtClean="0"/>
+              <a:t>var</a:t>
+            </a:r>
+            <a:r>
+              <a:rPr lang="en-US" u="none" dirty="0" smtClean="0"/>
+              <a:t> </a:t>
+            </a:r>
+            <a:r>
+              <a:rPr lang="en-US" u="none" dirty="0" err="1" smtClean="0"/>
+              <a:t>isolatedScope</a:t>
+            </a:r>
+            <a:r>
+              <a:rPr lang="en-US" u="none" dirty="0" smtClean="0"/>
+              <a:t> = </a:t>
+            </a:r>
+            <a:r>
+              <a:rPr lang="en-US" u="none" dirty="0" err="1" smtClean="0"/>
+              <a:t>element.isolateScope</a:t>
+            </a:r>
+            <a:r>
+              <a:rPr lang="en-US" u="none" dirty="0" smtClean="0"/>
+              <a:t>();</a:t>
+            </a:r>
+          </a:p>
+          <a:p>
+            <a:pPr marL="914400" marR="0" lvl="2" indent="0" algn="l" defTabSz="914400" rtl="0" eaLnBrk="1" fontAlgn="auto" latinLnBrk="0" hangingPunct="1">
+              <a:lnSpc>
+                <a:spcPct val="100000"/>
+              </a:lnSpc>
+              <a:spcBef>
+                <a:spcPts val="0"/>
+              </a:spcBef>
+              <a:spcAft>
+                <a:spcPts val="0"/>
+              </a:spcAft>
+              <a:buClrTx/>
+              <a:buSzTx/>
+              <a:buFont typeface="+mj-lt"/>
+              <a:buNone/>
+              <a:tabLst/>
+              <a:defRPr/>
+            </a:pPr>
+            <a:r>
+              <a:rPr lang="en-US" u="none" dirty="0" smtClean="0"/>
+              <a:t>    expect(element).</a:t>
+            </a:r>
+            <a:r>
+              <a:rPr lang="en-US" u="none" dirty="0" err="1" smtClean="0"/>
+              <a:t>toBeDefined</a:t>
+            </a:r>
+            <a:r>
+              <a:rPr lang="en-US" u="none" dirty="0" smtClean="0"/>
+              <a:t>();</a:t>
+            </a:r>
+          </a:p>
+          <a:p>
+            <a:pPr marL="914400" marR="0" lvl="2" indent="0" algn="l" defTabSz="914400" rtl="0" eaLnBrk="1" fontAlgn="auto" latinLnBrk="0" hangingPunct="1">
+              <a:lnSpc>
+                <a:spcPct val="100000"/>
+              </a:lnSpc>
+              <a:spcBef>
+                <a:spcPts val="0"/>
+              </a:spcBef>
+              <a:spcAft>
+                <a:spcPts val="0"/>
+              </a:spcAft>
+              <a:buClrTx/>
+              <a:buSzTx/>
+              <a:buFont typeface="+mj-lt"/>
+              <a:buNone/>
+              <a:tabLst/>
+              <a:defRPr/>
+            </a:pPr>
+            <a:r>
+              <a:rPr lang="en-US" u="none" dirty="0" smtClean="0"/>
+              <a:t>    expect(</a:t>
+            </a:r>
+            <a:r>
+              <a:rPr lang="en-US" u="none" dirty="0" err="1" smtClean="0"/>
+              <a:t>isolatedScope.test</a:t>
+            </a:r>
+            <a:r>
+              <a:rPr lang="en-US" u="none" dirty="0" smtClean="0"/>
+              <a:t>).</a:t>
+            </a:r>
+            <a:r>
+              <a:rPr lang="en-US" u="none" dirty="0" err="1" smtClean="0"/>
+              <a:t>toBe</a:t>
+            </a:r>
+            <a:r>
+              <a:rPr lang="en-US" u="none" dirty="0" smtClean="0"/>
+              <a:t>(1);</a:t>
+            </a:r>
+          </a:p>
+          <a:p>
+            <a:pPr marL="914400" marR="0" lvl="2" indent="0" algn="l" defTabSz="914400" rtl="0" eaLnBrk="1" fontAlgn="auto" latinLnBrk="0" hangingPunct="1">
+              <a:lnSpc>
+                <a:spcPct val="100000"/>
+              </a:lnSpc>
+              <a:spcBef>
+                <a:spcPts val="0"/>
+              </a:spcBef>
+              <a:spcAft>
+                <a:spcPts val="0"/>
+              </a:spcAft>
+              <a:buClrTx/>
+              <a:buSzTx/>
+              <a:buFont typeface="+mj-lt"/>
+              <a:buNone/>
+              <a:tabLst/>
+              <a:defRPr/>
+            </a:pPr>
+            <a:r>
+              <a:rPr lang="en-US" u="none" dirty="0" smtClean="0"/>
+              <a:t>  });</a:t>
+            </a:r>
+          </a:p>
+          <a:p>
+            <a:pPr marL="914400" marR="0" lvl="2" indent="0" algn="l" defTabSz="914400" rtl="0" eaLnBrk="1" fontAlgn="auto" latinLnBrk="0" hangingPunct="1">
+              <a:lnSpc>
+                <a:spcPct val="100000"/>
+              </a:lnSpc>
+              <a:spcBef>
+                <a:spcPts val="0"/>
+              </a:spcBef>
+              <a:spcAft>
+                <a:spcPts val="0"/>
+              </a:spcAft>
+              <a:buClrTx/>
+              <a:buSzTx/>
+              <a:buFont typeface="+mj-lt"/>
+              <a:buNone/>
+              <a:tabLst/>
+              <a:defRPr/>
+            </a:pPr>
+            <a:r>
+              <a:rPr lang="en-US" u="none" dirty="0" smtClean="0"/>
+              <a:t>});</a:t>
+            </a:r>
+          </a:p>
+          <a:p>
+            <a:pPr marL="0" marR="0" lvl="0" indent="0" algn="l" defTabSz="914400" rtl="0" eaLnBrk="1" fontAlgn="auto" latinLnBrk="0" hangingPunct="1">
+              <a:lnSpc>
+                <a:spcPct val="100000"/>
+              </a:lnSpc>
+              <a:spcBef>
+                <a:spcPts val="0"/>
+              </a:spcBef>
+              <a:spcAft>
+                <a:spcPts val="0"/>
+              </a:spcAft>
+              <a:buClrTx/>
+              <a:buSzTx/>
+              <a:buFont typeface="+mj-lt"/>
+              <a:buNone/>
+              <a:tabLst/>
+              <a:defRPr/>
+            </a:pPr>
+            <a:endParaRPr lang="en-US" dirty="0" smtClean="0"/>
+          </a:p>
+          <a:p>
+            <a:pPr marL="0" marR="0" lvl="0" indent="0" algn="l" defTabSz="914400" rtl="0" eaLnBrk="1" fontAlgn="auto" latinLnBrk="0" hangingPunct="1">
+              <a:lnSpc>
+                <a:spcPct val="100000"/>
+              </a:lnSpc>
+              <a:spcBef>
+                <a:spcPts val="0"/>
+              </a:spcBef>
+              <a:spcAft>
+                <a:spcPts val="0"/>
+              </a:spcAft>
+              <a:buClrTx/>
+              <a:buSzTx/>
+              <a:buFont typeface="+mj-lt"/>
+              <a:buNone/>
+              <a:tabLst/>
+              <a:defRPr/>
+            </a:pPr>
+            <a:r>
+              <a:rPr lang="en-US" dirty="0" smtClean="0"/>
+              <a:t>------------------------------------------------------------------------------------------------------------------------------------------------------</a:t>
+            </a:r>
+            <a:endParaRPr lang="en-US" baseline="0" dirty="0" smtClean="0"/>
+          </a:p>
+          <a:p>
+            <a:pPr marL="228600" marR="0" indent="-228600" algn="l" defTabSz="914400" rtl="0" eaLnBrk="1" fontAlgn="auto" latinLnBrk="0" hangingPunct="1">
+              <a:lnSpc>
+                <a:spcPct val="100000"/>
+              </a:lnSpc>
+              <a:spcBef>
+                <a:spcPts val="0"/>
+              </a:spcBef>
+              <a:spcAft>
+                <a:spcPts val="0"/>
+              </a:spcAft>
+              <a:buClrTx/>
+              <a:buSzTx/>
+              <a:buFont typeface="+mj-lt"/>
+              <a:buAutoNum type="arabicPeriod"/>
+              <a:tabLst/>
+              <a:defRPr/>
+            </a:pPr>
+            <a:endParaRPr lang="en-US" baseline="0" dirty="0" smtClean="0"/>
+          </a:p>
+          <a:p>
+            <a:pPr marL="228600" marR="0" lvl="0" indent="-228600" algn="l" defTabSz="914400" rtl="0" eaLnBrk="1" fontAlgn="auto" latinLnBrk="0" hangingPunct="1">
+              <a:lnSpc>
+                <a:spcPct val="100000"/>
+              </a:lnSpc>
+              <a:spcBef>
+                <a:spcPts val="0"/>
+              </a:spcBef>
+              <a:spcAft>
+                <a:spcPts val="0"/>
+              </a:spcAft>
+              <a:buClrTx/>
+              <a:buSzTx/>
+              <a:buFont typeface="+mj-lt"/>
+              <a:buAutoNum type="arabicPeriod" startAt="2"/>
+              <a:tabLst/>
+              <a:defRPr/>
+            </a:pPr>
+            <a:r>
+              <a:rPr lang="en-US" baseline="0" dirty="0" smtClean="0"/>
+              <a:t>Run "grunt test".</a:t>
+            </a:r>
+          </a:p>
+          <a:p>
+            <a:pPr marL="228600" marR="0" lvl="0" indent="-228600" algn="l" defTabSz="914400" rtl="0" eaLnBrk="1" fontAlgn="auto" latinLnBrk="0" hangingPunct="1">
+              <a:lnSpc>
+                <a:spcPct val="100000"/>
+              </a:lnSpc>
+              <a:spcBef>
+                <a:spcPts val="0"/>
+              </a:spcBef>
+              <a:spcAft>
+                <a:spcPts val="0"/>
+              </a:spcAft>
+              <a:buClrTx/>
+              <a:buSzTx/>
+              <a:buFont typeface="+mj-lt"/>
+              <a:buAutoNum type="arabicPeriod" startAt="2"/>
+              <a:tabLst/>
+              <a:defRPr/>
+            </a:pPr>
+            <a:r>
+              <a:rPr lang="en-US" baseline="0" dirty="0" smtClean="0"/>
+              <a:t>Checkout the coverage, and try to fill the 100%.</a:t>
+            </a:r>
+            <a:endParaRPr lang="en-US" dirty="0" smtClean="0"/>
+          </a:p>
+        </p:txBody>
+      </p:sp>
+      <p:sp>
+        <p:nvSpPr>
+          <p:cNvPr id="4" name="3 Marcador de número de diapositiva"/>
+          <p:cNvSpPr>
+            <a:spLocks noGrp="1"/>
+          </p:cNvSpPr>
+          <p:nvPr>
+            <p:ph type="sldNum" sz="quarter" idx="10"/>
+          </p:nvPr>
+        </p:nvSpPr>
+        <p:spPr/>
+        <p:txBody>
+          <a:bodyPr/>
+          <a:lstStyle/>
+          <a:p>
+            <a:fld id="{212C6109-0EF7-4E6B-B279-6389DF78298C}" type="slidenum">
+              <a:rPr lang="en-US" smtClean="0"/>
+              <a:t>49</a:t>
+            </a:fld>
+            <a:endParaRPr lang="en-US"/>
+          </a:p>
+        </p:txBody>
+      </p:sp>
+    </p:spTree>
+    <p:extLst>
+      <p:ext uri="{BB962C8B-B14F-4D97-AF65-F5344CB8AC3E}">
+        <p14:creationId xmlns:p14="http://schemas.microsoft.com/office/powerpoint/2010/main" val="2032696040"/>
       </p:ext>
     </p:extLst>
   </p:cSld>
@@ -38679,19 +42367,7 @@
             </a:pPr>
             <a:r>
               <a:rPr lang="en-US" dirty="0" smtClean="0"/>
-              <a:t>Create a Service that uses </a:t>
-            </a:r>
-            <a:r>
-              <a:rPr lang="en-US" dirty="0" smtClean="0"/>
-              <a:t>a $resource </a:t>
-            </a:r>
-            <a:r>
-              <a:rPr lang="en-US" dirty="0" smtClean="0"/>
-              <a:t>promise</a:t>
-            </a:r>
-            <a:r>
-              <a:rPr lang="en-US" dirty="0" smtClean="0"/>
-              <a:t>.</a:t>
+              <a:t>Create a Service that uses a $resource promise.</a:t>
             </a:r>
           </a:p>
           <a:p>
@@ -38703,7 +42379,6 @@
               <a:rPr lang="en-US" dirty="0" smtClean="0"/>
               <a:t>Get data before enter a view.</a:t>
             </a:r>
-            <a:endParaRPr lang="en-US" dirty="0" smtClean="0"/>
           </a:p>
           <a:p>
             <a:pPr marL="514350" indent="-514350">
@@ -38712,13 +42387,8 @@
             </a:pPr>
             <a:r>
               <a:rPr lang="en-US" dirty="0" smtClean="0"/>
-              <a:t>Creates an event listener triggered by $broadcast and $</a:t>
-            </a:r>
-            <a:r>
-              <a:rPr lang="en-US" dirty="0" smtClean="0"/>
-              <a:t>emit.</a:t>
-            </a:r>
-            <a:endParaRPr lang="en-US" dirty="0" smtClean="0"/>
+              <a:t>Creates an event listener triggered by $broadcast and $emit.</a:t>
+            </a:r>
           </a:p>
           <a:p>
             <a:pPr marL="514350" indent="-514350">
@@ -39782,6 +43452,298 @@
         </p:nvSpPr>
         <p:spPr/>
         <p:txBody>
+          <a:bodyPr/>
+          <a:lstStyle/>
+          <a:p>
+            <a:r>
+              <a:rPr lang="en-US" dirty="0" smtClean="0"/>
+              <a:t>Unit test coverage</a:t>
+            </a:r>
+            <a:endParaRPr lang="en-US" dirty="0"/>
+          </a:p>
+        </p:txBody>
+      </p:sp>
+      <p:pic>
+        <p:nvPicPr>
+          <p:cNvPr id="1026" name="Picture 2"/>
+          <p:cNvPicPr>
+            <a:picLocks noChangeAspect="1" noChangeArrowheads="1"/>
+          </p:cNvPicPr>
+          <p:nvPr/>
+        </p:nvPicPr>
+        <p:blipFill>
+          <a:blip r:embed="rId3">
+            <a:extLst>
+              <a:ext uri="{28A0092B-C50C-407E-A947-70E740481C1C}">
+                <a14:useLocalDpi xmlns:a14="http://schemas.microsoft.com/office/drawing/2010/main" val="0"/>
+              </a:ext>
+            </a:extLst>
+          </a:blip>
+          <a:srcRect/>
+          <a:stretch>
+            <a:fillRect/>
+          </a:stretch>
+        </p:blipFill>
+        <p:spPr bwMode="auto">
+          <a:xfrm>
+            <a:off x="323529" y="1954279"/>
+            <a:ext cx="8496944" cy="3562953"/>
+          </a:xfrm>
+          <a:prstGeom prst="rect">
+            <a:avLst/>
+          </a:prstGeom>
+          <a:noFill/>
+          <a:ln>
+            <a:noFill/>
+          </a:ln>
+          <a:extLst>
+            <a:ext uri="{909E8E84-426E-40DD-AFC4-6F175D3DCCD1}">
+              <a14:hiddenFill xmlns:a14="http://schemas.microsoft.com/office/drawing/2010/main">
+                <a:solidFill>
+                  <a:schemeClr val="accent1"/>
+                </a:solidFill>
+              </a14:hiddenFill>
+            </a:ext>
+            <a:ext uri="{91240B29-F687-4F45-9708-019B960494DF}">
+              <a14:hiddenLine xmlns:a14="http://schemas.microsoft.com/office/drawing/2010/main" w="9525">
+                <a:solidFill>
+                  <a:schemeClr val="tx1"/>
+                </a:solidFill>
+                <a:miter lim="800000"/>
+                <a:headEnd/>
+                <a:tailEnd/>
+              </a14:hiddenLine>
+            </a:ext>
+          </a:extLst>
+        </p:spPr>
+      </p:pic>
+      <p:sp>
+        <p:nvSpPr>
+          <p:cNvPr id="5" name="4 Rectángulo"/>
+          <p:cNvSpPr/>
+          <p:nvPr/>
+        </p:nvSpPr>
+        <p:spPr>
+          <a:xfrm>
+            <a:off x="323528" y="1412776"/>
+            <a:ext cx="8496944" cy="4536504"/>
+          </a:xfrm>
+          <a:prstGeom prst="rect">
+            <a:avLst/>
+          </a:prstGeom>
+          <a:noFill/>
+        </p:spPr>
+        <p:style>
+          <a:lnRef idx="2">
+            <a:schemeClr val="accent2"/>
+          </a:lnRef>
+          <a:fillRef idx="1">
+            <a:schemeClr val="lt1"/>
+          </a:fillRef>
+          <a:effectRef idx="0">
+            <a:schemeClr val="accent2"/>
+          </a:effectRef>
+          <a:fontRef idx="minor">
+            <a:schemeClr val="dk1"/>
+          </a:fontRef>
+        </p:style>
+        <p:txBody>
+          <a:bodyPr rtlCol="0" anchor="ctr"/>
+          <a:lstStyle/>
+          <a:p>
+            <a:pPr algn="ctr"/>
+            <a:endParaRPr lang="en-US"/>
+          </a:p>
+        </p:txBody>
+      </p:sp>
+    </p:spTree>
+    <p:extLst>
+      <p:ext uri="{BB962C8B-B14F-4D97-AF65-F5344CB8AC3E}">
+        <p14:creationId xmlns:p14="http://schemas.microsoft.com/office/powerpoint/2010/main" val="1348557365"/>
+      </p:ext>
+    </p:extLst>
+  </p:cSld>
+  <p:clrMapOvr>
+    <a:masterClrMapping/>
+  </p:clrMapOvr>
+</p:sld>
+</file>
+
+<file path=ppt/slides/slide48.xml><?xml version="1.0" encoding="utf-8"?>
+<p:sld xmlns:a="http://schemas.openxmlformats.org/drawingml/2006/main" xmlns:r="http://schemas.openxmlformats.org/officeDocument/2006/relationships" xmlns:p="http://schemas.openxmlformats.org/presentationml/2006/main">
+  <p:cSld>
+    <p:spTree>
+      <p:nvGrpSpPr>
+        <p:cNvPr id="1" name=""/>
+        <p:cNvGrpSpPr/>
+        <p:nvPr/>
+      </p:nvGrpSpPr>
+      <p:grpSpPr>
+        <a:xfrm>
+          <a:off x="0" y="0"/>
+          <a:ext cx="0" cy="0"/>
+          <a:chOff x="0" y="0"/>
+          <a:chExt cx="0" cy="0"/>
+        </a:xfrm>
+      </p:grpSpPr>
+      <p:pic>
+        <p:nvPicPr>
+          <p:cNvPr id="2050" name="Picture 2"/>
+          <p:cNvPicPr>
+            <a:picLocks noChangeAspect="1" noChangeArrowheads="1"/>
+          </p:cNvPicPr>
+          <p:nvPr/>
+        </p:nvPicPr>
+        <p:blipFill>
+          <a:blip r:embed="rId3">
+            <a:extLst>
+              <a:ext uri="{28A0092B-C50C-407E-A947-70E740481C1C}">
+                <a14:useLocalDpi xmlns:a14="http://schemas.microsoft.com/office/drawing/2010/main" val="0"/>
+              </a:ext>
+            </a:extLst>
+          </a:blip>
+          <a:srcRect/>
+          <a:stretch>
+            <a:fillRect/>
+          </a:stretch>
+        </p:blipFill>
+        <p:spPr bwMode="auto">
+          <a:xfrm>
+            <a:off x="1409700" y="1599406"/>
+            <a:ext cx="6324600" cy="4133850"/>
+          </a:xfrm>
+          <a:prstGeom prst="rect">
+            <a:avLst/>
+          </a:prstGeom>
+          <a:noFill/>
+          <a:ln>
+            <a:noFill/>
+          </a:ln>
+          <a:extLst>
+            <a:ext uri="{909E8E84-426E-40DD-AFC4-6F175D3DCCD1}">
+              <a14:hiddenFill xmlns:a14="http://schemas.microsoft.com/office/drawing/2010/main">
+                <a:solidFill>
+                  <a:schemeClr val="accent1"/>
+                </a:solidFill>
+              </a14:hiddenFill>
+            </a:ext>
+            <a:ext uri="{91240B29-F687-4F45-9708-019B960494DF}">
+              <a14:hiddenLine xmlns:a14="http://schemas.microsoft.com/office/drawing/2010/main" w="9525">
+                <a:solidFill>
+                  <a:schemeClr val="tx1"/>
+                </a:solidFill>
+                <a:miter lim="800000"/>
+                <a:headEnd/>
+                <a:tailEnd/>
+              </a14:hiddenLine>
+            </a:ext>
+          </a:extLst>
+        </p:spPr>
+      </p:pic>
+      <p:sp>
+        <p:nvSpPr>
+          <p:cNvPr id="5" name="4 Rectángulo"/>
+          <p:cNvSpPr/>
+          <p:nvPr/>
+        </p:nvSpPr>
+        <p:spPr>
+          <a:xfrm>
+            <a:off x="323528" y="1412776"/>
+            <a:ext cx="8496944" cy="4536504"/>
+          </a:xfrm>
+          <a:prstGeom prst="rect">
+            <a:avLst/>
+          </a:prstGeom>
+          <a:noFill/>
+        </p:spPr>
+        <p:style>
+          <a:lnRef idx="2">
+            <a:schemeClr val="accent2"/>
+          </a:lnRef>
+          <a:fillRef idx="1">
+            <a:schemeClr val="lt1"/>
+          </a:fillRef>
+          <a:effectRef idx="0">
+            <a:schemeClr val="accent2"/>
+          </a:effectRef>
+          <a:fontRef idx="minor">
+            <a:schemeClr val="dk1"/>
+          </a:fontRef>
+        </p:style>
+        <p:txBody>
+          <a:bodyPr rtlCol="0" anchor="ctr"/>
+          <a:lstStyle/>
+          <a:p>
+            <a:pPr algn="ctr"/>
+            <a:endParaRPr lang="en-US"/>
+          </a:p>
+        </p:txBody>
+      </p:sp>
+      <p:sp>
+        <p:nvSpPr>
+          <p:cNvPr id="4" name="3 Título"/>
+          <p:cNvSpPr>
+            <a:spLocks noGrp="1"/>
+          </p:cNvSpPr>
+          <p:nvPr>
+            <p:ph type="title"/>
+          </p:nvPr>
+        </p:nvSpPr>
+        <p:spPr/>
+        <p:txBody>
+          <a:bodyPr/>
+          <a:lstStyle/>
+          <a:p>
+            <a:r>
+              <a:rPr lang="en-US" dirty="0" smtClean="0"/>
+              <a:t>Unit test coverage report</a:t>
+            </a:r>
+            <a:endParaRPr lang="en-US" dirty="0"/>
+          </a:p>
+        </p:txBody>
+      </p:sp>
+    </p:spTree>
+    <p:extLst>
+      <p:ext uri="{BB962C8B-B14F-4D97-AF65-F5344CB8AC3E}">
+        <p14:creationId xmlns:p14="http://schemas.microsoft.com/office/powerpoint/2010/main" val="2415164389"/>
+      </p:ext>
+    </p:extLst>
+  </p:cSld>
+  <p:clrMapOvr>
+    <a:masterClrMapping/>
+  </p:clrMapOvr>
+</p:sld>
+</file>
+
+<file path=ppt/slides/slide49.xml><?xml version="1.0" encoding="utf-8"?>
+<p:sld xmlns:a="http://schemas.openxmlformats.org/drawingml/2006/main" xmlns:r="http://schemas.openxmlformats.org/officeDocument/2006/relationships" xmlns:p="http://schemas.openxmlformats.org/presentationml/2006/main">
+  <p:cSld>
+    <p:spTree>
+      <p:nvGrpSpPr>
+        <p:cNvPr id="1" name=""/>
+        <p:cNvGrpSpPr/>
+        <p:nvPr/>
+      </p:nvGrpSpPr>
+      <p:grpSpPr>
+        <a:xfrm>
+          <a:off x="0" y="0"/>
+          <a:ext cx="0" cy="0"/>
+          <a:chOff x="0" y="0"/>
+          <a:chExt cx="0" cy="0"/>
+        </a:xfrm>
+      </p:grpSpPr>
+      <p:sp>
+        <p:nvSpPr>
+          <p:cNvPr id="2" name="1 Título"/>
+          <p:cNvSpPr>
+            <a:spLocks noGrp="1"/>
+          </p:cNvSpPr>
+          <p:nvPr>
+            <p:ph type="title"/>
+          </p:nvPr>
+        </p:nvSpPr>
+        <p:spPr/>
+        <p:txBody>
           <a:bodyPr vert="horz" lIns="91440" tIns="45720" rIns="91440" bIns="45720" rtlCol="0" anchor="ctr">
             <a:normAutofit/>
             <a:scene3d>
@@ -39908,12 +43870,36 @@
               <a:buAutoNum type="alphaLcParenR"/>
             </a:pPr>
             <a:r>
+              <a:rPr lang="en-US" dirty="0" smtClean="0"/>
+              <a:t>Set up karma coverage.</a:t>
+            </a:r>
+          </a:p>
+          <a:p>
+            <a:pPr marL="514350" indent="-514350">
+              <a:buFont typeface="+mj-lt"/>
+              <a:buAutoNum type="alphaLcParenR"/>
+            </a:pPr>
+            <a:r>
+              <a:rPr lang="en-US" dirty="0" smtClean="0"/>
+              <a:t>Test a Service.</a:t>
+            </a:r>
+          </a:p>
+          <a:p>
+            <a:pPr marL="514350" indent="-514350">
+              <a:buFont typeface="+mj-lt"/>
+              <a:buAutoNum type="alphaLcParenR"/>
+            </a:pPr>
+            <a:r>
               <a:rPr lang="en-US" dirty="0"/>
               <a:t>T</a:t>
             </a:r>
             <a:r>
               <a:rPr lang="en-US" dirty="0" smtClean="0"/>
-              <a:t>est a Service</a:t>
+              <a:t>est a Controller</a:t>
+            </a:r>
+            <a:r>
+              <a:rPr lang="en-US" dirty="0" smtClean="0"/>
+              <a:t>.</a:t>
             </a:r>
           </a:p>
           <a:p>
@@ -39922,23 +43908,10 @@
               <a:buAutoNum type="alphaLcParenR"/>
             </a:pPr>
             <a:r>
-              <a:rPr lang="en-US" dirty="0"/>
-              <a:t>T</a:t>
-            </a:r>
-            <a:r>
-              <a:rPr lang="en-US" dirty="0" smtClean="0"/>
-              <a:t>est a Controller</a:t>
-            </a:r>
-          </a:p>
-          <a:p>
-            <a:pPr marL="514350" indent="-514350">
-              <a:buFont typeface="+mj-lt"/>
-              <a:buAutoNum type="alphaLcParenR"/>
-            </a:pPr>
-            <a:r>
-              <a:rPr lang="en-US" dirty="0" smtClean="0"/>
-              <a:t>Test a directive using a mock</a:t>
-            </a:r>
+              <a:rPr lang="en-US" dirty="0" smtClean="0"/>
+              <a:t>Test a directive.</a:t>
+            </a:r>
+            <a:endParaRPr lang="en-US" dirty="0" smtClean="0"/>
           </a:p>
         </p:txBody>
       </p:sp>
@@ -39955,7 +43928,336 @@
 </p:sld>
 </file>
 
-<file path=ppt/slides/slide48.xml><?xml version="1.0" encoding="utf-8"?>
+<file path=ppt/slides/slide5.xml><?xml version="1.0" encoding="utf-8"?>
+<p:sld xmlns:a="http://schemas.openxmlformats.org/drawingml/2006/main" xmlns:r="http://schemas.openxmlformats.org/officeDocument/2006/relationships" xmlns:p="http://schemas.openxmlformats.org/presentationml/2006/main">
+  <p:cSld>
+    <p:spTree>
+      <p:nvGrpSpPr>
+        <p:cNvPr id="1" name=""/>
+        <p:cNvGrpSpPr/>
+        <p:nvPr/>
+      </p:nvGrpSpPr>
+      <p:grpSpPr>
+        <a:xfrm>
+          <a:off x="0" y="0"/>
+          <a:ext cx="0" cy="0"/>
+          <a:chOff x="0" y="0"/>
+          <a:chExt cx="0" cy="0"/>
+        </a:xfrm>
+      </p:grpSpPr>
+      <p:sp>
+        <p:nvSpPr>
+          <p:cNvPr id="2" name="1 Título"/>
+          <p:cNvSpPr>
+            <a:spLocks noGrp="1"/>
+          </p:cNvSpPr>
+          <p:nvPr>
+            <p:ph type="title"/>
+          </p:nvPr>
+        </p:nvSpPr>
+        <p:spPr/>
+        <p:txBody>
+          <a:bodyPr/>
+          <a:lstStyle/>
+          <a:p>
+            <a:r>
+              <a:rPr lang="es-ES" dirty="0" smtClean="0"/>
+              <a:t>Data </a:t>
+            </a:r>
+            <a:r>
+              <a:rPr lang="es-ES" dirty="0" err="1" smtClean="0"/>
+              <a:t>binding</a:t>
+            </a:r>
+            <a:endParaRPr lang="en-US" dirty="0"/>
+          </a:p>
+        </p:txBody>
+      </p:sp>
+      <p:sp>
+        <p:nvSpPr>
+          <p:cNvPr id="3" name="2 Marcador de contenido"/>
+          <p:cNvSpPr>
+            <a:spLocks noGrp="1"/>
+          </p:cNvSpPr>
+          <p:nvPr>
+            <p:ph idx="1"/>
+          </p:nvPr>
+        </p:nvSpPr>
+        <p:spPr/>
+        <p:txBody>
+          <a:bodyPr>
+            <a:normAutofit/>
+          </a:bodyPr>
+          <a:lstStyle/>
+          <a:p>
+            <a:pPr marL="0" indent="0">
+              <a:buNone/>
+            </a:pPr>
+            <a:r>
+              <a:rPr lang="en-US" sz="1600" dirty="0" smtClean="0"/>
+              <a:t>&lt;html  </a:t>
+            </a:r>
+            <a:r>
+              <a:rPr lang="en-US" sz="1800" dirty="0" err="1" smtClean="0">
+                <a:solidFill>
+                  <a:schemeClr val="accent2"/>
+                </a:solidFill>
+              </a:rPr>
+              <a:t>ng</a:t>
+            </a:r>
+            <a:r>
+              <a:rPr lang="en-US" sz="1800" dirty="0" smtClean="0">
+                <a:solidFill>
+                  <a:schemeClr val="accent2"/>
+                </a:solidFill>
+              </a:rPr>
+              <a:t>-app=“</a:t>
+            </a:r>
+            <a:r>
+              <a:rPr lang="en-US" sz="1800" dirty="0" err="1" smtClean="0">
+                <a:solidFill>
+                  <a:schemeClr val="accent2"/>
+                </a:solidFill>
+              </a:rPr>
+              <a:t>myApp</a:t>
+            </a:r>
+            <a:r>
+              <a:rPr lang="en-US" sz="1800" dirty="0" smtClean="0">
+                <a:solidFill>
+                  <a:schemeClr val="accent2"/>
+                </a:solidFill>
+              </a:rPr>
+              <a:t>"</a:t>
+            </a:r>
+            <a:r>
+              <a:rPr lang="en-US" sz="1600" dirty="0" smtClean="0"/>
+              <a:t>&gt;</a:t>
+            </a:r>
+          </a:p>
+          <a:p>
+            <a:pPr marL="0" indent="0">
+              <a:buNone/>
+            </a:pPr>
+            <a:r>
+              <a:rPr lang="en-US" sz="1600" dirty="0" smtClean="0"/>
+              <a:t>    &lt;head&gt;</a:t>
+            </a:r>
+          </a:p>
+          <a:p>
+            <a:pPr marL="0" indent="0">
+              <a:buNone/>
+            </a:pPr>
+            <a:r>
+              <a:rPr lang="en-US" sz="1600" dirty="0" smtClean="0"/>
+              <a:t>        &lt;title&gt;</a:t>
+            </a:r>
+            <a:r>
+              <a:rPr lang="en-US" sz="1600" dirty="0" err="1" smtClean="0"/>
+              <a:t>AngularJS</a:t>
+            </a:r>
+            <a:r>
+              <a:rPr lang="en-US" sz="1600" dirty="0" smtClean="0"/>
+              <a:t> Test&lt;/title&gt;</a:t>
+            </a:r>
+          </a:p>
+          <a:p>
+            <a:pPr marL="0" indent="0">
+              <a:buNone/>
+            </a:pPr>
+            <a:r>
+              <a:rPr lang="en-US" sz="1600" dirty="0" smtClean="0"/>
+              <a:t>        &lt;meta http-</a:t>
+            </a:r>
+            <a:r>
+              <a:rPr lang="en-US" sz="1600" dirty="0" err="1" smtClean="0"/>
+              <a:t>equiv</a:t>
+            </a:r>
+            <a:r>
+              <a:rPr lang="en-US" sz="1600" dirty="0" smtClean="0"/>
+              <a:t>="Content-Type" content="text/html; charset=UTF-8"&gt;</a:t>
+            </a:r>
+          </a:p>
+          <a:p>
+            <a:pPr marL="0" indent="0">
+              <a:buNone/>
+            </a:pPr>
+            <a:r>
+              <a:rPr lang="en-US" sz="1600" dirty="0" smtClean="0"/>
+              <a:t>    &lt;/head&gt;</a:t>
+            </a:r>
+          </a:p>
+          <a:p>
+            <a:pPr marL="0" indent="0">
+              <a:buNone/>
+            </a:pPr>
+            <a:r>
+              <a:rPr lang="en-US" sz="1600" dirty="0" smtClean="0"/>
+              <a:t>    &lt;body&gt;</a:t>
+            </a:r>
+          </a:p>
+          <a:p>
+            <a:pPr marL="0" indent="0">
+              <a:buNone/>
+            </a:pPr>
+            <a:r>
+              <a:rPr lang="en-US" sz="1600" dirty="0" smtClean="0"/>
+              <a:t>        &lt;input type=“text”</a:t>
+            </a:r>
+            <a:r>
+              <a:rPr lang="en-US" sz="1800" dirty="0" smtClean="0">
+                <a:solidFill>
+                  <a:schemeClr val="accent2"/>
+                </a:solidFill>
+              </a:rPr>
+              <a:t> </a:t>
+            </a:r>
+            <a:r>
+              <a:rPr lang="en-US" sz="1800" dirty="0" err="1" smtClean="0">
+                <a:solidFill>
+                  <a:schemeClr val="accent2"/>
+                </a:solidFill>
+              </a:rPr>
+              <a:t>ng</a:t>
+            </a:r>
+            <a:r>
+              <a:rPr lang="en-US" sz="1800" dirty="0" smtClean="0">
+                <a:solidFill>
+                  <a:schemeClr val="accent2"/>
+                </a:solidFill>
+              </a:rPr>
+              <a:t>-model=“model1”</a:t>
+            </a:r>
+            <a:r>
+              <a:rPr lang="en-US" sz="1600" dirty="0" smtClean="0"/>
+              <a:t>&gt;</a:t>
+            </a:r>
+          </a:p>
+          <a:p>
+            <a:pPr marL="0" indent="0">
+              <a:buNone/>
+            </a:pPr>
+            <a:r>
+              <a:rPr lang="en-US" sz="1600" dirty="0" smtClean="0"/>
+              <a:t>        &lt;</a:t>
+            </a:r>
+            <a:r>
+              <a:rPr lang="en-US" sz="1600" dirty="0" err="1" smtClean="0"/>
+              <a:t>br</a:t>
+            </a:r>
+            <a:r>
+              <a:rPr lang="en-US" sz="1600" dirty="0" smtClean="0"/>
+              <a:t>&gt;</a:t>
+            </a:r>
+          </a:p>
+          <a:p>
+            <a:pPr marL="0" indent="0">
+              <a:buNone/>
+            </a:pPr>
+            <a:r>
+              <a:rPr lang="en-US" sz="1600" dirty="0" smtClean="0"/>
+              <a:t>        &lt;div&gt;</a:t>
+            </a:r>
+            <a:r>
+              <a:rPr lang="en-US" sz="1800" dirty="0" smtClean="0">
+                <a:solidFill>
+                  <a:schemeClr val="accent2"/>
+                </a:solidFill>
+              </a:rPr>
+              <a:t>{{variable1}}</a:t>
+            </a:r>
+            <a:r>
+              <a:rPr lang="en-US" sz="1600" dirty="0" smtClean="0"/>
+              <a:t>&lt;/div&gt;</a:t>
+            </a:r>
+          </a:p>
+          <a:p>
+            <a:pPr marL="0" indent="0">
+              <a:buNone/>
+            </a:pPr>
+            <a:r>
+              <a:rPr lang="en-US" sz="1600" dirty="0" smtClean="0"/>
+              <a:t>    &lt;/body&gt;</a:t>
+            </a:r>
+          </a:p>
+          <a:p>
+            <a:pPr marL="0" indent="0">
+              <a:buNone/>
+            </a:pPr>
+            <a:r>
+              <a:rPr lang="en-US" sz="1600" dirty="0" smtClean="0"/>
+              <a:t>&lt;/html&gt;</a:t>
+            </a:r>
+            <a:endParaRPr lang="es-MX" sz="1600" dirty="0" smtClean="0"/>
+          </a:p>
+          <a:p>
+            <a:pPr marL="0" indent="0">
+              <a:buNone/>
+            </a:pPr>
+            <a:endParaRPr lang="en-US" sz="1600" dirty="0"/>
+          </a:p>
+        </p:txBody>
+      </p:sp>
+      <p:pic>
+        <p:nvPicPr>
+          <p:cNvPr id="1026" name="Picture 2" descr="https://docs.angularjs.org/img/guide/concepts-runtime.png"/>
+          <p:cNvPicPr>
+            <a:picLocks noChangeAspect="1" noChangeArrowheads="1"/>
+          </p:cNvPicPr>
+          <p:nvPr/>
+        </p:nvPicPr>
+        <p:blipFill>
+          <a:blip r:embed="rId3">
+            <a:extLst>
+              <a:ext uri="{28A0092B-C50C-407E-A947-70E740481C1C}">
+                <a14:useLocalDpi xmlns:a14="http://schemas.microsoft.com/office/drawing/2010/main" val="0"/>
+              </a:ext>
+            </a:extLst>
+          </a:blip>
+          <a:srcRect/>
+          <a:stretch>
+            <a:fillRect/>
+          </a:stretch>
+        </p:blipFill>
+        <p:spPr bwMode="auto">
+          <a:xfrm>
+            <a:off x="4644008" y="3124002"/>
+            <a:ext cx="4091095" cy="3135758"/>
+          </a:xfrm>
+          <a:prstGeom prst="rect">
+            <a:avLst/>
+          </a:prstGeom>
+          <a:noFill/>
+          <a:extLst>
+            <a:ext uri="{909E8E84-426E-40DD-AFC4-6F175D3DCCD1}">
+              <a14:hiddenFill xmlns:a14="http://schemas.microsoft.com/office/drawing/2010/main">
+                <a:solidFill>
+                  <a:srgbClr val="FFFFFF"/>
+                </a:solidFill>
+              </a14:hiddenFill>
+            </a:ext>
+          </a:extLst>
+        </p:spPr>
+      </p:pic>
+    </p:spTree>
+    <p:extLst>
+      <p:ext uri="{BB962C8B-B14F-4D97-AF65-F5344CB8AC3E}">
+        <p14:creationId xmlns:p14="http://schemas.microsoft.com/office/powerpoint/2010/main" val="2022323590"/>
+      </p:ext>
+    </p:extLst>
+  </p:cSld>
+  <p:clrMapOvr>
+    <a:masterClrMapping/>
+  </p:clrMapOvr>
+  <p:timing>
+    <p:tnLst>
+      <p:par>
+        <p:cTn id="1" dur="indefinite" restart="never" nodeType="tmRoot"/>
+      </p:par>
+    </p:tnLst>
+  </p:timing>
+</p:sld>
+</file>
+
+<file path=ppt/slides/slide50.xml><?xml version="1.0" encoding="utf-8"?>
 <p:sld xmlns:a="http://schemas.openxmlformats.org/drawingml/2006/main" xmlns:r="http://schemas.openxmlformats.org/officeDocument/2006/relationships" xmlns:p="http://schemas.openxmlformats.org/presentationml/2006/main">
   <p:cSld>
     <p:spTree>
@@ -40565,335 +44867,6 @@
   <p:clrMapOvr>
     <a:masterClrMapping/>
   </p:clrMapOvr>
-</p:sld>
-</file>
-
-<file path=ppt/slides/slide5.xml><?xml version="1.0" encoding="utf-8"?>
-<p:sld xmlns:a="http://schemas.openxmlformats.org/drawingml/2006/main" xmlns:r="http://schemas.openxmlformats.org/officeDocument/2006/relationships" xmlns:p="http://schemas.openxmlformats.org/presentationml/2006/main">
-  <p:cSld>
-    <p:spTree>
-      <p:nvGrpSpPr>
-        <p:cNvPr id="1" name=""/>
-        <p:cNvGrpSpPr/>
-        <p:nvPr/>
-      </p:nvGrpSpPr>
-      <p:grpSpPr>
-        <a:xfrm>
-          <a:off x="0" y="0"/>
-          <a:ext cx="0" cy="0"/>
-          <a:chOff x="0" y="0"/>
-          <a:chExt cx="0" cy="0"/>
-        </a:xfrm>
-      </p:grpSpPr>
-      <p:sp>
-        <p:nvSpPr>
-          <p:cNvPr id="2" name="1 Título"/>
-          <p:cNvSpPr>
-            <a:spLocks noGrp="1"/>
-          </p:cNvSpPr>
-          <p:nvPr>
-            <p:ph type="title"/>
-          </p:nvPr>
-        </p:nvSpPr>
-        <p:spPr/>
-        <p:txBody>
-          <a:bodyPr/>
-          <a:lstStyle/>
-          <a:p>
-            <a:r>
-              <a:rPr lang="es-ES" dirty="0" smtClean="0"/>
-              <a:t>Data </a:t>
-            </a:r>
-            <a:r>
-              <a:rPr lang="es-ES" dirty="0" err="1" smtClean="0"/>
-              <a:t>binding</a:t>
-            </a:r>
-            <a:endParaRPr lang="en-US" dirty="0"/>
-          </a:p>
-        </p:txBody>
-      </p:sp>
-      <p:sp>
-        <p:nvSpPr>
-          <p:cNvPr id="3" name="2 Marcador de contenido"/>
-          <p:cNvSpPr>
-            <a:spLocks noGrp="1"/>
-          </p:cNvSpPr>
-          <p:nvPr>
-            <p:ph idx="1"/>
-          </p:nvPr>
-        </p:nvSpPr>
-        <p:spPr/>
-        <p:txBody>
-          <a:bodyPr>
-            <a:normAutofit/>
-          </a:bodyPr>
-          <a:lstStyle/>
-          <a:p>
-            <a:pPr marL="0" indent="0">
-              <a:buNone/>
-            </a:pPr>
-            <a:r>
-              <a:rPr lang="en-US" sz="1600" dirty="0" smtClean="0"/>
-              <a:t>&lt;html  </a:t>
-            </a:r>
-            <a:r>
-              <a:rPr lang="en-US" sz="1800" dirty="0" err="1" smtClean="0">
-                <a:solidFill>
-                  <a:schemeClr val="accent2"/>
-                </a:solidFill>
-              </a:rPr>
-              <a:t>ng</a:t>
-            </a:r>
-            <a:r>
-              <a:rPr lang="en-US" sz="1800" dirty="0" smtClean="0">
-                <a:solidFill>
-                  <a:schemeClr val="accent2"/>
-                </a:solidFill>
-              </a:rPr>
-              <a:t>-app=“</a:t>
-            </a:r>
-            <a:r>
-              <a:rPr lang="en-US" sz="1800" dirty="0" err="1" smtClean="0">
-                <a:solidFill>
-                  <a:schemeClr val="accent2"/>
-                </a:solidFill>
-              </a:rPr>
-              <a:t>myApp</a:t>
-            </a:r>
-            <a:r>
-              <a:rPr lang="en-US" sz="1800" dirty="0" smtClean="0">
-                <a:solidFill>
-                  <a:schemeClr val="accent2"/>
-                </a:solidFill>
-              </a:rPr>
-              <a:t>"</a:t>
-            </a:r>
-            <a:r>
-              <a:rPr lang="en-US" sz="1600" dirty="0" smtClean="0"/>
-              <a:t>&gt;</a:t>
-            </a:r>
-          </a:p>
-          <a:p>
-            <a:pPr marL="0" indent="0">
-              <a:buNone/>
-            </a:pPr>
-            <a:r>
-              <a:rPr lang="en-US" sz="1600" dirty="0" smtClean="0"/>
-              <a:t>    &lt;head&gt;</a:t>
-            </a:r>
-          </a:p>
-          <a:p>
-            <a:pPr marL="0" indent="0">
-              <a:buNone/>
-            </a:pPr>
-            <a:r>
-              <a:rPr lang="en-US" sz="1600" dirty="0" smtClean="0"/>
-              <a:t>        &lt;title&gt;</a:t>
-            </a:r>
-            <a:r>
-              <a:rPr lang="en-US" sz="1600" dirty="0" err="1" smtClean="0"/>
-              <a:t>AngularJS</a:t>
-            </a:r>
-            <a:r>
-              <a:rPr lang="en-US" sz="1600" dirty="0" smtClean="0"/>
-              <a:t> Test&lt;/title&gt;</a:t>
-            </a:r>
-          </a:p>
-          <a:p>
-            <a:pPr marL="0" indent="0">
-              <a:buNone/>
-            </a:pPr>
-            <a:r>
-              <a:rPr lang="en-US" sz="1600" dirty="0" smtClean="0"/>
-              <a:t>        &lt;meta http-</a:t>
-            </a:r>
-            <a:r>
-              <a:rPr lang="en-US" sz="1600" dirty="0" err="1" smtClean="0"/>
-              <a:t>equiv</a:t>
-            </a:r>
-            <a:r>
-              <a:rPr lang="en-US" sz="1600" dirty="0" smtClean="0"/>
-              <a:t>="Content-Type" content="text/html; charset=UTF-8"&gt;</a:t>
-            </a:r>
-          </a:p>
-          <a:p>
-            <a:pPr marL="0" indent="0">
-              <a:buNone/>
-            </a:pPr>
-            <a:r>
-              <a:rPr lang="en-US" sz="1600" dirty="0" smtClean="0"/>
-              <a:t>    &lt;/head&gt;</a:t>
-            </a:r>
-          </a:p>
-          <a:p>
-            <a:pPr marL="0" indent="0">
-              <a:buNone/>
-            </a:pPr>
-            <a:r>
-              <a:rPr lang="en-US" sz="1600" dirty="0" smtClean="0"/>
-              <a:t>    &lt;body&gt;</a:t>
-            </a:r>
-          </a:p>
-          <a:p>
-            <a:pPr marL="0" indent="0">
-              <a:buNone/>
-            </a:pPr>
-            <a:r>
-              <a:rPr lang="en-US" sz="1600" dirty="0" smtClean="0"/>
-              <a:t>        &lt;input type=“text”</a:t>
-            </a:r>
-            <a:r>
-              <a:rPr lang="en-US" sz="1800" dirty="0" smtClean="0">
-                <a:solidFill>
-                  <a:schemeClr val="accent2"/>
-                </a:solidFill>
-              </a:rPr>
-              <a:t> </a:t>
-            </a:r>
-            <a:r>
-              <a:rPr lang="en-US" sz="1800" dirty="0" err="1" smtClean="0">
-                <a:solidFill>
-                  <a:schemeClr val="accent2"/>
-                </a:solidFill>
-              </a:rPr>
-              <a:t>ng</a:t>
-            </a:r>
-            <a:r>
-              <a:rPr lang="en-US" sz="1800" dirty="0" smtClean="0">
-                <a:solidFill>
-                  <a:schemeClr val="accent2"/>
-                </a:solidFill>
-              </a:rPr>
-              <a:t>-model=“model1”</a:t>
-            </a:r>
-            <a:r>
-              <a:rPr lang="en-US" sz="1600" dirty="0" smtClean="0"/>
-              <a:t>&gt;</a:t>
-            </a:r>
-          </a:p>
-          <a:p>
-            <a:pPr marL="0" indent="0">
-              <a:buNone/>
-            </a:pPr>
-            <a:r>
-              <a:rPr lang="en-US" sz="1600" dirty="0" smtClean="0"/>
-              <a:t>        &lt;</a:t>
-            </a:r>
-            <a:r>
-              <a:rPr lang="en-US" sz="1600" dirty="0" err="1" smtClean="0"/>
-              <a:t>br</a:t>
-            </a:r>
-            <a:r>
-              <a:rPr lang="en-US" sz="1600" dirty="0" smtClean="0"/>
-              <a:t>&gt;</a:t>
-            </a:r>
-          </a:p>
-          <a:p>
-            <a:pPr marL="0" indent="0">
-              <a:buNone/>
-            </a:pPr>
-            <a:r>
-              <a:rPr lang="en-US" sz="1600" dirty="0" smtClean="0"/>
-              <a:t>        &lt;div&gt;</a:t>
-            </a:r>
-            <a:r>
-              <a:rPr lang="en-US" sz="1800" dirty="0" smtClean="0">
-                <a:solidFill>
-                  <a:schemeClr val="accent2"/>
-                </a:solidFill>
-              </a:rPr>
-              <a:t>{{variable1}}</a:t>
-            </a:r>
-            <a:r>
-              <a:rPr lang="en-US" sz="1600" dirty="0" smtClean="0"/>
-              <a:t>&lt;/div&gt;</a:t>
-            </a:r>
-          </a:p>
-          <a:p>
-            <a:pPr marL="0" indent="0">
-              <a:buNone/>
-            </a:pPr>
-            <a:r>
-              <a:rPr lang="en-US" sz="1600" dirty="0" smtClean="0"/>
-              <a:t>    &lt;/body&gt;</a:t>
-            </a:r>
-          </a:p>
-          <a:p>
-            <a:pPr marL="0" indent="0">
-              <a:buNone/>
-            </a:pPr>
-            <a:r>
-              <a:rPr lang="en-US" sz="1600" dirty="0" smtClean="0"/>
-              <a:t>&lt;/html&gt;</a:t>
-            </a:r>
-            <a:endParaRPr lang="es-MX" sz="1600" dirty="0" smtClean="0"/>
-          </a:p>
-          <a:p>
-            <a:pPr marL="0" indent="0">
-              <a:buNone/>
-            </a:pPr>
-            <a:endParaRPr lang="en-US" sz="1600" dirty="0"/>
-          </a:p>
-        </p:txBody>
-      </p:sp>
-      <p:pic>
-        <p:nvPicPr>
-          <p:cNvPr id="1026" name="Picture 2" descr="https://docs.angularjs.org/img/guide/concepts-runtime.png"/>
-          <p:cNvPicPr>
-            <a:picLocks noChangeAspect="1" noChangeArrowheads="1"/>
-          </p:cNvPicPr>
-          <p:nvPr/>
-        </p:nvPicPr>
-        <p:blipFill>
-          <a:blip r:embed="rId3">
-            <a:extLst>
-              <a:ext uri="{28A0092B-C50C-407E-A947-70E740481C1C}">
-                <a14:useLocalDpi xmlns:a14="http://schemas.microsoft.com/office/drawing/2010/main" val="0"/>
-              </a:ext>
-            </a:extLst>
-          </a:blip>
-          <a:srcRect/>
-          <a:stretch>
-            <a:fillRect/>
-          </a:stretch>
-        </p:blipFill>
-        <p:spPr bwMode="auto">
-          <a:xfrm>
-            <a:off x="4644008" y="3124002"/>
-            <a:ext cx="4091095" cy="3135758"/>
-          </a:xfrm>
-          <a:prstGeom prst="rect">
-            <a:avLst/>
-          </a:prstGeom>
-          <a:noFill/>
-          <a:extLst>
-            <a:ext uri="{909E8E84-426E-40DD-AFC4-6F175D3DCCD1}">
-              <a14:hiddenFill xmlns:a14="http://schemas.microsoft.com/office/drawing/2010/main">
-                <a:solidFill>
-                  <a:srgbClr val="FFFFFF"/>
-                </a:solidFill>
-              </a14:hiddenFill>
-            </a:ext>
-          </a:extLst>
-        </p:spPr>
-      </p:pic>
-    </p:spTree>
-    <p:extLst>
-      <p:ext uri="{BB962C8B-B14F-4D97-AF65-F5344CB8AC3E}">
-        <p14:creationId xmlns:p14="http://schemas.microsoft.com/office/powerpoint/2010/main" val="2022323590"/>
-      </p:ext>
-    </p:extLst>
-  </p:cSld>
-  <p:clrMapOvr>
-    <a:masterClrMapping/>
-  </p:clrMapOvr>
-  <p:timing>
-    <p:tnLst>
-      <p:par>
-        <p:cTn id="1" dur="indefinite" restart="never" nodeType="tmRoot"/>
-      </p:par>
-    </p:tnLst>
-  </p:timing>
 </p:sld>
 </file>
 

</xml_diff>